<commit_message>
Agrego Slides de métodos
</commit_message>
<xml_diff>
--- a/results/PCA_presentacion.pptx
+++ b/results/PCA_presentacion.pptx
@@ -220,7 +220,7 @@
           <a:p>
             <a:fld id="{395C63AC-4902-F448-A1B5-F71A761D9957}" type="datetimeFigureOut">
               <a:rPr lang="es-ES_tradnl" smtClean="0"/>
-              <a:t>28/5/20</a:t>
+              <a:t>29/05/2020</a:t>
             </a:fld>
             <a:endParaRPr lang="es-ES_tradnl"/>
           </a:p>
@@ -284,35 +284,35 @@
           <a:p>
             <a:pPr lvl="0"/>
             <a:r>
-              <a:rPr lang="en-US" smtClean="0"/>
+              <a:rPr lang="en-US"/>
               <a:t>Click to edit Master text styles</a:t>
             </a:r>
           </a:p>
           <a:p>
             <a:pPr lvl="1"/>
             <a:r>
-              <a:rPr lang="en-US" smtClean="0"/>
+              <a:rPr lang="en-US"/>
               <a:t>Second level</a:t>
             </a:r>
           </a:p>
           <a:p>
             <a:pPr lvl="2"/>
             <a:r>
-              <a:rPr lang="en-US" smtClean="0"/>
+              <a:rPr lang="en-US"/>
               <a:t>Third level</a:t>
             </a:r>
           </a:p>
           <a:p>
             <a:pPr lvl="3"/>
             <a:r>
-              <a:rPr lang="en-US" smtClean="0"/>
+              <a:rPr lang="en-US"/>
               <a:t>Fourth level</a:t>
             </a:r>
           </a:p>
           <a:p>
             <a:pPr lvl="4"/>
             <a:r>
-              <a:rPr lang="en-US" smtClean="0"/>
+              <a:rPr lang="en-US"/>
               <a:t>Fifth level</a:t>
             </a:r>
             <a:endParaRPr lang="es-ES_tradnl"/>
@@ -379,7 +379,7 @@
           <a:p>
             <a:fld id="{2DDB4F98-9E2F-4642-AD0A-52F13A28866B}" type="slidenum">
               <a:rPr lang="es-ES_tradnl" smtClean="0"/>
-              <a:t>‹#›</a:t>
+              <a:t>‹Nº›</a:t>
             </a:fld>
             <a:endParaRPr lang="es-ES_tradnl"/>
           </a:p>
@@ -894,7 +894,7 @@
           </a:lstStyle>
           <a:p>
             <a:r>
-              <a:rPr lang="en-US" smtClean="0"/>
+              <a:rPr lang="en-US"/>
               <a:t>Click to edit Master title style</a:t>
             </a:r>
             <a:endParaRPr lang="en-US" dirty="0"/>
@@ -965,7 +965,7 @@
           </a:lstStyle>
           <a:p>
             <a:r>
-              <a:rPr lang="en-US" smtClean="0"/>
+              <a:rPr lang="en-US"/>
               <a:t>Click to edit Master subtitle style</a:t>
             </a:r>
             <a:endParaRPr lang="en-US" dirty="0"/>
@@ -990,7 +990,7 @@
             <a:fld id="{B61BEF0D-F0BB-DE4B-95CE-6DB70DBA9567}" type="datetimeFigureOut">
               <a:rPr lang="en-US" smtClean="0"/>
               <a:pPr/>
-              <a:t>5/28/20</a:t>
+              <a:t>5/29/2020</a:t>
             </a:fld>
             <a:endParaRPr lang="en-US" dirty="0"/>
           </a:p>
@@ -1042,14 +1042,13 @@
             <a:fld id="{D57F1E4F-1CFF-5643-939E-217C01CDF565}" type="slidenum">
               <a:rPr lang="en-US" smtClean="0"/>
               <a:pPr/>
-              <a:t>‹#›</a:t>
+              <a:t>‹Nº›</a:t>
             </a:fld>
             <a:endParaRPr lang="en-US" dirty="0"/>
           </a:p>
         </p:txBody>
       </p:sp>
     </p:spTree>
-    <p:extLst/>
   </p:cSld>
   <p:clrMapOvr>
     <a:masterClrMapping/>
@@ -1090,10 +1089,9 @@
           <a:lstStyle/>
           <a:p>
             <a:r>
-              <a:rPr lang="en-US" smtClean="0"/>
+              <a:rPr lang="en-US"/>
               <a:t>Click to edit Master title style</a:t>
             </a:r>
-            <a:endParaRPr lang="en-US"/>
           </a:p>
         </p:txBody>
       </p:sp>
@@ -1114,38 +1112,37 @@
           <a:p>
             <a:pPr lvl="0"/>
             <a:r>
-              <a:rPr lang="en-US" smtClean="0"/>
+              <a:rPr lang="en-US"/>
               <a:t>Click to edit Master text styles</a:t>
             </a:r>
           </a:p>
           <a:p>
             <a:pPr lvl="1"/>
             <a:r>
-              <a:rPr lang="en-US" smtClean="0"/>
+              <a:rPr lang="en-US"/>
               <a:t>Second level</a:t>
             </a:r>
           </a:p>
           <a:p>
             <a:pPr lvl="2"/>
             <a:r>
-              <a:rPr lang="en-US" smtClean="0"/>
+              <a:rPr lang="en-US"/>
               <a:t>Third level</a:t>
             </a:r>
           </a:p>
           <a:p>
             <a:pPr lvl="3"/>
             <a:r>
-              <a:rPr lang="en-US" smtClean="0"/>
+              <a:rPr lang="en-US"/>
               <a:t>Fourth level</a:t>
             </a:r>
           </a:p>
           <a:p>
             <a:pPr lvl="4"/>
             <a:r>
-              <a:rPr lang="en-US" smtClean="0"/>
+              <a:rPr lang="en-US"/>
               <a:t>Fifth level</a:t>
             </a:r>
-            <a:endParaRPr lang="en-US"/>
           </a:p>
         </p:txBody>
       </p:sp>
@@ -1167,7 +1164,7 @@
             <a:fld id="{B61BEF0D-F0BB-DE4B-95CE-6DB70DBA9567}" type="datetimeFigureOut">
               <a:rPr lang="en-US" smtClean="0"/>
               <a:pPr/>
-              <a:t>5/28/20</a:t>
+              <a:t>5/29/2020</a:t>
             </a:fld>
             <a:endParaRPr lang="en-US" dirty="0"/>
           </a:p>
@@ -1210,14 +1207,13 @@
             <a:fld id="{D57F1E4F-1CFF-5643-939E-217C01CDF565}" type="slidenum">
               <a:rPr lang="en-US" smtClean="0"/>
               <a:pPr/>
-              <a:t>‹#›</a:t>
+              <a:t>‹Nº›</a:t>
             </a:fld>
             <a:endParaRPr lang="en-US" dirty="0"/>
           </a:p>
         </p:txBody>
       </p:sp>
     </p:spTree>
-    <p:extLst/>
   </p:cSld>
   <p:clrMapOvr>
     <a:masterClrMapping/>
@@ -1263,7 +1259,7 @@
           <a:lstStyle/>
           <a:p>
             <a:r>
-              <a:rPr lang="en-US" smtClean="0"/>
+              <a:rPr lang="en-US"/>
               <a:t>Click to edit Master title style</a:t>
             </a:r>
             <a:endParaRPr lang="en-US" dirty="0"/>
@@ -1292,35 +1288,35 @@
           <a:p>
             <a:pPr lvl="0"/>
             <a:r>
-              <a:rPr lang="en-US" smtClean="0"/>
+              <a:rPr lang="en-US"/>
               <a:t>Click to edit Master text styles</a:t>
             </a:r>
           </a:p>
           <a:p>
             <a:pPr lvl="1"/>
             <a:r>
-              <a:rPr lang="en-US" smtClean="0"/>
+              <a:rPr lang="en-US"/>
               <a:t>Second level</a:t>
             </a:r>
           </a:p>
           <a:p>
             <a:pPr lvl="2"/>
             <a:r>
-              <a:rPr lang="en-US" smtClean="0"/>
+              <a:rPr lang="en-US"/>
               <a:t>Third level</a:t>
             </a:r>
           </a:p>
           <a:p>
             <a:pPr lvl="3"/>
             <a:r>
-              <a:rPr lang="en-US" smtClean="0"/>
+              <a:rPr lang="en-US"/>
               <a:t>Fourth level</a:t>
             </a:r>
           </a:p>
           <a:p>
             <a:pPr lvl="4"/>
             <a:r>
-              <a:rPr lang="en-US" smtClean="0"/>
+              <a:rPr lang="en-US"/>
               <a:t>Fifth level</a:t>
             </a:r>
             <a:endParaRPr lang="en-US" dirty="0"/>
@@ -1345,7 +1341,7 @@
             <a:fld id="{B61BEF0D-F0BB-DE4B-95CE-6DB70DBA9567}" type="datetimeFigureOut">
               <a:rPr lang="en-US" smtClean="0"/>
               <a:pPr/>
-              <a:t>5/28/20</a:t>
+              <a:t>5/29/2020</a:t>
             </a:fld>
             <a:endParaRPr lang="en-US" dirty="0"/>
           </a:p>
@@ -1388,14 +1384,13 @@
             <a:fld id="{D57F1E4F-1CFF-5643-939E-217C01CDF565}" type="slidenum">
               <a:rPr lang="en-US" smtClean="0"/>
               <a:pPr/>
-              <a:t>‹#›</a:t>
+              <a:t>‹Nº›</a:t>
             </a:fld>
             <a:endParaRPr lang="en-US" dirty="0"/>
           </a:p>
         </p:txBody>
       </p:sp>
     </p:spTree>
-    <p:extLst/>
   </p:cSld>
   <p:clrMapOvr>
     <a:masterClrMapping/>
@@ -1436,7 +1431,7 @@
           <a:lstStyle/>
           <a:p>
             <a:r>
-              <a:rPr lang="en-US" smtClean="0"/>
+              <a:rPr lang="en-US"/>
               <a:t>Click to edit Master title style</a:t>
             </a:r>
             <a:endParaRPr lang="en-US" dirty="0"/>
@@ -1460,35 +1455,35 @@
           <a:p>
             <a:pPr lvl="0"/>
             <a:r>
-              <a:rPr lang="en-US" smtClean="0"/>
+              <a:rPr lang="en-US"/>
               <a:t>Click to edit Master text styles</a:t>
             </a:r>
           </a:p>
           <a:p>
             <a:pPr lvl="1"/>
             <a:r>
-              <a:rPr lang="en-US" smtClean="0"/>
+              <a:rPr lang="en-US"/>
               <a:t>Second level</a:t>
             </a:r>
           </a:p>
           <a:p>
             <a:pPr lvl="2"/>
             <a:r>
-              <a:rPr lang="en-US" smtClean="0"/>
+              <a:rPr lang="en-US"/>
               <a:t>Third level</a:t>
             </a:r>
           </a:p>
           <a:p>
             <a:pPr lvl="3"/>
             <a:r>
-              <a:rPr lang="en-US" smtClean="0"/>
+              <a:rPr lang="en-US"/>
               <a:t>Fourth level</a:t>
             </a:r>
           </a:p>
           <a:p>
             <a:pPr lvl="4"/>
             <a:r>
-              <a:rPr lang="en-US" smtClean="0"/>
+              <a:rPr lang="en-US"/>
               <a:t>Fifth level</a:t>
             </a:r>
             <a:endParaRPr lang="en-US" dirty="0"/>
@@ -1513,7 +1508,7 @@
             <a:fld id="{B61BEF0D-F0BB-DE4B-95CE-6DB70DBA9567}" type="datetimeFigureOut">
               <a:rPr lang="en-US" smtClean="0"/>
               <a:pPr/>
-              <a:t>5/28/20</a:t>
+              <a:t>5/29/2020</a:t>
             </a:fld>
             <a:endParaRPr lang="en-US" dirty="0"/>
           </a:p>
@@ -1556,14 +1551,13 @@
             <a:fld id="{D57F1E4F-1CFF-5643-939E-217C01CDF565}" type="slidenum">
               <a:rPr lang="en-US" smtClean="0"/>
               <a:pPr/>
-              <a:t>‹#›</a:t>
+              <a:t>‹Nº›</a:t>
             </a:fld>
             <a:endParaRPr lang="en-US" dirty="0"/>
           </a:p>
         </p:txBody>
       </p:sp>
     </p:spTree>
-    <p:extLst/>
   </p:cSld>
   <p:clrMapOvr>
     <a:masterClrMapping/>
@@ -1683,7 +1677,7 @@
           </a:lstStyle>
           <a:p>
             <a:r>
-              <a:rPr lang="en-US" smtClean="0"/>
+              <a:rPr lang="en-US"/>
               <a:t>Click to edit Master title style</a:t>
             </a:r>
             <a:endParaRPr lang="en-US" dirty="0"/>
@@ -1803,7 +1797,7 @@
           <a:p>
             <a:pPr lvl="0"/>
             <a:r>
-              <a:rPr lang="en-US" smtClean="0"/>
+              <a:rPr lang="en-US"/>
               <a:t>Click to edit Master text styles</a:t>
             </a:r>
           </a:p>
@@ -1832,7 +1826,7 @@
             <a:fld id="{B61BEF0D-F0BB-DE4B-95CE-6DB70DBA9567}" type="datetimeFigureOut">
               <a:rPr lang="en-US" smtClean="0"/>
               <a:pPr/>
-              <a:t>5/28/20</a:t>
+              <a:t>5/29/2020</a:t>
             </a:fld>
             <a:endParaRPr lang="en-US" dirty="0"/>
           </a:p>
@@ -2047,14 +2041,13 @@
             <a:fld id="{D57F1E4F-1CFF-5643-939E-217C01CDF565}" type="slidenum">
               <a:rPr lang="en-US" smtClean="0"/>
               <a:pPr/>
-              <a:t>‹#›</a:t>
+              <a:t>‹Nº›</a:t>
             </a:fld>
             <a:endParaRPr lang="en-US" dirty="0"/>
           </a:p>
         </p:txBody>
       </p:sp>
     </p:spTree>
-    <p:extLst/>
   </p:cSld>
   <p:clrMapOvr>
     <a:masterClrMapping/>
@@ -2095,7 +2088,7 @@
           <a:lstStyle/>
           <a:p>
             <a:r>
-              <a:rPr lang="en-US" smtClean="0"/>
+              <a:rPr lang="en-US"/>
               <a:t>Click to edit Master title style</a:t>
             </a:r>
             <a:endParaRPr lang="en-US" dirty="0"/>
@@ -2152,35 +2145,35 @@
           <a:p>
             <a:pPr lvl="0"/>
             <a:r>
-              <a:rPr lang="en-US" smtClean="0"/>
+              <a:rPr lang="en-US"/>
               <a:t>Click to edit Master text styles</a:t>
             </a:r>
           </a:p>
           <a:p>
             <a:pPr lvl="1"/>
             <a:r>
-              <a:rPr lang="en-US" smtClean="0"/>
+              <a:rPr lang="en-US"/>
               <a:t>Second level</a:t>
             </a:r>
           </a:p>
           <a:p>
             <a:pPr lvl="2"/>
             <a:r>
-              <a:rPr lang="en-US" smtClean="0"/>
+              <a:rPr lang="en-US"/>
               <a:t>Third level</a:t>
             </a:r>
           </a:p>
           <a:p>
             <a:pPr lvl="3"/>
             <a:r>
-              <a:rPr lang="en-US" smtClean="0"/>
+              <a:rPr lang="en-US"/>
               <a:t>Fourth level</a:t>
             </a:r>
           </a:p>
           <a:p>
             <a:pPr lvl="4"/>
             <a:r>
-              <a:rPr lang="en-US" smtClean="0"/>
+              <a:rPr lang="en-US"/>
               <a:t>Fifth level</a:t>
             </a:r>
             <a:endParaRPr lang="en-US" dirty="0"/>
@@ -2237,35 +2230,35 @@
           <a:p>
             <a:pPr lvl="0"/>
             <a:r>
-              <a:rPr lang="en-US" smtClean="0"/>
+              <a:rPr lang="en-US"/>
               <a:t>Click to edit Master text styles</a:t>
             </a:r>
           </a:p>
           <a:p>
             <a:pPr lvl="1"/>
             <a:r>
-              <a:rPr lang="en-US" smtClean="0"/>
+              <a:rPr lang="en-US"/>
               <a:t>Second level</a:t>
             </a:r>
           </a:p>
           <a:p>
             <a:pPr lvl="2"/>
             <a:r>
-              <a:rPr lang="en-US" smtClean="0"/>
+              <a:rPr lang="en-US"/>
               <a:t>Third level</a:t>
             </a:r>
           </a:p>
           <a:p>
             <a:pPr lvl="3"/>
             <a:r>
-              <a:rPr lang="en-US" smtClean="0"/>
+              <a:rPr lang="en-US"/>
               <a:t>Fourth level</a:t>
             </a:r>
           </a:p>
           <a:p>
             <a:pPr lvl="4"/>
             <a:r>
-              <a:rPr lang="en-US" smtClean="0"/>
+              <a:rPr lang="en-US"/>
               <a:t>Fifth level</a:t>
             </a:r>
             <a:endParaRPr lang="en-US" dirty="0"/>
@@ -2290,7 +2283,7 @@
             <a:fld id="{B61BEF0D-F0BB-DE4B-95CE-6DB70DBA9567}" type="datetimeFigureOut">
               <a:rPr lang="en-US" smtClean="0"/>
               <a:pPr/>
-              <a:t>5/28/20</a:t>
+              <a:t>5/29/2020</a:t>
             </a:fld>
             <a:endParaRPr lang="en-US" dirty="0"/>
           </a:p>
@@ -2333,14 +2326,13 @@
             <a:fld id="{D57F1E4F-1CFF-5643-939E-217C01CDF565}" type="slidenum">
               <a:rPr lang="en-US" smtClean="0"/>
               <a:pPr/>
-              <a:t>‹#›</a:t>
+              <a:t>‹Nº›</a:t>
             </a:fld>
             <a:endParaRPr lang="en-US" dirty="0"/>
           </a:p>
         </p:txBody>
       </p:sp>
     </p:spTree>
-    <p:extLst/>
   </p:cSld>
   <p:clrMapOvr>
     <a:masterClrMapping/>
@@ -2432,7 +2424,7 @@
           <a:p>
             <a:pPr lvl="0"/>
             <a:r>
-              <a:rPr lang="en-US" smtClean="0"/>
+              <a:rPr lang="en-US"/>
               <a:t>Click to edit Master text styles</a:t>
             </a:r>
           </a:p>
@@ -2488,35 +2480,35 @@
           <a:p>
             <a:pPr lvl="0"/>
             <a:r>
-              <a:rPr lang="en-US" smtClean="0"/>
+              <a:rPr lang="en-US"/>
               <a:t>Click to edit Master text styles</a:t>
             </a:r>
           </a:p>
           <a:p>
             <a:pPr lvl="1"/>
             <a:r>
-              <a:rPr lang="en-US" smtClean="0"/>
+              <a:rPr lang="en-US"/>
               <a:t>Second level</a:t>
             </a:r>
           </a:p>
           <a:p>
             <a:pPr lvl="2"/>
             <a:r>
-              <a:rPr lang="en-US" smtClean="0"/>
+              <a:rPr lang="en-US"/>
               <a:t>Third level</a:t>
             </a:r>
           </a:p>
           <a:p>
             <a:pPr lvl="3"/>
             <a:r>
-              <a:rPr lang="en-US" smtClean="0"/>
+              <a:rPr lang="en-US"/>
               <a:t>Fourth level</a:t>
             </a:r>
           </a:p>
           <a:p>
             <a:pPr lvl="4"/>
             <a:r>
-              <a:rPr lang="en-US" smtClean="0"/>
+              <a:rPr lang="en-US"/>
               <a:t>Fifth level</a:t>
             </a:r>
             <a:endParaRPr lang="en-US" dirty="0"/>
@@ -2590,7 +2582,7 @@
           <a:p>
             <a:pPr lvl="0"/>
             <a:r>
-              <a:rPr lang="en-US" smtClean="0"/>
+              <a:rPr lang="en-US"/>
               <a:t>Click to edit Master text styles</a:t>
             </a:r>
           </a:p>
@@ -2646,35 +2638,35 @@
           <a:p>
             <a:pPr lvl="0"/>
             <a:r>
-              <a:rPr lang="en-US" smtClean="0"/>
+              <a:rPr lang="en-US"/>
               <a:t>Click to edit Master text styles</a:t>
             </a:r>
           </a:p>
           <a:p>
             <a:pPr lvl="1"/>
             <a:r>
-              <a:rPr lang="en-US" smtClean="0"/>
+              <a:rPr lang="en-US"/>
               <a:t>Second level</a:t>
             </a:r>
           </a:p>
           <a:p>
             <a:pPr lvl="2"/>
             <a:r>
-              <a:rPr lang="en-US" smtClean="0"/>
+              <a:rPr lang="en-US"/>
               <a:t>Third level</a:t>
             </a:r>
           </a:p>
           <a:p>
             <a:pPr lvl="3"/>
             <a:r>
-              <a:rPr lang="en-US" smtClean="0"/>
+              <a:rPr lang="en-US"/>
               <a:t>Fourth level</a:t>
             </a:r>
           </a:p>
           <a:p>
             <a:pPr lvl="4"/>
             <a:r>
-              <a:rPr lang="en-US" smtClean="0"/>
+              <a:rPr lang="en-US"/>
               <a:t>Fifth level</a:t>
             </a:r>
             <a:endParaRPr lang="en-US" dirty="0"/>
@@ -2699,7 +2691,7 @@
             <a:fld id="{B61BEF0D-F0BB-DE4B-95CE-6DB70DBA9567}" type="datetimeFigureOut">
               <a:rPr lang="en-US" smtClean="0"/>
               <a:pPr/>
-              <a:t>5/28/20</a:t>
+              <a:t>5/29/2020</a:t>
             </a:fld>
             <a:endParaRPr lang="en-US" dirty="0"/>
           </a:p>
@@ -2742,7 +2734,7 @@
             <a:fld id="{D57F1E4F-1CFF-5643-939E-217C01CDF565}" type="slidenum">
               <a:rPr lang="en-US" smtClean="0"/>
               <a:pPr/>
-              <a:t>‹#›</a:t>
+              <a:t>‹Nº›</a:t>
             </a:fld>
             <a:endParaRPr lang="en-US" dirty="0"/>
           </a:p>
@@ -2764,7 +2756,7 @@
           <a:lstStyle/>
           <a:p>
             <a:r>
-              <a:rPr lang="en-US" smtClean="0"/>
+              <a:rPr lang="en-US"/>
               <a:t>Click to edit Master title style</a:t>
             </a:r>
             <a:endParaRPr lang="en-US" dirty="0"/>
@@ -2772,7 +2764,6 @@
         </p:txBody>
       </p:sp>
     </p:spTree>
-    <p:extLst/>
   </p:cSld>
   <p:clrMapOvr>
     <a:masterClrMapping/>
@@ -2815,7 +2806,7 @@
             <a:fld id="{B61BEF0D-F0BB-DE4B-95CE-6DB70DBA9567}" type="datetimeFigureOut">
               <a:rPr lang="en-US" smtClean="0"/>
               <a:pPr/>
-              <a:t>5/28/20</a:t>
+              <a:t>5/29/2020</a:t>
             </a:fld>
             <a:endParaRPr lang="en-US" dirty="0"/>
           </a:p>
@@ -2858,7 +2849,7 @@
             <a:fld id="{D57F1E4F-1CFF-5643-939E-217C01CDF565}" type="slidenum">
               <a:rPr lang="en-US" smtClean="0"/>
               <a:pPr/>
-              <a:t>‹#›</a:t>
+              <a:t>‹Nº›</a:t>
             </a:fld>
             <a:endParaRPr lang="en-US" dirty="0"/>
           </a:p>
@@ -2880,15 +2871,13 @@
           <a:lstStyle/>
           <a:p>
             <a:r>
-              <a:rPr lang="en-US" smtClean="0"/>
+              <a:rPr lang="en-US"/>
               <a:t>Click to edit Master title style</a:t>
             </a:r>
-            <a:endParaRPr lang="en-US"/>
           </a:p>
         </p:txBody>
       </p:sp>
     </p:spTree>
-    <p:extLst/>
   </p:cSld>
   <p:clrMapOvr>
     <a:masterClrMapping/>
@@ -2931,7 +2920,7 @@
             <a:fld id="{B61BEF0D-F0BB-DE4B-95CE-6DB70DBA9567}" type="datetimeFigureOut">
               <a:rPr lang="en-US" smtClean="0"/>
               <a:pPr/>
-              <a:t>5/28/20</a:t>
+              <a:t>5/29/2020</a:t>
             </a:fld>
             <a:endParaRPr lang="en-US" dirty="0"/>
           </a:p>
@@ -2974,14 +2963,13 @@
             <a:fld id="{D57F1E4F-1CFF-5643-939E-217C01CDF565}" type="slidenum">
               <a:rPr lang="en-US" smtClean="0"/>
               <a:pPr/>
-              <a:t>‹#›</a:t>
+              <a:t>‹Nº›</a:t>
             </a:fld>
             <a:endParaRPr lang="en-US" dirty="0"/>
           </a:p>
         </p:txBody>
       </p:sp>
     </p:spTree>
-    <p:extLst/>
   </p:cSld>
   <p:clrMapOvr>
     <a:masterClrMapping/>
@@ -3098,7 +3086,7 @@
           </a:lstStyle>
           <a:p>
             <a:r>
-              <a:rPr lang="en-US" smtClean="0"/>
+              <a:rPr lang="en-US"/>
               <a:t>Click to edit Master title style</a:t>
             </a:r>
             <a:endParaRPr lang="en-US" dirty="0"/>
@@ -3155,35 +3143,35 @@
           <a:p>
             <a:pPr lvl="0"/>
             <a:r>
-              <a:rPr lang="en-US" smtClean="0"/>
+              <a:rPr lang="en-US"/>
               <a:t>Click to edit Master text styles</a:t>
             </a:r>
           </a:p>
           <a:p>
             <a:pPr lvl="1"/>
             <a:r>
-              <a:rPr lang="en-US" smtClean="0"/>
+              <a:rPr lang="en-US"/>
               <a:t>Second level</a:t>
             </a:r>
           </a:p>
           <a:p>
             <a:pPr lvl="2"/>
             <a:r>
-              <a:rPr lang="en-US" smtClean="0"/>
+              <a:rPr lang="en-US"/>
               <a:t>Third level</a:t>
             </a:r>
           </a:p>
           <a:p>
             <a:pPr lvl="3"/>
             <a:r>
-              <a:rPr lang="en-US" smtClean="0"/>
+              <a:rPr lang="en-US"/>
               <a:t>Fourth level</a:t>
             </a:r>
           </a:p>
           <a:p>
             <a:pPr lvl="4"/>
             <a:r>
-              <a:rPr lang="en-US" smtClean="0"/>
+              <a:rPr lang="en-US"/>
               <a:t>Fifth level</a:t>
             </a:r>
             <a:endParaRPr lang="en-US" dirty="0"/>
@@ -3263,7 +3251,7 @@
           <a:p>
             <a:pPr lvl="0"/>
             <a:r>
-              <a:rPr lang="en-US" smtClean="0"/>
+              <a:rPr lang="en-US"/>
               <a:t>Click to edit Master text styles</a:t>
             </a:r>
           </a:p>
@@ -3287,7 +3275,7 @@
             <a:fld id="{B61BEF0D-F0BB-DE4B-95CE-6DB70DBA9567}" type="datetimeFigureOut">
               <a:rPr lang="en-US" smtClean="0"/>
               <a:pPr/>
-              <a:t>5/28/20</a:t>
+              <a:t>5/29/2020</a:t>
             </a:fld>
             <a:endParaRPr lang="en-US" dirty="0"/>
           </a:p>
@@ -3493,14 +3481,13 @@
             <a:fld id="{D57F1E4F-1CFF-5643-939E-217C01CDF565}" type="slidenum">
               <a:rPr lang="en-US" smtClean="0"/>
               <a:pPr/>
-              <a:t>‹#›</a:t>
+              <a:t>‹Nº›</a:t>
             </a:fld>
             <a:endParaRPr lang="en-US" dirty="0"/>
           </a:p>
         </p:txBody>
       </p:sp>
     </p:spTree>
-    <p:extLst/>
   </p:cSld>
   <p:clrMapOvr>
     <a:masterClrMapping/>
@@ -3617,7 +3604,7 @@
           </a:lstStyle>
           <a:p>
             <a:r>
-              <a:rPr lang="en-US" smtClean="0"/>
+              <a:rPr lang="en-US"/>
               <a:t>Click to edit Master title style</a:t>
             </a:r>
             <a:endParaRPr lang="en-US" dirty="0"/>
@@ -3688,7 +3675,7 @@
           </a:lstStyle>
           <a:p>
             <a:r>
-              <a:rPr lang="en-US" smtClean="0"/>
+              <a:rPr lang="en-US"/>
               <a:t>Drag picture to placeholder or click icon to add</a:t>
             </a:r>
             <a:endParaRPr lang="en-US" dirty="0"/>
@@ -3768,7 +3755,7 @@
           <a:p>
             <a:pPr lvl="0"/>
             <a:r>
-              <a:rPr lang="en-US" smtClean="0"/>
+              <a:rPr lang="en-US"/>
               <a:t>Click to edit Master text styles</a:t>
             </a:r>
           </a:p>
@@ -3792,7 +3779,7 @@
             <a:fld id="{B61BEF0D-F0BB-DE4B-95CE-6DB70DBA9567}" type="datetimeFigureOut">
               <a:rPr lang="en-US" smtClean="0"/>
               <a:pPr/>
-              <a:t>5/28/20</a:t>
+              <a:t>5/29/2020</a:t>
             </a:fld>
             <a:endParaRPr lang="en-US" dirty="0"/>
           </a:p>
@@ -3979,14 +3966,13 @@
             <a:fld id="{D57F1E4F-1CFF-5643-939E-217C01CDF565}" type="slidenum">
               <a:rPr lang="en-US" smtClean="0"/>
               <a:pPr/>
-              <a:t>‹#›</a:t>
+              <a:t>‹Nº›</a:t>
             </a:fld>
             <a:endParaRPr lang="en-US" dirty="0"/>
           </a:p>
         </p:txBody>
       </p:sp>
     </p:spTree>
-    <p:extLst/>
   </p:cSld>
   <p:clrMapOvr>
     <a:masterClrMapping/>
@@ -4042,7 +4028,7 @@
           <a:lstStyle/>
           <a:p>
             <a:r>
-              <a:rPr lang="en-US" smtClean="0"/>
+              <a:rPr lang="en-US"/>
               <a:t>Click to edit Master title style</a:t>
             </a:r>
             <a:endParaRPr lang="en-US" dirty="0"/>
@@ -4076,35 +4062,35 @@
           <a:p>
             <a:pPr lvl="0"/>
             <a:r>
-              <a:rPr lang="en-US" smtClean="0"/>
+              <a:rPr lang="en-US"/>
               <a:t>Click to edit Master text styles</a:t>
             </a:r>
           </a:p>
           <a:p>
             <a:pPr lvl="1"/>
             <a:r>
-              <a:rPr lang="en-US" smtClean="0"/>
+              <a:rPr lang="en-US"/>
               <a:t>Second level</a:t>
             </a:r>
           </a:p>
           <a:p>
             <a:pPr lvl="2"/>
             <a:r>
-              <a:rPr lang="en-US" smtClean="0"/>
+              <a:rPr lang="en-US"/>
               <a:t>Third level</a:t>
             </a:r>
           </a:p>
           <a:p>
             <a:pPr lvl="3"/>
             <a:r>
-              <a:rPr lang="en-US" smtClean="0"/>
+              <a:rPr lang="en-US"/>
               <a:t>Fourth level</a:t>
             </a:r>
           </a:p>
           <a:p>
             <a:pPr lvl="4"/>
             <a:r>
-              <a:rPr lang="en-US" smtClean="0"/>
+              <a:rPr lang="en-US"/>
               <a:t>Fifth level</a:t>
             </a:r>
             <a:endParaRPr lang="en-US" dirty="0"/>
@@ -4145,7 +4131,7 @@
             <a:fld id="{B61BEF0D-F0BB-DE4B-95CE-6DB70DBA9567}" type="datetimeFigureOut">
               <a:rPr lang="en-US" smtClean="0"/>
               <a:pPr/>
-              <a:t>5/28/20</a:t>
+              <a:t>5/29/2020</a:t>
             </a:fld>
             <a:endParaRPr lang="en-US" dirty="0"/>
           </a:p>
@@ -4384,7 +4370,7 @@
             <a:fld id="{D57F1E4F-1CFF-5643-939E-217C01CDF565}" type="slidenum">
               <a:rPr lang="en-US" smtClean="0"/>
               <a:pPr/>
-              <a:t>‹#›</a:t>
+              <a:t>‹Nº›</a:t>
             </a:fld>
             <a:endParaRPr lang="en-US" dirty="0"/>
           </a:p>
@@ -4842,24 +4828,16 @@
               <a:rPr lang="en-US" sz="4000" b="1" dirty="0"/>
               <a:t> para </a:t>
             </a:r>
-            <a:r>
-              <a:rPr lang="en-US" sz="4000" b="1" dirty="0" smtClean="0"/>
-              <a:t/>
-            </a:r>
             <a:br>
-              <a:rPr lang="en-US" sz="4000" b="1" dirty="0" smtClean="0"/>
+              <a:rPr lang="en-US" sz="4000" b="1" dirty="0"/>
             </a:br>
             <a:r>
-              <a:rPr lang="en-US" sz="4000" b="1" dirty="0" err="1" smtClean="0"/>
+              <a:rPr lang="en-US" sz="4000" b="1" dirty="0" err="1"/>
               <a:t>Clasificación</a:t>
             </a:r>
             <a:r>
-              <a:rPr lang="en-US" sz="4000" b="1" dirty="0" smtClean="0"/>
-              <a:t> </a:t>
-            </a:r>
-            <a:r>
               <a:rPr lang="en-US" sz="4000" b="1" dirty="0"/>
-              <a:t>de </a:t>
+              <a:t> de </a:t>
             </a:r>
             <a:r>
               <a:rPr lang="en-US" sz="4000" b="1" dirty="0" err="1"/>
@@ -4869,23 +4847,19 @@
               <a:rPr lang="en-US" sz="4000" b="1" dirty="0"/>
               <a:t> de Comida con </a:t>
             </a:r>
-            <a:r>
-              <a:rPr lang="en-US" sz="4000" b="1" dirty="0" smtClean="0"/>
-              <a:t/>
-            </a:r>
             <a:br>
-              <a:rPr lang="en-US" sz="4000" b="1" dirty="0" smtClean="0"/>
+              <a:rPr lang="en-US" sz="4000" b="1" dirty="0"/>
             </a:br>
             <a:r>
-              <a:rPr lang="en-US" sz="4000" b="1" dirty="0" smtClean="0"/>
+              <a:rPr lang="en-US" sz="4000" b="1" dirty="0"/>
               <a:t>Base </a:t>
             </a:r>
             <a:r>
-              <a:rPr lang="en-US" sz="4000" b="1" dirty="0" err="1" smtClean="0"/>
+              <a:rPr lang="en-US" sz="4000" b="1" dirty="0" err="1"/>
               <a:t>en</a:t>
             </a:r>
             <a:r>
-              <a:rPr lang="en-US" sz="4000" b="1" dirty="0" smtClean="0"/>
+              <a:rPr lang="en-US" sz="4000" b="1" dirty="0"/>
               <a:t> </a:t>
             </a:r>
             <a:r>
@@ -4931,56 +4905,39 @@
           <a:lstStyle/>
           <a:p>
             <a:r>
-              <a:rPr lang="es-ES_tradnl" dirty="0" smtClean="0"/>
-              <a:t>Elizabeth </a:t>
-            </a:r>
-            <a:r>
               <a:rPr lang="es-ES_tradnl" dirty="0"/>
-              <a:t>R</a:t>
-            </a:r>
-            <a:r>
-              <a:rPr lang="es-ES_tradnl" dirty="0" smtClean="0"/>
-              <a:t>odríguez</a:t>
-            </a:r>
-          </a:p>
-          <a:p>
-            <a:r>
-              <a:rPr lang="es-ES_tradnl" dirty="0" smtClean="0"/>
+              <a:t>Elizabeth Rodríguez</a:t>
+            </a:r>
+          </a:p>
+          <a:p>
+            <a:r>
+              <a:rPr lang="es-ES_tradnl" dirty="0"/>
               <a:t>Elizabeth Viveros</a:t>
             </a:r>
           </a:p>
           <a:p>
             <a:r>
-              <a:rPr lang="es-ES_tradnl" dirty="0" smtClean="0"/>
+              <a:rPr lang="es-ES_tradnl" dirty="0"/>
               <a:t>Leonardo Marín</a:t>
             </a:r>
           </a:p>
           <a:p>
             <a:r>
-              <a:rPr lang="es-ES_tradnl" dirty="0" smtClean="0"/>
+              <a:rPr lang="es-ES_tradnl" dirty="0"/>
               <a:t>Ángel Rafael Ortega</a:t>
             </a:r>
           </a:p>
           <a:p>
             <a:r>
-              <a:rPr lang="es-ES_tradnl" dirty="0" smtClean="0"/>
-              <a:t>Karla </a:t>
-            </a:r>
-            <a:r>
               <a:rPr lang="es-ES_tradnl" dirty="0"/>
-              <a:t>A</a:t>
-            </a:r>
-            <a:r>
-              <a:rPr lang="es-ES_tradnl" dirty="0" smtClean="0"/>
-              <a:t>lfaro</a:t>
-            </a:r>
-          </a:p>
-          <a:p>
-            <a:r>
-              <a:rPr lang="es-ES_tradnl" dirty="0" smtClean="0"/>
+              <a:t>Karla Alfaro</a:t>
+            </a:r>
+          </a:p>
+          <a:p>
+            <a:r>
+              <a:rPr lang="es-ES_tradnl" dirty="0"/>
               <a:t>Mario Rodríguez</a:t>
             </a:r>
-            <a:endParaRPr lang="es-ES_tradnl" dirty="0"/>
           </a:p>
         </p:txBody>
       </p:sp>
@@ -5031,10 +4988,9 @@
           <a:p>
             <a:pPr algn="ctr"/>
             <a:r>
-              <a:rPr lang="es-ES_tradnl" dirty="0" smtClean="0"/>
+              <a:rPr lang="es-ES_tradnl" dirty="0"/>
               <a:t>Análisis de componentes principales</a:t>
             </a:r>
-            <a:endParaRPr lang="es-ES_tradnl" dirty="0"/>
           </a:p>
         </p:txBody>
       </p:sp>
@@ -5054,10 +5010,9 @@
           <a:lstStyle/>
           <a:p>
             <a:r>
-              <a:rPr lang="es-ES_tradnl" dirty="0" smtClean="0"/>
+              <a:rPr lang="es-ES_tradnl" dirty="0"/>
               <a:t>Enfoque geométrico</a:t>
             </a:r>
-            <a:endParaRPr lang="es-ES_tradnl" dirty="0"/>
           </a:p>
         </p:txBody>
       </p:sp>
@@ -5077,10 +5032,9 @@
           <a:lstStyle/>
           <a:p>
             <a:r>
-              <a:rPr lang="es-ES_tradnl" dirty="0" smtClean="0"/>
+              <a:rPr lang="es-ES_tradnl" dirty="0"/>
               <a:t>Enfoque algebraico</a:t>
             </a:r>
-            <a:endParaRPr lang="es-ES_tradnl" dirty="0"/>
           </a:p>
         </p:txBody>
       </p:sp>
@@ -5221,55 +5175,188 @@
           <a:p>
             <a:pPr algn="ctr"/>
             <a:r>
-              <a:rPr lang="es-ES_tradnl" dirty="0" smtClean="0"/>
+              <a:rPr lang="es-ES_tradnl" dirty="0"/>
               <a:t>1. Algoritmo </a:t>
             </a:r>
             <a:r>
-              <a:rPr lang="es-ES_tradnl" dirty="0" err="1" smtClean="0"/>
+              <a:rPr lang="es-ES_tradnl" dirty="0" err="1"/>
               <a:t>svd</a:t>
             </a:r>
             <a:endParaRPr lang="es-ES_tradnl" dirty="0"/>
           </a:p>
         </p:txBody>
       </p:sp>
-      <p:sp>
-        <p:nvSpPr>
-          <p:cNvPr id="3" name="Content Placeholder 2"/>
-          <p:cNvSpPr>
-            <a:spLocks noGrp="1"/>
-          </p:cNvSpPr>
-          <p:nvPr>
-            <p:ph sz="half" idx="1"/>
-          </p:nvPr>
-        </p:nvSpPr>
-        <p:spPr/>
-        <p:txBody>
-          <a:bodyPr/>
-          <a:lstStyle/>
-          <a:p>
-            <a:endParaRPr lang="es-ES_tradnl"/>
-          </a:p>
-        </p:txBody>
-      </p:sp>
-      <p:sp>
-        <p:nvSpPr>
-          <p:cNvPr id="4" name="Content Placeholder 3"/>
-          <p:cNvSpPr>
-            <a:spLocks noGrp="1"/>
-          </p:cNvSpPr>
-          <p:nvPr>
-            <p:ph sz="half" idx="2"/>
-          </p:nvPr>
-        </p:nvSpPr>
-        <p:spPr/>
-        <p:txBody>
-          <a:bodyPr/>
-          <a:lstStyle/>
-          <a:p>
-            <a:endParaRPr lang="es-ES_tradnl"/>
-          </a:p>
-        </p:txBody>
-      </p:sp>
+      <mc:AlternateContent xmlns:mc="http://schemas.openxmlformats.org/markup-compatibility/2006">
+        <mc:Choice xmlns:a14="http://schemas.microsoft.com/office/drawing/2010/main" Requires="a14">
+          <p:sp>
+            <p:nvSpPr>
+              <p:cNvPr id="3" name="Content Placeholder 2"/>
+              <p:cNvSpPr>
+                <a:spLocks noGrp="1"/>
+              </p:cNvSpPr>
+              <p:nvPr>
+                <p:ph sz="half" idx="1"/>
+              </p:nvPr>
+            </p:nvSpPr>
+            <p:spPr>
+              <a:xfrm>
+                <a:off x="2631233" y="2093976"/>
+                <a:ext cx="6552096" cy="2670049"/>
+              </a:xfrm>
+            </p:spPr>
+            <p:txBody>
+              <a:bodyPr/>
+              <a:lstStyle/>
+              <a:p>
+                <a:pPr marL="0" indent="0">
+                  <a:buNone/>
+                </a:pPr>
+                <a:r>
+                  <a:rPr lang="es-ES_tradnl" dirty="0"/>
+                  <a:t>Se aplica SVD a la matriz de datos (centrada) </a:t>
+                </a:r>
+                <a14:m>
+                  <m:oMath xmlns:m="http://schemas.openxmlformats.org/officeDocument/2006/math">
+                    <m:r>
+                      <a:rPr lang="es-MX" b="0" i="1" smtClean="0">
+                        <a:latin typeface="Cambria Math" panose="02040503050406030204" pitchFamily="18" charset="0"/>
+                      </a:rPr>
+                      <m:t>𝐴</m:t>
+                    </m:r>
+                    <m:r>
+                      <a:rPr lang="es-MX" b="0" i="1" smtClean="0">
+                        <a:latin typeface="Cambria Math" panose="02040503050406030204" pitchFamily="18" charset="0"/>
+                      </a:rPr>
+                      <m:t>:</m:t>
+                    </m:r>
+                  </m:oMath>
+                </a14:m>
+                <a:endParaRPr lang="es-ES_tradnl" dirty="0"/>
+              </a:p>
+              <a:p>
+                <a:pPr marL="0" indent="0" algn="ctr">
+                  <a:buNone/>
+                </a:pPr>
+                <a:r>
+                  <a:rPr lang="es-ES_tradnl" dirty="0"/>
+                  <a:t> </a:t>
+                </a:r>
+                <a14:m>
+                  <m:oMath xmlns:m="http://schemas.openxmlformats.org/officeDocument/2006/math">
+                    <m:r>
+                      <a:rPr lang="es-ES_tradnl" i="1" dirty="0" smtClean="0">
+                        <a:latin typeface="Cambria Math" panose="02040503050406030204" pitchFamily="18" charset="0"/>
+                      </a:rPr>
+                      <m:t>𝐴</m:t>
+                    </m:r>
+                    <m:r>
+                      <a:rPr lang="es-ES_tradnl" i="1" dirty="0" smtClean="0">
+                        <a:latin typeface="Cambria Math" panose="02040503050406030204" pitchFamily="18" charset="0"/>
+                      </a:rPr>
+                      <m:t> = </m:t>
+                    </m:r>
+                    <m:r>
+                      <a:rPr lang="es-ES_tradnl" i="1" dirty="0" smtClean="0">
+                        <a:latin typeface="Cambria Math" panose="02040503050406030204" pitchFamily="18" charset="0"/>
+                      </a:rPr>
+                      <m:t>𝑈𝑆</m:t>
+                    </m:r>
+                    <m:sSup>
+                      <m:sSupPr>
+                        <m:ctrlPr>
+                          <a:rPr lang="es-MX" b="0" i="1" dirty="0" smtClean="0">
+                            <a:latin typeface="Cambria Math" panose="02040503050406030204" pitchFamily="18" charset="0"/>
+                          </a:rPr>
+                        </m:ctrlPr>
+                      </m:sSupPr>
+                      <m:e>
+                        <m:r>
+                          <a:rPr lang="es-ES_tradnl" i="1" dirty="0" smtClean="0">
+                            <a:latin typeface="Cambria Math" panose="02040503050406030204" pitchFamily="18" charset="0"/>
+                          </a:rPr>
+                          <m:t>𝑉</m:t>
+                        </m:r>
+                      </m:e>
+                      <m:sup>
+                        <m:r>
+                          <a:rPr lang="es-MX" b="0" i="1" dirty="0" smtClean="0">
+                            <a:latin typeface="Cambria Math" panose="02040503050406030204" pitchFamily="18" charset="0"/>
+                          </a:rPr>
+                          <m:t>𝑇</m:t>
+                        </m:r>
+                      </m:sup>
+                    </m:sSup>
+                  </m:oMath>
+                </a14:m>
+                <a:endParaRPr lang="es-ES_tradnl" dirty="0"/>
+              </a:p>
+              <a:p>
+                <a:pPr>
+                  <a:buFont typeface="Wingdings" panose="05000000000000000000" pitchFamily="2" charset="2"/>
+                  <a:buChar char="Ø"/>
+                </a:pPr>
+                <a:r>
+                  <a:rPr lang="es-ES_tradnl" dirty="0"/>
+                  <a:t>Las columnas de V son las direcciones de los componentes.</a:t>
+                </a:r>
+              </a:p>
+              <a:p>
+                <a:pPr>
+                  <a:buFont typeface="Wingdings" panose="05000000000000000000" pitchFamily="2" charset="2"/>
+                  <a:buChar char="Ø"/>
+                </a:pPr>
+                <a:r>
+                  <a:rPr lang="es-ES_tradnl" dirty="0"/>
+                  <a:t>Las columnas de US nos darán los componentes principales.</a:t>
+                </a:r>
+              </a:p>
+              <a:p>
+                <a:pPr marL="0" indent="0">
+                  <a:buNone/>
+                </a:pPr>
+                <a:endParaRPr lang="es-ES_tradnl" dirty="0"/>
+              </a:p>
+            </p:txBody>
+          </p:sp>
+        </mc:Choice>
+        <mc:Fallback>
+          <p:sp>
+            <p:nvSpPr>
+              <p:cNvPr id="3" name="Content Placeholder 2"/>
+              <p:cNvSpPr>
+                <a:spLocks noGrp="1" noRot="1" noChangeAspect="1" noMove="1" noResize="1" noEditPoints="1" noAdjustHandles="1" noChangeArrowheads="1" noChangeShapeType="1" noTextEdit="1"/>
+              </p:cNvSpPr>
+              <p:nvPr>
+                <p:ph sz="half" idx="1"/>
+              </p:nvPr>
+            </p:nvSpPr>
+            <p:spPr>
+              <a:xfrm>
+                <a:off x="2631233" y="2093976"/>
+                <a:ext cx="6552096" cy="2670049"/>
+              </a:xfrm>
+              <a:blipFill>
+                <a:blip r:embed="rId2"/>
+                <a:stretch>
+                  <a:fillRect l="-1024" t="-2511"/>
+                </a:stretch>
+              </a:blipFill>
+            </p:spPr>
+            <p:txBody>
+              <a:bodyPr/>
+              <a:lstStyle/>
+              <a:p>
+                <a:r>
+                  <a:rPr lang="es-MX">
+                    <a:noFill/>
+                  </a:rPr>
+                  <a:t> </a:t>
+                </a:r>
+              </a:p>
+            </p:txBody>
+          </p:sp>
+        </mc:Fallback>
+      </mc:AlternateContent>
     </p:spTree>
     <p:extLst>
       <p:ext uri="{BB962C8B-B14F-4D97-AF65-F5344CB8AC3E}">
@@ -5317,55 +5404,559 @@
           <a:p>
             <a:pPr algn="ctr"/>
             <a:r>
-              <a:rPr lang="es-ES_tradnl" dirty="0" smtClean="0"/>
+              <a:rPr lang="es-ES_tradnl" dirty="0"/>
               <a:t>2. Algoritmo </a:t>
             </a:r>
             <a:r>
-              <a:rPr lang="es-ES_tradnl" dirty="0" err="1" smtClean="0"/>
+              <a:rPr lang="es-ES_tradnl" dirty="0" err="1"/>
               <a:t>qr</a:t>
             </a:r>
             <a:endParaRPr lang="es-ES_tradnl" dirty="0"/>
           </a:p>
         </p:txBody>
       </p:sp>
-      <p:sp>
-        <p:nvSpPr>
-          <p:cNvPr id="3" name="Content Placeholder 2"/>
-          <p:cNvSpPr>
-            <a:spLocks noGrp="1"/>
-          </p:cNvSpPr>
-          <p:nvPr>
-            <p:ph sz="half" idx="1"/>
-          </p:nvPr>
-        </p:nvSpPr>
-        <p:spPr/>
-        <p:txBody>
-          <a:bodyPr/>
-          <a:lstStyle/>
-          <a:p>
-            <a:endParaRPr lang="es-ES_tradnl"/>
-          </a:p>
-        </p:txBody>
-      </p:sp>
-      <p:sp>
-        <p:nvSpPr>
-          <p:cNvPr id="4" name="Content Placeholder 3"/>
-          <p:cNvSpPr>
-            <a:spLocks noGrp="1"/>
-          </p:cNvSpPr>
-          <p:nvPr>
-            <p:ph sz="half" idx="2"/>
-          </p:nvPr>
-        </p:nvSpPr>
-        <p:spPr/>
-        <p:txBody>
-          <a:bodyPr/>
-          <a:lstStyle/>
-          <a:p>
-            <a:endParaRPr lang="es-ES_tradnl"/>
-          </a:p>
-        </p:txBody>
-      </p:sp>
+      <mc:AlternateContent xmlns:mc="http://schemas.openxmlformats.org/markup-compatibility/2006">
+        <mc:Choice xmlns:a14="http://schemas.microsoft.com/office/drawing/2010/main" Requires="a14">
+          <p:sp>
+            <p:nvSpPr>
+              <p:cNvPr id="3" name="Content Placeholder 2"/>
+              <p:cNvSpPr>
+                <a:spLocks noGrp="1"/>
+              </p:cNvSpPr>
+              <p:nvPr>
+                <p:ph sz="half" idx="1"/>
+              </p:nvPr>
+            </p:nvSpPr>
+            <p:spPr>
+              <a:xfrm>
+                <a:off x="1072897" y="2636645"/>
+                <a:ext cx="4450825" cy="2146041"/>
+              </a:xfrm>
+            </p:spPr>
+            <p:txBody>
+              <a:bodyPr/>
+              <a:lstStyle/>
+              <a:p>
+                <a:r>
+                  <a:rPr lang="es-ES" dirty="0"/>
+                  <a:t>Procedimiento para calcular los eigenvalores y </a:t>
+                </a:r>
+                <a:r>
+                  <a:rPr lang="es-ES" dirty="0" err="1"/>
+                  <a:t>eigenvectores</a:t>
+                </a:r>
+                <a:r>
+                  <a:rPr lang="es-ES" dirty="0"/>
+                  <a:t> de una matriz A.</a:t>
+                </a:r>
+              </a:p>
+              <a:p>
+                <a:r>
+                  <a:rPr lang="es-ES" dirty="0"/>
+                  <a:t>Basado en la descomposición QR:</a:t>
+                </a:r>
+                <a:br>
+                  <a:rPr lang="es-ES" dirty="0"/>
+                </a:br>
+                <a14:m>
+                  <m:oMath xmlns:m="http://schemas.openxmlformats.org/officeDocument/2006/math">
+                    <m:r>
+                      <a:rPr lang="es-ES" i="1" dirty="0" smtClean="0">
+                        <a:latin typeface="Cambria Math" panose="02040503050406030204" pitchFamily="18" charset="0"/>
+                      </a:rPr>
+                      <m:t>𝐴</m:t>
+                    </m:r>
+                    <m:r>
+                      <a:rPr lang="es-ES" i="1" dirty="0">
+                        <a:latin typeface="Cambria Math" panose="02040503050406030204" pitchFamily="18" charset="0"/>
+                      </a:rPr>
+                      <m:t>=</m:t>
+                    </m:r>
+                    <m:r>
+                      <a:rPr lang="es-ES" i="1" dirty="0">
+                        <a:latin typeface="Cambria Math" panose="02040503050406030204" pitchFamily="18" charset="0"/>
+                      </a:rPr>
+                      <m:t>𝑄𝑅</m:t>
+                    </m:r>
+                    <m:r>
+                      <a:rPr lang="es-ES" i="1" dirty="0">
+                        <a:latin typeface="Cambria Math" panose="02040503050406030204" pitchFamily="18" charset="0"/>
+                      </a:rPr>
+                      <m:t> </m:t>
+                    </m:r>
+                  </m:oMath>
+                </a14:m>
+                <a:r>
+                  <a:rPr lang="es-ES" dirty="0"/>
+                  <a:t>(con  𝑄  matriz ortogonal y  𝑅  triangular superior)</a:t>
+                </a:r>
+              </a:p>
+              <a:p>
+                <a:endParaRPr lang="es-ES_tradnl" dirty="0"/>
+              </a:p>
+            </p:txBody>
+          </p:sp>
+        </mc:Choice>
+        <mc:Fallback>
+          <p:sp>
+            <p:nvSpPr>
+              <p:cNvPr id="3" name="Content Placeholder 2"/>
+              <p:cNvSpPr>
+                <a:spLocks noGrp="1" noRot="1" noChangeAspect="1" noMove="1" noResize="1" noEditPoints="1" noAdjustHandles="1" noChangeArrowheads="1" noChangeShapeType="1" noTextEdit="1"/>
+              </p:cNvSpPr>
+              <p:nvPr>
+                <p:ph sz="half" idx="1"/>
+              </p:nvPr>
+            </p:nvSpPr>
+            <p:spPr>
+              <a:xfrm>
+                <a:off x="1072897" y="2636645"/>
+                <a:ext cx="4450825" cy="2146041"/>
+              </a:xfrm>
+              <a:blipFill>
+                <a:blip r:embed="rId2"/>
+                <a:stretch>
+                  <a:fillRect l="-548" t="-3125" r="-1644"/>
+                </a:stretch>
+              </a:blipFill>
+            </p:spPr>
+            <p:txBody>
+              <a:bodyPr/>
+              <a:lstStyle/>
+              <a:p>
+                <a:r>
+                  <a:rPr lang="es-MX">
+                    <a:noFill/>
+                  </a:rPr>
+                  <a:t> </a:t>
+                </a:r>
+              </a:p>
+            </p:txBody>
+          </p:sp>
+        </mc:Fallback>
+      </mc:AlternateContent>
+      <mc:AlternateContent xmlns:mc="http://schemas.openxmlformats.org/markup-compatibility/2006">
+        <mc:Choice xmlns:a14="http://schemas.microsoft.com/office/drawing/2010/main" Requires="a14">
+          <p:sp>
+            <p:nvSpPr>
+              <p:cNvPr id="4" name="Content Placeholder 3"/>
+              <p:cNvSpPr>
+                <a:spLocks noGrp="1"/>
+              </p:cNvSpPr>
+              <p:nvPr>
+                <p:ph sz="half" idx="2"/>
+              </p:nvPr>
+            </p:nvSpPr>
+            <p:spPr>
+              <a:xfrm>
+                <a:off x="6373368" y="2093976"/>
+                <a:ext cx="4754880" cy="4279392"/>
+              </a:xfrm>
+            </p:spPr>
+            <p:txBody>
+              <a:bodyPr/>
+              <a:lstStyle/>
+              <a:p>
+                <a:pPr marL="0" indent="0">
+                  <a:buNone/>
+                </a:pPr>
+                <a:r>
+                  <a:rPr lang="es-ES_tradnl" b="1" dirty="0"/>
+                  <a:t>Algoritmo</a:t>
+                </a:r>
+              </a:p>
+              <a:p>
+                <a:r>
+                  <a:rPr lang="es-ES_tradnl" dirty="0"/>
+                  <a:t>Iniciar con </a:t>
+                </a:r>
+                <a14:m>
+                  <m:oMath xmlns:m="http://schemas.openxmlformats.org/officeDocument/2006/math">
+                    <m:sSub>
+                      <m:sSubPr>
+                        <m:ctrlPr>
+                          <a:rPr lang="es-ES_tradnl" i="1" dirty="0" smtClean="0">
+                            <a:latin typeface="Cambria Math" panose="02040503050406030204" pitchFamily="18" charset="0"/>
+                          </a:rPr>
+                        </m:ctrlPr>
+                      </m:sSubPr>
+                      <m:e>
+                        <m:r>
+                          <a:rPr lang="es-ES_tradnl" i="1" dirty="0" smtClean="0">
+                            <a:latin typeface="Cambria Math" panose="02040503050406030204" pitchFamily="18" charset="0"/>
+                          </a:rPr>
+                          <m:t>𝐴</m:t>
+                        </m:r>
+                      </m:e>
+                      <m:sub>
+                        <m:r>
+                          <a:rPr lang="es-MX" b="0" i="1" dirty="0" smtClean="0">
+                            <a:latin typeface="Cambria Math" panose="02040503050406030204" pitchFamily="18" charset="0"/>
+                          </a:rPr>
+                          <m:t>0</m:t>
+                        </m:r>
+                      </m:sub>
+                    </m:sSub>
+                    <m:r>
+                      <a:rPr lang="es-ES_tradnl" i="1" dirty="0" smtClean="0">
+                        <a:latin typeface="Cambria Math" panose="02040503050406030204" pitchFamily="18" charset="0"/>
+                      </a:rPr>
+                      <m:t>= </m:t>
+                    </m:r>
+                    <m:r>
+                      <a:rPr lang="es-ES_tradnl" i="1" dirty="0" smtClean="0">
+                        <a:latin typeface="Cambria Math" panose="02040503050406030204" pitchFamily="18" charset="0"/>
+                      </a:rPr>
+                      <m:t>𝐴</m:t>
+                    </m:r>
+                  </m:oMath>
+                </a14:m>
+                <a:endParaRPr lang="es-MX" dirty="0"/>
+              </a:p>
+              <a:p>
+                <a:r>
+                  <a:rPr lang="es-ES_tradnl" dirty="0"/>
+                  <a:t>Iterar hasta convergencia:</a:t>
+                </a:r>
+              </a:p>
+              <a:p>
+                <a:pPr lvl="1"/>
+                <a14:m>
+                  <m:oMath xmlns:m="http://schemas.openxmlformats.org/officeDocument/2006/math">
+                    <m:sSub>
+                      <m:sSubPr>
+                        <m:ctrlPr>
+                          <a:rPr lang="es-MX" b="0" i="1" smtClean="0">
+                            <a:latin typeface="Cambria Math" panose="02040503050406030204" pitchFamily="18" charset="0"/>
+                          </a:rPr>
+                        </m:ctrlPr>
+                      </m:sSubPr>
+                      <m:e>
+                        <m:r>
+                          <a:rPr lang="es-MX" b="0" i="1" smtClean="0">
+                            <a:latin typeface="Cambria Math" panose="02040503050406030204" pitchFamily="18" charset="0"/>
+                          </a:rPr>
+                          <m:t>𝐴</m:t>
+                        </m:r>
+                      </m:e>
+                      <m:sub>
+                        <m:r>
+                          <a:rPr lang="es-MX" b="0" i="1" smtClean="0">
+                            <a:latin typeface="Cambria Math" panose="02040503050406030204" pitchFamily="18" charset="0"/>
+                          </a:rPr>
+                          <m:t>𝑘</m:t>
+                        </m:r>
+                      </m:sub>
+                    </m:sSub>
+                    <m:r>
+                      <a:rPr lang="es-MX" b="0" i="1" smtClean="0">
+                        <a:latin typeface="Cambria Math" panose="02040503050406030204" pitchFamily="18" charset="0"/>
+                      </a:rPr>
+                      <m:t>=</m:t>
+                    </m:r>
+                    <m:sSub>
+                      <m:sSubPr>
+                        <m:ctrlPr>
+                          <a:rPr lang="es-MX" b="0" i="1" smtClean="0">
+                            <a:latin typeface="Cambria Math" panose="02040503050406030204" pitchFamily="18" charset="0"/>
+                          </a:rPr>
+                        </m:ctrlPr>
+                      </m:sSubPr>
+                      <m:e>
+                        <m:r>
+                          <a:rPr lang="es-MX" b="0" i="1" smtClean="0">
+                            <a:latin typeface="Cambria Math" panose="02040503050406030204" pitchFamily="18" charset="0"/>
+                          </a:rPr>
+                          <m:t>𝑄</m:t>
+                        </m:r>
+                      </m:e>
+                      <m:sub>
+                        <m:r>
+                          <a:rPr lang="es-MX" b="0" i="1" smtClean="0">
+                            <a:latin typeface="Cambria Math" panose="02040503050406030204" pitchFamily="18" charset="0"/>
+                          </a:rPr>
+                          <m:t>𝑘</m:t>
+                        </m:r>
+                      </m:sub>
+                    </m:sSub>
+                    <m:sSub>
+                      <m:sSubPr>
+                        <m:ctrlPr>
+                          <a:rPr lang="es-MX" b="0" i="1" smtClean="0">
+                            <a:latin typeface="Cambria Math" panose="02040503050406030204" pitchFamily="18" charset="0"/>
+                          </a:rPr>
+                        </m:ctrlPr>
+                      </m:sSubPr>
+                      <m:e>
+                        <m:r>
+                          <a:rPr lang="es-MX" b="0" i="1" smtClean="0">
+                            <a:latin typeface="Cambria Math" panose="02040503050406030204" pitchFamily="18" charset="0"/>
+                          </a:rPr>
+                          <m:t>𝑅</m:t>
+                        </m:r>
+                      </m:e>
+                      <m:sub>
+                        <m:r>
+                          <a:rPr lang="es-MX" b="0" i="1" smtClean="0">
+                            <a:latin typeface="Cambria Math" panose="02040503050406030204" pitchFamily="18" charset="0"/>
+                          </a:rPr>
+                          <m:t>𝑘</m:t>
+                        </m:r>
+                      </m:sub>
+                    </m:sSub>
+                  </m:oMath>
+                </a14:m>
+                <a:endParaRPr lang="es-ES_tradnl" dirty="0"/>
+              </a:p>
+              <a:p>
+                <a:pPr lvl="1"/>
+                <a14:m>
+                  <m:oMath xmlns:m="http://schemas.openxmlformats.org/officeDocument/2006/math">
+                    <m:sSub>
+                      <m:sSubPr>
+                        <m:ctrlPr>
+                          <a:rPr lang="es-ES_tradnl" i="1" dirty="0" smtClean="0">
+                            <a:latin typeface="Cambria Math" panose="02040503050406030204" pitchFamily="18" charset="0"/>
+                          </a:rPr>
+                        </m:ctrlPr>
+                      </m:sSubPr>
+                      <m:e>
+                        <m:r>
+                          <a:rPr lang="es-ES_tradnl" i="1" dirty="0" smtClean="0">
+                            <a:latin typeface="Cambria Math" panose="02040503050406030204" pitchFamily="18" charset="0"/>
+                          </a:rPr>
+                          <m:t>𝐴</m:t>
+                        </m:r>
+                      </m:e>
+                      <m:sub>
+                        <m:r>
+                          <a:rPr lang="es-MX" b="0" i="1" dirty="0" smtClean="0">
+                            <a:latin typeface="Cambria Math" panose="02040503050406030204" pitchFamily="18" charset="0"/>
+                          </a:rPr>
+                          <m:t>𝑘</m:t>
+                        </m:r>
+                        <m:r>
+                          <a:rPr lang="es-MX" b="0" i="1" dirty="0" smtClean="0">
+                            <a:latin typeface="Cambria Math" panose="02040503050406030204" pitchFamily="18" charset="0"/>
+                          </a:rPr>
+                          <m:t>+1</m:t>
+                        </m:r>
+                      </m:sub>
+                    </m:sSub>
+                    <m:r>
+                      <a:rPr lang="es-MX" b="0" i="1" dirty="0" smtClean="0">
+                        <a:latin typeface="Cambria Math" panose="02040503050406030204" pitchFamily="18" charset="0"/>
+                      </a:rPr>
+                      <m:t>=</m:t>
+                    </m:r>
+                    <m:sSub>
+                      <m:sSubPr>
+                        <m:ctrlPr>
+                          <a:rPr lang="es-MX" b="0" i="1" dirty="0" smtClean="0">
+                            <a:latin typeface="Cambria Math" panose="02040503050406030204" pitchFamily="18" charset="0"/>
+                          </a:rPr>
+                        </m:ctrlPr>
+                      </m:sSubPr>
+                      <m:e>
+                        <m:r>
+                          <a:rPr lang="es-MX" b="0" i="1" dirty="0" smtClean="0">
+                            <a:latin typeface="Cambria Math" panose="02040503050406030204" pitchFamily="18" charset="0"/>
+                          </a:rPr>
+                          <m:t>𝑅</m:t>
+                        </m:r>
+                      </m:e>
+                      <m:sub>
+                        <m:r>
+                          <a:rPr lang="es-MX" b="0" i="1" dirty="0" smtClean="0">
+                            <a:latin typeface="Cambria Math" panose="02040503050406030204" pitchFamily="18" charset="0"/>
+                          </a:rPr>
+                          <m:t>𝑘</m:t>
+                        </m:r>
+                      </m:sub>
+                    </m:sSub>
+                    <m:sSub>
+                      <m:sSubPr>
+                        <m:ctrlPr>
+                          <a:rPr lang="es-MX" b="0" i="1" dirty="0" smtClean="0">
+                            <a:latin typeface="Cambria Math" panose="02040503050406030204" pitchFamily="18" charset="0"/>
+                          </a:rPr>
+                        </m:ctrlPr>
+                      </m:sSubPr>
+                      <m:e>
+                        <m:r>
+                          <a:rPr lang="es-MX" b="0" i="1" dirty="0" smtClean="0">
+                            <a:latin typeface="Cambria Math" panose="02040503050406030204" pitchFamily="18" charset="0"/>
+                          </a:rPr>
+                          <m:t>𝑄</m:t>
+                        </m:r>
+                      </m:e>
+                      <m:sub>
+                        <m:r>
+                          <a:rPr lang="es-MX" b="0" i="1" dirty="0" smtClean="0">
+                            <a:latin typeface="Cambria Math" panose="02040503050406030204" pitchFamily="18" charset="0"/>
+                          </a:rPr>
+                          <m:t>𝑘</m:t>
+                        </m:r>
+                      </m:sub>
+                    </m:sSub>
+                  </m:oMath>
+                </a14:m>
+                <a:endParaRPr lang="es-ES_tradnl" dirty="0"/>
+              </a:p>
+              <a:p>
+                <a:pPr marL="0" indent="0">
+                  <a:buNone/>
+                </a:pPr>
+                <a:endParaRPr lang="es-ES_tradnl" dirty="0"/>
+              </a:p>
+              <a:p>
+                <a:pPr marL="0" indent="0">
+                  <a:buNone/>
+                </a:pPr>
+                <a:r>
+                  <a:rPr lang="es-ES_tradnl" dirty="0"/>
+                  <a:t>Para </a:t>
+                </a:r>
+                <a14:m>
+                  <m:oMath xmlns:m="http://schemas.openxmlformats.org/officeDocument/2006/math">
+                    <m:r>
+                      <a:rPr lang="es-ES_tradnl" i="1" dirty="0" smtClean="0">
+                        <a:latin typeface="Cambria Math" panose="02040503050406030204" pitchFamily="18" charset="0"/>
+                      </a:rPr>
+                      <m:t>𝐴</m:t>
+                    </m:r>
+                  </m:oMath>
+                </a14:m>
+                <a:r>
+                  <a:rPr lang="es-ES_tradnl" dirty="0"/>
+                  <a:t> simétrica:</a:t>
+                </a:r>
+              </a:p>
+              <a:p>
+                <a:pPr>
+                  <a:buFont typeface="Wingdings" panose="05000000000000000000" pitchFamily="2" charset="2"/>
+                  <a:buChar char="Ø"/>
+                </a:pPr>
+                <a:r>
+                  <a:rPr lang="es-ES_tradnl" dirty="0"/>
+                  <a:t>eigenvalores en la diagonal de </a:t>
+                </a:r>
+                <a14:m>
+                  <m:oMath xmlns:m="http://schemas.openxmlformats.org/officeDocument/2006/math">
+                    <m:sSub>
+                      <m:sSubPr>
+                        <m:ctrlPr>
+                          <a:rPr lang="es-ES_tradnl" i="1" dirty="0" smtClean="0">
+                            <a:latin typeface="Cambria Math" panose="02040503050406030204" pitchFamily="18" charset="0"/>
+                          </a:rPr>
+                        </m:ctrlPr>
+                      </m:sSubPr>
+                      <m:e>
+                        <m:r>
+                          <a:rPr lang="es-ES_tradnl" i="1" dirty="0" smtClean="0">
+                            <a:latin typeface="Cambria Math" panose="02040503050406030204" pitchFamily="18" charset="0"/>
+                          </a:rPr>
+                          <m:t>𝐴</m:t>
+                        </m:r>
+                      </m:e>
+                      <m:sub>
+                        <m:r>
+                          <a:rPr lang="es-ES_tradnl" i="1" dirty="0" smtClean="0">
+                            <a:latin typeface="Cambria Math" panose="02040503050406030204" pitchFamily="18" charset="0"/>
+                          </a:rPr>
+                          <m:t>𝑘</m:t>
+                        </m:r>
+                      </m:sub>
+                    </m:sSub>
+                  </m:oMath>
+                </a14:m>
+                <a:endParaRPr lang="es-ES_tradnl" dirty="0"/>
+              </a:p>
+              <a:p>
+                <a:pPr>
+                  <a:buFont typeface="Wingdings" panose="05000000000000000000" pitchFamily="2" charset="2"/>
+                  <a:buChar char="Ø"/>
+                </a:pPr>
+                <a:r>
+                  <a:rPr lang="es-ES_tradnl" dirty="0" err="1"/>
+                  <a:t>eigenvectores</a:t>
+                </a:r>
+                <a:r>
+                  <a:rPr lang="es-ES_tradnl" dirty="0"/>
+                  <a:t> correspondientes en las  columnas de la composición de las transformaciones </a:t>
+                </a:r>
+                <a14:m>
+                  <m:oMath xmlns:m="http://schemas.openxmlformats.org/officeDocument/2006/math">
+                    <m:sSub>
+                      <m:sSubPr>
+                        <m:ctrlPr>
+                          <a:rPr lang="es-ES_tradnl" i="1" dirty="0" smtClean="0">
+                            <a:latin typeface="Cambria Math" panose="02040503050406030204" pitchFamily="18" charset="0"/>
+                          </a:rPr>
+                        </m:ctrlPr>
+                      </m:sSubPr>
+                      <m:e>
+                        <m:r>
+                          <a:rPr lang="es-ES_tradnl" i="1" dirty="0" smtClean="0">
+                            <a:latin typeface="Cambria Math" panose="02040503050406030204" pitchFamily="18" charset="0"/>
+                          </a:rPr>
+                          <m:t>𝑄</m:t>
+                        </m:r>
+                      </m:e>
+                      <m:sub>
+                        <m:r>
+                          <a:rPr lang="es-MX" b="0" i="1" dirty="0" smtClean="0">
+                            <a:latin typeface="Cambria Math" panose="02040503050406030204" pitchFamily="18" charset="0"/>
+                          </a:rPr>
+                          <m:t>𝑘</m:t>
+                        </m:r>
+                      </m:sub>
+                    </m:sSub>
+                  </m:oMath>
+                </a14:m>
+                <a:endParaRPr lang="es-ES_tradnl" dirty="0"/>
+              </a:p>
+            </p:txBody>
+          </p:sp>
+        </mc:Choice>
+        <mc:Fallback>
+          <p:sp>
+            <p:nvSpPr>
+              <p:cNvPr id="4" name="Content Placeholder 3"/>
+              <p:cNvSpPr>
+                <a:spLocks noGrp="1" noRot="1" noChangeAspect="1" noMove="1" noResize="1" noEditPoints="1" noAdjustHandles="1" noChangeArrowheads="1" noChangeShapeType="1" noTextEdit="1"/>
+              </p:cNvSpPr>
+              <p:nvPr>
+                <p:ph sz="half" idx="2"/>
+              </p:nvPr>
+            </p:nvSpPr>
+            <p:spPr>
+              <a:xfrm>
+                <a:off x="6373368" y="2093976"/>
+                <a:ext cx="4754880" cy="4279392"/>
+              </a:xfrm>
+              <a:blipFill>
+                <a:blip r:embed="rId3"/>
+                <a:stretch>
+                  <a:fillRect l="-1410" t="-1567"/>
+                </a:stretch>
+              </a:blipFill>
+            </p:spPr>
+            <p:txBody>
+              <a:bodyPr/>
+              <a:lstStyle/>
+              <a:p>
+                <a:r>
+                  <a:rPr lang="es-MX">
+                    <a:noFill/>
+                  </a:rPr>
+                  <a:t> </a:t>
+                </a:r>
+              </a:p>
+            </p:txBody>
+          </p:sp>
+        </mc:Fallback>
+      </mc:AlternateContent>
     </p:spTree>
     <p:extLst>
       <p:ext uri="{BB962C8B-B14F-4D97-AF65-F5344CB8AC3E}">
@@ -5413,51 +6004,713 @@
           <a:p>
             <a:pPr algn="ctr"/>
             <a:r>
-              <a:rPr lang="es-ES_tradnl" dirty="0" smtClean="0"/>
+              <a:rPr lang="es-ES_tradnl" dirty="0"/>
               <a:t>3. Método de la potencia</a:t>
             </a:r>
-            <a:endParaRPr lang="es-ES_tradnl" dirty="0"/>
           </a:p>
         </p:txBody>
       </p:sp>
-      <p:sp>
-        <p:nvSpPr>
-          <p:cNvPr id="3" name="Content Placeholder 2"/>
-          <p:cNvSpPr>
-            <a:spLocks noGrp="1"/>
-          </p:cNvSpPr>
-          <p:nvPr>
-            <p:ph sz="half" idx="1"/>
-          </p:nvPr>
-        </p:nvSpPr>
-        <p:spPr/>
-        <p:txBody>
-          <a:bodyPr/>
-          <a:lstStyle/>
-          <a:p>
-            <a:endParaRPr lang="es-ES_tradnl"/>
-          </a:p>
-        </p:txBody>
-      </p:sp>
-      <p:sp>
-        <p:nvSpPr>
-          <p:cNvPr id="4" name="Content Placeholder 3"/>
-          <p:cNvSpPr>
-            <a:spLocks noGrp="1"/>
-          </p:cNvSpPr>
-          <p:nvPr>
-            <p:ph sz="half" idx="2"/>
-          </p:nvPr>
-        </p:nvSpPr>
-        <p:spPr/>
-        <p:txBody>
-          <a:bodyPr/>
-          <a:lstStyle/>
-          <a:p>
-            <a:endParaRPr lang="es-ES_tradnl"/>
-          </a:p>
-        </p:txBody>
-      </p:sp>
+      <mc:AlternateContent xmlns:mc="http://schemas.openxmlformats.org/markup-compatibility/2006">
+        <mc:Choice xmlns:a14="http://schemas.microsoft.com/office/drawing/2010/main" Requires="a14">
+          <p:sp>
+            <p:nvSpPr>
+              <p:cNvPr id="3" name="Content Placeholder 2"/>
+              <p:cNvSpPr>
+                <a:spLocks noGrp="1"/>
+              </p:cNvSpPr>
+              <p:nvPr>
+                <p:ph sz="half" idx="1"/>
+              </p:nvPr>
+            </p:nvSpPr>
+            <p:spPr>
+              <a:xfrm>
+                <a:off x="1069848" y="2194560"/>
+                <a:ext cx="5026152" cy="3977640"/>
+              </a:xfrm>
+            </p:spPr>
+            <p:txBody>
+              <a:bodyPr>
+                <a:normAutofit lnSpcReduction="10000"/>
+              </a:bodyPr>
+              <a:lstStyle/>
+              <a:p>
+                <a:r>
+                  <a:rPr lang="es-ES" dirty="0"/>
+                  <a:t>Para una matriz  𝐴  </a:t>
+                </a:r>
+                <a:r>
+                  <a:rPr lang="es-ES" dirty="0" err="1"/>
+                  <a:t>diagonalizable</a:t>
+                </a:r>
+                <a:r>
+                  <a:rPr lang="es-ES" dirty="0"/>
+                  <a:t>, genera un número  𝜆  que es el eigenvalor más grande (en valor absoluto) de  𝐴 , y un vector no nulo  𝑣 , que es el </a:t>
+                </a:r>
+                <a:r>
+                  <a:rPr lang="es-ES" dirty="0" err="1"/>
+                  <a:t>eigenvector</a:t>
+                </a:r>
+                <a:r>
+                  <a:rPr lang="es-ES" dirty="0"/>
+                  <a:t> correspondiente a  𝜆  </a:t>
+                </a:r>
+                <a:r>
+                  <a:rPr lang="es-ES" i="1" dirty="0"/>
+                  <a:t>(</a:t>
+                </a:r>
+                <a:r>
+                  <a:rPr lang="es-ES" dirty="0"/>
+                  <a:t>𝐴𝑣=𝜆𝑣)</a:t>
+                </a:r>
+              </a:p>
+              <a:p>
+                <a:r>
+                  <a:rPr lang="es-ES" dirty="0"/>
+                  <a:t>Para asegurar la convergencia se debe cumplir:</a:t>
+                </a:r>
+              </a:p>
+              <a:p>
+                <a:pPr lvl="1"/>
+                <a14:m>
+                  <m:oMath xmlns:m="http://schemas.openxmlformats.org/officeDocument/2006/math">
+                    <m:r>
+                      <a:rPr lang="es-ES" i="1" dirty="0" smtClean="0">
+                        <a:latin typeface="Cambria Math" panose="02040503050406030204" pitchFamily="18" charset="0"/>
+                      </a:rPr>
+                      <m:t>𝐴</m:t>
+                    </m:r>
+                  </m:oMath>
+                </a14:m>
+                <a:r>
+                  <a:rPr lang="es-ES" dirty="0"/>
+                  <a:t> tiene un eigenvalor estrictamente mayor en magnitud respecto a sus otros eigenvalores</a:t>
+                </a:r>
+              </a:p>
+              <a:p>
+                <a:pPr lvl="1"/>
+                <a:r>
+                  <a:rPr lang="es-ES" dirty="0"/>
+                  <a:t>El vector inicial </a:t>
+                </a:r>
+                <a14:m>
+                  <m:oMath xmlns:m="http://schemas.openxmlformats.org/officeDocument/2006/math">
+                    <m:sSub>
+                      <m:sSubPr>
+                        <m:ctrlPr>
+                          <a:rPr lang="es-ES" i="1" dirty="0" smtClean="0">
+                            <a:latin typeface="Cambria Math" panose="02040503050406030204" pitchFamily="18" charset="0"/>
+                          </a:rPr>
+                        </m:ctrlPr>
+                      </m:sSubPr>
+                      <m:e>
+                        <m:r>
+                          <a:rPr lang="es-ES" i="1" dirty="0" smtClean="0">
+                            <a:latin typeface="Cambria Math" panose="02040503050406030204" pitchFamily="18" charset="0"/>
+                          </a:rPr>
+                          <m:t>𝑏</m:t>
+                        </m:r>
+                      </m:e>
+                      <m:sub>
+                        <m:r>
+                          <a:rPr lang="es-ES" i="1" dirty="0">
+                            <a:latin typeface="Cambria Math" panose="02040503050406030204" pitchFamily="18" charset="0"/>
+                          </a:rPr>
+                          <m:t>0</m:t>
+                        </m:r>
+                      </m:sub>
+                    </m:sSub>
+                  </m:oMath>
+                </a14:m>
+                <a:r>
+                  <a:rPr lang="es-ES" dirty="0"/>
+                  <a:t> tiene una componente distinta de cero en la dirección de un </a:t>
+                </a:r>
+                <a:r>
+                  <a:rPr lang="es-ES" dirty="0" err="1"/>
+                  <a:t>eigenvector</a:t>
+                </a:r>
+                <a:r>
+                  <a:rPr lang="es-ES" dirty="0"/>
+                  <a:t> asociado con el eigenvalor dominante</a:t>
+                </a:r>
+                <a:endParaRPr lang="es-ES_tradnl" dirty="0"/>
+              </a:p>
+            </p:txBody>
+          </p:sp>
+        </mc:Choice>
+        <mc:Fallback>
+          <p:sp>
+            <p:nvSpPr>
+              <p:cNvPr id="3" name="Content Placeholder 2"/>
+              <p:cNvSpPr>
+                <a:spLocks noGrp="1" noRot="1" noChangeAspect="1" noMove="1" noResize="1" noEditPoints="1" noAdjustHandles="1" noChangeArrowheads="1" noChangeShapeType="1" noTextEdit="1"/>
+              </p:cNvSpPr>
+              <p:nvPr>
+                <p:ph sz="half" idx="1"/>
+              </p:nvPr>
+            </p:nvSpPr>
+            <p:spPr>
+              <a:xfrm>
+                <a:off x="1069848" y="2194560"/>
+                <a:ext cx="5026152" cy="3977640"/>
+              </a:xfrm>
+              <a:blipFill>
+                <a:blip r:embed="rId2"/>
+                <a:stretch>
+                  <a:fillRect l="-607" t="-2450" r="-728"/>
+                </a:stretch>
+              </a:blipFill>
+            </p:spPr>
+            <p:txBody>
+              <a:bodyPr/>
+              <a:lstStyle/>
+              <a:p>
+                <a:r>
+                  <a:rPr lang="es-MX">
+                    <a:noFill/>
+                  </a:rPr>
+                  <a:t> </a:t>
+                </a:r>
+              </a:p>
+            </p:txBody>
+          </p:sp>
+        </mc:Fallback>
+      </mc:AlternateContent>
+      <mc:AlternateContent xmlns:mc="http://schemas.openxmlformats.org/markup-compatibility/2006">
+        <mc:Choice xmlns:a14="http://schemas.microsoft.com/office/drawing/2010/main" Requires="a14">
+          <p:sp>
+            <p:nvSpPr>
+              <p:cNvPr id="4" name="Content Placeholder 3"/>
+              <p:cNvSpPr>
+                <a:spLocks noGrp="1"/>
+              </p:cNvSpPr>
+              <p:nvPr>
+                <p:ph sz="half" idx="2"/>
+              </p:nvPr>
+            </p:nvSpPr>
+            <p:spPr>
+              <a:xfrm>
+                <a:off x="6934200" y="2194560"/>
+                <a:ext cx="4184904" cy="3977640"/>
+              </a:xfrm>
+            </p:spPr>
+            <p:txBody>
+              <a:bodyPr>
+                <a:normAutofit lnSpcReduction="10000"/>
+              </a:bodyPr>
+              <a:lstStyle/>
+              <a:p>
+                <a:r>
+                  <a:rPr lang="es-ES_tradnl" dirty="0"/>
+                  <a:t>Iniciar con un vector </a:t>
+                </a:r>
+                <a14:m>
+                  <m:oMath xmlns:m="http://schemas.openxmlformats.org/officeDocument/2006/math">
+                    <m:sSub>
+                      <m:sSubPr>
+                        <m:ctrlPr>
+                          <a:rPr lang="es-ES_tradnl" i="1" dirty="0" smtClean="0">
+                            <a:latin typeface="Cambria Math" panose="02040503050406030204" pitchFamily="18" charset="0"/>
+                          </a:rPr>
+                        </m:ctrlPr>
+                      </m:sSubPr>
+                      <m:e>
+                        <m:r>
+                          <a:rPr lang="es-ES_tradnl" i="1" dirty="0" smtClean="0">
+                            <a:latin typeface="Cambria Math" panose="02040503050406030204" pitchFamily="18" charset="0"/>
+                          </a:rPr>
+                          <m:t>𝑏</m:t>
+                        </m:r>
+                      </m:e>
+                      <m:sub>
+                        <m:r>
+                          <a:rPr lang="es-ES_tradnl" i="1" dirty="0" smtClean="0">
+                            <a:latin typeface="Cambria Math" panose="02040503050406030204" pitchFamily="18" charset="0"/>
+                          </a:rPr>
+                          <m:t>0</m:t>
+                        </m:r>
+                      </m:sub>
+                    </m:sSub>
+                    <m:r>
+                      <a:rPr lang="es-ES_tradnl" i="1" dirty="0" smtClean="0">
+                        <a:latin typeface="Cambria Math" panose="02040503050406030204" pitchFamily="18" charset="0"/>
+                      </a:rPr>
+                      <m:t> </m:t>
+                    </m:r>
+                  </m:oMath>
+                </a14:m>
+                <a:r>
+                  <a:rPr lang="es-ES_tradnl" dirty="0"/>
+                  <a:t>aleatorio</a:t>
+                </a:r>
+              </a:p>
+              <a:p>
+                <a:r>
+                  <a:rPr lang="es-ES_tradnl" dirty="0"/>
+                  <a:t>Iterar</a:t>
+                </a:r>
+              </a:p>
+              <a:p>
+                <a:pPr lvl="1"/>
+                <a14:m>
+                  <m:oMath xmlns:m="http://schemas.openxmlformats.org/officeDocument/2006/math">
+                    <m:sSub>
+                      <m:sSubPr>
+                        <m:ctrlPr>
+                          <a:rPr lang="es-MX" i="1">
+                            <a:latin typeface="Cambria Math" panose="02040503050406030204" pitchFamily="18" charset="0"/>
+                          </a:rPr>
+                        </m:ctrlPr>
+                      </m:sSubPr>
+                      <m:e>
+                        <m:r>
+                          <a:rPr lang="es-MX" i="1">
+                            <a:latin typeface="Cambria Math" panose="02040503050406030204" pitchFamily="18" charset="0"/>
+                          </a:rPr>
+                          <m:t>𝑏</m:t>
+                        </m:r>
+                      </m:e>
+                      <m:sub>
+                        <m:r>
+                          <a:rPr lang="es-MX" b="0" i="1" smtClean="0">
+                            <a:latin typeface="Cambria Math" panose="02040503050406030204" pitchFamily="18" charset="0"/>
+                          </a:rPr>
+                          <m:t>𝑘</m:t>
+                        </m:r>
+                        <m:r>
+                          <a:rPr lang="es-MX" b="0" i="1" smtClean="0">
+                            <a:latin typeface="Cambria Math" panose="02040503050406030204" pitchFamily="18" charset="0"/>
+                          </a:rPr>
+                          <m:t>+1</m:t>
+                        </m:r>
+                      </m:sub>
+                    </m:sSub>
+                    <m:r>
+                      <a:rPr lang="es-MX" i="1">
+                        <a:latin typeface="Cambria Math" panose="02040503050406030204" pitchFamily="18" charset="0"/>
+                      </a:rPr>
+                      <m:t>= </m:t>
+                    </m:r>
+                    <m:f>
+                      <m:fPr>
+                        <m:ctrlPr>
+                          <a:rPr lang="es-MX" i="1" smtClean="0">
+                            <a:latin typeface="Cambria Math" panose="02040503050406030204" pitchFamily="18" charset="0"/>
+                          </a:rPr>
+                        </m:ctrlPr>
+                      </m:fPr>
+                      <m:num>
+                        <m:r>
+                          <a:rPr lang="es-MX" i="1">
+                            <a:latin typeface="Cambria Math" panose="02040503050406030204" pitchFamily="18" charset="0"/>
+                          </a:rPr>
+                          <m:t>𝐴</m:t>
+                        </m:r>
+                        <m:sSub>
+                          <m:sSubPr>
+                            <m:ctrlPr>
+                              <a:rPr lang="es-MX" i="1">
+                                <a:latin typeface="Cambria Math" panose="02040503050406030204" pitchFamily="18" charset="0"/>
+                              </a:rPr>
+                            </m:ctrlPr>
+                          </m:sSubPr>
+                          <m:e>
+                            <m:r>
+                              <a:rPr lang="es-MX" i="1">
+                                <a:latin typeface="Cambria Math" panose="02040503050406030204" pitchFamily="18" charset="0"/>
+                              </a:rPr>
+                              <m:t>𝑏</m:t>
+                            </m:r>
+                          </m:e>
+                          <m:sub>
+                            <m:r>
+                              <a:rPr lang="es-MX" i="1">
+                                <a:latin typeface="Cambria Math" panose="02040503050406030204" pitchFamily="18" charset="0"/>
+                              </a:rPr>
+                              <m:t>𝑘</m:t>
+                            </m:r>
+                          </m:sub>
+                        </m:sSub>
+                      </m:num>
+                      <m:den>
+                        <m:d>
+                          <m:dPr>
+                            <m:begChr m:val="|"/>
+                            <m:endChr m:val="|"/>
+                            <m:ctrlPr>
+                              <a:rPr lang="es-MX" b="0" i="1" smtClean="0">
+                                <a:latin typeface="Cambria Math" panose="02040503050406030204" pitchFamily="18" charset="0"/>
+                              </a:rPr>
+                            </m:ctrlPr>
+                          </m:dPr>
+                          <m:e>
+                            <m:d>
+                              <m:dPr>
+                                <m:begChr m:val="|"/>
+                                <m:endChr m:val="|"/>
+                                <m:ctrlPr>
+                                  <a:rPr lang="es-MX" b="0" i="1" smtClean="0">
+                                    <a:latin typeface="Cambria Math" panose="02040503050406030204" pitchFamily="18" charset="0"/>
+                                  </a:rPr>
+                                </m:ctrlPr>
+                              </m:dPr>
+                              <m:e>
+                                <m:r>
+                                  <a:rPr lang="es-MX" i="1">
+                                    <a:latin typeface="Cambria Math" panose="02040503050406030204" pitchFamily="18" charset="0"/>
+                                  </a:rPr>
+                                  <m:t>𝐴</m:t>
+                                </m:r>
+                                <m:sSub>
+                                  <m:sSubPr>
+                                    <m:ctrlPr>
+                                      <a:rPr lang="es-MX" i="1">
+                                        <a:latin typeface="Cambria Math" panose="02040503050406030204" pitchFamily="18" charset="0"/>
+                                      </a:rPr>
+                                    </m:ctrlPr>
+                                  </m:sSubPr>
+                                  <m:e>
+                                    <m:r>
+                                      <a:rPr lang="es-MX" i="1">
+                                        <a:latin typeface="Cambria Math" panose="02040503050406030204" pitchFamily="18" charset="0"/>
+                                      </a:rPr>
+                                      <m:t>𝑏</m:t>
+                                    </m:r>
+                                  </m:e>
+                                  <m:sub>
+                                    <m:r>
+                                      <a:rPr lang="es-MX" i="1">
+                                        <a:latin typeface="Cambria Math" panose="02040503050406030204" pitchFamily="18" charset="0"/>
+                                      </a:rPr>
+                                      <m:t>𝑘</m:t>
+                                    </m:r>
+                                  </m:sub>
+                                </m:sSub>
+                              </m:e>
+                            </m:d>
+                          </m:e>
+                        </m:d>
+                      </m:den>
+                    </m:f>
+                  </m:oMath>
+                </a14:m>
+                <a:endParaRPr lang="es-ES_tradnl" dirty="0"/>
+              </a:p>
+              <a:p>
+                <a:pPr lvl="1"/>
+                <a14:m>
+                  <m:oMath xmlns:m="http://schemas.openxmlformats.org/officeDocument/2006/math">
+                    <m:sSub>
+                      <m:sSubPr>
+                        <m:ctrlPr>
+                          <a:rPr lang="es-MX" b="0" i="1" smtClean="0">
+                            <a:latin typeface="Cambria Math" panose="02040503050406030204" pitchFamily="18" charset="0"/>
+                          </a:rPr>
+                        </m:ctrlPr>
+                      </m:sSubPr>
+                      <m:e>
+                        <m:r>
+                          <a:rPr lang="es-MX" b="0" i="1" smtClean="0">
+                            <a:latin typeface="Cambria Math" panose="02040503050406030204" pitchFamily="18" charset="0"/>
+                          </a:rPr>
+                          <m:t>𝜇</m:t>
+                        </m:r>
+                      </m:e>
+                      <m:sub>
+                        <m:r>
+                          <a:rPr lang="es-MX" b="0" i="1" smtClean="0">
+                            <a:latin typeface="Cambria Math" panose="02040503050406030204" pitchFamily="18" charset="0"/>
+                          </a:rPr>
+                          <m:t>𝑘</m:t>
+                        </m:r>
+                      </m:sub>
+                    </m:sSub>
+                    <m:r>
+                      <a:rPr lang="es-MX" b="0" i="1" smtClean="0">
+                        <a:latin typeface="Cambria Math" panose="02040503050406030204" pitchFamily="18" charset="0"/>
+                      </a:rPr>
+                      <m:t>= </m:t>
+                    </m:r>
+                    <m:f>
+                      <m:fPr>
+                        <m:ctrlPr>
+                          <a:rPr lang="es-MX" b="0" i="1" smtClean="0">
+                            <a:latin typeface="Cambria Math" panose="02040503050406030204" pitchFamily="18" charset="0"/>
+                          </a:rPr>
+                        </m:ctrlPr>
+                      </m:fPr>
+                      <m:num>
+                        <m:sSubSup>
+                          <m:sSubSupPr>
+                            <m:ctrlPr>
+                              <a:rPr lang="es-MX" i="1" smtClean="0">
+                                <a:latin typeface="Cambria Math" panose="02040503050406030204" pitchFamily="18" charset="0"/>
+                              </a:rPr>
+                            </m:ctrlPr>
+                          </m:sSubSupPr>
+                          <m:e>
+                            <m:sSub>
+                              <m:sSubPr>
+                                <m:ctrlPr>
+                                  <a:rPr lang="es-MX" b="0" i="1" smtClean="0">
+                                    <a:latin typeface="Cambria Math" panose="02040503050406030204" pitchFamily="18" charset="0"/>
+                                  </a:rPr>
+                                </m:ctrlPr>
+                              </m:sSubPr>
+                              <m:e>
+                                <m:r>
+                                  <a:rPr lang="es-MX" b="0" i="1" smtClean="0">
+                                    <a:latin typeface="Cambria Math" panose="02040503050406030204" pitchFamily="18" charset="0"/>
+                                  </a:rPr>
+                                  <m:t>𝑏</m:t>
+                                </m:r>
+                              </m:e>
+                              <m:sub>
+                                <m:r>
+                                  <a:rPr lang="es-MX" i="1">
+                                    <a:latin typeface="Cambria Math" panose="02040503050406030204" pitchFamily="18" charset="0"/>
+                                  </a:rPr>
+                                  <m:t>𝑘</m:t>
+                                </m:r>
+                              </m:sub>
+                            </m:sSub>
+                            <m:r>
+                              <a:rPr lang="es-MX" b="0" i="1" smtClean="0">
+                                <a:latin typeface="Cambria Math" panose="02040503050406030204" pitchFamily="18" charset="0"/>
+                              </a:rPr>
+                              <m:t> </m:t>
+                            </m:r>
+                          </m:e>
+                          <m:sub>
+                            <m:r>
+                              <a:rPr lang="es-MX" b="0" i="1" smtClean="0">
+                                <a:latin typeface="Cambria Math" panose="02040503050406030204" pitchFamily="18" charset="0"/>
+                              </a:rPr>
+                              <m:t> </m:t>
+                            </m:r>
+                          </m:sub>
+                          <m:sup>
+                            <m:r>
+                              <a:rPr lang="es-MX" i="1">
+                                <a:latin typeface="Cambria Math" panose="02040503050406030204" pitchFamily="18" charset="0"/>
+                              </a:rPr>
+                              <m:t>𝑇</m:t>
+                            </m:r>
+                          </m:sup>
+                        </m:sSubSup>
+                        <m:r>
+                          <a:rPr lang="es-MX" b="0" i="1" smtClean="0">
+                            <a:latin typeface="Cambria Math" panose="02040503050406030204" pitchFamily="18" charset="0"/>
+                          </a:rPr>
+                          <m:t>𝐴</m:t>
+                        </m:r>
+                        <m:sSub>
+                          <m:sSubPr>
+                            <m:ctrlPr>
+                              <a:rPr lang="es-MX" b="0" i="1" smtClean="0">
+                                <a:latin typeface="Cambria Math" panose="02040503050406030204" pitchFamily="18" charset="0"/>
+                              </a:rPr>
+                            </m:ctrlPr>
+                          </m:sSubPr>
+                          <m:e>
+                            <m:r>
+                              <a:rPr lang="es-MX" b="0" i="1" smtClean="0">
+                                <a:latin typeface="Cambria Math" panose="02040503050406030204" pitchFamily="18" charset="0"/>
+                              </a:rPr>
+                              <m:t>𝑏</m:t>
+                            </m:r>
+                          </m:e>
+                          <m:sub>
+                            <m:r>
+                              <a:rPr lang="es-MX" b="0" i="1" smtClean="0">
+                                <a:latin typeface="Cambria Math" panose="02040503050406030204" pitchFamily="18" charset="0"/>
+                              </a:rPr>
+                              <m:t>𝑘</m:t>
+                            </m:r>
+                          </m:sub>
+                        </m:sSub>
+                      </m:num>
+                      <m:den>
+                        <m:sSubSup>
+                          <m:sSubSupPr>
+                            <m:ctrlPr>
+                              <a:rPr lang="es-MX" i="1">
+                                <a:latin typeface="Cambria Math" panose="02040503050406030204" pitchFamily="18" charset="0"/>
+                              </a:rPr>
+                            </m:ctrlPr>
+                          </m:sSubSupPr>
+                          <m:e>
+                            <m:r>
+                              <a:rPr lang="es-MX" i="1">
+                                <a:latin typeface="Cambria Math" panose="02040503050406030204" pitchFamily="18" charset="0"/>
+                              </a:rPr>
+                              <m:t>𝑏</m:t>
+                            </m:r>
+                          </m:e>
+                          <m:sub>
+                            <m:r>
+                              <a:rPr lang="es-MX" i="1">
+                                <a:latin typeface="Cambria Math" panose="02040503050406030204" pitchFamily="18" charset="0"/>
+                              </a:rPr>
+                              <m:t>𝑘</m:t>
+                            </m:r>
+                          </m:sub>
+                          <m:sup>
+                            <m:r>
+                              <a:rPr lang="es-MX" i="1">
+                                <a:latin typeface="Cambria Math" panose="02040503050406030204" pitchFamily="18" charset="0"/>
+                              </a:rPr>
+                              <m:t>𝑇</m:t>
+                            </m:r>
+                          </m:sup>
+                        </m:sSubSup>
+                        <m:sSub>
+                          <m:sSubPr>
+                            <m:ctrlPr>
+                              <a:rPr lang="es-MX" i="1">
+                                <a:latin typeface="Cambria Math" panose="02040503050406030204" pitchFamily="18" charset="0"/>
+                              </a:rPr>
+                            </m:ctrlPr>
+                          </m:sSubPr>
+                          <m:e>
+                            <m:r>
+                              <a:rPr lang="es-MX" i="1">
+                                <a:latin typeface="Cambria Math" panose="02040503050406030204" pitchFamily="18" charset="0"/>
+                              </a:rPr>
+                              <m:t>𝑏</m:t>
+                            </m:r>
+                          </m:e>
+                          <m:sub>
+                            <m:r>
+                              <a:rPr lang="es-MX" i="1">
+                                <a:latin typeface="Cambria Math" panose="02040503050406030204" pitchFamily="18" charset="0"/>
+                              </a:rPr>
+                              <m:t>𝑘</m:t>
+                            </m:r>
+                          </m:sub>
+                        </m:sSub>
+                      </m:den>
+                    </m:f>
+                  </m:oMath>
+                </a14:m>
+                <a:endParaRPr lang="es-ES_tradnl" dirty="0"/>
+              </a:p>
+              <a:p>
+                <a:pPr lvl="1"/>
+                <a:endParaRPr lang="es-ES_tradnl" dirty="0"/>
+              </a:p>
+              <a:p>
+                <a14:m>
+                  <m:oMath xmlns:m="http://schemas.openxmlformats.org/officeDocument/2006/math">
+                    <m:sSub>
+                      <m:sSubPr>
+                        <m:ctrlPr>
+                          <a:rPr lang="es-MX" i="1" smtClean="0">
+                            <a:latin typeface="Cambria Math" panose="02040503050406030204" pitchFamily="18" charset="0"/>
+                          </a:rPr>
+                        </m:ctrlPr>
+                      </m:sSubPr>
+                      <m:e>
+                        <m:r>
+                          <a:rPr lang="es-MX" i="1" smtClean="0">
+                            <a:latin typeface="Cambria Math" panose="02040503050406030204" pitchFamily="18" charset="0"/>
+                          </a:rPr>
+                          <m:t>𝜇</m:t>
+                        </m:r>
+                      </m:e>
+                      <m:sub>
+                        <m:r>
+                          <a:rPr lang="es-MX" b="0" i="1" smtClean="0">
+                            <a:latin typeface="Cambria Math" panose="02040503050406030204" pitchFamily="18" charset="0"/>
+                          </a:rPr>
+                          <m:t>𝑘</m:t>
+                        </m:r>
+                      </m:sub>
+                    </m:sSub>
+                  </m:oMath>
+                </a14:m>
+                <a:r>
+                  <a:rPr lang="es-ES_tradnl" dirty="0"/>
+                  <a:t> converge al eigenvalor dominante</a:t>
+                </a:r>
+              </a:p>
+              <a:p>
+                <a14:m>
+                  <m:oMath xmlns:m="http://schemas.openxmlformats.org/officeDocument/2006/math">
+                    <m:r>
+                      <a:rPr lang="es-ES_tradnl" i="1" dirty="0" smtClean="0">
+                        <a:latin typeface="Cambria Math" panose="02040503050406030204" pitchFamily="18" charset="0"/>
+                      </a:rPr>
+                      <m:t>𝑏</m:t>
+                    </m:r>
+                    <m:r>
+                      <a:rPr lang="es-ES_tradnl" i="1" dirty="0" smtClean="0">
+                        <a:latin typeface="Cambria Math" panose="02040503050406030204" pitchFamily="18" charset="0"/>
+                      </a:rPr>
+                      <m:t>_</m:t>
+                    </m:r>
+                    <m:r>
+                      <a:rPr lang="es-ES_tradnl" i="1" dirty="0" smtClean="0">
+                        <a:latin typeface="Cambria Math" panose="02040503050406030204" pitchFamily="18" charset="0"/>
+                      </a:rPr>
+                      <m:t>𝑘</m:t>
+                    </m:r>
+                  </m:oMath>
+                </a14:m>
+                <a:r>
+                  <a:rPr lang="es-ES_tradnl" dirty="0"/>
+                  <a:t> converge al </a:t>
+                </a:r>
+                <a:r>
+                  <a:rPr lang="es-ES_tradnl" dirty="0" err="1"/>
+                  <a:t>eigenvector</a:t>
+                </a:r>
+                <a:r>
+                  <a:rPr lang="es-ES_tradnl" dirty="0"/>
+                  <a:t> correspondiente</a:t>
+                </a:r>
+              </a:p>
+            </p:txBody>
+          </p:sp>
+        </mc:Choice>
+        <mc:Fallback>
+          <p:sp>
+            <p:nvSpPr>
+              <p:cNvPr id="4" name="Content Placeholder 3"/>
+              <p:cNvSpPr>
+                <a:spLocks noGrp="1" noRot="1" noChangeAspect="1" noMove="1" noResize="1" noEditPoints="1" noAdjustHandles="1" noChangeArrowheads="1" noChangeShapeType="1" noTextEdit="1"/>
+              </p:cNvSpPr>
+              <p:nvPr>
+                <p:ph sz="half" idx="2"/>
+              </p:nvPr>
+            </p:nvSpPr>
+            <p:spPr>
+              <a:xfrm>
+                <a:off x="6934200" y="2194560"/>
+                <a:ext cx="4184904" cy="3977640"/>
+              </a:xfrm>
+              <a:blipFill>
+                <a:blip r:embed="rId3"/>
+                <a:stretch>
+                  <a:fillRect l="-729" t="-2297" r="-1166"/>
+                </a:stretch>
+              </a:blipFill>
+            </p:spPr>
+            <p:txBody>
+              <a:bodyPr/>
+              <a:lstStyle/>
+              <a:p>
+                <a:r>
+                  <a:rPr lang="es-MX">
+                    <a:noFill/>
+                  </a:rPr>
+                  <a:t> </a:t>
+                </a:r>
+              </a:p>
+            </p:txBody>
+          </p:sp>
+        </mc:Fallback>
+      </mc:AlternateContent>
     </p:spTree>
     <p:extLst>
       <p:ext uri="{BB962C8B-B14F-4D97-AF65-F5344CB8AC3E}">
@@ -5505,10 +6758,9 @@
           <a:p>
             <a:pPr algn="ctr"/>
             <a:r>
-              <a:rPr lang="es-ES_tradnl" dirty="0" smtClean="0"/>
+              <a:rPr lang="es-ES_tradnl" dirty="0"/>
               <a:t>Comparación entre algoritmos</a:t>
             </a:r>
-            <a:endParaRPr lang="es-ES_tradnl" dirty="0"/>
           </a:p>
         </p:txBody>
       </p:sp>
@@ -5543,7 +6795,7 @@
               <a:t> PCA </a:t>
             </a:r>
             <a:r>
-              <a:rPr lang="en-US" sz="2400" dirty="0" err="1" smtClean="0"/>
+              <a:rPr lang="en-US" sz="2400" dirty="0" err="1"/>
               <a:t>utilizando</a:t>
             </a:r>
             <a:r>
@@ -5685,16 +6937,12 @@
           <a:p>
             <a:pPr lvl="1"/>
             <a:r>
-              <a:rPr lang="en-US" sz="2000" dirty="0" err="1" smtClean="0"/>
+              <a:rPr lang="en-US" sz="2000" dirty="0" err="1"/>
               <a:t>Programando</a:t>
             </a:r>
             <a:r>
-              <a:rPr lang="en-US" sz="2000" dirty="0" smtClean="0"/>
-              <a:t> </a:t>
-            </a:r>
-            <a:r>
               <a:rPr lang="en-US" sz="2000" dirty="0"/>
-              <a:t>el </a:t>
+              <a:t> el </a:t>
             </a:r>
             <a:r>
               <a:rPr lang="en-US" sz="2000" dirty="0" err="1"/>
@@ -5781,11 +7029,11 @@
           <a:p>
             <a:pPr algn="ctr"/>
             <a:r>
-              <a:rPr lang="es-ES_tradnl" dirty="0" smtClean="0"/>
+              <a:rPr lang="es-ES_tradnl" dirty="0"/>
               <a:t>1. Algoritmo </a:t>
             </a:r>
             <a:r>
-              <a:rPr lang="es-ES_tradnl" dirty="0" err="1" smtClean="0"/>
+              <a:rPr lang="es-ES_tradnl" dirty="0" err="1"/>
               <a:t>svd</a:t>
             </a:r>
             <a:endParaRPr lang="es-ES_tradnl" dirty="0"/>
@@ -6086,20 +7334,8 @@
           </a:lstStyle>
           <a:p>
             <a:r>
-              <a:rPr lang="es-ES_tradnl" sz="2400" dirty="0" smtClean="0"/>
-              <a:t>El </a:t>
-            </a:r>
-            <a:r>
               <a:rPr lang="es-ES_tradnl" sz="2400" dirty="0"/>
-              <a:t>mayor error relativo, que se presenta en las componentes principales </a:t>
-            </a:r>
-            <a:r>
-              <a:rPr lang="es-ES_tradnl" sz="2400" dirty="0" smtClean="0"/>
-              <a:t>fue </a:t>
-            </a:r>
-            <a:r>
-              <a:rPr lang="es-ES_tradnl" sz="2400" dirty="0"/>
-              <a:t>del orden de 10</a:t>
+              <a:t>El mayor error relativo, que se presenta en las componentes principales fue del orden de 10</a:t>
             </a:r>
             <a:r>
               <a:rPr lang="es-ES_tradnl" sz="2400" baseline="30000" dirty="0"/>
@@ -6159,11 +7395,11 @@
           <a:p>
             <a:pPr algn="ctr"/>
             <a:r>
-              <a:rPr lang="es-ES_tradnl" dirty="0" smtClean="0"/>
+              <a:rPr lang="es-ES_tradnl" dirty="0"/>
               <a:t>2. Algoritmo </a:t>
             </a:r>
             <a:r>
-              <a:rPr lang="es-ES_tradnl" dirty="0" err="1" smtClean="0"/>
+              <a:rPr lang="es-ES_tradnl" dirty="0" err="1"/>
               <a:t>qr</a:t>
             </a:r>
             <a:endParaRPr lang="es-ES_tradnl" dirty="0"/>
@@ -6464,34 +7700,17 @@
           </a:lstStyle>
           <a:p>
             <a:r>
-              <a:rPr lang="es-ES_tradnl" sz="2400" dirty="0" smtClean="0"/>
-              <a:t>El </a:t>
-            </a:r>
-            <a:r>
               <a:rPr lang="es-ES_tradnl" sz="2400" dirty="0"/>
-              <a:t>mayor error relativo, que se presenta en las componentes principales </a:t>
-            </a:r>
-            <a:r>
-              <a:rPr lang="es-ES_tradnl" sz="2400" dirty="0" smtClean="0"/>
-              <a:t>fue </a:t>
+              <a:t>El mayor error relativo, que se presenta en las componentes principales fue del orden de 10</a:t>
+            </a:r>
+            <a:r>
+              <a:rPr lang="es-ES_tradnl" sz="2400" baseline="30000" dirty="0"/>
+              <a:t>-5</a:t>
             </a:r>
             <a:r>
               <a:rPr lang="es-ES_tradnl" sz="2400" dirty="0"/>
-              <a:t>del orden de </a:t>
-            </a:r>
-            <a:r>
-              <a:rPr lang="es-ES_tradnl" sz="2400" dirty="0" smtClean="0"/>
-              <a:t>10</a:t>
-            </a:r>
-            <a:r>
-              <a:rPr lang="es-ES_tradnl" sz="2400" baseline="30000" dirty="0" smtClean="0"/>
-              <a:t>-5</a:t>
-            </a:r>
-            <a:r>
-              <a:rPr lang="es-ES_tradnl" sz="2400" dirty="0" smtClean="0"/>
               <a:t>.</a:t>
             </a:r>
-            <a:endParaRPr lang="es-ES_tradnl" sz="2400" dirty="0"/>
           </a:p>
         </p:txBody>
       </p:sp>
@@ -6547,10 +7766,9 @@
           <a:p>
             <a:pPr algn="ctr"/>
             <a:r>
-              <a:rPr lang="es-ES_tradnl" dirty="0" smtClean="0"/>
+              <a:rPr lang="es-ES_tradnl" dirty="0"/>
               <a:t>3. Método de la potencia</a:t>
             </a:r>
-            <a:endParaRPr lang="es-ES_tradnl" dirty="0"/>
           </a:p>
         </p:txBody>
       </p:sp>
@@ -6625,11 +7843,11 @@
           <a:p>
             <a:pPr algn="ctr"/>
             <a:r>
-              <a:rPr lang="es-ES_tradnl" dirty="0" smtClean="0"/>
+              <a:rPr lang="es-ES_tradnl" dirty="0"/>
               <a:t>Varianza explicada y </a:t>
             </a:r>
             <a:r>
-              <a:rPr lang="es-ES_tradnl" dirty="0" err="1" smtClean="0"/>
+              <a:rPr lang="es-ES_tradnl" dirty="0" err="1"/>
               <a:t>eigenvalores</a:t>
             </a:r>
             <a:endParaRPr lang="es-ES_tradnl" dirty="0"/>
@@ -6657,14 +7875,14 @@
           <a:lstStyle/>
           <a:p>
             <a:r>
-              <a:rPr lang="es-ES_tradnl" dirty="0" smtClean="0"/>
+              <a:rPr lang="es-ES_tradnl" dirty="0"/>
               <a:t>Criterio de varianza explicada (80%): </a:t>
             </a:r>
           </a:p>
           <a:p>
             <a:pPr lvl="1"/>
             <a:r>
-              <a:rPr lang="es-ES_tradnl" dirty="0" smtClean="0"/>
+              <a:rPr lang="es-ES_tradnl" dirty="0"/>
               <a:t>10 componentes</a:t>
             </a:r>
           </a:p>
@@ -6965,11 +8183,11 @@
           </a:lstStyle>
           <a:p>
             <a:r>
-              <a:rPr lang="es-ES_tradnl" dirty="0" err="1" smtClean="0"/>
+              <a:rPr lang="es-ES_tradnl" dirty="0" err="1"/>
               <a:t>Eigenvalores</a:t>
             </a:r>
             <a:r>
-              <a:rPr lang="es-ES_tradnl" dirty="0" smtClean="0"/>
+              <a:rPr lang="es-ES_tradnl" dirty="0"/>
               <a:t> (&gt;1): </a:t>
             </a:r>
           </a:p>
@@ -6977,13 +8195,8 @@
             <a:pPr lvl="1"/>
             <a:r>
               <a:rPr lang="es-ES_tradnl" dirty="0"/>
-              <a:t>7</a:t>
-            </a:r>
-            <a:r>
-              <a:rPr lang="es-ES_tradnl" dirty="0" smtClean="0"/>
-              <a:t> componentes</a:t>
-            </a:r>
-            <a:endParaRPr lang="es-ES_tradnl" dirty="0" smtClean="0"/>
+              <a:t>7 componentes</a:t>
+            </a:r>
           </a:p>
         </p:txBody>
       </p:sp>
@@ -7252,92 +8465,84 @@
           </a:lstStyle>
           <a:p>
             <a:r>
-              <a:rPr lang="es-ES_tradnl" dirty="0" smtClean="0"/>
+              <a:rPr lang="es-ES_tradnl" dirty="0"/>
               <a:t>C1: </a:t>
             </a:r>
             <a:r>
-              <a:rPr lang="hr-HR" dirty="0" smtClean="0"/>
+              <a:rPr lang="hr-HR" dirty="0"/>
               <a:t>5.44991815</a:t>
             </a:r>
           </a:p>
           <a:p>
             <a:r>
-              <a:rPr lang="hr-HR" dirty="0" smtClean="0"/>
+              <a:rPr lang="hr-HR" dirty="0"/>
               <a:t>C2: </a:t>
             </a:r>
             <a:r>
-              <a:rPr lang="cs-CZ" dirty="0" smtClean="0"/>
+              <a:rPr lang="cs-CZ" dirty="0"/>
               <a:t>2.61876222</a:t>
             </a:r>
           </a:p>
           <a:p>
             <a:r>
-              <a:rPr lang="cs-CZ" dirty="0" smtClean="0"/>
+              <a:rPr lang="cs-CZ" dirty="0"/>
               <a:t>C3: </a:t>
             </a:r>
             <a:r>
-              <a:rPr lang="is-IS" dirty="0" smtClean="0"/>
+              <a:rPr lang="is-IS" dirty="0"/>
               <a:t>2.03213339</a:t>
             </a:r>
           </a:p>
           <a:p>
             <a:r>
-              <a:rPr lang="is-IS" dirty="0" smtClean="0"/>
+              <a:rPr lang="is-IS" dirty="0"/>
               <a:t>C4: </a:t>
             </a:r>
             <a:r>
-              <a:rPr lang="fi-FI" dirty="0" smtClean="0"/>
+              <a:rPr lang="fi-FI" dirty="0"/>
               <a:t>1.87934951</a:t>
             </a:r>
           </a:p>
           <a:p>
             <a:r>
-              <a:rPr lang="fi-FI" dirty="0" smtClean="0"/>
+              <a:rPr lang="fi-FI" dirty="0"/>
               <a:t>C5: </a:t>
             </a:r>
             <a:r>
-              <a:rPr lang="tr-TR" dirty="0" smtClean="0"/>
+              <a:rPr lang="tr-TR" dirty="0"/>
               <a:t>1.63586122</a:t>
             </a:r>
           </a:p>
           <a:p>
             <a:r>
-              <a:rPr lang="tr-TR" dirty="0" smtClean="0"/>
+              <a:rPr lang="tr-TR" dirty="0"/>
               <a:t>C6: </a:t>
             </a:r>
             <a:r>
-              <a:rPr lang="nb-NO" dirty="0" smtClean="0"/>
+              <a:rPr lang="nb-NO" dirty="0"/>
               <a:t>1.140503</a:t>
             </a:r>
           </a:p>
           <a:p>
             <a:r>
-              <a:rPr lang="nb-NO" dirty="0" smtClean="0"/>
+              <a:rPr lang="nb-NO" dirty="0"/>
               <a:t>C7: </a:t>
             </a:r>
             <a:r>
-              <a:rPr lang="is-IS" dirty="0" smtClean="0"/>
+              <a:rPr lang="is-IS" dirty="0"/>
               <a:t>1.06099038</a:t>
             </a:r>
           </a:p>
           <a:p>
             <a:r>
               <a:rPr lang="is-IS" dirty="0"/>
-              <a:t>C8: </a:t>
-            </a:r>
-            <a:r>
-              <a:rPr lang="is-IS" dirty="0" smtClean="0"/>
-              <a:t>0.92636129</a:t>
+              <a:t>C8: 0.92636129</a:t>
             </a:r>
           </a:p>
           <a:p>
             <a:r>
               <a:rPr lang="is-IS" dirty="0"/>
-              <a:t>C9: </a:t>
-            </a:r>
-            <a:r>
-              <a:rPr lang="is-IS" dirty="0" smtClean="0"/>
-              <a:t>0.8621182</a:t>
+              <a:t>C9: 0.8621182</a:t>
             </a:r>
           </a:p>
           <a:p>
@@ -7345,7 +8550,7 @@
               <a:rPr lang="is-IS" dirty="0"/>
               <a:t>C10: 0.82478215</a:t>
             </a:r>
-            <a:endParaRPr lang="es-ES_tradnl" dirty="0" smtClean="0"/>
+            <a:endParaRPr lang="es-ES_tradnl" dirty="0"/>
           </a:p>
         </p:txBody>
       </p:sp>
@@ -7401,10 +8606,9 @@
           <a:p>
             <a:pPr algn="ctr"/>
             <a:r>
-              <a:rPr lang="es-ES_tradnl" dirty="0" smtClean="0"/>
+              <a:rPr lang="es-ES_tradnl" dirty="0"/>
               <a:t>Interpretación de componentes</a:t>
             </a:r>
-            <a:endParaRPr lang="es-ES_tradnl" dirty="0"/>
           </a:p>
         </p:txBody>
       </p:sp>
@@ -7702,10 +8906,9 @@
           </a:lstStyle>
           <a:p>
             <a:r>
-              <a:rPr lang="es-ES_tradnl" dirty="0" smtClean="0"/>
+              <a:rPr lang="es-ES_tradnl" dirty="0"/>
               <a:t>Componente 1</a:t>
             </a:r>
-            <a:endParaRPr lang="es-ES_tradnl" dirty="0" smtClean="0"/>
           </a:p>
         </p:txBody>
       </p:sp>
@@ -7974,10 +9177,9 @@
           </a:lstStyle>
           <a:p>
             <a:r>
-              <a:rPr lang="es-ES_tradnl" dirty="0" smtClean="0"/>
+              <a:rPr lang="es-ES_tradnl" dirty="0"/>
               <a:t>Componente 2</a:t>
             </a:r>
-            <a:endParaRPr lang="es-ES_tradnl" dirty="0" smtClean="0"/>
           </a:p>
         </p:txBody>
       </p:sp>
@@ -8246,10 +9448,9 @@
           </a:lstStyle>
           <a:p>
             <a:r>
-              <a:rPr lang="es-ES_tradnl" dirty="0" smtClean="0"/>
+              <a:rPr lang="es-ES_tradnl" dirty="0"/>
               <a:t>Componente 3</a:t>
             </a:r>
-            <a:endParaRPr lang="es-ES_tradnl" dirty="0" smtClean="0"/>
           </a:p>
         </p:txBody>
       </p:sp>
@@ -8578,10 +9779,9 @@
           </a:lstStyle>
           <a:p>
             <a:r>
-              <a:rPr lang="es-ES_tradnl" dirty="0" smtClean="0"/>
+              <a:rPr lang="es-ES_tradnl" dirty="0"/>
               <a:t>Componente 4</a:t>
             </a:r>
-            <a:endParaRPr lang="es-ES_tradnl" dirty="0" smtClean="0"/>
           </a:p>
         </p:txBody>
       </p:sp>
@@ -8667,10 +9867,9 @@
           <a:p>
             <a:pPr algn="ctr"/>
             <a:r>
-              <a:rPr lang="es-ES_tradnl" dirty="0" smtClean="0"/>
+              <a:rPr lang="es-ES_tradnl" dirty="0"/>
               <a:t>Tabla de contenidos</a:t>
             </a:r>
-            <a:endParaRPr lang="es-ES_tradnl" dirty="0"/>
           </a:p>
         </p:txBody>
       </p:sp>
@@ -8733,18 +9932,11 @@
           </a:p>
           <a:p>
             <a:r>
-              <a:rPr lang="en-US" sz="2400" u="sng" dirty="0" smtClean="0">
-                <a:effectLst/>
-                <a:hlinkClick r:id="rId5"/>
-              </a:rPr>
-              <a:t>Teoría </a:t>
-            </a:r>
-            <a:r>
               <a:rPr lang="en-US" sz="2400" u="sng" dirty="0">
                 <a:effectLst/>
                 <a:hlinkClick r:id="rId5"/>
               </a:rPr>
-              <a:t>del Análisis de Componentes Principales</a:t>
+              <a:t>Teoría del Análisis de Componentes Principales</a:t>
             </a:r>
             <a:endParaRPr lang="en-US" sz="2400" dirty="0">
               <a:effectLst/>
@@ -8764,18 +9956,11 @@
           </a:p>
           <a:p>
             <a:r>
-              <a:rPr lang="en-US" sz="2400" u="sng" dirty="0" smtClean="0">
-                <a:effectLst/>
-                <a:hlinkClick r:id="rId7"/>
-              </a:rPr>
-              <a:t>Análisis </a:t>
-            </a:r>
-            <a:r>
               <a:rPr lang="en-US" sz="2400" u="sng" dirty="0">
                 <a:effectLst/>
                 <a:hlinkClick r:id="rId7"/>
               </a:rPr>
-              <a:t>de conglomerados (clustering)</a:t>
+              <a:t>Análisis de conglomerados (clustering)</a:t>
             </a:r>
             <a:endParaRPr lang="en-US" sz="2400" dirty="0">
               <a:effectLst/>
@@ -8795,7 +9980,7 @@
           </a:p>
           <a:p>
             <a:r>
-              <a:rPr lang="en-US" sz="2400" u="sng" dirty="0" smtClean="0">
+              <a:rPr lang="en-US" sz="2400" u="sng" dirty="0">
                 <a:effectLst/>
                 <a:hlinkClick r:id="rId9"/>
               </a:rPr>
@@ -8859,10 +10044,9 @@
           <a:p>
             <a:pPr algn="ctr"/>
             <a:r>
-              <a:rPr lang="es-ES_tradnl" dirty="0" smtClean="0"/>
+              <a:rPr lang="es-ES_tradnl" dirty="0"/>
               <a:t>Interpretación de componentes</a:t>
             </a:r>
-            <a:endParaRPr lang="es-ES_tradnl" dirty="0"/>
           </a:p>
         </p:txBody>
       </p:sp>
@@ -9131,10 +10315,9 @@
           </a:lstStyle>
           <a:p>
             <a:r>
-              <a:rPr lang="es-ES_tradnl" dirty="0" smtClean="0"/>
+              <a:rPr lang="es-ES_tradnl" dirty="0"/>
               <a:t>Componente 5</a:t>
             </a:r>
-            <a:endParaRPr lang="es-ES_tradnl" dirty="0" smtClean="0"/>
           </a:p>
         </p:txBody>
       </p:sp>
@@ -9403,10 +10586,9 @@
           </a:lstStyle>
           <a:p>
             <a:r>
-              <a:rPr lang="es-ES_tradnl" dirty="0" smtClean="0"/>
+              <a:rPr lang="es-ES_tradnl" dirty="0"/>
               <a:t>Componente 6</a:t>
             </a:r>
-            <a:endParaRPr lang="es-ES_tradnl" dirty="0" smtClean="0"/>
           </a:p>
         </p:txBody>
       </p:sp>
@@ -9675,10 +10857,9 @@
           </a:lstStyle>
           <a:p>
             <a:r>
-              <a:rPr lang="es-ES_tradnl" dirty="0" smtClean="0"/>
+              <a:rPr lang="es-ES_tradnl" dirty="0"/>
               <a:t>Componente 7</a:t>
             </a:r>
-            <a:endParaRPr lang="es-ES_tradnl" dirty="0" smtClean="0"/>
           </a:p>
         </p:txBody>
       </p:sp>
@@ -9823,14 +11004,9 @@
           <a:p>
             <a:pPr algn="ctr"/>
             <a:r>
-              <a:rPr lang="es-ES_tradnl" dirty="0" smtClean="0"/>
-              <a:t>Análisis </a:t>
-            </a:r>
-            <a:r>
-              <a:rPr lang="es-ES_tradnl" dirty="0" smtClean="0"/>
-              <a:t>de conglomerados</a:t>
-            </a:r>
-            <a:endParaRPr lang="es-ES_tradnl" dirty="0"/>
+              <a:rPr lang="es-ES_tradnl" dirty="0"/>
+              <a:t>Análisis de conglomerados</a:t>
+            </a:r>
           </a:p>
         </p:txBody>
       </p:sp>
@@ -9863,13 +11039,6 @@
   <p:clrMapOvr>
     <a:masterClrMapping/>
   </p:clrMapOvr>
-  <p:timing>
-    <p:tnLst>
-      <p:par>
-        <p:cTn id="1" dur="indefinite" restart="never" nodeType="tmRoot"/>
-      </p:par>
-    </p:tnLst>
-  </p:timing>
 </p:sld>
 </file>
 
@@ -9912,7 +11081,7 @@
           <a:p>
             <a:pPr algn="ctr"/>
             <a:r>
-              <a:rPr lang="es-ES_tradnl" dirty="0" err="1" smtClean="0"/>
+              <a:rPr lang="es-ES_tradnl" dirty="0" err="1"/>
               <a:t>Paralelización</a:t>
             </a:r>
             <a:endParaRPr lang="es-ES_tradnl" dirty="0"/>
@@ -9948,13 +11117,6 @@
   <p:clrMapOvr>
     <a:masterClrMapping/>
   </p:clrMapOvr>
-  <p:timing>
-    <p:tnLst>
-      <p:par>
-        <p:cTn id="1" dur="indefinite" restart="never" nodeType="tmRoot"/>
-      </p:par>
-    </p:tnLst>
-  </p:timing>
 </p:sld>
 </file>
 
@@ -9997,10 +11159,9 @@
           <a:p>
             <a:pPr algn="ctr"/>
             <a:r>
-              <a:rPr lang="es-ES_tradnl" dirty="0" smtClean="0"/>
+              <a:rPr lang="es-ES_tradnl" dirty="0"/>
               <a:t>Conclusión</a:t>
             </a:r>
-            <a:endParaRPr lang="es-ES_tradnl" dirty="0"/>
           </a:p>
         </p:txBody>
       </p:sp>
@@ -10075,10 +11236,9 @@
           <a:p>
             <a:pPr algn="ctr"/>
             <a:r>
-              <a:rPr lang="es-ES_tradnl" dirty="0" smtClean="0"/>
+              <a:rPr lang="es-ES_tradnl" dirty="0"/>
               <a:t>referencias</a:t>
             </a:r>
-            <a:endParaRPr lang="es-ES_tradnl" dirty="0"/>
           </a:p>
         </p:txBody>
       </p:sp>
@@ -10418,10 +11578,9 @@
           <a:p>
             <a:pPr algn="ctr"/>
             <a:r>
-              <a:rPr lang="es-ES_tradnl" dirty="0" smtClean="0"/>
+              <a:rPr lang="es-ES_tradnl" dirty="0"/>
               <a:t>Introducción</a:t>
             </a:r>
-            <a:endParaRPr lang="es-ES_tradnl" dirty="0"/>
           </a:p>
         </p:txBody>
       </p:sp>
@@ -10446,32 +11605,28 @@
           <a:lstStyle/>
           <a:p>
             <a:r>
-              <a:rPr lang="en-US" dirty="0" err="1" smtClean="0"/>
+              <a:rPr lang="en-US" dirty="0" err="1"/>
               <a:t>Métodos</a:t>
             </a:r>
             <a:r>
-              <a:rPr lang="en-US" dirty="0" smtClean="0"/>
+              <a:rPr lang="en-US" dirty="0"/>
               <a:t> </a:t>
             </a:r>
             <a:r>
-              <a:rPr lang="en-US" dirty="0" err="1" smtClean="0"/>
+              <a:rPr lang="en-US" dirty="0" err="1"/>
               <a:t>numéricos</a:t>
             </a:r>
             <a:r>
-              <a:rPr lang="en-US" dirty="0" smtClean="0"/>
+              <a:rPr lang="en-US" dirty="0"/>
               <a:t>: </a:t>
             </a:r>
             <a:r>
-              <a:rPr lang="en-US" dirty="0" err="1" smtClean="0"/>
+              <a:rPr lang="en-US" dirty="0" err="1"/>
               <a:t>Análisis</a:t>
             </a:r>
             <a:r>
-              <a:rPr lang="en-US" dirty="0" smtClean="0"/>
-              <a:t> </a:t>
-            </a:r>
-            <a:r>
               <a:rPr lang="en-US" dirty="0"/>
-              <a:t>de </a:t>
+              <a:t> de </a:t>
             </a:r>
             <a:r>
               <a:rPr lang="en-US" dirty="0" err="1"/>
@@ -10482,105 +11637,101 @@
               <a:t> </a:t>
             </a:r>
             <a:r>
-              <a:rPr lang="en-US" dirty="0" err="1" smtClean="0"/>
+              <a:rPr lang="en-US" dirty="0" err="1"/>
               <a:t>Principales</a:t>
             </a:r>
             <a:r>
-              <a:rPr lang="en-US" dirty="0" smtClean="0"/>
+              <a:rPr lang="en-US" dirty="0"/>
               <a:t> con </a:t>
             </a:r>
             <a:r>
-              <a:rPr lang="en-US" dirty="0" err="1" smtClean="0"/>
+              <a:rPr lang="en-US" dirty="0" err="1"/>
               <a:t>los</a:t>
             </a:r>
             <a:r>
-              <a:rPr lang="en-US" dirty="0" smtClean="0"/>
+              <a:rPr lang="en-US" dirty="0"/>
               <a:t> </a:t>
             </a:r>
             <a:r>
-              <a:rPr lang="en-US" dirty="0" err="1" smtClean="0"/>
+              <a:rPr lang="en-US" dirty="0" err="1"/>
               <a:t>algoritmos</a:t>
             </a:r>
             <a:r>
-              <a:rPr lang="en-US" dirty="0" smtClean="0"/>
+              <a:rPr lang="en-US" dirty="0"/>
               <a:t>:</a:t>
             </a:r>
           </a:p>
           <a:p>
             <a:pPr lvl="1"/>
             <a:r>
-              <a:rPr lang="en-US" dirty="0" err="1" smtClean="0"/>
+              <a:rPr lang="en-US" dirty="0" err="1"/>
               <a:t>Algoritmo</a:t>
             </a:r>
             <a:r>
-              <a:rPr lang="en-US" dirty="0" smtClean="0"/>
+              <a:rPr lang="en-US" dirty="0"/>
               <a:t> de SVD.</a:t>
             </a:r>
           </a:p>
           <a:p>
             <a:pPr lvl="1"/>
             <a:r>
-              <a:rPr lang="en-US" dirty="0" err="1" smtClean="0"/>
+              <a:rPr lang="en-US" dirty="0" err="1"/>
               <a:t>Algoritmo</a:t>
             </a:r>
             <a:r>
-              <a:rPr lang="en-US" dirty="0" smtClean="0"/>
+              <a:rPr lang="en-US" dirty="0"/>
               <a:t> QR.</a:t>
             </a:r>
           </a:p>
           <a:p>
             <a:pPr lvl="1"/>
             <a:r>
-              <a:rPr lang="en-US" dirty="0" err="1" smtClean="0"/>
+              <a:rPr lang="en-US" dirty="0" err="1"/>
               <a:t>Método</a:t>
             </a:r>
             <a:r>
-              <a:rPr lang="en-US" dirty="0" smtClean="0"/>
-              <a:t> </a:t>
-            </a:r>
-            <a:r>
               <a:rPr lang="en-US" dirty="0"/>
-              <a:t>de la </a:t>
+              <a:t> de la </a:t>
             </a:r>
             <a:r>
               <a:rPr lang="en-US" dirty="0" err="1"/>
               <a:t>potencia</a:t>
             </a:r>
             <a:r>
-              <a:rPr lang="en-US" dirty="0" smtClean="0"/>
+              <a:rPr lang="en-US" dirty="0"/>
               <a:t>.</a:t>
             </a:r>
           </a:p>
           <a:p>
             <a:pPr lvl="1"/>
             <a:r>
-              <a:rPr lang="en-US" dirty="0" smtClean="0"/>
+              <a:rPr lang="en-US" dirty="0"/>
               <a:t>PCA de </a:t>
             </a:r>
             <a:r>
-              <a:rPr lang="en-US" dirty="0" err="1" smtClean="0"/>
+              <a:rPr lang="en-US" dirty="0" err="1"/>
               <a:t>sklearn</a:t>
             </a:r>
             <a:r>
-              <a:rPr lang="en-US" dirty="0" smtClean="0"/>
+              <a:rPr lang="en-US" dirty="0"/>
               <a:t>.</a:t>
             </a:r>
           </a:p>
           <a:p>
             <a:pPr lvl="1"/>
-            <a:endParaRPr lang="en-US" dirty="0" smtClean="0"/>
-          </a:p>
-          <a:p>
-            <a:r>
-              <a:rPr lang="en-US" dirty="0" smtClean="0"/>
+            <a:endParaRPr lang="en-US" dirty="0"/>
+          </a:p>
+          <a:p>
+            <a:r>
+              <a:rPr lang="en-US" dirty="0"/>
               <a:t> </a:t>
             </a:r>
             <a:r>
-              <a:rPr lang="en-US" dirty="0" err="1" smtClean="0"/>
+              <a:rPr lang="en-US" dirty="0" err="1"/>
               <a:t>Clasificar</a:t>
             </a:r>
             <a:r>
-              <a:rPr lang="en-US" dirty="0" smtClean="0"/>
+              <a:rPr lang="en-US" dirty="0"/>
               <a:t> </a:t>
             </a:r>
             <a:r>
@@ -10632,16 +11783,12 @@
               <a:t> </a:t>
             </a:r>
             <a:r>
-              <a:rPr lang="en-US" dirty="0" err="1" smtClean="0"/>
+              <a:rPr lang="en-US" dirty="0" err="1"/>
               <a:t>eliminado</a:t>
             </a:r>
             <a:r>
-              <a:rPr lang="en-US" dirty="0" smtClean="0"/>
-              <a:t> </a:t>
-            </a:r>
-            <a:r>
               <a:rPr lang="en-US" dirty="0"/>
-              <a:t>la multicolinealidad de la base.</a:t>
+              <a:t> la multicolinealidad de la base.</a:t>
             </a:r>
             <a:endParaRPr lang="es-ES_tradnl" dirty="0"/>
           </a:p>
@@ -10699,10 +11846,9 @@
           <a:p>
             <a:pPr algn="ctr"/>
             <a:r>
-              <a:rPr lang="es-ES_tradnl" dirty="0" smtClean="0"/>
+              <a:rPr lang="es-ES_tradnl" dirty="0"/>
               <a:t>Datos y contexto</a:t>
             </a:r>
-            <a:endParaRPr lang="es-ES_tradnl" dirty="0"/>
           </a:p>
         </p:txBody>
       </p:sp>
@@ -10730,14 +11876,10 @@
           <a:p>
             <a:r>
               <a:rPr lang="en-US" dirty="0" err="1"/>
-              <a:t>D</a:t>
-            </a:r>
-            <a:r>
-              <a:rPr lang="en-US" dirty="0" err="1" smtClean="0"/>
-              <a:t>atos</a:t>
-            </a:r>
-            <a:r>
-              <a:rPr lang="en-US" dirty="0" smtClean="0"/>
+              <a:t>Datos</a:t>
+            </a:r>
+            <a:r>
+              <a:rPr lang="en-US" dirty="0"/>
               <a:t> </a:t>
             </a:r>
             <a:r>
@@ -10762,24 +11904,20 @@
             </a:r>
             <a:r>
               <a:rPr lang="en-US" dirty="0"/>
-              <a:t> de la USDA National Nutrient Database for Standard Reference (SR) </a:t>
-            </a:r>
-            <a:r>
-              <a:rPr lang="en-US" dirty="0" smtClean="0"/>
-              <a:t> (2014).</a:t>
-            </a:r>
-          </a:p>
-          <a:p>
-            <a:r>
-              <a:rPr lang="en-US" dirty="0" smtClean="0"/>
+              <a:t> de la USDA National Nutrient Database for Standard Reference (SR)  (2014).</a:t>
+            </a:r>
+          </a:p>
+          <a:p>
+            <a:r>
+              <a:rPr lang="en-US" dirty="0"/>
               <a:t>8,618 </a:t>
             </a:r>
             <a:r>
-              <a:rPr lang="en-US" dirty="0" err="1" smtClean="0"/>
+              <a:rPr lang="en-US" dirty="0" err="1"/>
               <a:t>observaciones</a:t>
             </a:r>
             <a:r>
-              <a:rPr lang="en-US" dirty="0" smtClean="0"/>
+              <a:rPr lang="en-US" dirty="0"/>
               <a:t> y 45 variables</a:t>
             </a:r>
             <a:endParaRPr lang="es-ES_tradnl" dirty="0"/>
@@ -10868,10 +12006,9 @@
           <a:p>
             <a:pPr algn="ctr"/>
             <a:r>
-              <a:rPr lang="es-ES_tradnl" dirty="0" smtClean="0"/>
+              <a:rPr lang="es-ES_tradnl" dirty="0"/>
               <a:t>Diagnóstico de Multicolinealidad</a:t>
             </a:r>
-            <a:endParaRPr lang="es-ES_tradnl" dirty="0"/>
           </a:p>
         </p:txBody>
       </p:sp>
@@ -10956,18 +12093,13 @@
           <a:p>
             <a:pPr algn="ctr"/>
             <a:r>
-              <a:rPr lang="es-ES_tradnl" dirty="0" err="1" smtClean="0"/>
+              <a:rPr lang="es-ES_tradnl" dirty="0" err="1"/>
               <a:t>Distr</a:t>
             </a:r>
             <a:r>
-              <a:rPr lang="es-ES_tradnl" dirty="0" smtClean="0"/>
-              <a:t>.</a:t>
-            </a:r>
-            <a:r>
-              <a:rPr lang="es-ES_tradnl" dirty="0" smtClean="0"/>
-              <a:t> de los macro y micronutrientes</a:t>
-            </a:r>
-            <a:endParaRPr lang="es-ES_tradnl" dirty="0"/>
+              <a:rPr lang="es-ES_tradnl" dirty="0"/>
+              <a:t>. de los macro y micronutrientes</a:t>
+            </a:r>
           </a:p>
         </p:txBody>
       </p:sp>
@@ -11042,10 +12174,9 @@
           <a:p>
             <a:pPr algn="ctr"/>
             <a:r>
-              <a:rPr lang="es-ES_tradnl" dirty="0" smtClean="0"/>
+              <a:rPr lang="es-ES_tradnl" dirty="0"/>
               <a:t>Frecuencia por grupo de alimento</a:t>
             </a:r>
-            <a:endParaRPr lang="es-ES_tradnl" dirty="0"/>
           </a:p>
         </p:txBody>
       </p:sp>
@@ -11130,18 +12261,13 @@
           <a:p>
             <a:pPr algn="ctr"/>
             <a:r>
-              <a:rPr lang="es-ES_tradnl" dirty="0" err="1" smtClean="0"/>
+              <a:rPr lang="es-ES_tradnl" dirty="0" err="1"/>
               <a:t>kilocalorias</a:t>
             </a:r>
             <a:r>
-              <a:rPr lang="es-ES_tradnl" dirty="0" smtClean="0"/>
-              <a:t> </a:t>
-            </a:r>
-            <a:r>
               <a:rPr lang="es-ES_tradnl" dirty="0"/>
-              <a:t>por grupo de alimento</a:t>
-            </a:r>
-            <a:endParaRPr lang="es-ES_tradnl" dirty="0"/>
+              <a:t> por grupo de alimento</a:t>
+            </a:r>
           </a:p>
         </p:txBody>
       </p:sp>
@@ -11216,14 +12342,9 @@
           <a:p>
             <a:pPr algn="ctr"/>
             <a:r>
-              <a:rPr lang="es-ES_tradnl" dirty="0" smtClean="0"/>
-              <a:t>grasas </a:t>
-            </a:r>
-            <a:r>
               <a:rPr lang="es-ES_tradnl" dirty="0"/>
-              <a:t>por grupo de alimento</a:t>
-            </a:r>
-            <a:endParaRPr lang="es-ES_tradnl" dirty="0"/>
+              <a:t>grasas por grupo de alimento</a:t>
+            </a:r>
           </a:p>
         </p:txBody>
       </p:sp>

</xml_diff>

<commit_message>
aregando EDA al reporte y presentacion
</commit_message>
<xml_diff>
--- a/results/PCA_presentacion.pptx
+++ b/results/PCA_presentacion.pptx
@@ -5,7 +5,7 @@
     <p:sldMasterId id="2147483787" r:id="rId1"/>
   </p:sldMasterIdLst>
   <p:notesMasterIdLst>
-    <p:notesMasterId r:id="rId26"/>
+    <p:notesMasterId r:id="rId30"/>
   </p:notesMasterIdLst>
   <p:sldIdLst>
     <p:sldId id="256" r:id="rId2"/>
@@ -14,24 +14,28 @@
     <p:sldId id="259" r:id="rId5"/>
     <p:sldId id="262" r:id="rId6"/>
     <p:sldId id="261" r:id="rId7"/>
-    <p:sldId id="274" r:id="rId8"/>
-    <p:sldId id="278" r:id="rId9"/>
-    <p:sldId id="279" r:id="rId10"/>
-    <p:sldId id="263" r:id="rId11"/>
-    <p:sldId id="280" r:id="rId12"/>
-    <p:sldId id="281" r:id="rId13"/>
-    <p:sldId id="282" r:id="rId14"/>
-    <p:sldId id="264" r:id="rId15"/>
-    <p:sldId id="269" r:id="rId16"/>
-    <p:sldId id="270" r:id="rId17"/>
-    <p:sldId id="271" r:id="rId18"/>
-    <p:sldId id="265" r:id="rId19"/>
-    <p:sldId id="283" r:id="rId20"/>
-    <p:sldId id="285" r:id="rId21"/>
-    <p:sldId id="267" r:id="rId22"/>
-    <p:sldId id="277" r:id="rId23"/>
-    <p:sldId id="268" r:id="rId24"/>
-    <p:sldId id="273" r:id="rId25"/>
+    <p:sldId id="287" r:id="rId8"/>
+    <p:sldId id="274" r:id="rId9"/>
+    <p:sldId id="278" r:id="rId10"/>
+    <p:sldId id="288" r:id="rId11"/>
+    <p:sldId id="279" r:id="rId12"/>
+    <p:sldId id="289" r:id="rId13"/>
+    <p:sldId id="290" r:id="rId14"/>
+    <p:sldId id="263" r:id="rId15"/>
+    <p:sldId id="280" r:id="rId16"/>
+    <p:sldId id="281" r:id="rId17"/>
+    <p:sldId id="282" r:id="rId18"/>
+    <p:sldId id="264" r:id="rId19"/>
+    <p:sldId id="269" r:id="rId20"/>
+    <p:sldId id="270" r:id="rId21"/>
+    <p:sldId id="271" r:id="rId22"/>
+    <p:sldId id="265" r:id="rId23"/>
+    <p:sldId id="283" r:id="rId24"/>
+    <p:sldId id="285" r:id="rId25"/>
+    <p:sldId id="267" r:id="rId26"/>
+    <p:sldId id="277" r:id="rId27"/>
+    <p:sldId id="268" r:id="rId28"/>
+    <p:sldId id="273" r:id="rId29"/>
   </p:sldIdLst>
   <p:sldSz cx="12192000" cy="6858000"/>
   <p:notesSz cx="6858000" cy="9144000"/>
@@ -220,7 +224,7 @@
           <a:p>
             <a:fld id="{395C63AC-4902-F448-A1B5-F71A761D9957}" type="datetimeFigureOut">
               <a:rPr lang="es-ES_tradnl" smtClean="0"/>
-              <a:t>29/05/2020</a:t>
+              <a:t>29/5/20</a:t>
             </a:fld>
             <a:endParaRPr lang="es-ES_tradnl"/>
           </a:p>
@@ -379,7 +383,7 @@
           <a:p>
             <a:fld id="{2DDB4F98-9E2F-4642-AD0A-52F13A28866B}" type="slidenum">
               <a:rPr lang="es-ES_tradnl" smtClean="0"/>
-              <a:t>‹Nº›</a:t>
+              <a:t>‹#›</a:t>
             </a:fld>
             <a:endParaRPr lang="es-ES_tradnl"/>
           </a:p>
@@ -990,7 +994,7 @@
             <a:fld id="{B61BEF0D-F0BB-DE4B-95CE-6DB70DBA9567}" type="datetimeFigureOut">
               <a:rPr lang="en-US" smtClean="0"/>
               <a:pPr/>
-              <a:t>5/29/2020</a:t>
+              <a:t>5/29/20</a:t>
             </a:fld>
             <a:endParaRPr lang="en-US" dirty="0"/>
           </a:p>
@@ -1042,7 +1046,7 @@
             <a:fld id="{D57F1E4F-1CFF-5643-939E-217C01CDF565}" type="slidenum">
               <a:rPr lang="en-US" smtClean="0"/>
               <a:pPr/>
-              <a:t>‹Nº›</a:t>
+              <a:t>‹#›</a:t>
             </a:fld>
             <a:endParaRPr lang="en-US" dirty="0"/>
           </a:p>
@@ -1164,7 +1168,7 @@
             <a:fld id="{B61BEF0D-F0BB-DE4B-95CE-6DB70DBA9567}" type="datetimeFigureOut">
               <a:rPr lang="en-US" smtClean="0"/>
               <a:pPr/>
-              <a:t>5/29/2020</a:t>
+              <a:t>5/29/20</a:t>
             </a:fld>
             <a:endParaRPr lang="en-US" dirty="0"/>
           </a:p>
@@ -1207,7 +1211,7 @@
             <a:fld id="{D57F1E4F-1CFF-5643-939E-217C01CDF565}" type="slidenum">
               <a:rPr lang="en-US" smtClean="0"/>
               <a:pPr/>
-              <a:t>‹Nº›</a:t>
+              <a:t>‹#›</a:t>
             </a:fld>
             <a:endParaRPr lang="en-US" dirty="0"/>
           </a:p>
@@ -1341,7 +1345,7 @@
             <a:fld id="{B61BEF0D-F0BB-DE4B-95CE-6DB70DBA9567}" type="datetimeFigureOut">
               <a:rPr lang="en-US" smtClean="0"/>
               <a:pPr/>
-              <a:t>5/29/2020</a:t>
+              <a:t>5/29/20</a:t>
             </a:fld>
             <a:endParaRPr lang="en-US" dirty="0"/>
           </a:p>
@@ -1384,7 +1388,7 @@
             <a:fld id="{D57F1E4F-1CFF-5643-939E-217C01CDF565}" type="slidenum">
               <a:rPr lang="en-US" smtClean="0"/>
               <a:pPr/>
-              <a:t>‹Nº›</a:t>
+              <a:t>‹#›</a:t>
             </a:fld>
             <a:endParaRPr lang="en-US" dirty="0"/>
           </a:p>
@@ -1508,7 +1512,7 @@
             <a:fld id="{B61BEF0D-F0BB-DE4B-95CE-6DB70DBA9567}" type="datetimeFigureOut">
               <a:rPr lang="en-US" smtClean="0"/>
               <a:pPr/>
-              <a:t>5/29/2020</a:t>
+              <a:t>5/29/20</a:t>
             </a:fld>
             <a:endParaRPr lang="en-US" dirty="0"/>
           </a:p>
@@ -1551,7 +1555,7 @@
             <a:fld id="{D57F1E4F-1CFF-5643-939E-217C01CDF565}" type="slidenum">
               <a:rPr lang="en-US" smtClean="0"/>
               <a:pPr/>
-              <a:t>‹Nº›</a:t>
+              <a:t>‹#›</a:t>
             </a:fld>
             <a:endParaRPr lang="en-US" dirty="0"/>
           </a:p>
@@ -1826,7 +1830,7 @@
             <a:fld id="{B61BEF0D-F0BB-DE4B-95CE-6DB70DBA9567}" type="datetimeFigureOut">
               <a:rPr lang="en-US" smtClean="0"/>
               <a:pPr/>
-              <a:t>5/29/2020</a:t>
+              <a:t>5/29/20</a:t>
             </a:fld>
             <a:endParaRPr lang="en-US" dirty="0"/>
           </a:p>
@@ -2041,7 +2045,7 @@
             <a:fld id="{D57F1E4F-1CFF-5643-939E-217C01CDF565}" type="slidenum">
               <a:rPr lang="en-US" smtClean="0"/>
               <a:pPr/>
-              <a:t>‹Nº›</a:t>
+              <a:t>‹#›</a:t>
             </a:fld>
             <a:endParaRPr lang="en-US" dirty="0"/>
           </a:p>
@@ -2283,7 +2287,7 @@
             <a:fld id="{B61BEF0D-F0BB-DE4B-95CE-6DB70DBA9567}" type="datetimeFigureOut">
               <a:rPr lang="en-US" smtClean="0"/>
               <a:pPr/>
-              <a:t>5/29/2020</a:t>
+              <a:t>5/29/20</a:t>
             </a:fld>
             <a:endParaRPr lang="en-US" dirty="0"/>
           </a:p>
@@ -2326,7 +2330,7 @@
             <a:fld id="{D57F1E4F-1CFF-5643-939E-217C01CDF565}" type="slidenum">
               <a:rPr lang="en-US" smtClean="0"/>
               <a:pPr/>
-              <a:t>‹Nº›</a:t>
+              <a:t>‹#›</a:t>
             </a:fld>
             <a:endParaRPr lang="en-US" dirty="0"/>
           </a:p>
@@ -2691,7 +2695,7 @@
             <a:fld id="{B61BEF0D-F0BB-DE4B-95CE-6DB70DBA9567}" type="datetimeFigureOut">
               <a:rPr lang="en-US" smtClean="0"/>
               <a:pPr/>
-              <a:t>5/29/2020</a:t>
+              <a:t>5/29/20</a:t>
             </a:fld>
             <a:endParaRPr lang="en-US" dirty="0"/>
           </a:p>
@@ -2734,7 +2738,7 @@
             <a:fld id="{D57F1E4F-1CFF-5643-939E-217C01CDF565}" type="slidenum">
               <a:rPr lang="en-US" smtClean="0"/>
               <a:pPr/>
-              <a:t>‹Nº›</a:t>
+              <a:t>‹#›</a:t>
             </a:fld>
             <a:endParaRPr lang="en-US" dirty="0"/>
           </a:p>
@@ -2806,7 +2810,7 @@
             <a:fld id="{B61BEF0D-F0BB-DE4B-95CE-6DB70DBA9567}" type="datetimeFigureOut">
               <a:rPr lang="en-US" smtClean="0"/>
               <a:pPr/>
-              <a:t>5/29/2020</a:t>
+              <a:t>5/29/20</a:t>
             </a:fld>
             <a:endParaRPr lang="en-US" dirty="0"/>
           </a:p>
@@ -2849,7 +2853,7 @@
             <a:fld id="{D57F1E4F-1CFF-5643-939E-217C01CDF565}" type="slidenum">
               <a:rPr lang="en-US" smtClean="0"/>
               <a:pPr/>
-              <a:t>‹Nº›</a:t>
+              <a:t>‹#›</a:t>
             </a:fld>
             <a:endParaRPr lang="en-US" dirty="0"/>
           </a:p>
@@ -2920,7 +2924,7 @@
             <a:fld id="{B61BEF0D-F0BB-DE4B-95CE-6DB70DBA9567}" type="datetimeFigureOut">
               <a:rPr lang="en-US" smtClean="0"/>
               <a:pPr/>
-              <a:t>5/29/2020</a:t>
+              <a:t>5/29/20</a:t>
             </a:fld>
             <a:endParaRPr lang="en-US" dirty="0"/>
           </a:p>
@@ -2963,7 +2967,7 @@
             <a:fld id="{D57F1E4F-1CFF-5643-939E-217C01CDF565}" type="slidenum">
               <a:rPr lang="en-US" smtClean="0"/>
               <a:pPr/>
-              <a:t>‹Nº›</a:t>
+              <a:t>‹#›</a:t>
             </a:fld>
             <a:endParaRPr lang="en-US" dirty="0"/>
           </a:p>
@@ -3275,7 +3279,7 @@
             <a:fld id="{B61BEF0D-F0BB-DE4B-95CE-6DB70DBA9567}" type="datetimeFigureOut">
               <a:rPr lang="en-US" smtClean="0"/>
               <a:pPr/>
-              <a:t>5/29/2020</a:t>
+              <a:t>5/29/20</a:t>
             </a:fld>
             <a:endParaRPr lang="en-US" dirty="0"/>
           </a:p>
@@ -3481,7 +3485,7 @@
             <a:fld id="{D57F1E4F-1CFF-5643-939E-217C01CDF565}" type="slidenum">
               <a:rPr lang="en-US" smtClean="0"/>
               <a:pPr/>
-              <a:t>‹Nº›</a:t>
+              <a:t>‹#›</a:t>
             </a:fld>
             <a:endParaRPr lang="en-US" dirty="0"/>
           </a:p>
@@ -3779,7 +3783,7 @@
             <a:fld id="{B61BEF0D-F0BB-DE4B-95CE-6DB70DBA9567}" type="datetimeFigureOut">
               <a:rPr lang="en-US" smtClean="0"/>
               <a:pPr/>
-              <a:t>5/29/2020</a:t>
+              <a:t>5/29/20</a:t>
             </a:fld>
             <a:endParaRPr lang="en-US" dirty="0"/>
           </a:p>
@@ -3966,7 +3970,7 @@
             <a:fld id="{D57F1E4F-1CFF-5643-939E-217C01CDF565}" type="slidenum">
               <a:rPr lang="en-US" smtClean="0"/>
               <a:pPr/>
-              <a:t>‹Nº›</a:t>
+              <a:t>‹#›</a:t>
             </a:fld>
             <a:endParaRPr lang="en-US" dirty="0"/>
           </a:p>
@@ -4131,7 +4135,7 @@
             <a:fld id="{B61BEF0D-F0BB-DE4B-95CE-6DB70DBA9567}" type="datetimeFigureOut">
               <a:rPr lang="en-US" smtClean="0"/>
               <a:pPr/>
-              <a:t>5/29/2020</a:t>
+              <a:t>5/29/20</a:t>
             </a:fld>
             <a:endParaRPr lang="en-US" dirty="0"/>
           </a:p>
@@ -4370,7 +4374,7 @@
             <a:fld id="{D57F1E4F-1CFF-5643-939E-217C01CDF565}" type="slidenum">
               <a:rPr lang="en-US" smtClean="0"/>
               <a:pPr/>
-              <a:t>‹Nº›</a:t>
+              <a:t>‹#›</a:t>
             </a:fld>
             <a:endParaRPr lang="en-US" dirty="0"/>
           </a:p>
@@ -4981,6 +4985,368 @@
             <p:ph type="title"/>
           </p:nvPr>
         </p:nvSpPr>
+        <p:spPr>
+          <a:xfrm>
+            <a:off x="1069848" y="0"/>
+            <a:ext cx="10058400" cy="1609344"/>
+          </a:xfrm>
+        </p:spPr>
+        <p:txBody>
+          <a:bodyPr/>
+          <a:lstStyle/>
+          <a:p>
+            <a:pPr algn="ctr"/>
+            <a:r>
+              <a:rPr lang="es-ES_tradnl" dirty="0" smtClean="0"/>
+              <a:t>Proteínas por grupo de alimento</a:t>
+            </a:r>
+            <a:endParaRPr lang="es-ES_tradnl" dirty="0"/>
+          </a:p>
+        </p:txBody>
+      </p:sp>
+      <p:pic>
+        <p:nvPicPr>
+          <p:cNvPr id="4" name="Content Placeholder 3"/>
+          <p:cNvPicPr>
+            <a:picLocks noGrp="1" noChangeAspect="1"/>
+          </p:cNvPicPr>
+          <p:nvPr>
+            <p:ph idx="1"/>
+          </p:nvPr>
+        </p:nvPicPr>
+        <p:blipFill>
+          <a:blip r:embed="rId2">
+            <a:extLst>
+              <a:ext uri="{28A0092B-C50C-407E-A947-70E740481C1C}">
+                <a14:useLocalDpi xmlns:a14="http://schemas.microsoft.com/office/drawing/2010/main" val="0"/>
+              </a:ext>
+            </a:extLst>
+          </a:blip>
+          <a:stretch>
+            <a:fillRect/>
+          </a:stretch>
+        </p:blipFill>
+        <p:spPr>
+          <a:xfrm>
+            <a:off x="1563329" y="1245345"/>
+            <a:ext cx="8598310" cy="5570911"/>
+          </a:xfrm>
+        </p:spPr>
+      </p:pic>
+    </p:spTree>
+    <p:extLst>
+      <p:ext uri="{BB962C8B-B14F-4D97-AF65-F5344CB8AC3E}">
+        <p14:creationId xmlns:p14="http://schemas.microsoft.com/office/powerpoint/2010/main" val="1708456701"/>
+      </p:ext>
+    </p:extLst>
+  </p:cSld>
+  <p:clrMapOvr>
+    <a:masterClrMapping/>
+  </p:clrMapOvr>
+</p:sld>
+</file>
+
+<file path=ppt/slides/slide11.xml><?xml version="1.0" encoding="utf-8"?>
+<p:sld xmlns:a="http://schemas.openxmlformats.org/drawingml/2006/main" xmlns:r="http://schemas.openxmlformats.org/officeDocument/2006/relationships" xmlns:p="http://schemas.openxmlformats.org/presentationml/2006/main">
+  <p:cSld>
+    <p:spTree>
+      <p:nvGrpSpPr>
+        <p:cNvPr id="1" name=""/>
+        <p:cNvGrpSpPr/>
+        <p:nvPr/>
+      </p:nvGrpSpPr>
+      <p:grpSpPr>
+        <a:xfrm>
+          <a:off x="0" y="0"/>
+          <a:ext cx="0" cy="0"/>
+          <a:chOff x="0" y="0"/>
+          <a:chExt cx="0" cy="0"/>
+        </a:xfrm>
+      </p:grpSpPr>
+      <p:sp>
+        <p:nvSpPr>
+          <p:cNvPr id="2" name="Title 1"/>
+          <p:cNvSpPr>
+            <a:spLocks noGrp="1"/>
+          </p:cNvSpPr>
+          <p:nvPr>
+            <p:ph type="title"/>
+          </p:nvPr>
+        </p:nvSpPr>
+        <p:spPr>
+          <a:xfrm>
+            <a:off x="289765" y="0"/>
+            <a:ext cx="11618563" cy="1609344"/>
+          </a:xfrm>
+        </p:spPr>
+        <p:txBody>
+          <a:bodyPr/>
+          <a:lstStyle/>
+          <a:p>
+            <a:pPr algn="ctr"/>
+            <a:r>
+              <a:rPr lang="es-ES_tradnl" dirty="0"/>
+              <a:t>grasas por grupo de alimento</a:t>
+            </a:r>
+          </a:p>
+        </p:txBody>
+      </p:sp>
+      <p:pic>
+        <p:nvPicPr>
+          <p:cNvPr id="5" name="Picture 4"/>
+          <p:cNvPicPr>
+            <a:picLocks noChangeAspect="1"/>
+          </p:cNvPicPr>
+          <p:nvPr/>
+        </p:nvPicPr>
+        <p:blipFill>
+          <a:blip r:embed="rId2">
+            <a:extLst>
+              <a:ext uri="{28A0092B-C50C-407E-A947-70E740481C1C}">
+                <a14:useLocalDpi xmlns:a14="http://schemas.microsoft.com/office/drawing/2010/main" val="0"/>
+              </a:ext>
+            </a:extLst>
+          </a:blip>
+          <a:stretch>
+            <a:fillRect/>
+          </a:stretch>
+        </p:blipFill>
+        <p:spPr>
+          <a:xfrm>
+            <a:off x="1495297" y="1489587"/>
+            <a:ext cx="9207500" cy="5220929"/>
+          </a:xfrm>
+          <a:prstGeom prst="rect">
+            <a:avLst/>
+          </a:prstGeom>
+        </p:spPr>
+      </p:pic>
+    </p:spTree>
+    <p:extLst>
+      <p:ext uri="{BB962C8B-B14F-4D97-AF65-F5344CB8AC3E}">
+        <p14:creationId xmlns:p14="http://schemas.microsoft.com/office/powerpoint/2010/main" val="261875099"/>
+      </p:ext>
+    </p:extLst>
+  </p:cSld>
+  <p:clrMapOvr>
+    <a:masterClrMapping/>
+  </p:clrMapOvr>
+</p:sld>
+</file>
+
+<file path=ppt/slides/slide12.xml><?xml version="1.0" encoding="utf-8"?>
+<p:sld xmlns:a="http://schemas.openxmlformats.org/drawingml/2006/main" xmlns:r="http://schemas.openxmlformats.org/officeDocument/2006/relationships" xmlns:p="http://schemas.openxmlformats.org/presentationml/2006/main">
+  <p:cSld>
+    <p:spTree>
+      <p:nvGrpSpPr>
+        <p:cNvPr id="1" name=""/>
+        <p:cNvGrpSpPr/>
+        <p:nvPr/>
+      </p:nvGrpSpPr>
+      <p:grpSpPr>
+        <a:xfrm>
+          <a:off x="0" y="0"/>
+          <a:ext cx="0" cy="0"/>
+          <a:chOff x="0" y="0"/>
+          <a:chExt cx="0" cy="0"/>
+        </a:xfrm>
+      </p:grpSpPr>
+      <p:sp>
+        <p:nvSpPr>
+          <p:cNvPr id="2" name="Title 1"/>
+          <p:cNvSpPr>
+            <a:spLocks noGrp="1"/>
+          </p:cNvSpPr>
+          <p:nvPr>
+            <p:ph type="title"/>
+          </p:nvPr>
+        </p:nvSpPr>
+        <p:spPr>
+          <a:xfrm>
+            <a:off x="437250" y="163982"/>
+            <a:ext cx="11618563" cy="1609344"/>
+          </a:xfrm>
+        </p:spPr>
+        <p:txBody>
+          <a:bodyPr/>
+          <a:lstStyle/>
+          <a:p>
+            <a:pPr algn="ctr"/>
+            <a:r>
+              <a:rPr lang="es-ES_tradnl" dirty="0" smtClean="0"/>
+              <a:t>carbohidratos </a:t>
+            </a:r>
+            <a:r>
+              <a:rPr lang="es-ES_tradnl" dirty="0"/>
+              <a:t>por grupo de alimento</a:t>
+            </a:r>
+          </a:p>
+        </p:txBody>
+      </p:sp>
+      <p:pic>
+        <p:nvPicPr>
+          <p:cNvPr id="5" name="Content Placeholder 4"/>
+          <p:cNvPicPr>
+            <a:picLocks noGrp="1" noChangeAspect="1"/>
+          </p:cNvPicPr>
+          <p:nvPr>
+            <p:ph idx="1"/>
+          </p:nvPr>
+        </p:nvPicPr>
+        <p:blipFill>
+          <a:blip r:embed="rId2">
+            <a:extLst>
+              <a:ext uri="{28A0092B-C50C-407E-A947-70E740481C1C}">
+                <a14:useLocalDpi xmlns:a14="http://schemas.microsoft.com/office/drawing/2010/main" val="0"/>
+              </a:ext>
+            </a:extLst>
+          </a:blip>
+          <a:stretch>
+            <a:fillRect/>
+          </a:stretch>
+        </p:blipFill>
+        <p:spPr>
+          <a:xfrm>
+            <a:off x="1700793" y="1553093"/>
+            <a:ext cx="8342859" cy="5304907"/>
+          </a:xfrm>
+        </p:spPr>
+      </p:pic>
+    </p:spTree>
+    <p:extLst>
+      <p:ext uri="{BB962C8B-B14F-4D97-AF65-F5344CB8AC3E}">
+        <p14:creationId xmlns:p14="http://schemas.microsoft.com/office/powerpoint/2010/main" val="946424490"/>
+      </p:ext>
+    </p:extLst>
+  </p:cSld>
+  <p:clrMapOvr>
+    <a:masterClrMapping/>
+  </p:clrMapOvr>
+</p:sld>
+</file>
+
+<file path=ppt/slides/slide13.xml><?xml version="1.0" encoding="utf-8"?>
+<p:sld xmlns:a="http://schemas.openxmlformats.org/drawingml/2006/main" xmlns:r="http://schemas.openxmlformats.org/officeDocument/2006/relationships" xmlns:p="http://schemas.openxmlformats.org/presentationml/2006/main">
+  <p:cSld>
+    <p:spTree>
+      <p:nvGrpSpPr>
+        <p:cNvPr id="1" name=""/>
+        <p:cNvGrpSpPr/>
+        <p:nvPr/>
+      </p:nvGrpSpPr>
+      <p:grpSpPr>
+        <a:xfrm>
+          <a:off x="0" y="0"/>
+          <a:ext cx="0" cy="0"/>
+          <a:chOff x="0" y="0"/>
+          <a:chExt cx="0" cy="0"/>
+        </a:xfrm>
+      </p:grpSpPr>
+      <p:sp>
+        <p:nvSpPr>
+          <p:cNvPr id="2" name="Title 1"/>
+          <p:cNvSpPr>
+            <a:spLocks noGrp="1"/>
+          </p:cNvSpPr>
+          <p:nvPr>
+            <p:ph type="title"/>
+          </p:nvPr>
+        </p:nvSpPr>
+        <p:spPr>
+          <a:xfrm>
+            <a:off x="437250" y="163982"/>
+            <a:ext cx="11618563" cy="1609344"/>
+          </a:xfrm>
+        </p:spPr>
+        <p:txBody>
+          <a:bodyPr/>
+          <a:lstStyle/>
+          <a:p>
+            <a:pPr algn="ctr"/>
+            <a:r>
+              <a:rPr lang="es-ES_tradnl" dirty="0" smtClean="0"/>
+              <a:t>Azúcares</a:t>
+            </a:r>
+            <a:r>
+              <a:rPr lang="es-ES_tradnl" dirty="0" smtClean="0"/>
+              <a:t> </a:t>
+            </a:r>
+            <a:r>
+              <a:rPr lang="es-ES_tradnl" dirty="0"/>
+              <a:t>por grupo de alimento</a:t>
+            </a:r>
+          </a:p>
+        </p:txBody>
+      </p:sp>
+      <p:pic>
+        <p:nvPicPr>
+          <p:cNvPr id="4" name="Content Placeholder 3"/>
+          <p:cNvPicPr>
+            <a:picLocks noGrp="1" noChangeAspect="1"/>
+          </p:cNvPicPr>
+          <p:nvPr>
+            <p:ph idx="1"/>
+          </p:nvPr>
+        </p:nvPicPr>
+        <p:blipFill>
+          <a:blip r:embed="rId2">
+            <a:extLst>
+              <a:ext uri="{28A0092B-C50C-407E-A947-70E740481C1C}">
+                <a14:useLocalDpi xmlns:a14="http://schemas.microsoft.com/office/drawing/2010/main" val="0"/>
+              </a:ext>
+            </a:extLst>
+          </a:blip>
+          <a:stretch>
+            <a:fillRect/>
+          </a:stretch>
+        </p:blipFill>
+        <p:spPr>
+          <a:xfrm>
+            <a:off x="1769805" y="1393668"/>
+            <a:ext cx="8431220" cy="5361094"/>
+          </a:xfrm>
+        </p:spPr>
+      </p:pic>
+    </p:spTree>
+    <p:extLst>
+      <p:ext uri="{BB962C8B-B14F-4D97-AF65-F5344CB8AC3E}">
+        <p14:creationId xmlns:p14="http://schemas.microsoft.com/office/powerpoint/2010/main" val="1849054013"/>
+      </p:ext>
+    </p:extLst>
+  </p:cSld>
+  <p:clrMapOvr>
+    <a:masterClrMapping/>
+  </p:clrMapOvr>
+</p:sld>
+</file>
+
+<file path=ppt/slides/slide14.xml><?xml version="1.0" encoding="utf-8"?>
+<p:sld xmlns:a="http://schemas.openxmlformats.org/drawingml/2006/main" xmlns:r="http://schemas.openxmlformats.org/officeDocument/2006/relationships" xmlns:p="http://schemas.openxmlformats.org/presentationml/2006/main">
+  <p:cSld>
+    <p:spTree>
+      <p:nvGrpSpPr>
+        <p:cNvPr id="1" name=""/>
+        <p:cNvGrpSpPr/>
+        <p:nvPr/>
+      </p:nvGrpSpPr>
+      <p:grpSpPr>
+        <a:xfrm>
+          <a:off x="0" y="0"/>
+          <a:ext cx="0" cy="0"/>
+          <a:chOff x="0" y="0"/>
+          <a:chExt cx="0" cy="0"/>
+        </a:xfrm>
+      </p:grpSpPr>
+      <p:sp>
+        <p:nvSpPr>
+          <p:cNvPr id="2" name="Title 1"/>
+          <p:cNvSpPr>
+            <a:spLocks noGrp="1"/>
+          </p:cNvSpPr>
+          <p:nvPr>
+            <p:ph type="title"/>
+          </p:nvPr>
+        </p:nvSpPr>
         <p:spPr/>
         <p:txBody>
           <a:bodyPr/>
@@ -5141,7 +5507,7 @@
 </p:sld>
 </file>
 
-<file path=ppt/slides/slide11.xml><?xml version="1.0" encoding="utf-8"?>
+<file path=ppt/slides/slide15.xml><?xml version="1.0" encoding="utf-8"?>
 <p:sld xmlns:a="http://schemas.openxmlformats.org/drawingml/2006/main" xmlns:r="http://schemas.openxmlformats.org/officeDocument/2006/relationships" xmlns:p="http://schemas.openxmlformats.org/presentationml/2006/main">
   <p:cSld>
     <p:spTree>
@@ -5200,7 +5566,7 @@
             </p:nvSpPr>
             <p:spPr>
               <a:xfrm>
-                <a:off x="2631233" y="2093976"/>
+                <a:off x="2690227" y="2374196"/>
                 <a:ext cx="6552096" cy="2670049"/>
               </a:xfrm>
             </p:spPr>
@@ -5265,7 +5631,7 @@
                       <m:sSupPr>
                         <m:ctrlPr>
                           <a:rPr lang="es-MX" b="0" i="1" dirty="0" smtClean="0">
-                            <a:latin typeface="Cambria Math" panose="02040503050406030204" pitchFamily="18" charset="0"/>
+                            <a:latin typeface="Cambria Math" charset="0"/>
                           </a:rPr>
                         </m:ctrlPr>
                       </m:sSupPr>
@@ -5332,13 +5698,13 @@
             </p:nvSpPr>
             <p:spPr>
               <a:xfrm>
-                <a:off x="2631233" y="2093976"/>
+                <a:off x="2690227" y="2374196"/>
                 <a:ext cx="6552096" cy="2670049"/>
               </a:xfrm>
-              <a:blipFill>
+              <a:blipFill rotWithShape="0">
                 <a:blip r:embed="rId2"/>
                 <a:stretch>
-                  <a:fillRect l="-1024" t="-2511"/>
+                  <a:fillRect l="-930" t="-2283"/>
                 </a:stretch>
               </a:blipFill>
             </p:spPr>
@@ -5347,7 +5713,7 @@
               <a:lstStyle/>
               <a:p>
                 <a:r>
-                  <a:rPr lang="es-MX">
+                  <a:rPr lang="es-ES_tradnl">
                     <a:noFill/>
                   </a:rPr>
                   <a:t> </a:t>
@@ -5370,7 +5736,7 @@
 </p:sld>
 </file>
 
-<file path=ppt/slides/slide12.xml><?xml version="1.0" encoding="utf-8"?>
+<file path=ppt/slides/slide16.xml><?xml version="1.0" encoding="utf-8"?>
 <p:sld xmlns:a="http://schemas.openxmlformats.org/drawingml/2006/main" xmlns:r="http://schemas.openxmlformats.org/officeDocument/2006/relationships" xmlns:p="http://schemas.openxmlformats.org/presentationml/2006/main">
   <p:cSld>
     <p:spTree>
@@ -5415,8 +5781,8 @@
           </a:p>
         </p:txBody>
       </p:sp>
-      <mc:AlternateContent xmlns:mc="http://schemas.openxmlformats.org/markup-compatibility/2006">
-        <mc:Choice xmlns:a14="http://schemas.microsoft.com/office/drawing/2010/main" Requires="a14">
+      <mc:AlternateContent xmlns:mc="http://schemas.openxmlformats.org/markup-compatibility/2006" xmlns:a14="http://schemas.microsoft.com/office/drawing/2010/main">
+        <mc:Choice Requires="a14">
           <p:sp>
             <p:nvSpPr>
               <p:cNvPr id="3" name="Content Placeholder 2"/>
@@ -5497,7 +5863,7 @@
             </p:txBody>
           </p:sp>
         </mc:Choice>
-        <mc:Fallback>
+        <mc:Fallback xmlns="">
           <p:sp>
             <p:nvSpPr>
               <p:cNvPr id="3" name="Content Placeholder 2"/>
@@ -5535,8 +5901,8 @@
           </p:sp>
         </mc:Fallback>
       </mc:AlternateContent>
-      <mc:AlternateContent xmlns:mc="http://schemas.openxmlformats.org/markup-compatibility/2006">
-        <mc:Choice xmlns:a14="http://schemas.microsoft.com/office/drawing/2010/main" Requires="a14">
+      <mc:AlternateContent xmlns:mc="http://schemas.openxmlformats.org/markup-compatibility/2006" xmlns:a14="http://schemas.microsoft.com/office/drawing/2010/main">
+        <mc:Choice Requires="a14">
           <p:sp>
             <p:nvSpPr>
               <p:cNvPr id="4" name="Content Placeholder 3"/>
@@ -5576,7 +5942,7 @@
                       <m:sSubPr>
                         <m:ctrlPr>
                           <a:rPr lang="es-ES_tradnl" i="1" dirty="0" smtClean="0">
-                            <a:latin typeface="Cambria Math" panose="02040503050406030204" pitchFamily="18" charset="0"/>
+                            <a:latin typeface="Cambria Math" charset="0"/>
                           </a:rPr>
                         </m:ctrlPr>
                       </m:sSubPr>
@@ -5627,7 +5993,7 @@
                       <m:sSubPr>
                         <m:ctrlPr>
                           <a:rPr lang="es-MX" b="0" i="1" smtClean="0">
-                            <a:latin typeface="Cambria Math" panose="02040503050406030204" pitchFamily="18" charset="0"/>
+                            <a:latin typeface="Cambria Math" charset="0"/>
                           </a:rPr>
                         </m:ctrlPr>
                       </m:sSubPr>
@@ -5658,7 +6024,7 @@
                       <m:sSubPr>
                         <m:ctrlPr>
                           <a:rPr lang="es-MX" b="0" i="1" smtClean="0">
-                            <a:latin typeface="Cambria Math" panose="02040503050406030204" pitchFamily="18" charset="0"/>
+                            <a:latin typeface="Cambria Math" charset="0"/>
                           </a:rPr>
                         </m:ctrlPr>
                       </m:sSubPr>
@@ -5683,7 +6049,7 @@
                       <m:sSubPr>
                         <m:ctrlPr>
                           <a:rPr lang="es-MX" b="0" i="1" smtClean="0">
-                            <a:latin typeface="Cambria Math" panose="02040503050406030204" pitchFamily="18" charset="0"/>
+                            <a:latin typeface="Cambria Math" charset="0"/>
                           </a:rPr>
                         </m:ctrlPr>
                       </m:sSubPr>
@@ -5716,7 +6082,7 @@
                       <m:sSubPr>
                         <m:ctrlPr>
                           <a:rPr lang="es-ES_tradnl" i="1" dirty="0" smtClean="0">
-                            <a:latin typeface="Cambria Math" panose="02040503050406030204" pitchFamily="18" charset="0"/>
+                            <a:latin typeface="Cambria Math" charset="0"/>
                           </a:rPr>
                         </m:ctrlPr>
                       </m:sSubPr>
@@ -5753,7 +6119,7 @@
                       <m:sSubPr>
                         <m:ctrlPr>
                           <a:rPr lang="es-MX" b="0" i="1" dirty="0" smtClean="0">
-                            <a:latin typeface="Cambria Math" panose="02040503050406030204" pitchFamily="18" charset="0"/>
+                            <a:latin typeface="Cambria Math" charset="0"/>
                           </a:rPr>
                         </m:ctrlPr>
                       </m:sSubPr>
@@ -5778,7 +6144,7 @@
                       <m:sSubPr>
                         <m:ctrlPr>
                           <a:rPr lang="es-MX" b="0" i="1" dirty="0" smtClean="0">
-                            <a:latin typeface="Cambria Math" panose="02040503050406030204" pitchFamily="18" charset="0"/>
+                            <a:latin typeface="Cambria Math" charset="0"/>
                           </a:rPr>
                         </m:ctrlPr>
                       </m:sSubPr>
@@ -5847,7 +6213,7 @@
                       <m:sSubPr>
                         <m:ctrlPr>
                           <a:rPr lang="es-ES_tradnl" i="1" dirty="0" smtClean="0">
-                            <a:latin typeface="Cambria Math" panose="02040503050406030204" pitchFamily="18" charset="0"/>
+                            <a:latin typeface="Cambria Math" charset="0"/>
                           </a:rPr>
                         </m:ctrlPr>
                       </m:sSubPr>
@@ -5891,7 +6257,7 @@
                       <m:sSubPr>
                         <m:ctrlPr>
                           <a:rPr lang="es-ES_tradnl" i="1" dirty="0" smtClean="0">
-                            <a:latin typeface="Cambria Math" panose="02040503050406030204" pitchFamily="18" charset="0"/>
+                            <a:latin typeface="Cambria Math" charset="0"/>
                           </a:rPr>
                         </m:ctrlPr>
                       </m:sSubPr>
@@ -5919,7 +6285,7 @@
             </p:txBody>
           </p:sp>
         </mc:Choice>
-        <mc:Fallback>
+        <mc:Fallback xmlns="">
           <p:sp>
             <p:nvSpPr>
               <p:cNvPr id="4" name="Content Placeholder 3"/>
@@ -5970,7 +6336,7 @@
 </p:sld>
 </file>
 
-<file path=ppt/slides/slide13.xml><?xml version="1.0" encoding="utf-8"?>
+<file path=ppt/slides/slide17.xml><?xml version="1.0" encoding="utf-8"?>
 <p:sld xmlns:a="http://schemas.openxmlformats.org/drawingml/2006/main" xmlns:r="http://schemas.openxmlformats.org/officeDocument/2006/relationships" xmlns:p="http://schemas.openxmlformats.org/presentationml/2006/main">
   <p:cSld>
     <p:spTree>
@@ -6010,8 +6376,8 @@
           </a:p>
         </p:txBody>
       </p:sp>
-      <mc:AlternateContent xmlns:mc="http://schemas.openxmlformats.org/markup-compatibility/2006">
-        <mc:Choice xmlns:a14="http://schemas.microsoft.com/office/drawing/2010/main" Requires="a14">
+      <mc:AlternateContent xmlns:mc="http://schemas.openxmlformats.org/markup-compatibility/2006" xmlns:a14="http://schemas.microsoft.com/office/drawing/2010/main">
+        <mc:Choice Requires="a14">
           <p:sp>
             <p:nvSpPr>
               <p:cNvPr id="3" name="Content Placeholder 2"/>
@@ -6098,7 +6464,7 @@
                       <m:sSubPr>
                         <m:ctrlPr>
                           <a:rPr lang="es-ES" i="1" dirty="0" smtClean="0">
-                            <a:latin typeface="Cambria Math" panose="02040503050406030204" pitchFamily="18" charset="0"/>
+                            <a:latin typeface="Cambria Math" charset="0"/>
                           </a:rPr>
                         </m:ctrlPr>
                       </m:sSubPr>
@@ -6138,7 +6504,7 @@
             </p:txBody>
           </p:sp>
         </mc:Choice>
-        <mc:Fallback>
+        <mc:Fallback xmlns="">
           <p:sp>
             <p:nvSpPr>
               <p:cNvPr id="3" name="Content Placeholder 2"/>
@@ -6176,8 +6542,8 @@
           </p:sp>
         </mc:Fallback>
       </mc:AlternateContent>
-      <mc:AlternateContent xmlns:mc="http://schemas.openxmlformats.org/markup-compatibility/2006">
-        <mc:Choice xmlns:a14="http://schemas.microsoft.com/office/drawing/2010/main" Requires="a14">
+      <mc:AlternateContent xmlns:mc="http://schemas.openxmlformats.org/markup-compatibility/2006" xmlns:a14="http://schemas.microsoft.com/office/drawing/2010/main">
+        <mc:Choice Requires="a14">
           <p:sp>
             <p:nvSpPr>
               <p:cNvPr id="4" name="Content Placeholder 3"/>
@@ -6210,7 +6576,7 @@
                       <m:sSubPr>
                         <m:ctrlPr>
                           <a:rPr lang="es-ES_tradnl" i="1" dirty="0" smtClean="0">
-                            <a:latin typeface="Cambria Math" panose="02040503050406030204" pitchFamily="18" charset="0"/>
+                            <a:latin typeface="Cambria Math" charset="0"/>
                           </a:rPr>
                         </m:ctrlPr>
                       </m:sSubPr>
@@ -6258,7 +6624,7 @@
                       <m:sSubPr>
                         <m:ctrlPr>
                           <a:rPr lang="es-MX" i="1">
-                            <a:latin typeface="Cambria Math" panose="02040503050406030204" pitchFamily="18" charset="0"/>
+                            <a:latin typeface="Cambria Math" charset="0"/>
                           </a:rPr>
                         </m:ctrlPr>
                       </m:sSubPr>
@@ -6295,7 +6661,7 @@
                       <m:fPr>
                         <m:ctrlPr>
                           <a:rPr lang="es-MX" i="1" smtClean="0">
-                            <a:latin typeface="Cambria Math" panose="02040503050406030204" pitchFamily="18" charset="0"/>
+                            <a:latin typeface="Cambria Math" charset="0"/>
                           </a:rPr>
                         </m:ctrlPr>
                       </m:fPr>
@@ -6310,7 +6676,7 @@
                           <m:sSubPr>
                             <m:ctrlPr>
                               <a:rPr lang="es-MX" i="1">
-                                <a:latin typeface="Cambria Math" panose="02040503050406030204" pitchFamily="18" charset="0"/>
+                                <a:latin typeface="Cambria Math" charset="0"/>
                               </a:rPr>
                             </m:ctrlPr>
                           </m:sSubPr>
@@ -6339,7 +6705,7 @@
                             <m:endChr m:val="|"/>
                             <m:ctrlPr>
                               <a:rPr lang="es-MX" b="0" i="1" smtClean="0">
-                                <a:latin typeface="Cambria Math" panose="02040503050406030204" pitchFamily="18" charset="0"/>
+                                <a:latin typeface="Cambria Math" charset="0"/>
                               </a:rPr>
                             </m:ctrlPr>
                           </m:dPr>
@@ -6350,7 +6716,7 @@
                                 <m:endChr m:val="|"/>
                                 <m:ctrlPr>
                                   <a:rPr lang="es-MX" b="0" i="1" smtClean="0">
-                                    <a:latin typeface="Cambria Math" panose="02040503050406030204" pitchFamily="18" charset="0"/>
+                                    <a:latin typeface="Cambria Math" charset="0"/>
                                   </a:rPr>
                                 </m:ctrlPr>
                               </m:dPr>
@@ -6365,7 +6731,7 @@
                                   <m:sSubPr>
                                     <m:ctrlPr>
                                       <a:rPr lang="es-MX" i="1">
-                                        <a:latin typeface="Cambria Math" panose="02040503050406030204" pitchFamily="18" charset="0"/>
+                                        <a:latin typeface="Cambria Math" charset="0"/>
                                       </a:rPr>
                                     </m:ctrlPr>
                                   </m:sSubPr>
@@ -6404,7 +6770,7 @@
                       <m:sSubPr>
                         <m:ctrlPr>
                           <a:rPr lang="es-MX" b="0" i="1" smtClean="0">
-                            <a:latin typeface="Cambria Math" panose="02040503050406030204" pitchFamily="18" charset="0"/>
+                            <a:latin typeface="Cambria Math" charset="0"/>
                           </a:rPr>
                         </m:ctrlPr>
                       </m:sSubPr>
@@ -6435,7 +6801,7 @@
                       <m:fPr>
                         <m:ctrlPr>
                           <a:rPr lang="es-MX" b="0" i="1" smtClean="0">
-                            <a:latin typeface="Cambria Math" panose="02040503050406030204" pitchFamily="18" charset="0"/>
+                            <a:latin typeface="Cambria Math" charset="0"/>
                           </a:rPr>
                         </m:ctrlPr>
                       </m:fPr>
@@ -6444,7 +6810,7 @@
                           <m:sSubSupPr>
                             <m:ctrlPr>
                               <a:rPr lang="es-MX" i="1" smtClean="0">
-                                <a:latin typeface="Cambria Math" panose="02040503050406030204" pitchFamily="18" charset="0"/>
+                                <a:latin typeface="Cambria Math" charset="0"/>
                               </a:rPr>
                             </m:ctrlPr>
                           </m:sSubSupPr>
@@ -6453,7 +6819,7 @@
                               <m:sSubPr>
                                 <m:ctrlPr>
                                   <a:rPr lang="es-MX" b="0" i="1" smtClean="0">
-                                    <a:latin typeface="Cambria Math" panose="02040503050406030204" pitchFamily="18" charset="0"/>
+                                    <a:latin typeface="Cambria Math" charset="0"/>
                                   </a:rPr>
                                 </m:ctrlPr>
                               </m:sSubPr>
@@ -6508,7 +6874,7 @@
                           <m:sSubPr>
                             <m:ctrlPr>
                               <a:rPr lang="es-MX" b="0" i="1" smtClean="0">
-                                <a:latin typeface="Cambria Math" panose="02040503050406030204" pitchFamily="18" charset="0"/>
+                                <a:latin typeface="Cambria Math" charset="0"/>
                               </a:rPr>
                             </m:ctrlPr>
                           </m:sSubPr>
@@ -6535,7 +6901,7 @@
                           <m:sSubSupPr>
                             <m:ctrlPr>
                               <a:rPr lang="es-MX" i="1">
-                                <a:latin typeface="Cambria Math" panose="02040503050406030204" pitchFamily="18" charset="0"/>
+                                <a:latin typeface="Cambria Math" charset="0"/>
                               </a:rPr>
                             </m:ctrlPr>
                           </m:sSubSupPr>
@@ -6568,7 +6934,7 @@
                           <m:sSubPr>
                             <m:ctrlPr>
                               <a:rPr lang="es-MX" i="1">
-                                <a:latin typeface="Cambria Math" panose="02040503050406030204" pitchFamily="18" charset="0"/>
+                                <a:latin typeface="Cambria Math" charset="0"/>
                               </a:rPr>
                             </m:ctrlPr>
                           </m:sSubPr>
@@ -6606,7 +6972,7 @@
                       <m:sSubPr>
                         <m:ctrlPr>
                           <a:rPr lang="es-MX" i="1" smtClean="0">
-                            <a:latin typeface="Cambria Math" panose="02040503050406030204" pitchFamily="18" charset="0"/>
+                            <a:latin typeface="Cambria Math" charset="0"/>
                           </a:rPr>
                         </m:ctrlPr>
                       </m:sSubPr>
@@ -6673,7 +7039,7 @@
             </p:txBody>
           </p:sp>
         </mc:Choice>
-        <mc:Fallback>
+        <mc:Fallback xmlns="">
           <p:sp>
             <p:nvSpPr>
               <p:cNvPr id="4" name="Content Placeholder 3"/>
@@ -6724,7 +7090,7 @@
 </p:sld>
 </file>
 
-<file path=ppt/slides/slide14.xml><?xml version="1.0" encoding="utf-8"?>
+<file path=ppt/slides/slide18.xml><?xml version="1.0" encoding="utf-8"?>
 <p:sld xmlns:a="http://schemas.openxmlformats.org/drawingml/2006/main" xmlns:r="http://schemas.openxmlformats.org/officeDocument/2006/relationships" xmlns:p="http://schemas.openxmlformats.org/presentationml/2006/main">
   <p:cSld>
     <p:spTree>
@@ -6995,7 +7361,7 @@
 </p:sld>
 </file>
 
-<file path=ppt/slides/slide15.xml><?xml version="1.0" encoding="utf-8"?>
+<file path=ppt/slides/slide19.xml><?xml version="1.0" encoding="utf-8"?>
 <p:sld xmlns:a="http://schemas.openxmlformats.org/drawingml/2006/main" xmlns:r="http://schemas.openxmlformats.org/officeDocument/2006/relationships" xmlns:p="http://schemas.openxmlformats.org/presentationml/2006/main">
   <p:cSld>
     <p:spTree>
@@ -7361,7 +7727,184 @@
 </p:sld>
 </file>
 
-<file path=ppt/slides/slide16.xml><?xml version="1.0" encoding="utf-8"?>
+<file path=ppt/slides/slide2.xml><?xml version="1.0" encoding="utf-8"?>
+<p:sld xmlns:a="http://schemas.openxmlformats.org/drawingml/2006/main" xmlns:r="http://schemas.openxmlformats.org/officeDocument/2006/relationships" xmlns:p="http://schemas.openxmlformats.org/presentationml/2006/main">
+  <p:cSld>
+    <p:spTree>
+      <p:nvGrpSpPr>
+        <p:cNvPr id="1" name=""/>
+        <p:cNvGrpSpPr/>
+        <p:nvPr/>
+      </p:nvGrpSpPr>
+      <p:grpSpPr>
+        <a:xfrm>
+          <a:off x="0" y="0"/>
+          <a:ext cx="0" cy="0"/>
+          <a:chOff x="0" y="0"/>
+          <a:chExt cx="0" cy="0"/>
+        </a:xfrm>
+      </p:grpSpPr>
+      <p:sp>
+        <p:nvSpPr>
+          <p:cNvPr id="2" name="Title 1"/>
+          <p:cNvSpPr>
+            <a:spLocks noGrp="1"/>
+          </p:cNvSpPr>
+          <p:nvPr>
+            <p:ph type="title"/>
+          </p:nvPr>
+        </p:nvSpPr>
+        <p:spPr>
+          <a:xfrm>
+            <a:off x="1141413" y="0"/>
+            <a:ext cx="9905998" cy="1905000"/>
+          </a:xfrm>
+        </p:spPr>
+        <p:txBody>
+          <a:bodyPr/>
+          <a:lstStyle/>
+          <a:p>
+            <a:pPr algn="ctr"/>
+            <a:r>
+              <a:rPr lang="es-ES_tradnl" dirty="0"/>
+              <a:t>Tabla de contenidos</a:t>
+            </a:r>
+          </a:p>
+        </p:txBody>
+      </p:sp>
+      <p:sp>
+        <p:nvSpPr>
+          <p:cNvPr id="3" name="Content Placeholder 2"/>
+          <p:cNvSpPr>
+            <a:spLocks noGrp="1"/>
+          </p:cNvSpPr>
+          <p:nvPr>
+            <p:ph idx="1"/>
+          </p:nvPr>
+        </p:nvSpPr>
+        <p:spPr>
+          <a:xfrm>
+            <a:off x="1141413" y="2053086"/>
+            <a:ext cx="9905998" cy="4347713"/>
+          </a:xfrm>
+        </p:spPr>
+        <p:txBody>
+          <a:bodyPr>
+            <a:normAutofit/>
+          </a:bodyPr>
+          <a:lstStyle/>
+          <a:p>
+            <a:r>
+              <a:rPr lang="en-US" sz="2400" u="sng" dirty="0">
+                <a:effectLst/>
+                <a:hlinkClick r:id="rId2"/>
+              </a:rPr>
+              <a:t>Introducción</a:t>
+            </a:r>
+            <a:endParaRPr lang="en-US" sz="2400" dirty="0">
+              <a:effectLst/>
+            </a:endParaRPr>
+          </a:p>
+          <a:p>
+            <a:r>
+              <a:rPr lang="en-US" sz="2400" u="sng" dirty="0">
+                <a:effectLst/>
+                <a:hlinkClick r:id="rId3"/>
+              </a:rPr>
+              <a:t>Datos y contexto</a:t>
+            </a:r>
+            <a:endParaRPr lang="en-US" sz="2400" dirty="0">
+              <a:effectLst/>
+            </a:endParaRPr>
+          </a:p>
+          <a:p>
+            <a:r>
+              <a:rPr lang="en-US" sz="2400" u="sng" dirty="0">
+                <a:effectLst/>
+                <a:hlinkClick r:id="rId4"/>
+              </a:rPr>
+              <a:t>Análisis exploratorio de los datos</a:t>
+            </a:r>
+            <a:endParaRPr lang="en-US" sz="2400" dirty="0">
+              <a:effectLst/>
+            </a:endParaRPr>
+          </a:p>
+          <a:p>
+            <a:r>
+              <a:rPr lang="en-US" sz="2400" u="sng" dirty="0">
+                <a:effectLst/>
+                <a:hlinkClick r:id="rId5"/>
+              </a:rPr>
+              <a:t>Teoría del Análisis de Componentes Principales</a:t>
+            </a:r>
+            <a:endParaRPr lang="en-US" sz="2400" dirty="0">
+              <a:effectLst/>
+            </a:endParaRPr>
+          </a:p>
+          <a:p>
+            <a:r>
+              <a:rPr lang="en-US" sz="2400" u="sng" dirty="0">
+                <a:effectLst/>
+                <a:hlinkClick r:id="rId6"/>
+              </a:rPr>
+              <a:t>Resultados del Análisis de Componentes Principales</a:t>
+            </a:r>
+            <a:endParaRPr lang="en-US" sz="2400" dirty="0">
+              <a:effectLst/>
+            </a:endParaRPr>
+          </a:p>
+          <a:p>
+            <a:r>
+              <a:rPr lang="en-US" sz="2400" u="sng" dirty="0">
+                <a:effectLst/>
+                <a:hlinkClick r:id="rId7"/>
+              </a:rPr>
+              <a:t>Análisis de conglomerados (clustering)</a:t>
+            </a:r>
+            <a:endParaRPr lang="en-US" sz="2400" dirty="0">
+              <a:effectLst/>
+            </a:endParaRPr>
+          </a:p>
+          <a:p>
+            <a:r>
+              <a:rPr lang="en-US" sz="2400" u="sng" dirty="0">
+                <a:effectLst/>
+                <a:hlinkClick r:id="rId8"/>
+              </a:rPr>
+              <a:t>Conclusiones</a:t>
+            </a:r>
+            <a:endParaRPr lang="en-US" sz="2400" dirty="0">
+              <a:effectLst/>
+            </a:endParaRPr>
+          </a:p>
+          <a:p>
+            <a:r>
+              <a:rPr lang="en-US" sz="2400" u="sng" dirty="0">
+                <a:effectLst/>
+                <a:hlinkClick r:id="rId9"/>
+              </a:rPr>
+              <a:t>Referencias</a:t>
+            </a:r>
+            <a:endParaRPr lang="en-US" sz="2400" dirty="0">
+              <a:effectLst/>
+            </a:endParaRPr>
+          </a:p>
+        </p:txBody>
+      </p:sp>
+    </p:spTree>
+    <p:extLst>
+      <p:ext uri="{BB962C8B-B14F-4D97-AF65-F5344CB8AC3E}">
+        <p14:creationId xmlns:p14="http://schemas.microsoft.com/office/powerpoint/2010/main" val="1960165556"/>
+      </p:ext>
+    </p:extLst>
+  </p:cSld>
+  <p:clrMapOvr>
+    <a:masterClrMapping/>
+  </p:clrMapOvr>
+</p:sld>
+</file>
+
+<file path=ppt/slides/slide20.xml><?xml version="1.0" encoding="utf-8"?>
 <p:sld xmlns:a="http://schemas.openxmlformats.org/drawingml/2006/main" xmlns:r="http://schemas.openxmlformats.org/officeDocument/2006/relationships" xmlns:p="http://schemas.openxmlformats.org/presentationml/2006/main">
   <p:cSld>
     <p:spTree>
@@ -7430,8 +7973,8 @@
         </p:blipFill>
         <p:spPr>
           <a:xfrm>
-            <a:off x="294467" y="3177153"/>
-            <a:ext cx="11748141" cy="1937288"/>
+            <a:off x="682157" y="3210255"/>
+            <a:ext cx="10833781" cy="1937288"/>
           </a:xfrm>
         </p:spPr>
       </p:pic>
@@ -7727,7 +8270,7 @@
 </p:sld>
 </file>
 
-<file path=ppt/slides/slide17.xml><?xml version="1.0" encoding="utf-8"?>
+<file path=ppt/slides/slide21.xml><?xml version="1.0" encoding="utf-8"?>
 <p:sld xmlns:a="http://schemas.openxmlformats.org/drawingml/2006/main" xmlns:r="http://schemas.openxmlformats.org/officeDocument/2006/relationships" xmlns:p="http://schemas.openxmlformats.org/presentationml/2006/main">
   <p:cSld>
     <p:spTree>
@@ -7804,7 +8347,7 @@
 </p:sld>
 </file>
 
-<file path=ppt/slides/slide18.xml><?xml version="1.0" encoding="utf-8"?>
+<file path=ppt/slides/slide22.xml><?xml version="1.0" encoding="utf-8"?>
 <p:sld xmlns:a="http://schemas.openxmlformats.org/drawingml/2006/main" xmlns:r="http://schemas.openxmlformats.org/officeDocument/2006/relationships" xmlns:p="http://schemas.openxmlformats.org/presentationml/2006/main">
   <p:cSld>
     <p:spTree>
@@ -8567,7 +9110,7 @@
 </p:sld>
 </file>
 
-<file path=ppt/slides/slide19.xml><?xml version="1.0" encoding="utf-8"?>
+<file path=ppt/slides/slide23.xml><?xml version="1.0" encoding="utf-8"?>
 <p:sld xmlns:a="http://schemas.openxmlformats.org/drawingml/2006/main" xmlns:r="http://schemas.openxmlformats.org/officeDocument/2006/relationships" xmlns:p="http://schemas.openxmlformats.org/presentationml/2006/main">
   <p:cSld>
     <p:spTree>
@@ -8636,7 +9179,7 @@
         </p:blipFill>
         <p:spPr>
           <a:xfrm>
-            <a:off x="637697" y="2337875"/>
+            <a:off x="637697" y="2029148"/>
             <a:ext cx="2539456" cy="4402465"/>
           </a:xfrm>
         </p:spPr>
@@ -8651,7 +9194,7 @@
         </p:nvSpPr>
         <p:spPr>
           <a:xfrm>
-            <a:off x="784931" y="1796208"/>
+            <a:off x="784931" y="1487481"/>
             <a:ext cx="2244988" cy="465880"/>
           </a:xfrm>
           <a:prstGeom prst="rect">
@@ -8922,7 +9465,7 @@
         </p:nvSpPr>
         <p:spPr>
           <a:xfrm>
-            <a:off x="3572043" y="1796208"/>
+            <a:off x="3572043" y="1487481"/>
             <a:ext cx="2244988" cy="465880"/>
           </a:xfrm>
           <a:prstGeom prst="rect">
@@ -9193,7 +9736,7 @@
         </p:nvSpPr>
         <p:spPr>
           <a:xfrm>
-            <a:off x="6359155" y="1796208"/>
+            <a:off x="6359155" y="1487481"/>
             <a:ext cx="2244988" cy="465880"/>
           </a:xfrm>
           <a:prstGeom prst="rect">
@@ -9476,7 +10019,7 @@
         </p:blipFill>
         <p:spPr>
           <a:xfrm>
-            <a:off x="3428701" y="2337874"/>
+            <a:off x="3428701" y="2029147"/>
             <a:ext cx="2522015" cy="4402465"/>
           </a:xfrm>
           <a:prstGeom prst="rect">
@@ -9506,7 +10049,7 @@
         </p:blipFill>
         <p:spPr>
           <a:xfrm>
-            <a:off x="6202264" y="2337874"/>
+            <a:off x="6202264" y="2029147"/>
             <a:ext cx="2496588" cy="4402465"/>
           </a:xfrm>
           <a:prstGeom prst="rect">
@@ -9524,7 +10067,7 @@
         </p:nvSpPr>
         <p:spPr>
           <a:xfrm>
-            <a:off x="9168177" y="1796208"/>
+            <a:off x="9168177" y="1487481"/>
             <a:ext cx="2244988" cy="465880"/>
           </a:xfrm>
           <a:prstGeom prst="rect">
@@ -9807,7 +10350,7 @@
         </p:blipFill>
         <p:spPr>
           <a:xfrm>
-            <a:off x="9012392" y="2337874"/>
+            <a:off x="9012392" y="2029147"/>
             <a:ext cx="2482002" cy="4402465"/>
           </a:xfrm>
           <a:prstGeom prst="rect">
@@ -9828,184 +10371,7 @@
 </p:sld>
 </file>
 
-<file path=ppt/slides/slide2.xml><?xml version="1.0" encoding="utf-8"?>
-<p:sld xmlns:a="http://schemas.openxmlformats.org/drawingml/2006/main" xmlns:r="http://schemas.openxmlformats.org/officeDocument/2006/relationships" xmlns:p="http://schemas.openxmlformats.org/presentationml/2006/main">
-  <p:cSld>
-    <p:spTree>
-      <p:nvGrpSpPr>
-        <p:cNvPr id="1" name=""/>
-        <p:cNvGrpSpPr/>
-        <p:nvPr/>
-      </p:nvGrpSpPr>
-      <p:grpSpPr>
-        <a:xfrm>
-          <a:off x="0" y="0"/>
-          <a:ext cx="0" cy="0"/>
-          <a:chOff x="0" y="0"/>
-          <a:chExt cx="0" cy="0"/>
-        </a:xfrm>
-      </p:grpSpPr>
-      <p:sp>
-        <p:nvSpPr>
-          <p:cNvPr id="2" name="Title 1"/>
-          <p:cNvSpPr>
-            <a:spLocks noGrp="1"/>
-          </p:cNvSpPr>
-          <p:nvPr>
-            <p:ph type="title"/>
-          </p:nvPr>
-        </p:nvSpPr>
-        <p:spPr>
-          <a:xfrm>
-            <a:off x="1141413" y="0"/>
-            <a:ext cx="9905998" cy="1905000"/>
-          </a:xfrm>
-        </p:spPr>
-        <p:txBody>
-          <a:bodyPr/>
-          <a:lstStyle/>
-          <a:p>
-            <a:pPr algn="ctr"/>
-            <a:r>
-              <a:rPr lang="es-ES_tradnl" dirty="0"/>
-              <a:t>Tabla de contenidos</a:t>
-            </a:r>
-          </a:p>
-        </p:txBody>
-      </p:sp>
-      <p:sp>
-        <p:nvSpPr>
-          <p:cNvPr id="3" name="Content Placeholder 2"/>
-          <p:cNvSpPr>
-            <a:spLocks noGrp="1"/>
-          </p:cNvSpPr>
-          <p:nvPr>
-            <p:ph idx="1"/>
-          </p:nvPr>
-        </p:nvSpPr>
-        <p:spPr>
-          <a:xfrm>
-            <a:off x="1141413" y="2053086"/>
-            <a:ext cx="9905998" cy="4347713"/>
-          </a:xfrm>
-        </p:spPr>
-        <p:txBody>
-          <a:bodyPr>
-            <a:normAutofit/>
-          </a:bodyPr>
-          <a:lstStyle/>
-          <a:p>
-            <a:r>
-              <a:rPr lang="en-US" sz="2400" u="sng" dirty="0">
-                <a:effectLst/>
-                <a:hlinkClick r:id="rId2"/>
-              </a:rPr>
-              <a:t>Introducción</a:t>
-            </a:r>
-            <a:endParaRPr lang="en-US" sz="2400" dirty="0">
-              <a:effectLst/>
-            </a:endParaRPr>
-          </a:p>
-          <a:p>
-            <a:r>
-              <a:rPr lang="en-US" sz="2400" u="sng" dirty="0">
-                <a:effectLst/>
-                <a:hlinkClick r:id="rId3"/>
-              </a:rPr>
-              <a:t>Datos y contexto</a:t>
-            </a:r>
-            <a:endParaRPr lang="en-US" sz="2400" dirty="0">
-              <a:effectLst/>
-            </a:endParaRPr>
-          </a:p>
-          <a:p>
-            <a:r>
-              <a:rPr lang="en-US" sz="2400" u="sng" dirty="0">
-                <a:effectLst/>
-                <a:hlinkClick r:id="rId4"/>
-              </a:rPr>
-              <a:t>Análisis exploratorio de los datos</a:t>
-            </a:r>
-            <a:endParaRPr lang="en-US" sz="2400" dirty="0">
-              <a:effectLst/>
-            </a:endParaRPr>
-          </a:p>
-          <a:p>
-            <a:r>
-              <a:rPr lang="en-US" sz="2400" u="sng" dirty="0">
-                <a:effectLst/>
-                <a:hlinkClick r:id="rId5"/>
-              </a:rPr>
-              <a:t>Teoría del Análisis de Componentes Principales</a:t>
-            </a:r>
-            <a:endParaRPr lang="en-US" sz="2400" dirty="0">
-              <a:effectLst/>
-            </a:endParaRPr>
-          </a:p>
-          <a:p>
-            <a:r>
-              <a:rPr lang="en-US" sz="2400" u="sng" dirty="0">
-                <a:effectLst/>
-                <a:hlinkClick r:id="rId6"/>
-              </a:rPr>
-              <a:t>Resultados del Análisis de Componentes Principales</a:t>
-            </a:r>
-            <a:endParaRPr lang="en-US" sz="2400" dirty="0">
-              <a:effectLst/>
-            </a:endParaRPr>
-          </a:p>
-          <a:p>
-            <a:r>
-              <a:rPr lang="en-US" sz="2400" u="sng" dirty="0">
-                <a:effectLst/>
-                <a:hlinkClick r:id="rId7"/>
-              </a:rPr>
-              <a:t>Análisis de conglomerados (clustering)</a:t>
-            </a:r>
-            <a:endParaRPr lang="en-US" sz="2400" dirty="0">
-              <a:effectLst/>
-            </a:endParaRPr>
-          </a:p>
-          <a:p>
-            <a:r>
-              <a:rPr lang="en-US" sz="2400" u="sng" dirty="0">
-                <a:effectLst/>
-                <a:hlinkClick r:id="rId8"/>
-              </a:rPr>
-              <a:t>Conclusiones</a:t>
-            </a:r>
-            <a:endParaRPr lang="en-US" sz="2400" dirty="0">
-              <a:effectLst/>
-            </a:endParaRPr>
-          </a:p>
-          <a:p>
-            <a:r>
-              <a:rPr lang="en-US" sz="2400" u="sng" dirty="0">
-                <a:effectLst/>
-                <a:hlinkClick r:id="rId9"/>
-              </a:rPr>
-              <a:t>Referencias</a:t>
-            </a:r>
-            <a:endParaRPr lang="en-US" sz="2400" dirty="0">
-              <a:effectLst/>
-            </a:endParaRPr>
-          </a:p>
-        </p:txBody>
-      </p:sp>
-    </p:spTree>
-    <p:extLst>
-      <p:ext uri="{BB962C8B-B14F-4D97-AF65-F5344CB8AC3E}">
-        <p14:creationId xmlns:p14="http://schemas.microsoft.com/office/powerpoint/2010/main" val="1960165556"/>
-      </p:ext>
-    </p:extLst>
-  </p:cSld>
-  <p:clrMapOvr>
-    <a:masterClrMapping/>
-  </p:clrMapOvr>
-</p:sld>
-</file>
-
-<file path=ppt/slides/slide20.xml><?xml version="1.0" encoding="utf-8"?>
+<file path=ppt/slides/slide24.xml><?xml version="1.0" encoding="utf-8"?>
 <p:sld xmlns:a="http://schemas.openxmlformats.org/drawingml/2006/main" xmlns:r="http://schemas.openxmlformats.org/officeDocument/2006/relationships" xmlns:p="http://schemas.openxmlformats.org/presentationml/2006/main">
   <p:cSld>
     <p:spTree>
@@ -10965,7 +11331,7 @@
 </p:sld>
 </file>
 
-<file path=ppt/slides/slide21.xml><?xml version="1.0" encoding="utf-8"?>
+<file path=ppt/slides/slide25.xml><?xml version="1.0" encoding="utf-8"?>
 <p:sld xmlns:a="http://schemas.openxmlformats.org/drawingml/2006/main" xmlns:r="http://schemas.openxmlformats.org/officeDocument/2006/relationships" xmlns:p="http://schemas.openxmlformats.org/presentationml/2006/main">
   <p:cSld>
     <p:spTree>
@@ -11042,7 +11408,7 @@
 </p:sld>
 </file>
 
-<file path=ppt/slides/slide22.xml><?xml version="1.0" encoding="utf-8"?>
+<file path=ppt/slides/slide26.xml><?xml version="1.0" encoding="utf-8"?>
 <p:sld xmlns:a="http://schemas.openxmlformats.org/drawingml/2006/main" xmlns:r="http://schemas.openxmlformats.org/officeDocument/2006/relationships" xmlns:p="http://schemas.openxmlformats.org/presentationml/2006/main">
   <p:cSld>
     <p:spTree>
@@ -11120,7 +11486,7 @@
 </p:sld>
 </file>
 
-<file path=ppt/slides/slide23.xml><?xml version="1.0" encoding="utf-8"?>
+<file path=ppt/slides/slide27.xml><?xml version="1.0" encoding="utf-8"?>
 <p:sld xmlns:a="http://schemas.openxmlformats.org/drawingml/2006/main" xmlns:r="http://schemas.openxmlformats.org/officeDocument/2006/relationships" xmlns:p="http://schemas.openxmlformats.org/presentationml/2006/main">
   <p:cSld>
     <p:spTree>
@@ -11197,7 +11563,7 @@
 </p:sld>
 </file>
 
-<file path=ppt/slides/slide24.xml><?xml version="1.0" encoding="utf-8"?>
+<file path=ppt/slides/slide28.xml><?xml version="1.0" encoding="utf-8"?>
 <p:sld xmlns:a="http://schemas.openxmlformats.org/drawingml/2006/main" xmlns:r="http://schemas.openxmlformats.org/officeDocument/2006/relationships" xmlns:p="http://schemas.openxmlformats.org/presentationml/2006/main">
   <p:cSld>
     <p:spTree>
@@ -12014,7 +12380,7 @@
       </p:sp>
       <p:pic>
         <p:nvPicPr>
-          <p:cNvPr id="6" name="Content Placeholder 5"/>
+          <p:cNvPr id="4" name="Content Placeholder 3"/>
           <p:cNvPicPr>
             <a:picLocks noGrp="1" noChangeAspect="1"/>
           </p:cNvPicPr>
@@ -12036,8 +12402,8 @@
         </p:blipFill>
         <p:spPr>
           <a:xfrm>
-            <a:off x="2014780" y="1250085"/>
-            <a:ext cx="7551251" cy="5607915"/>
+            <a:off x="1946787" y="1211958"/>
+            <a:ext cx="7639665" cy="5473935"/>
           </a:xfrm>
         </p:spPr>
       </p:pic>
@@ -12098,8 +12464,13 @@
             </a:r>
             <a:r>
               <a:rPr lang="es-ES_tradnl" dirty="0"/>
-              <a:t>. de los macro y micronutrientes</a:t>
-            </a:r>
+              <a:t>. de los </a:t>
+            </a:r>
+            <a:r>
+              <a:rPr lang="es-ES_tradnl" dirty="0" smtClean="0"/>
+              <a:t>macronutrientes</a:t>
+            </a:r>
+            <a:endParaRPr lang="es-ES_tradnl" dirty="0"/>
           </a:p>
         </p:txBody>
       </p:sp>
@@ -12164,8 +12535,8 @@
         </p:nvSpPr>
         <p:spPr>
           <a:xfrm>
-            <a:off x="1069848" y="0"/>
-            <a:ext cx="10058400" cy="1609344"/>
+            <a:off x="0" y="278969"/>
+            <a:ext cx="12026684" cy="1609344"/>
           </a:xfrm>
         </p:spPr>
         <p:txBody>
@@ -12174,45 +12545,44 @@
           <a:p>
             <a:pPr algn="ctr"/>
             <a:r>
+              <a:rPr lang="es-ES_tradnl" dirty="0" err="1"/>
+              <a:t>Distr</a:t>
+            </a:r>
+            <a:r>
               <a:rPr lang="es-ES_tradnl" dirty="0"/>
-              <a:t>Frecuencia por grupo de alimento</a:t>
-            </a:r>
+              <a:t>. de los </a:t>
+            </a:r>
+            <a:r>
+              <a:rPr lang="es-ES_tradnl" dirty="0" smtClean="0"/>
+              <a:t>micronutrientes</a:t>
+            </a:r>
+            <a:endParaRPr lang="es-ES_tradnl" dirty="0"/>
           </a:p>
         </p:txBody>
       </p:sp>
-      <p:pic>
-        <p:nvPicPr>
-          <p:cNvPr id="6" name="Content Placeholder 5"/>
-          <p:cNvPicPr>
-            <a:picLocks noGrp="1" noChangeAspect="1"/>
-          </p:cNvPicPr>
+      <p:sp>
+        <p:nvSpPr>
+          <p:cNvPr id="3" name="Content Placeholder 2"/>
+          <p:cNvSpPr>
+            <a:spLocks noGrp="1"/>
+          </p:cNvSpPr>
           <p:nvPr>
             <p:ph idx="1"/>
           </p:nvPr>
-        </p:nvPicPr>
-        <p:blipFill>
-          <a:blip r:embed="rId2">
-            <a:extLst>
-              <a:ext uri="{28A0092B-C50C-407E-A947-70E740481C1C}">
-                <a14:useLocalDpi xmlns:a14="http://schemas.microsoft.com/office/drawing/2010/main" val="0"/>
-              </a:ext>
-            </a:extLst>
-          </a:blip>
-          <a:stretch>
-            <a:fillRect/>
-          </a:stretch>
-        </p:blipFill>
-        <p:spPr>
-          <a:xfrm>
-            <a:off x="2034964" y="1365044"/>
-            <a:ext cx="7285148" cy="5492956"/>
-          </a:xfrm>
-        </p:spPr>
-      </p:pic>
+        </p:nvSpPr>
+        <p:spPr/>
+        <p:txBody>
+          <a:bodyPr/>
+          <a:lstStyle/>
+          <a:p>
+            <a:endParaRPr lang="es-ES_tradnl"/>
+          </a:p>
+        </p:txBody>
+      </p:sp>
     </p:spTree>
     <p:extLst>
       <p:ext uri="{BB962C8B-B14F-4D97-AF65-F5344CB8AC3E}">
-        <p14:creationId xmlns:p14="http://schemas.microsoft.com/office/powerpoint/2010/main" val="1534924295"/>
+        <p14:creationId xmlns:p14="http://schemas.microsoft.com/office/powerpoint/2010/main" val="481101816"/>
       </p:ext>
     </p:extLst>
   </p:cSld>
@@ -12251,8 +12621,8 @@
         </p:nvSpPr>
         <p:spPr>
           <a:xfrm>
-            <a:off x="473163" y="263472"/>
-            <a:ext cx="11251770" cy="1609344"/>
+            <a:off x="1069848" y="0"/>
+            <a:ext cx="10058400" cy="1609344"/>
           </a:xfrm>
         </p:spPr>
         <p:txBody>
@@ -12261,39 +12631,45 @@
           <a:p>
             <a:pPr algn="ctr"/>
             <a:r>
-              <a:rPr lang="es-ES_tradnl" dirty="0" err="1"/>
-              <a:t>kilocalorias</a:t>
-            </a:r>
-            <a:r>
               <a:rPr lang="es-ES_tradnl" dirty="0"/>
-              <a:t> por grupo de alimento</a:t>
+              <a:t>Frecuencia por grupo de alimento</a:t>
             </a:r>
           </a:p>
         </p:txBody>
       </p:sp>
-      <p:sp>
-        <p:nvSpPr>
-          <p:cNvPr id="3" name="Content Placeholder 2"/>
-          <p:cNvSpPr>
-            <a:spLocks noGrp="1"/>
-          </p:cNvSpPr>
+      <p:pic>
+        <p:nvPicPr>
+          <p:cNvPr id="4" name="Content Placeholder 3"/>
+          <p:cNvPicPr>
+            <a:picLocks noGrp="1" noChangeAspect="1"/>
+          </p:cNvPicPr>
           <p:nvPr>
             <p:ph idx="1"/>
           </p:nvPr>
-        </p:nvSpPr>
-        <p:spPr/>
-        <p:txBody>
-          <a:bodyPr/>
-          <a:lstStyle/>
-          <a:p>
-            <a:endParaRPr lang="es-ES_tradnl"/>
-          </a:p>
-        </p:txBody>
-      </p:sp>
+        </p:nvPicPr>
+        <p:blipFill>
+          <a:blip r:embed="rId2">
+            <a:extLst>
+              <a:ext uri="{28A0092B-C50C-407E-A947-70E740481C1C}">
+                <a14:useLocalDpi xmlns:a14="http://schemas.microsoft.com/office/drawing/2010/main" val="0"/>
+              </a:ext>
+            </a:extLst>
+          </a:blip>
+          <a:stretch>
+            <a:fillRect/>
+          </a:stretch>
+        </p:blipFill>
+        <p:spPr>
+          <a:xfrm>
+            <a:off x="1376985" y="1253614"/>
+            <a:ext cx="8681416" cy="5454032"/>
+          </a:xfrm>
+        </p:spPr>
+      </p:pic>
     </p:spTree>
     <p:extLst>
       <p:ext uri="{BB962C8B-B14F-4D97-AF65-F5344CB8AC3E}">
-        <p14:creationId xmlns:p14="http://schemas.microsoft.com/office/powerpoint/2010/main" val="897016843"/>
+        <p14:creationId xmlns:p14="http://schemas.microsoft.com/office/powerpoint/2010/main" val="1534924295"/>
       </p:ext>
     </p:extLst>
   </p:cSld>
@@ -12332,8 +12708,8 @@
         </p:nvSpPr>
         <p:spPr>
           <a:xfrm>
-            <a:off x="289766" y="340963"/>
-            <a:ext cx="11618563" cy="1609344"/>
+            <a:off x="487912" y="0"/>
+            <a:ext cx="11251770" cy="1609344"/>
           </a:xfrm>
         </p:spPr>
         <p:txBody>
@@ -12342,35 +12718,49 @@
           <a:p>
             <a:pPr algn="ctr"/>
             <a:r>
+              <a:rPr lang="es-ES_tradnl" dirty="0" smtClean="0"/>
+              <a:t>kilocalorías </a:t>
+            </a:r>
+            <a:r>
               <a:rPr lang="es-ES_tradnl" dirty="0"/>
-              <a:t>grasas por grupo de alimento</a:t>
+              <a:t>por grupo de alimento</a:t>
             </a:r>
           </a:p>
         </p:txBody>
       </p:sp>
-      <p:sp>
-        <p:nvSpPr>
-          <p:cNvPr id="3" name="Content Placeholder 2"/>
-          <p:cNvSpPr>
-            <a:spLocks noGrp="1"/>
-          </p:cNvSpPr>
+      <p:pic>
+        <p:nvPicPr>
+          <p:cNvPr id="6" name="Content Placeholder 5"/>
+          <p:cNvPicPr>
+            <a:picLocks noGrp="1" noChangeAspect="1"/>
+          </p:cNvPicPr>
           <p:nvPr>
             <p:ph idx="1"/>
           </p:nvPr>
-        </p:nvSpPr>
-        <p:spPr/>
-        <p:txBody>
-          <a:bodyPr/>
-          <a:lstStyle/>
-          <a:p>
-            <a:endParaRPr lang="es-ES_tradnl"/>
-          </a:p>
-        </p:txBody>
-      </p:sp>
+        </p:nvPicPr>
+        <p:blipFill>
+          <a:blip r:embed="rId2">
+            <a:extLst>
+              <a:ext uri="{28A0092B-C50C-407E-A947-70E740481C1C}">
+                <a14:useLocalDpi xmlns:a14="http://schemas.microsoft.com/office/drawing/2010/main" val="0"/>
+              </a:ext>
+            </a:extLst>
+          </a:blip>
+          <a:stretch>
+            <a:fillRect/>
+          </a:stretch>
+        </p:blipFill>
+        <p:spPr>
+          <a:xfrm>
+            <a:off x="1563329" y="1253759"/>
+            <a:ext cx="8745794" cy="5577737"/>
+          </a:xfrm>
+        </p:spPr>
+      </p:pic>
     </p:spTree>
     <p:extLst>
       <p:ext uri="{BB962C8B-B14F-4D97-AF65-F5344CB8AC3E}">
-        <p14:creationId xmlns:p14="http://schemas.microsoft.com/office/powerpoint/2010/main" val="261875099"/>
+        <p14:creationId xmlns:p14="http://schemas.microsoft.com/office/powerpoint/2010/main" val="897016843"/>
       </p:ext>
     </p:extLst>
   </p:cSld>

</xml_diff>

<commit_message>
agregando inf de cong y arboles
</commit_message>
<xml_diff>
--- a/results/PCA_presentacion.pptx
+++ b/results/PCA_presentacion.pptx
@@ -5,7 +5,7 @@
     <p:sldMasterId id="2147483787" r:id="rId1"/>
   </p:sldMasterIdLst>
   <p:notesMasterIdLst>
-    <p:notesMasterId r:id="rId30"/>
+    <p:notesMasterId r:id="rId31"/>
   </p:notesMasterIdLst>
   <p:sldIdLst>
     <p:sldId id="256" r:id="rId2"/>
@@ -32,10 +32,11 @@
     <p:sldId id="265" r:id="rId23"/>
     <p:sldId id="283" r:id="rId24"/>
     <p:sldId id="285" r:id="rId25"/>
-    <p:sldId id="267" r:id="rId26"/>
+    <p:sldId id="291" r:id="rId26"/>
     <p:sldId id="277" r:id="rId27"/>
-    <p:sldId id="268" r:id="rId28"/>
-    <p:sldId id="273" r:id="rId29"/>
+    <p:sldId id="267" r:id="rId28"/>
+    <p:sldId id="268" r:id="rId29"/>
+    <p:sldId id="273" r:id="rId30"/>
   </p:sldIdLst>
   <p:sldSz cx="12192000" cy="6858000"/>
   <p:notesSz cx="6858000" cy="9144000"/>
@@ -224,7 +225,7 @@
           <a:p>
             <a:fld id="{395C63AC-4902-F448-A1B5-F71A761D9957}" type="datetimeFigureOut">
               <a:rPr lang="es-ES_tradnl" smtClean="0"/>
-              <a:t>29/5/20</a:t>
+              <a:t>29/05/2020</a:t>
             </a:fld>
             <a:endParaRPr lang="es-ES_tradnl"/>
           </a:p>
@@ -383,7 +384,7 @@
           <a:p>
             <a:fld id="{2DDB4F98-9E2F-4642-AD0A-52F13A28866B}" type="slidenum">
               <a:rPr lang="es-ES_tradnl" smtClean="0"/>
-              <a:t>‹#›</a:t>
+              <a:t>‹Nº›</a:t>
             </a:fld>
             <a:endParaRPr lang="es-ES_tradnl"/>
           </a:p>
@@ -994,7 +995,7 @@
             <a:fld id="{B61BEF0D-F0BB-DE4B-95CE-6DB70DBA9567}" type="datetimeFigureOut">
               <a:rPr lang="en-US" smtClean="0"/>
               <a:pPr/>
-              <a:t>5/29/20</a:t>
+              <a:t>5/29/2020</a:t>
             </a:fld>
             <a:endParaRPr lang="en-US" dirty="0"/>
           </a:p>
@@ -1046,7 +1047,7 @@
             <a:fld id="{D57F1E4F-1CFF-5643-939E-217C01CDF565}" type="slidenum">
               <a:rPr lang="en-US" smtClean="0"/>
               <a:pPr/>
-              <a:t>‹#›</a:t>
+              <a:t>‹Nº›</a:t>
             </a:fld>
             <a:endParaRPr lang="en-US" dirty="0"/>
           </a:p>
@@ -1168,7 +1169,7 @@
             <a:fld id="{B61BEF0D-F0BB-DE4B-95CE-6DB70DBA9567}" type="datetimeFigureOut">
               <a:rPr lang="en-US" smtClean="0"/>
               <a:pPr/>
-              <a:t>5/29/20</a:t>
+              <a:t>5/29/2020</a:t>
             </a:fld>
             <a:endParaRPr lang="en-US" dirty="0"/>
           </a:p>
@@ -1211,7 +1212,7 @@
             <a:fld id="{D57F1E4F-1CFF-5643-939E-217C01CDF565}" type="slidenum">
               <a:rPr lang="en-US" smtClean="0"/>
               <a:pPr/>
-              <a:t>‹#›</a:t>
+              <a:t>‹Nº›</a:t>
             </a:fld>
             <a:endParaRPr lang="en-US" dirty="0"/>
           </a:p>
@@ -1345,7 +1346,7 @@
             <a:fld id="{B61BEF0D-F0BB-DE4B-95CE-6DB70DBA9567}" type="datetimeFigureOut">
               <a:rPr lang="en-US" smtClean="0"/>
               <a:pPr/>
-              <a:t>5/29/20</a:t>
+              <a:t>5/29/2020</a:t>
             </a:fld>
             <a:endParaRPr lang="en-US" dirty="0"/>
           </a:p>
@@ -1388,7 +1389,7 @@
             <a:fld id="{D57F1E4F-1CFF-5643-939E-217C01CDF565}" type="slidenum">
               <a:rPr lang="en-US" smtClean="0"/>
               <a:pPr/>
-              <a:t>‹#›</a:t>
+              <a:t>‹Nº›</a:t>
             </a:fld>
             <a:endParaRPr lang="en-US" dirty="0"/>
           </a:p>
@@ -1512,7 +1513,7 @@
             <a:fld id="{B61BEF0D-F0BB-DE4B-95CE-6DB70DBA9567}" type="datetimeFigureOut">
               <a:rPr lang="en-US" smtClean="0"/>
               <a:pPr/>
-              <a:t>5/29/20</a:t>
+              <a:t>5/29/2020</a:t>
             </a:fld>
             <a:endParaRPr lang="en-US" dirty="0"/>
           </a:p>
@@ -1555,7 +1556,7 @@
             <a:fld id="{D57F1E4F-1CFF-5643-939E-217C01CDF565}" type="slidenum">
               <a:rPr lang="en-US" smtClean="0"/>
               <a:pPr/>
-              <a:t>‹#›</a:t>
+              <a:t>‹Nº›</a:t>
             </a:fld>
             <a:endParaRPr lang="en-US" dirty="0"/>
           </a:p>
@@ -1830,7 +1831,7 @@
             <a:fld id="{B61BEF0D-F0BB-DE4B-95CE-6DB70DBA9567}" type="datetimeFigureOut">
               <a:rPr lang="en-US" smtClean="0"/>
               <a:pPr/>
-              <a:t>5/29/20</a:t>
+              <a:t>5/29/2020</a:t>
             </a:fld>
             <a:endParaRPr lang="en-US" dirty="0"/>
           </a:p>
@@ -2045,7 +2046,7 @@
             <a:fld id="{D57F1E4F-1CFF-5643-939E-217C01CDF565}" type="slidenum">
               <a:rPr lang="en-US" smtClean="0"/>
               <a:pPr/>
-              <a:t>‹#›</a:t>
+              <a:t>‹Nº›</a:t>
             </a:fld>
             <a:endParaRPr lang="en-US" dirty="0"/>
           </a:p>
@@ -2287,7 +2288,7 @@
             <a:fld id="{B61BEF0D-F0BB-DE4B-95CE-6DB70DBA9567}" type="datetimeFigureOut">
               <a:rPr lang="en-US" smtClean="0"/>
               <a:pPr/>
-              <a:t>5/29/20</a:t>
+              <a:t>5/29/2020</a:t>
             </a:fld>
             <a:endParaRPr lang="en-US" dirty="0"/>
           </a:p>
@@ -2330,7 +2331,7 @@
             <a:fld id="{D57F1E4F-1CFF-5643-939E-217C01CDF565}" type="slidenum">
               <a:rPr lang="en-US" smtClean="0"/>
               <a:pPr/>
-              <a:t>‹#›</a:t>
+              <a:t>‹Nº›</a:t>
             </a:fld>
             <a:endParaRPr lang="en-US" dirty="0"/>
           </a:p>
@@ -2695,7 +2696,7 @@
             <a:fld id="{B61BEF0D-F0BB-DE4B-95CE-6DB70DBA9567}" type="datetimeFigureOut">
               <a:rPr lang="en-US" smtClean="0"/>
               <a:pPr/>
-              <a:t>5/29/20</a:t>
+              <a:t>5/29/2020</a:t>
             </a:fld>
             <a:endParaRPr lang="en-US" dirty="0"/>
           </a:p>
@@ -2738,7 +2739,7 @@
             <a:fld id="{D57F1E4F-1CFF-5643-939E-217C01CDF565}" type="slidenum">
               <a:rPr lang="en-US" smtClean="0"/>
               <a:pPr/>
-              <a:t>‹#›</a:t>
+              <a:t>‹Nº›</a:t>
             </a:fld>
             <a:endParaRPr lang="en-US" dirty="0"/>
           </a:p>
@@ -2810,7 +2811,7 @@
             <a:fld id="{B61BEF0D-F0BB-DE4B-95CE-6DB70DBA9567}" type="datetimeFigureOut">
               <a:rPr lang="en-US" smtClean="0"/>
               <a:pPr/>
-              <a:t>5/29/20</a:t>
+              <a:t>5/29/2020</a:t>
             </a:fld>
             <a:endParaRPr lang="en-US" dirty="0"/>
           </a:p>
@@ -2853,7 +2854,7 @@
             <a:fld id="{D57F1E4F-1CFF-5643-939E-217C01CDF565}" type="slidenum">
               <a:rPr lang="en-US" smtClean="0"/>
               <a:pPr/>
-              <a:t>‹#›</a:t>
+              <a:t>‹Nº›</a:t>
             </a:fld>
             <a:endParaRPr lang="en-US" dirty="0"/>
           </a:p>
@@ -2924,7 +2925,7 @@
             <a:fld id="{B61BEF0D-F0BB-DE4B-95CE-6DB70DBA9567}" type="datetimeFigureOut">
               <a:rPr lang="en-US" smtClean="0"/>
               <a:pPr/>
-              <a:t>5/29/20</a:t>
+              <a:t>5/29/2020</a:t>
             </a:fld>
             <a:endParaRPr lang="en-US" dirty="0"/>
           </a:p>
@@ -2967,7 +2968,7 @@
             <a:fld id="{D57F1E4F-1CFF-5643-939E-217C01CDF565}" type="slidenum">
               <a:rPr lang="en-US" smtClean="0"/>
               <a:pPr/>
-              <a:t>‹#›</a:t>
+              <a:t>‹Nº›</a:t>
             </a:fld>
             <a:endParaRPr lang="en-US" dirty="0"/>
           </a:p>
@@ -3279,7 +3280,7 @@
             <a:fld id="{B61BEF0D-F0BB-DE4B-95CE-6DB70DBA9567}" type="datetimeFigureOut">
               <a:rPr lang="en-US" smtClean="0"/>
               <a:pPr/>
-              <a:t>5/29/20</a:t>
+              <a:t>5/29/2020</a:t>
             </a:fld>
             <a:endParaRPr lang="en-US" dirty="0"/>
           </a:p>
@@ -3485,7 +3486,7 @@
             <a:fld id="{D57F1E4F-1CFF-5643-939E-217C01CDF565}" type="slidenum">
               <a:rPr lang="en-US" smtClean="0"/>
               <a:pPr/>
-              <a:t>‹#›</a:t>
+              <a:t>‹Nº›</a:t>
             </a:fld>
             <a:endParaRPr lang="en-US" dirty="0"/>
           </a:p>
@@ -3783,7 +3784,7 @@
             <a:fld id="{B61BEF0D-F0BB-DE4B-95CE-6DB70DBA9567}" type="datetimeFigureOut">
               <a:rPr lang="en-US" smtClean="0"/>
               <a:pPr/>
-              <a:t>5/29/20</a:t>
+              <a:t>5/29/2020</a:t>
             </a:fld>
             <a:endParaRPr lang="en-US" dirty="0"/>
           </a:p>
@@ -3970,7 +3971,7 @@
             <a:fld id="{D57F1E4F-1CFF-5643-939E-217C01CDF565}" type="slidenum">
               <a:rPr lang="en-US" smtClean="0"/>
               <a:pPr/>
-              <a:t>‹#›</a:t>
+              <a:t>‹Nº›</a:t>
             </a:fld>
             <a:endParaRPr lang="en-US" dirty="0"/>
           </a:p>
@@ -4135,7 +4136,7 @@
             <a:fld id="{B61BEF0D-F0BB-DE4B-95CE-6DB70DBA9567}" type="datetimeFigureOut">
               <a:rPr lang="en-US" smtClean="0"/>
               <a:pPr/>
-              <a:t>5/29/20</a:t>
+              <a:t>5/29/2020</a:t>
             </a:fld>
             <a:endParaRPr lang="en-US" dirty="0"/>
           </a:p>
@@ -4374,7 +4375,7 @@
             <a:fld id="{D57F1E4F-1CFF-5643-939E-217C01CDF565}" type="slidenum">
               <a:rPr lang="en-US" smtClean="0"/>
               <a:pPr/>
-              <a:t>‹#›</a:t>
+              <a:t>‹Nº›</a:t>
             </a:fld>
             <a:endParaRPr lang="en-US" dirty="0"/>
           </a:p>
@@ -4997,10 +4998,9 @@
           <a:p>
             <a:pPr algn="ctr"/>
             <a:r>
-              <a:rPr lang="es-ES_tradnl" dirty="0" smtClean="0"/>
+              <a:rPr lang="es-ES_tradnl" dirty="0"/>
               <a:t>Proteínas por grupo de alimento</a:t>
             </a:r>
-            <a:endParaRPr lang="es-ES_tradnl" dirty="0"/>
           </a:p>
         </p:txBody>
       </p:sp>
@@ -5173,12 +5173,8 @@
           <a:p>
             <a:pPr algn="ctr"/>
             <a:r>
-              <a:rPr lang="es-ES_tradnl" dirty="0" smtClean="0"/>
-              <a:t>carbohidratos </a:t>
-            </a:r>
-            <a:r>
               <a:rPr lang="es-ES_tradnl" dirty="0"/>
-              <a:t>por grupo de alimento</a:t>
+              <a:t>carbohidratos por grupo de alimento</a:t>
             </a:r>
           </a:p>
         </p:txBody>
@@ -5264,16 +5260,8 @@
           <a:p>
             <a:pPr algn="ctr"/>
             <a:r>
-              <a:rPr lang="es-ES_tradnl" dirty="0" smtClean="0"/>
-              <a:t>Azúcares</a:t>
-            </a:r>
-            <a:r>
-              <a:rPr lang="es-ES_tradnl" dirty="0" smtClean="0"/>
-              <a:t> </a:t>
-            </a:r>
-            <a:r>
               <a:rPr lang="es-ES_tradnl" dirty="0"/>
-              <a:t>por grupo de alimento</a:t>
+              <a:t>Azúcares por grupo de alimento</a:t>
             </a:r>
           </a:p>
         </p:txBody>
@@ -5552,8 +5540,8 @@
           </a:p>
         </p:txBody>
       </p:sp>
-      <mc:AlternateContent xmlns:mc="http://schemas.openxmlformats.org/markup-compatibility/2006">
-        <mc:Choice xmlns:a14="http://schemas.microsoft.com/office/drawing/2010/main" Requires="a14">
+      <mc:AlternateContent xmlns:mc="http://schemas.openxmlformats.org/markup-compatibility/2006" xmlns:a14="http://schemas.microsoft.com/office/drawing/2010/main">
+        <mc:Choice Requires="a14">
           <p:sp>
             <p:nvSpPr>
               <p:cNvPr id="3" name="Content Placeholder 2"/>
@@ -5631,7 +5619,7 @@
                       <m:sSupPr>
                         <m:ctrlPr>
                           <a:rPr lang="es-MX" b="0" i="1" dirty="0" smtClean="0">
-                            <a:latin typeface="Cambria Math" charset="0"/>
+                            <a:latin typeface="Cambria Math" panose="02040503050406030204" pitchFamily="18" charset="0"/>
                           </a:rPr>
                         </m:ctrlPr>
                       </m:sSupPr>
@@ -5685,7 +5673,7 @@
             </p:txBody>
           </p:sp>
         </mc:Choice>
-        <mc:Fallback>
+        <mc:Fallback xmlns="">
           <p:sp>
             <p:nvSpPr>
               <p:cNvPr id="3" name="Content Placeholder 2"/>
@@ -5942,7 +5930,7 @@
                       <m:sSubPr>
                         <m:ctrlPr>
                           <a:rPr lang="es-ES_tradnl" i="1" dirty="0" smtClean="0">
-                            <a:latin typeface="Cambria Math" charset="0"/>
+                            <a:latin typeface="Cambria Math" panose="02040503050406030204" pitchFamily="18" charset="0"/>
                           </a:rPr>
                         </m:ctrlPr>
                       </m:sSubPr>
@@ -5993,7 +5981,7 @@
                       <m:sSubPr>
                         <m:ctrlPr>
                           <a:rPr lang="es-MX" b="0" i="1" smtClean="0">
-                            <a:latin typeface="Cambria Math" charset="0"/>
+                            <a:latin typeface="Cambria Math" panose="02040503050406030204" pitchFamily="18" charset="0"/>
                           </a:rPr>
                         </m:ctrlPr>
                       </m:sSubPr>
@@ -6024,7 +6012,7 @@
                       <m:sSubPr>
                         <m:ctrlPr>
                           <a:rPr lang="es-MX" b="0" i="1" smtClean="0">
-                            <a:latin typeface="Cambria Math" charset="0"/>
+                            <a:latin typeface="Cambria Math" panose="02040503050406030204" pitchFamily="18" charset="0"/>
                           </a:rPr>
                         </m:ctrlPr>
                       </m:sSubPr>
@@ -6049,7 +6037,7 @@
                       <m:sSubPr>
                         <m:ctrlPr>
                           <a:rPr lang="es-MX" b="0" i="1" smtClean="0">
-                            <a:latin typeface="Cambria Math" charset="0"/>
+                            <a:latin typeface="Cambria Math" panose="02040503050406030204" pitchFamily="18" charset="0"/>
                           </a:rPr>
                         </m:ctrlPr>
                       </m:sSubPr>
@@ -6082,7 +6070,7 @@
                       <m:sSubPr>
                         <m:ctrlPr>
                           <a:rPr lang="es-ES_tradnl" i="1" dirty="0" smtClean="0">
-                            <a:latin typeface="Cambria Math" charset="0"/>
+                            <a:latin typeface="Cambria Math" panose="02040503050406030204" pitchFamily="18" charset="0"/>
                           </a:rPr>
                         </m:ctrlPr>
                       </m:sSubPr>
@@ -6119,7 +6107,7 @@
                       <m:sSubPr>
                         <m:ctrlPr>
                           <a:rPr lang="es-MX" b="0" i="1" dirty="0" smtClean="0">
-                            <a:latin typeface="Cambria Math" charset="0"/>
+                            <a:latin typeface="Cambria Math" panose="02040503050406030204" pitchFamily="18" charset="0"/>
                           </a:rPr>
                         </m:ctrlPr>
                       </m:sSubPr>
@@ -6144,7 +6132,7 @@
                       <m:sSubPr>
                         <m:ctrlPr>
                           <a:rPr lang="es-MX" b="0" i="1" dirty="0" smtClean="0">
-                            <a:latin typeface="Cambria Math" charset="0"/>
+                            <a:latin typeface="Cambria Math" panose="02040503050406030204" pitchFamily="18" charset="0"/>
                           </a:rPr>
                         </m:ctrlPr>
                       </m:sSubPr>
@@ -6213,7 +6201,7 @@
                       <m:sSubPr>
                         <m:ctrlPr>
                           <a:rPr lang="es-ES_tradnl" i="1" dirty="0" smtClean="0">
-                            <a:latin typeface="Cambria Math" charset="0"/>
+                            <a:latin typeface="Cambria Math" panose="02040503050406030204" pitchFamily="18" charset="0"/>
                           </a:rPr>
                         </m:ctrlPr>
                       </m:sSubPr>
@@ -6257,7 +6245,7 @@
                       <m:sSubPr>
                         <m:ctrlPr>
                           <a:rPr lang="es-ES_tradnl" i="1" dirty="0" smtClean="0">
-                            <a:latin typeface="Cambria Math" charset="0"/>
+                            <a:latin typeface="Cambria Math" panose="02040503050406030204" pitchFamily="18" charset="0"/>
                           </a:rPr>
                         </m:ctrlPr>
                       </m:sSubPr>
@@ -6464,7 +6452,7 @@
                       <m:sSubPr>
                         <m:ctrlPr>
                           <a:rPr lang="es-ES" i="1" dirty="0" smtClean="0">
-                            <a:latin typeface="Cambria Math" charset="0"/>
+                            <a:latin typeface="Cambria Math" panose="02040503050406030204" pitchFamily="18" charset="0"/>
                           </a:rPr>
                         </m:ctrlPr>
                       </m:sSubPr>
@@ -6576,7 +6564,7 @@
                       <m:sSubPr>
                         <m:ctrlPr>
                           <a:rPr lang="es-ES_tradnl" i="1" dirty="0" smtClean="0">
-                            <a:latin typeface="Cambria Math" charset="0"/>
+                            <a:latin typeface="Cambria Math" panose="02040503050406030204" pitchFamily="18" charset="0"/>
                           </a:rPr>
                         </m:ctrlPr>
                       </m:sSubPr>
@@ -6624,7 +6612,7 @@
                       <m:sSubPr>
                         <m:ctrlPr>
                           <a:rPr lang="es-MX" i="1">
-                            <a:latin typeface="Cambria Math" charset="0"/>
+                            <a:latin typeface="Cambria Math" panose="02040503050406030204" pitchFamily="18" charset="0"/>
                           </a:rPr>
                         </m:ctrlPr>
                       </m:sSubPr>
@@ -6661,7 +6649,7 @@
                       <m:fPr>
                         <m:ctrlPr>
                           <a:rPr lang="es-MX" i="1" smtClean="0">
-                            <a:latin typeface="Cambria Math" charset="0"/>
+                            <a:latin typeface="Cambria Math" panose="02040503050406030204" pitchFamily="18" charset="0"/>
                           </a:rPr>
                         </m:ctrlPr>
                       </m:fPr>
@@ -6676,7 +6664,7 @@
                           <m:sSubPr>
                             <m:ctrlPr>
                               <a:rPr lang="es-MX" i="1">
-                                <a:latin typeface="Cambria Math" charset="0"/>
+                                <a:latin typeface="Cambria Math" panose="02040503050406030204" pitchFamily="18" charset="0"/>
                               </a:rPr>
                             </m:ctrlPr>
                           </m:sSubPr>
@@ -6705,7 +6693,7 @@
                             <m:endChr m:val="|"/>
                             <m:ctrlPr>
                               <a:rPr lang="es-MX" b="0" i="1" smtClean="0">
-                                <a:latin typeface="Cambria Math" charset="0"/>
+                                <a:latin typeface="Cambria Math" panose="02040503050406030204" pitchFamily="18" charset="0"/>
                               </a:rPr>
                             </m:ctrlPr>
                           </m:dPr>
@@ -6716,7 +6704,7 @@
                                 <m:endChr m:val="|"/>
                                 <m:ctrlPr>
                                   <a:rPr lang="es-MX" b="0" i="1" smtClean="0">
-                                    <a:latin typeface="Cambria Math" charset="0"/>
+                                    <a:latin typeface="Cambria Math" panose="02040503050406030204" pitchFamily="18" charset="0"/>
                                   </a:rPr>
                                 </m:ctrlPr>
                               </m:dPr>
@@ -6731,7 +6719,7 @@
                                   <m:sSubPr>
                                     <m:ctrlPr>
                                       <a:rPr lang="es-MX" i="1">
-                                        <a:latin typeface="Cambria Math" charset="0"/>
+                                        <a:latin typeface="Cambria Math" panose="02040503050406030204" pitchFamily="18" charset="0"/>
                                       </a:rPr>
                                     </m:ctrlPr>
                                   </m:sSubPr>
@@ -6770,7 +6758,7 @@
                       <m:sSubPr>
                         <m:ctrlPr>
                           <a:rPr lang="es-MX" b="0" i="1" smtClean="0">
-                            <a:latin typeface="Cambria Math" charset="0"/>
+                            <a:latin typeface="Cambria Math" panose="02040503050406030204" pitchFamily="18" charset="0"/>
                           </a:rPr>
                         </m:ctrlPr>
                       </m:sSubPr>
@@ -6801,7 +6789,7 @@
                       <m:fPr>
                         <m:ctrlPr>
                           <a:rPr lang="es-MX" b="0" i="1" smtClean="0">
-                            <a:latin typeface="Cambria Math" charset="0"/>
+                            <a:latin typeface="Cambria Math" panose="02040503050406030204" pitchFamily="18" charset="0"/>
                           </a:rPr>
                         </m:ctrlPr>
                       </m:fPr>
@@ -6810,7 +6798,7 @@
                           <m:sSubSupPr>
                             <m:ctrlPr>
                               <a:rPr lang="es-MX" i="1" smtClean="0">
-                                <a:latin typeface="Cambria Math" charset="0"/>
+                                <a:latin typeface="Cambria Math" panose="02040503050406030204" pitchFamily="18" charset="0"/>
                               </a:rPr>
                             </m:ctrlPr>
                           </m:sSubSupPr>
@@ -6819,7 +6807,7 @@
                               <m:sSubPr>
                                 <m:ctrlPr>
                                   <a:rPr lang="es-MX" b="0" i="1" smtClean="0">
-                                    <a:latin typeface="Cambria Math" charset="0"/>
+                                    <a:latin typeface="Cambria Math" panose="02040503050406030204" pitchFamily="18" charset="0"/>
                                   </a:rPr>
                                 </m:ctrlPr>
                               </m:sSubPr>
@@ -6874,7 +6862,7 @@
                           <m:sSubPr>
                             <m:ctrlPr>
                               <a:rPr lang="es-MX" b="0" i="1" smtClean="0">
-                                <a:latin typeface="Cambria Math" charset="0"/>
+                                <a:latin typeface="Cambria Math" panose="02040503050406030204" pitchFamily="18" charset="0"/>
                               </a:rPr>
                             </m:ctrlPr>
                           </m:sSubPr>
@@ -6901,7 +6889,7 @@
                           <m:sSubSupPr>
                             <m:ctrlPr>
                               <a:rPr lang="es-MX" i="1">
-                                <a:latin typeface="Cambria Math" charset="0"/>
+                                <a:latin typeface="Cambria Math" panose="02040503050406030204" pitchFamily="18" charset="0"/>
                               </a:rPr>
                             </m:ctrlPr>
                           </m:sSubSupPr>
@@ -6934,7 +6922,7 @@
                           <m:sSubPr>
                             <m:ctrlPr>
                               <a:rPr lang="es-MX" i="1">
-                                <a:latin typeface="Cambria Math" charset="0"/>
+                                <a:latin typeface="Cambria Math" panose="02040503050406030204" pitchFamily="18" charset="0"/>
                               </a:rPr>
                             </m:ctrlPr>
                           </m:sSubPr>
@@ -6972,7 +6960,7 @@
                       <m:sSubPr>
                         <m:ctrlPr>
                           <a:rPr lang="es-MX" i="1" smtClean="0">
-                            <a:latin typeface="Cambria Math" charset="0"/>
+                            <a:latin typeface="Cambria Math" panose="02040503050406030204" pitchFamily="18" charset="0"/>
                           </a:rPr>
                         </m:ctrlPr>
                       </m:sSubPr>
@@ -11334,6 +11322,14 @@
 <file path=ppt/slides/slide25.xml><?xml version="1.0" encoding="utf-8"?>
 <p:sld xmlns:a="http://schemas.openxmlformats.org/drawingml/2006/main" xmlns:r="http://schemas.openxmlformats.org/officeDocument/2006/relationships" xmlns:p="http://schemas.openxmlformats.org/presentationml/2006/main">
   <p:cSld>
+    <p:bg>
+      <p:bgPr>
+        <a:solidFill>
+          <a:schemeClr val="bg1"/>
+        </a:solidFill>
+        <a:effectLst/>
+      </p:bgPr>
+    </p:bg>
     <p:spTree>
       <p:nvGrpSpPr>
         <p:cNvPr id="1" name=""/>
@@ -11348,9 +11344,130 @@
           <a:chExt cx="0" cy="0"/>
         </a:xfrm>
       </p:grpSpPr>
+      <p:pic>
+        <p:nvPicPr>
+          <p:cNvPr id="6" name="Marcador de contenido 5">
+            <a:extLst>
+              <a:ext uri="{FF2B5EF4-FFF2-40B4-BE49-F238E27FC236}">
+                <a16:creationId xmlns:a16="http://schemas.microsoft.com/office/drawing/2014/main" id="{23D41DC1-16F7-498C-8C38-3F268A285C40}"/>
+              </a:ext>
+            </a:extLst>
+          </p:cNvPr>
+          <p:cNvPicPr>
+            <a:picLocks noChangeAspect="1"/>
+          </p:cNvPicPr>
+          <p:nvPr/>
+        </p:nvPicPr>
+        <p:blipFill>
+          <a:blip r:embed="rId2"/>
+          <a:stretch>
+            <a:fillRect/>
+          </a:stretch>
+        </p:blipFill>
+        <p:spPr>
+          <a:xfrm>
+            <a:off x="995302" y="1129940"/>
+            <a:ext cx="5224873" cy="5588101"/>
+          </a:xfrm>
+          <a:prstGeom prst="rect">
+            <a:avLst/>
+          </a:prstGeom>
+        </p:spPr>
+      </p:pic>
       <p:sp>
         <p:nvSpPr>
-          <p:cNvPr id="2" name="Title 1"/>
+          <p:cNvPr id="27" name="Content Placeholder 10">
+            <a:extLst>
+              <a:ext uri="{FF2B5EF4-FFF2-40B4-BE49-F238E27FC236}">
+                <a16:creationId xmlns:a16="http://schemas.microsoft.com/office/drawing/2014/main" id="{ECBD1444-430D-480D-8E00-07AC237FD6F9}"/>
+              </a:ext>
+            </a:extLst>
+          </p:cNvPr>
+          <p:cNvSpPr>
+            <a:spLocks noGrp="1"/>
+          </p:cNvSpPr>
+          <p:nvPr>
+            <p:ph idx="1"/>
+          </p:nvPr>
+        </p:nvSpPr>
+        <p:spPr>
+          <a:xfrm>
+            <a:off x="6988580" y="1877700"/>
+            <a:ext cx="3677263" cy="4092579"/>
+          </a:xfrm>
+        </p:spPr>
+        <p:txBody>
+          <a:bodyPr>
+            <a:normAutofit/>
+          </a:bodyPr>
+          <a:lstStyle/>
+          <a:p>
+            <a:r>
+              <a:rPr lang="en-US" dirty="0" err="1"/>
+              <a:t>Matriz</a:t>
+            </a:r>
+            <a:r>
+              <a:rPr lang="en-US" dirty="0"/>
+              <a:t> de confusion</a:t>
+            </a:r>
+          </a:p>
+          <a:p>
+            <a:r>
+              <a:rPr lang="es-ES_tradnl" dirty="0" err="1"/>
+              <a:t>Precision</a:t>
+            </a:r>
+            <a:r>
+              <a:rPr lang="es-ES_tradnl" dirty="0"/>
+              <a:t> score:</a:t>
+            </a:r>
+          </a:p>
+          <a:p>
+            <a:pPr lvl="1"/>
+            <a:r>
+              <a:rPr lang="es-ES_tradnl" dirty="0"/>
+              <a:t>0.5673</a:t>
+            </a:r>
+          </a:p>
+          <a:p>
+            <a:r>
+              <a:rPr lang="es-ES_tradnl" dirty="0" err="1"/>
+              <a:t>Recall</a:t>
+            </a:r>
+            <a:r>
+              <a:rPr lang="es-ES_tradnl" dirty="0"/>
+              <a:t> score: </a:t>
+            </a:r>
+          </a:p>
+          <a:p>
+            <a:pPr lvl="1"/>
+            <a:r>
+              <a:rPr lang="es-ES_tradnl" dirty="0"/>
+              <a:t>0.5558</a:t>
+            </a:r>
+          </a:p>
+          <a:p>
+            <a:pPr marL="274320" lvl="1" indent="0">
+              <a:buNone/>
+            </a:pPr>
+            <a:endParaRPr lang="es-ES_tradnl" dirty="0"/>
+          </a:p>
+          <a:p>
+            <a:pPr marL="0" indent="0">
+              <a:buNone/>
+            </a:pPr>
+            <a:endParaRPr lang="en-US" dirty="0"/>
+          </a:p>
+        </p:txBody>
+      </p:sp>
+      <p:sp>
+        <p:nvSpPr>
+          <p:cNvPr id="4" name="Título 3">
+            <a:extLst>
+              <a:ext uri="{FF2B5EF4-FFF2-40B4-BE49-F238E27FC236}">
+                <a16:creationId xmlns:a16="http://schemas.microsoft.com/office/drawing/2014/main" id="{1EED4081-E428-4AAC-8F91-9FB80487ADE2}"/>
+              </a:ext>
+            </a:extLst>
+          </p:cNvPr>
           <p:cNvSpPr>
             <a:spLocks noGrp="1"/>
           </p:cNvSpPr>
@@ -11360,45 +11477,27 @@
         </p:nvSpPr>
         <p:spPr>
           <a:xfrm>
-            <a:off x="1069848" y="216977"/>
-            <a:ext cx="10058400" cy="1609344"/>
+            <a:off x="2998337" y="-15302"/>
+            <a:ext cx="7190692" cy="1609344"/>
           </a:xfrm>
         </p:spPr>
         <p:txBody>
-          <a:bodyPr/>
+          <a:bodyPr>
+            <a:normAutofit/>
+          </a:bodyPr>
           <a:lstStyle/>
           <a:p>
-            <a:pPr algn="ctr"/>
-            <a:r>
-              <a:rPr lang="es-ES_tradnl" dirty="0"/>
-              <a:t>Análisis de conglomerados</a:t>
-            </a:r>
-          </a:p>
-        </p:txBody>
-      </p:sp>
-      <p:sp>
-        <p:nvSpPr>
-          <p:cNvPr id="3" name="Content Placeholder 2"/>
-          <p:cNvSpPr>
-            <a:spLocks noGrp="1"/>
-          </p:cNvSpPr>
-          <p:nvPr>
-            <p:ph idx="1"/>
-          </p:nvPr>
-        </p:nvSpPr>
-        <p:spPr/>
-        <p:txBody>
-          <a:bodyPr/>
-          <a:lstStyle/>
-          <a:p>
-            <a:endParaRPr lang="es-ES_tradnl"/>
+            <a:r>
+              <a:rPr lang="es-ES_tradnl" sz="3600" dirty="0"/>
+              <a:t>Árboles de decisión para clasificación</a:t>
+            </a:r>
           </a:p>
         </p:txBody>
       </p:sp>
     </p:spTree>
     <p:extLst>
       <p:ext uri="{BB962C8B-B14F-4D97-AF65-F5344CB8AC3E}">
-        <p14:creationId xmlns:p14="http://schemas.microsoft.com/office/powerpoint/2010/main" val="284662205"/>
+        <p14:creationId xmlns:p14="http://schemas.microsoft.com/office/powerpoint/2010/main" val="2479810407"/>
       </p:ext>
     </p:extLst>
   </p:cSld>
@@ -11447,32 +11546,156 @@
           <a:p>
             <a:pPr algn="ctr"/>
             <a:r>
+              <a:rPr lang="es-ES_tradnl" dirty="0"/>
+              <a:t>Paralelización</a:t>
+            </a:r>
+            <a:br>
+              <a:rPr lang="es-ES_tradnl" dirty="0"/>
+            </a:br>
+            <a:r>
+              <a:rPr lang="es-ES_tradnl" dirty="0"/>
+              <a:t>(</a:t>
+            </a:r>
+            <a:r>
               <a:rPr lang="es-ES_tradnl" dirty="0" err="1"/>
-              <a:t>Paralelización</a:t>
-            </a:r>
-            <a:endParaRPr lang="es-ES_tradnl" dirty="0"/>
+              <a:t>Dask</a:t>
+            </a:r>
+            <a:r>
+              <a:rPr lang="es-ES_tradnl" dirty="0"/>
+              <a:t>)</a:t>
+            </a:r>
           </a:p>
         </p:txBody>
       </p:sp>
-      <p:sp>
-        <p:nvSpPr>
-          <p:cNvPr id="3" name="Content Placeholder 2"/>
-          <p:cNvSpPr>
-            <a:spLocks noGrp="1"/>
-          </p:cNvSpPr>
-          <p:nvPr>
-            <p:ph idx="1"/>
-          </p:nvPr>
-        </p:nvSpPr>
-        <p:spPr/>
-        <p:txBody>
-          <a:bodyPr/>
-          <a:lstStyle/>
-          <a:p>
-            <a:endParaRPr lang="es-ES_tradnl"/>
-          </a:p>
-        </p:txBody>
-      </p:sp>
+      <p:pic>
+        <p:nvPicPr>
+          <p:cNvPr id="6" name="Imagen 5">
+            <a:extLst>
+              <a:ext uri="{FF2B5EF4-FFF2-40B4-BE49-F238E27FC236}">
+                <a16:creationId xmlns:a16="http://schemas.microsoft.com/office/drawing/2014/main" id="{9D5E962C-9996-4E68-AB37-F3934F0727D0}"/>
+              </a:ext>
+            </a:extLst>
+          </p:cNvPr>
+          <p:cNvPicPr>
+            <a:picLocks noChangeAspect="1"/>
+          </p:cNvPicPr>
+          <p:nvPr/>
+        </p:nvPicPr>
+        <p:blipFill>
+          <a:blip r:embed="rId2"/>
+          <a:stretch>
+            <a:fillRect/>
+          </a:stretch>
+        </p:blipFill>
+        <p:spPr>
+          <a:xfrm>
+            <a:off x="4350256" y="1888314"/>
+            <a:ext cx="3733800" cy="1009650"/>
+          </a:xfrm>
+          <a:prstGeom prst="rect">
+            <a:avLst/>
+          </a:prstGeom>
+        </p:spPr>
+      </p:pic>
+      <p:cxnSp>
+        <p:nvCxnSpPr>
+          <p:cNvPr id="8" name="Conector recto de flecha 7">
+            <a:extLst>
+              <a:ext uri="{FF2B5EF4-FFF2-40B4-BE49-F238E27FC236}">
+                <a16:creationId xmlns:a16="http://schemas.microsoft.com/office/drawing/2014/main" id="{4CF654CC-9649-4D13-BCF8-3A8B2183FFD4}"/>
+              </a:ext>
+            </a:extLst>
+          </p:cNvPr>
+          <p:cNvCxnSpPr/>
+          <p:nvPr/>
+        </p:nvCxnSpPr>
+        <p:spPr>
+          <a:xfrm>
+            <a:off x="5522162" y="4225771"/>
+            <a:ext cx="1038687" cy="0"/>
+          </a:xfrm>
+          <a:prstGeom prst="straightConnector1">
+            <a:avLst/>
+          </a:prstGeom>
+          <a:ln w="57150">
+            <a:tailEnd type="triangle"/>
+          </a:ln>
+        </p:spPr>
+        <p:style>
+          <a:lnRef idx="1">
+            <a:schemeClr val="accent1"/>
+          </a:lnRef>
+          <a:fillRef idx="0">
+            <a:schemeClr val="accent1"/>
+          </a:fillRef>
+          <a:effectRef idx="0">
+            <a:schemeClr val="accent1"/>
+          </a:effectRef>
+          <a:fontRef idx="minor">
+            <a:schemeClr val="tx1"/>
+          </a:fontRef>
+        </p:style>
+      </p:cxnSp>
+      <p:pic>
+        <p:nvPicPr>
+          <p:cNvPr id="10" name="Imagen 9">
+            <a:extLst>
+              <a:ext uri="{FF2B5EF4-FFF2-40B4-BE49-F238E27FC236}">
+                <a16:creationId xmlns:a16="http://schemas.microsoft.com/office/drawing/2014/main" id="{19FE01A7-2E58-45CF-B53A-06C162079B06}"/>
+              </a:ext>
+            </a:extLst>
+          </p:cNvPr>
+          <p:cNvPicPr>
+            <a:picLocks noChangeAspect="1"/>
+          </p:cNvPicPr>
+          <p:nvPr/>
+        </p:nvPicPr>
+        <p:blipFill>
+          <a:blip r:embed="rId3"/>
+          <a:stretch>
+            <a:fillRect/>
+          </a:stretch>
+        </p:blipFill>
+        <p:spPr>
+          <a:xfrm>
+            <a:off x="929889" y="2933342"/>
+            <a:ext cx="4867275" cy="3048000"/>
+          </a:xfrm>
+          <a:prstGeom prst="rect">
+            <a:avLst/>
+          </a:prstGeom>
+        </p:spPr>
+      </p:pic>
+      <p:pic>
+        <p:nvPicPr>
+          <p:cNvPr id="13" name="Imagen 12">
+            <a:extLst>
+              <a:ext uri="{FF2B5EF4-FFF2-40B4-BE49-F238E27FC236}">
+                <a16:creationId xmlns:a16="http://schemas.microsoft.com/office/drawing/2014/main" id="{C37197B3-7E12-4321-9631-01C8C41DE7ED}"/>
+              </a:ext>
+            </a:extLst>
+          </p:cNvPr>
+          <p:cNvPicPr>
+            <a:picLocks noChangeAspect="1"/>
+          </p:cNvPicPr>
+          <p:nvPr/>
+        </p:nvPicPr>
+        <p:blipFill>
+          <a:blip r:embed="rId4"/>
+          <a:stretch>
+            <a:fillRect/>
+          </a:stretch>
+        </p:blipFill>
+        <p:spPr>
+          <a:xfrm>
+            <a:off x="6969968" y="2942867"/>
+            <a:ext cx="4876800" cy="3038475"/>
+          </a:xfrm>
+          <a:prstGeom prst="rect">
+            <a:avLst/>
+          </a:prstGeom>
+        </p:spPr>
+      </p:pic>
     </p:spTree>
     <p:extLst>
       <p:ext uri="{BB962C8B-B14F-4D97-AF65-F5344CB8AC3E}">
@@ -11515,6 +11738,136 @@
         </p:nvSpPr>
         <p:spPr>
           <a:xfrm>
+            <a:off x="1069848" y="216977"/>
+            <a:ext cx="10058400" cy="1609344"/>
+          </a:xfrm>
+        </p:spPr>
+        <p:txBody>
+          <a:bodyPr/>
+          <a:lstStyle/>
+          <a:p>
+            <a:pPr algn="ctr"/>
+            <a:r>
+              <a:rPr lang="es-ES_tradnl"/>
+              <a:t>Análisis de conglomerados</a:t>
+            </a:r>
+            <a:endParaRPr lang="es-ES_tradnl" dirty="0"/>
+          </a:p>
+        </p:txBody>
+      </p:sp>
+      <p:pic>
+        <p:nvPicPr>
+          <p:cNvPr id="4" name="Imagen 3">
+            <a:extLst>
+              <a:ext uri="{FF2B5EF4-FFF2-40B4-BE49-F238E27FC236}">
+                <a16:creationId xmlns:a16="http://schemas.microsoft.com/office/drawing/2014/main" id="{22EBF1D6-84F7-42D3-B3D7-B0537994E33C}"/>
+              </a:ext>
+            </a:extLst>
+          </p:cNvPr>
+          <p:cNvPicPr>
+            <a:picLocks noChangeAspect="1"/>
+          </p:cNvPicPr>
+          <p:nvPr/>
+        </p:nvPicPr>
+        <p:blipFill>
+          <a:blip r:embed="rId2"/>
+          <a:stretch>
+            <a:fillRect/>
+          </a:stretch>
+        </p:blipFill>
+        <p:spPr>
+          <a:xfrm>
+            <a:off x="5034043" y="2416968"/>
+            <a:ext cx="6717135" cy="3772887"/>
+          </a:xfrm>
+          <a:prstGeom prst="rect">
+            <a:avLst/>
+          </a:prstGeom>
+        </p:spPr>
+      </p:pic>
+      <p:sp>
+        <p:nvSpPr>
+          <p:cNvPr id="18" name="Content Placeholder 10">
+            <a:extLst>
+              <a:ext uri="{FF2B5EF4-FFF2-40B4-BE49-F238E27FC236}">
+                <a16:creationId xmlns:a16="http://schemas.microsoft.com/office/drawing/2014/main" id="{90672348-6608-45D4-89A7-3650AB93C70D}"/>
+              </a:ext>
+            </a:extLst>
+          </p:cNvPr>
+          <p:cNvSpPr>
+            <a:spLocks noGrp="1"/>
+          </p:cNvSpPr>
+          <p:nvPr>
+            <p:ph idx="1"/>
+          </p:nvPr>
+        </p:nvSpPr>
+        <p:spPr>
+          <a:xfrm>
+            <a:off x="440822" y="1997896"/>
+            <a:ext cx="4512918" cy="4092579"/>
+          </a:xfrm>
+        </p:spPr>
+        <p:txBody>
+          <a:bodyPr>
+            <a:normAutofit/>
+          </a:bodyPr>
+          <a:lstStyle/>
+          <a:p>
+            <a:pPr algn="just"/>
+            <a:r>
+              <a:rPr lang="en-US" dirty="0"/>
+              <a:t>S</a:t>
+            </a:r>
+            <a:r>
+              <a:rPr lang="es-ES" dirty="0"/>
+              <a:t>e eligió un parámetro de k=2que este es el número de grupos en los que se agrupan los datos.</a:t>
+            </a:r>
+            <a:endParaRPr lang="en-US" dirty="0"/>
+          </a:p>
+        </p:txBody>
+      </p:sp>
+    </p:spTree>
+    <p:extLst>
+      <p:ext uri="{BB962C8B-B14F-4D97-AF65-F5344CB8AC3E}">
+        <p14:creationId xmlns:p14="http://schemas.microsoft.com/office/powerpoint/2010/main" val="284662205"/>
+      </p:ext>
+    </p:extLst>
+  </p:cSld>
+  <p:clrMapOvr>
+    <a:masterClrMapping/>
+  </p:clrMapOvr>
+</p:sld>
+</file>
+
+<file path=ppt/slides/slide28.xml><?xml version="1.0" encoding="utf-8"?>
+<p:sld xmlns:a="http://schemas.openxmlformats.org/drawingml/2006/main" xmlns:r="http://schemas.openxmlformats.org/officeDocument/2006/relationships" xmlns:p="http://schemas.openxmlformats.org/presentationml/2006/main">
+  <p:cSld>
+    <p:spTree>
+      <p:nvGrpSpPr>
+        <p:cNvPr id="1" name=""/>
+        <p:cNvGrpSpPr/>
+        <p:nvPr/>
+      </p:nvGrpSpPr>
+      <p:grpSpPr>
+        <a:xfrm>
+          <a:off x="0" y="0"/>
+          <a:ext cx="0" cy="0"/>
+          <a:chOff x="0" y="0"/>
+          <a:chExt cx="0" cy="0"/>
+        </a:xfrm>
+      </p:grpSpPr>
+      <p:sp>
+        <p:nvSpPr>
+          <p:cNvPr id="2" name="Title 1"/>
+          <p:cNvSpPr>
+            <a:spLocks noGrp="1"/>
+          </p:cNvSpPr>
+          <p:nvPr>
+            <p:ph type="title"/>
+          </p:nvPr>
+        </p:nvSpPr>
+        <p:spPr>
+          <a:xfrm>
             <a:off x="1069848" y="294468"/>
             <a:ext cx="10058400" cy="1609344"/>
           </a:xfrm>
@@ -11563,7 +11916,7 @@
 </p:sld>
 </file>
 
-<file path=ppt/slides/slide28.xml><?xml version="1.0" encoding="utf-8"?>
+<file path=ppt/slides/slide29.xml><?xml version="1.0" encoding="utf-8"?>
 <p:sld xmlns:a="http://schemas.openxmlformats.org/drawingml/2006/main" xmlns:r="http://schemas.openxmlformats.org/officeDocument/2006/relationships" xmlns:p="http://schemas.openxmlformats.org/presentationml/2006/main">
   <p:cSld>
     <p:spTree>
@@ -12464,13 +12817,8 @@
             </a:r>
             <a:r>
               <a:rPr lang="es-ES_tradnl" dirty="0"/>
-              <a:t>. de los </a:t>
-            </a:r>
-            <a:r>
-              <a:rPr lang="es-ES_tradnl" dirty="0" smtClean="0"/>
-              <a:t>macronutrientes</a:t>
-            </a:r>
-            <a:endParaRPr lang="es-ES_tradnl" dirty="0"/>
+              <a:t>. de los macronutrientes</a:t>
+            </a:r>
           </a:p>
         </p:txBody>
       </p:sp>
@@ -12550,13 +12898,8 @@
             </a:r>
             <a:r>
               <a:rPr lang="es-ES_tradnl" dirty="0"/>
-              <a:t>. de los </a:t>
-            </a:r>
-            <a:r>
-              <a:rPr lang="es-ES_tradnl" dirty="0" smtClean="0"/>
-              <a:t>micronutrientes</a:t>
-            </a:r>
-            <a:endParaRPr lang="es-ES_tradnl" dirty="0"/>
+              <a:t>. de los micronutrientes</a:t>
+            </a:r>
           </a:p>
         </p:txBody>
       </p:sp>
@@ -12718,12 +13061,8 @@
           <a:p>
             <a:pPr algn="ctr"/>
             <a:r>
-              <a:rPr lang="es-ES_tradnl" dirty="0" smtClean="0"/>
-              <a:t>kilocalorías </a:t>
-            </a:r>
-            <a:r>
               <a:rPr lang="es-ES_tradnl" dirty="0"/>
-              <a:t>por grupo de alimento</a:t>
+              <a:t>kilocalorías por grupo de alimento</a:t>
             </a:r>
           </a:p>
         </p:txBody>

</xml_diff>

<commit_message>
arreglar cosas de presentacion
</commit_message>
<xml_diff>
--- a/results/PCA_presentacion.pptx
+++ b/results/PCA_presentacion.pptx
@@ -5,7 +5,7 @@
     <p:sldMasterId id="2147483787" r:id="rId1"/>
   </p:sldMasterIdLst>
   <p:notesMasterIdLst>
-    <p:notesMasterId r:id="rId31"/>
+    <p:notesMasterId r:id="rId32"/>
   </p:notesMasterIdLst>
   <p:sldIdLst>
     <p:sldId id="256" r:id="rId2"/>
@@ -25,18 +25,19 @@
     <p:sldId id="280" r:id="rId16"/>
     <p:sldId id="281" r:id="rId17"/>
     <p:sldId id="282" r:id="rId18"/>
-    <p:sldId id="264" r:id="rId19"/>
-    <p:sldId id="269" r:id="rId20"/>
-    <p:sldId id="270" r:id="rId21"/>
-    <p:sldId id="271" r:id="rId22"/>
-    <p:sldId id="265" r:id="rId23"/>
-    <p:sldId id="283" r:id="rId24"/>
-    <p:sldId id="285" r:id="rId25"/>
-    <p:sldId id="291" r:id="rId26"/>
-    <p:sldId id="277" r:id="rId27"/>
-    <p:sldId id="267" r:id="rId28"/>
-    <p:sldId id="268" r:id="rId29"/>
-    <p:sldId id="273" r:id="rId30"/>
+    <p:sldId id="292" r:id="rId19"/>
+    <p:sldId id="264" r:id="rId20"/>
+    <p:sldId id="269" r:id="rId21"/>
+    <p:sldId id="270" r:id="rId22"/>
+    <p:sldId id="271" r:id="rId23"/>
+    <p:sldId id="265" r:id="rId24"/>
+    <p:sldId id="283" r:id="rId25"/>
+    <p:sldId id="285" r:id="rId26"/>
+    <p:sldId id="291" r:id="rId27"/>
+    <p:sldId id="277" r:id="rId28"/>
+    <p:sldId id="267" r:id="rId29"/>
+    <p:sldId id="268" r:id="rId30"/>
+    <p:sldId id="273" r:id="rId31"/>
   </p:sldIdLst>
   <p:sldSz cx="12192000" cy="6858000"/>
   <p:notesSz cx="6858000" cy="9144000"/>
@@ -225,7 +226,7 @@
           <a:p>
             <a:fld id="{395C63AC-4902-F448-A1B5-F71A761D9957}" type="datetimeFigureOut">
               <a:rPr lang="es-ES_tradnl" smtClean="0"/>
-              <a:t>29/05/2020</a:t>
+              <a:t>29/5/20</a:t>
             </a:fld>
             <a:endParaRPr lang="es-ES_tradnl"/>
           </a:p>
@@ -384,7 +385,7 @@
           <a:p>
             <a:fld id="{2DDB4F98-9E2F-4642-AD0A-52F13A28866B}" type="slidenum">
               <a:rPr lang="es-ES_tradnl" smtClean="0"/>
-              <a:t>‹Nº›</a:t>
+              <a:t>‹#›</a:t>
             </a:fld>
             <a:endParaRPr lang="es-ES_tradnl"/>
           </a:p>
@@ -995,7 +996,7 @@
             <a:fld id="{B61BEF0D-F0BB-DE4B-95CE-6DB70DBA9567}" type="datetimeFigureOut">
               <a:rPr lang="en-US" smtClean="0"/>
               <a:pPr/>
-              <a:t>5/29/2020</a:t>
+              <a:t>5/29/20</a:t>
             </a:fld>
             <a:endParaRPr lang="en-US" dirty="0"/>
           </a:p>
@@ -1047,7 +1048,7 @@
             <a:fld id="{D57F1E4F-1CFF-5643-939E-217C01CDF565}" type="slidenum">
               <a:rPr lang="en-US" smtClean="0"/>
               <a:pPr/>
-              <a:t>‹Nº›</a:t>
+              <a:t>‹#›</a:t>
             </a:fld>
             <a:endParaRPr lang="en-US" dirty="0"/>
           </a:p>
@@ -1169,7 +1170,7 @@
             <a:fld id="{B61BEF0D-F0BB-DE4B-95CE-6DB70DBA9567}" type="datetimeFigureOut">
               <a:rPr lang="en-US" smtClean="0"/>
               <a:pPr/>
-              <a:t>5/29/2020</a:t>
+              <a:t>5/29/20</a:t>
             </a:fld>
             <a:endParaRPr lang="en-US" dirty="0"/>
           </a:p>
@@ -1212,7 +1213,7 @@
             <a:fld id="{D57F1E4F-1CFF-5643-939E-217C01CDF565}" type="slidenum">
               <a:rPr lang="en-US" smtClean="0"/>
               <a:pPr/>
-              <a:t>‹Nº›</a:t>
+              <a:t>‹#›</a:t>
             </a:fld>
             <a:endParaRPr lang="en-US" dirty="0"/>
           </a:p>
@@ -1346,7 +1347,7 @@
             <a:fld id="{B61BEF0D-F0BB-DE4B-95CE-6DB70DBA9567}" type="datetimeFigureOut">
               <a:rPr lang="en-US" smtClean="0"/>
               <a:pPr/>
-              <a:t>5/29/2020</a:t>
+              <a:t>5/29/20</a:t>
             </a:fld>
             <a:endParaRPr lang="en-US" dirty="0"/>
           </a:p>
@@ -1389,7 +1390,7 @@
             <a:fld id="{D57F1E4F-1CFF-5643-939E-217C01CDF565}" type="slidenum">
               <a:rPr lang="en-US" smtClean="0"/>
               <a:pPr/>
-              <a:t>‹Nº›</a:t>
+              <a:t>‹#›</a:t>
             </a:fld>
             <a:endParaRPr lang="en-US" dirty="0"/>
           </a:p>
@@ -1513,7 +1514,7 @@
             <a:fld id="{B61BEF0D-F0BB-DE4B-95CE-6DB70DBA9567}" type="datetimeFigureOut">
               <a:rPr lang="en-US" smtClean="0"/>
               <a:pPr/>
-              <a:t>5/29/2020</a:t>
+              <a:t>5/29/20</a:t>
             </a:fld>
             <a:endParaRPr lang="en-US" dirty="0"/>
           </a:p>
@@ -1556,7 +1557,7 @@
             <a:fld id="{D57F1E4F-1CFF-5643-939E-217C01CDF565}" type="slidenum">
               <a:rPr lang="en-US" smtClean="0"/>
               <a:pPr/>
-              <a:t>‹Nº›</a:t>
+              <a:t>‹#›</a:t>
             </a:fld>
             <a:endParaRPr lang="en-US" dirty="0"/>
           </a:p>
@@ -1831,7 +1832,7 @@
             <a:fld id="{B61BEF0D-F0BB-DE4B-95CE-6DB70DBA9567}" type="datetimeFigureOut">
               <a:rPr lang="en-US" smtClean="0"/>
               <a:pPr/>
-              <a:t>5/29/2020</a:t>
+              <a:t>5/29/20</a:t>
             </a:fld>
             <a:endParaRPr lang="en-US" dirty="0"/>
           </a:p>
@@ -2046,7 +2047,7 @@
             <a:fld id="{D57F1E4F-1CFF-5643-939E-217C01CDF565}" type="slidenum">
               <a:rPr lang="en-US" smtClean="0"/>
               <a:pPr/>
-              <a:t>‹Nº›</a:t>
+              <a:t>‹#›</a:t>
             </a:fld>
             <a:endParaRPr lang="en-US" dirty="0"/>
           </a:p>
@@ -2288,7 +2289,7 @@
             <a:fld id="{B61BEF0D-F0BB-DE4B-95CE-6DB70DBA9567}" type="datetimeFigureOut">
               <a:rPr lang="en-US" smtClean="0"/>
               <a:pPr/>
-              <a:t>5/29/2020</a:t>
+              <a:t>5/29/20</a:t>
             </a:fld>
             <a:endParaRPr lang="en-US" dirty="0"/>
           </a:p>
@@ -2331,7 +2332,7 @@
             <a:fld id="{D57F1E4F-1CFF-5643-939E-217C01CDF565}" type="slidenum">
               <a:rPr lang="en-US" smtClean="0"/>
               <a:pPr/>
-              <a:t>‹Nº›</a:t>
+              <a:t>‹#›</a:t>
             </a:fld>
             <a:endParaRPr lang="en-US" dirty="0"/>
           </a:p>
@@ -2696,7 +2697,7 @@
             <a:fld id="{B61BEF0D-F0BB-DE4B-95CE-6DB70DBA9567}" type="datetimeFigureOut">
               <a:rPr lang="en-US" smtClean="0"/>
               <a:pPr/>
-              <a:t>5/29/2020</a:t>
+              <a:t>5/29/20</a:t>
             </a:fld>
             <a:endParaRPr lang="en-US" dirty="0"/>
           </a:p>
@@ -2739,7 +2740,7 @@
             <a:fld id="{D57F1E4F-1CFF-5643-939E-217C01CDF565}" type="slidenum">
               <a:rPr lang="en-US" smtClean="0"/>
               <a:pPr/>
-              <a:t>‹Nº›</a:t>
+              <a:t>‹#›</a:t>
             </a:fld>
             <a:endParaRPr lang="en-US" dirty="0"/>
           </a:p>
@@ -2811,7 +2812,7 @@
             <a:fld id="{B61BEF0D-F0BB-DE4B-95CE-6DB70DBA9567}" type="datetimeFigureOut">
               <a:rPr lang="en-US" smtClean="0"/>
               <a:pPr/>
-              <a:t>5/29/2020</a:t>
+              <a:t>5/29/20</a:t>
             </a:fld>
             <a:endParaRPr lang="en-US" dirty="0"/>
           </a:p>
@@ -2854,7 +2855,7 @@
             <a:fld id="{D57F1E4F-1CFF-5643-939E-217C01CDF565}" type="slidenum">
               <a:rPr lang="en-US" smtClean="0"/>
               <a:pPr/>
-              <a:t>‹Nº›</a:t>
+              <a:t>‹#›</a:t>
             </a:fld>
             <a:endParaRPr lang="en-US" dirty="0"/>
           </a:p>
@@ -2925,7 +2926,7 @@
             <a:fld id="{B61BEF0D-F0BB-DE4B-95CE-6DB70DBA9567}" type="datetimeFigureOut">
               <a:rPr lang="en-US" smtClean="0"/>
               <a:pPr/>
-              <a:t>5/29/2020</a:t>
+              <a:t>5/29/20</a:t>
             </a:fld>
             <a:endParaRPr lang="en-US" dirty="0"/>
           </a:p>
@@ -2968,7 +2969,7 @@
             <a:fld id="{D57F1E4F-1CFF-5643-939E-217C01CDF565}" type="slidenum">
               <a:rPr lang="en-US" smtClean="0"/>
               <a:pPr/>
-              <a:t>‹Nº›</a:t>
+              <a:t>‹#›</a:t>
             </a:fld>
             <a:endParaRPr lang="en-US" dirty="0"/>
           </a:p>
@@ -3280,7 +3281,7 @@
             <a:fld id="{B61BEF0D-F0BB-DE4B-95CE-6DB70DBA9567}" type="datetimeFigureOut">
               <a:rPr lang="en-US" smtClean="0"/>
               <a:pPr/>
-              <a:t>5/29/2020</a:t>
+              <a:t>5/29/20</a:t>
             </a:fld>
             <a:endParaRPr lang="en-US" dirty="0"/>
           </a:p>
@@ -3486,7 +3487,7 @@
             <a:fld id="{D57F1E4F-1CFF-5643-939E-217C01CDF565}" type="slidenum">
               <a:rPr lang="en-US" smtClean="0"/>
               <a:pPr/>
-              <a:t>‹Nº›</a:t>
+              <a:t>‹#›</a:t>
             </a:fld>
             <a:endParaRPr lang="en-US" dirty="0"/>
           </a:p>
@@ -3784,7 +3785,7 @@
             <a:fld id="{B61BEF0D-F0BB-DE4B-95CE-6DB70DBA9567}" type="datetimeFigureOut">
               <a:rPr lang="en-US" smtClean="0"/>
               <a:pPr/>
-              <a:t>5/29/2020</a:t>
+              <a:t>5/29/20</a:t>
             </a:fld>
             <a:endParaRPr lang="en-US" dirty="0"/>
           </a:p>
@@ -3971,7 +3972,7 @@
             <a:fld id="{D57F1E4F-1CFF-5643-939E-217C01CDF565}" type="slidenum">
               <a:rPr lang="en-US" smtClean="0"/>
               <a:pPr/>
-              <a:t>‹Nº›</a:t>
+              <a:t>‹#›</a:t>
             </a:fld>
             <a:endParaRPr lang="en-US" dirty="0"/>
           </a:p>
@@ -4136,7 +4137,7 @@
             <a:fld id="{B61BEF0D-F0BB-DE4B-95CE-6DB70DBA9567}" type="datetimeFigureOut">
               <a:rPr lang="en-US" smtClean="0"/>
               <a:pPr/>
-              <a:t>5/29/2020</a:t>
+              <a:t>5/29/20</a:t>
             </a:fld>
             <a:endParaRPr lang="en-US" dirty="0"/>
           </a:p>
@@ -4375,7 +4376,7 @@
             <a:fld id="{D57F1E4F-1CFF-5643-939E-217C01CDF565}" type="slidenum">
               <a:rPr lang="en-US" smtClean="0"/>
               <a:pPr/>
-              <a:t>‹Nº›</a:t>
+              <a:t>‹#›</a:t>
             </a:fld>
             <a:endParaRPr lang="en-US" dirty="0"/>
           </a:p>
@@ -5619,7 +5620,7 @@
                       <m:sSupPr>
                         <m:ctrlPr>
                           <a:rPr lang="es-MX" b="0" i="1" dirty="0" smtClean="0">
-                            <a:latin typeface="Cambria Math" panose="02040503050406030204" pitchFamily="18" charset="0"/>
+                            <a:latin typeface="Cambria Math" charset="0"/>
                           </a:rPr>
                         </m:ctrlPr>
                       </m:sSupPr>
@@ -5930,7 +5931,7 @@
                       <m:sSubPr>
                         <m:ctrlPr>
                           <a:rPr lang="es-ES_tradnl" i="1" dirty="0" smtClean="0">
-                            <a:latin typeface="Cambria Math" panose="02040503050406030204" pitchFamily="18" charset="0"/>
+                            <a:latin typeface="Cambria Math" charset="0"/>
                           </a:rPr>
                         </m:ctrlPr>
                       </m:sSubPr>
@@ -5981,7 +5982,7 @@
                       <m:sSubPr>
                         <m:ctrlPr>
                           <a:rPr lang="es-MX" b="0" i="1" smtClean="0">
-                            <a:latin typeface="Cambria Math" panose="02040503050406030204" pitchFamily="18" charset="0"/>
+                            <a:latin typeface="Cambria Math" charset="0"/>
                           </a:rPr>
                         </m:ctrlPr>
                       </m:sSubPr>
@@ -6012,7 +6013,7 @@
                       <m:sSubPr>
                         <m:ctrlPr>
                           <a:rPr lang="es-MX" b="0" i="1" smtClean="0">
-                            <a:latin typeface="Cambria Math" panose="02040503050406030204" pitchFamily="18" charset="0"/>
+                            <a:latin typeface="Cambria Math" charset="0"/>
                           </a:rPr>
                         </m:ctrlPr>
                       </m:sSubPr>
@@ -6037,7 +6038,7 @@
                       <m:sSubPr>
                         <m:ctrlPr>
                           <a:rPr lang="es-MX" b="0" i="1" smtClean="0">
-                            <a:latin typeface="Cambria Math" panose="02040503050406030204" pitchFamily="18" charset="0"/>
+                            <a:latin typeface="Cambria Math" charset="0"/>
                           </a:rPr>
                         </m:ctrlPr>
                       </m:sSubPr>
@@ -6070,7 +6071,7 @@
                       <m:sSubPr>
                         <m:ctrlPr>
                           <a:rPr lang="es-ES_tradnl" i="1" dirty="0" smtClean="0">
-                            <a:latin typeface="Cambria Math" panose="02040503050406030204" pitchFamily="18" charset="0"/>
+                            <a:latin typeface="Cambria Math" charset="0"/>
                           </a:rPr>
                         </m:ctrlPr>
                       </m:sSubPr>
@@ -6107,7 +6108,7 @@
                       <m:sSubPr>
                         <m:ctrlPr>
                           <a:rPr lang="es-MX" b="0" i="1" dirty="0" smtClean="0">
-                            <a:latin typeface="Cambria Math" panose="02040503050406030204" pitchFamily="18" charset="0"/>
+                            <a:latin typeface="Cambria Math" charset="0"/>
                           </a:rPr>
                         </m:ctrlPr>
                       </m:sSubPr>
@@ -6132,7 +6133,7 @@
                       <m:sSubPr>
                         <m:ctrlPr>
                           <a:rPr lang="es-MX" b="0" i="1" dirty="0" smtClean="0">
-                            <a:latin typeface="Cambria Math" panose="02040503050406030204" pitchFamily="18" charset="0"/>
+                            <a:latin typeface="Cambria Math" charset="0"/>
                           </a:rPr>
                         </m:ctrlPr>
                       </m:sSubPr>
@@ -6201,7 +6202,7 @@
                       <m:sSubPr>
                         <m:ctrlPr>
                           <a:rPr lang="es-ES_tradnl" i="1" dirty="0" smtClean="0">
-                            <a:latin typeface="Cambria Math" panose="02040503050406030204" pitchFamily="18" charset="0"/>
+                            <a:latin typeface="Cambria Math" charset="0"/>
                           </a:rPr>
                         </m:ctrlPr>
                       </m:sSubPr>
@@ -6245,7 +6246,7 @@
                       <m:sSubPr>
                         <m:ctrlPr>
                           <a:rPr lang="es-ES_tradnl" i="1" dirty="0" smtClean="0">
-                            <a:latin typeface="Cambria Math" panose="02040503050406030204" pitchFamily="18" charset="0"/>
+                            <a:latin typeface="Cambria Math" charset="0"/>
                           </a:rPr>
                         </m:ctrlPr>
                       </m:sSubPr>
@@ -6452,7 +6453,7 @@
                       <m:sSubPr>
                         <m:ctrlPr>
                           <a:rPr lang="es-ES" i="1" dirty="0" smtClean="0">
-                            <a:latin typeface="Cambria Math" panose="02040503050406030204" pitchFamily="18" charset="0"/>
+                            <a:latin typeface="Cambria Math" charset="0"/>
                           </a:rPr>
                         </m:ctrlPr>
                       </m:sSubPr>
@@ -6564,7 +6565,7 @@
                       <m:sSubPr>
                         <m:ctrlPr>
                           <a:rPr lang="es-ES_tradnl" i="1" dirty="0" smtClean="0">
-                            <a:latin typeface="Cambria Math" panose="02040503050406030204" pitchFamily="18" charset="0"/>
+                            <a:latin typeface="Cambria Math" charset="0"/>
                           </a:rPr>
                         </m:ctrlPr>
                       </m:sSubPr>
@@ -6612,7 +6613,7 @@
                       <m:sSubPr>
                         <m:ctrlPr>
                           <a:rPr lang="es-MX" i="1">
-                            <a:latin typeface="Cambria Math" panose="02040503050406030204" pitchFamily="18" charset="0"/>
+                            <a:latin typeface="Cambria Math" charset="0"/>
                           </a:rPr>
                         </m:ctrlPr>
                       </m:sSubPr>
@@ -6649,7 +6650,7 @@
                       <m:fPr>
                         <m:ctrlPr>
                           <a:rPr lang="es-MX" i="1" smtClean="0">
-                            <a:latin typeface="Cambria Math" panose="02040503050406030204" pitchFamily="18" charset="0"/>
+                            <a:latin typeface="Cambria Math" charset="0"/>
                           </a:rPr>
                         </m:ctrlPr>
                       </m:fPr>
@@ -6664,7 +6665,7 @@
                           <m:sSubPr>
                             <m:ctrlPr>
                               <a:rPr lang="es-MX" i="1">
-                                <a:latin typeface="Cambria Math" panose="02040503050406030204" pitchFamily="18" charset="0"/>
+                                <a:latin typeface="Cambria Math" charset="0"/>
                               </a:rPr>
                             </m:ctrlPr>
                           </m:sSubPr>
@@ -6693,7 +6694,7 @@
                             <m:endChr m:val="|"/>
                             <m:ctrlPr>
                               <a:rPr lang="es-MX" b="0" i="1" smtClean="0">
-                                <a:latin typeface="Cambria Math" panose="02040503050406030204" pitchFamily="18" charset="0"/>
+                                <a:latin typeface="Cambria Math" charset="0"/>
                               </a:rPr>
                             </m:ctrlPr>
                           </m:dPr>
@@ -6704,7 +6705,7 @@
                                 <m:endChr m:val="|"/>
                                 <m:ctrlPr>
                                   <a:rPr lang="es-MX" b="0" i="1" smtClean="0">
-                                    <a:latin typeface="Cambria Math" panose="02040503050406030204" pitchFamily="18" charset="0"/>
+                                    <a:latin typeface="Cambria Math" charset="0"/>
                                   </a:rPr>
                                 </m:ctrlPr>
                               </m:dPr>
@@ -6719,7 +6720,7 @@
                                   <m:sSubPr>
                                     <m:ctrlPr>
                                       <a:rPr lang="es-MX" i="1">
-                                        <a:latin typeface="Cambria Math" panose="02040503050406030204" pitchFamily="18" charset="0"/>
+                                        <a:latin typeface="Cambria Math" charset="0"/>
                                       </a:rPr>
                                     </m:ctrlPr>
                                   </m:sSubPr>
@@ -6758,7 +6759,7 @@
                       <m:sSubPr>
                         <m:ctrlPr>
                           <a:rPr lang="es-MX" b="0" i="1" smtClean="0">
-                            <a:latin typeface="Cambria Math" panose="02040503050406030204" pitchFamily="18" charset="0"/>
+                            <a:latin typeface="Cambria Math" charset="0"/>
                           </a:rPr>
                         </m:ctrlPr>
                       </m:sSubPr>
@@ -6789,7 +6790,7 @@
                       <m:fPr>
                         <m:ctrlPr>
                           <a:rPr lang="es-MX" b="0" i="1" smtClean="0">
-                            <a:latin typeface="Cambria Math" panose="02040503050406030204" pitchFamily="18" charset="0"/>
+                            <a:latin typeface="Cambria Math" charset="0"/>
                           </a:rPr>
                         </m:ctrlPr>
                       </m:fPr>
@@ -6798,7 +6799,7 @@
                           <m:sSubSupPr>
                             <m:ctrlPr>
                               <a:rPr lang="es-MX" i="1" smtClean="0">
-                                <a:latin typeface="Cambria Math" panose="02040503050406030204" pitchFamily="18" charset="0"/>
+                                <a:latin typeface="Cambria Math" charset="0"/>
                               </a:rPr>
                             </m:ctrlPr>
                           </m:sSubSupPr>
@@ -6807,7 +6808,7 @@
                               <m:sSubPr>
                                 <m:ctrlPr>
                                   <a:rPr lang="es-MX" b="0" i="1" smtClean="0">
-                                    <a:latin typeface="Cambria Math" panose="02040503050406030204" pitchFamily="18" charset="0"/>
+                                    <a:latin typeface="Cambria Math" charset="0"/>
                                   </a:rPr>
                                 </m:ctrlPr>
                               </m:sSubPr>
@@ -6862,7 +6863,7 @@
                           <m:sSubPr>
                             <m:ctrlPr>
                               <a:rPr lang="es-MX" b="0" i="1" smtClean="0">
-                                <a:latin typeface="Cambria Math" panose="02040503050406030204" pitchFamily="18" charset="0"/>
+                                <a:latin typeface="Cambria Math" charset="0"/>
                               </a:rPr>
                             </m:ctrlPr>
                           </m:sSubPr>
@@ -6889,7 +6890,7 @@
                           <m:sSubSupPr>
                             <m:ctrlPr>
                               <a:rPr lang="es-MX" i="1">
-                                <a:latin typeface="Cambria Math" panose="02040503050406030204" pitchFamily="18" charset="0"/>
+                                <a:latin typeface="Cambria Math" charset="0"/>
                               </a:rPr>
                             </m:ctrlPr>
                           </m:sSubSupPr>
@@ -6922,7 +6923,7 @@
                           <m:sSubPr>
                             <m:ctrlPr>
                               <a:rPr lang="es-MX" i="1">
-                                <a:latin typeface="Cambria Math" panose="02040503050406030204" pitchFamily="18" charset="0"/>
+                                <a:latin typeface="Cambria Math" charset="0"/>
                               </a:rPr>
                             </m:ctrlPr>
                           </m:sSubPr>
@@ -6960,7 +6961,7 @@
                       <m:sSubPr>
                         <m:ctrlPr>
                           <a:rPr lang="es-MX" i="1" smtClean="0">
-                            <a:latin typeface="Cambria Math" panose="02040503050406030204" pitchFamily="18" charset="0"/>
+                            <a:latin typeface="Cambria Math" charset="0"/>
                           </a:rPr>
                         </m:ctrlPr>
                       </m:sSubPr>
@@ -7107,6 +7108,240 @@
         </p:nvSpPr>
         <p:spPr/>
         <p:txBody>
+          <a:bodyPr>
+            <a:normAutofit/>
+          </a:bodyPr>
+          <a:lstStyle/>
+          <a:p>
+            <a:pPr algn="ctr"/>
+            <a:r>
+              <a:rPr lang="es-ES_tradnl"/>
+              <a:t>PCA a partir de </a:t>
+            </a:r>
+            <a:r>
+              <a:rPr lang="es-ES_tradnl" err="1"/>
+              <a:t>eigenvectores</a:t>
+            </a:r>
+            <a:r>
+              <a:rPr lang="es-ES_tradnl"/>
+              <a:t> de la matriz de covarianzas</a:t>
+            </a:r>
+          </a:p>
+        </p:txBody>
+      </p:sp>
+      <p:sp>
+        <p:nvSpPr>
+          <p:cNvPr id="6" name="Marcador de contenido 5">
+            <a:extLst>
+              <a:ext uri="{FF2B5EF4-FFF2-40B4-BE49-F238E27FC236}">
+                <a16:creationId xmlns:a16="http://schemas.microsoft.com/office/drawing/2014/main" xmlns="" id="{E455B322-C01E-4610-841D-977DCE934821}"/>
+              </a:ext>
+            </a:extLst>
+          </p:cNvPr>
+          <p:cNvSpPr>
+            <a:spLocks noGrp="1"/>
+          </p:cNvSpPr>
+          <p:nvPr>
+            <p:ph sz="half" idx="1"/>
+          </p:nvPr>
+        </p:nvSpPr>
+        <p:spPr/>
+        <p:txBody>
+          <a:bodyPr vert="horz" lIns="91440" tIns="45720" rIns="91440" bIns="45720" rtlCol="0" anchor="t">
+            <a:normAutofit/>
+          </a:bodyPr>
+          <a:lstStyle/>
+          <a:p>
+            <a:r>
+              <a:rPr lang="es-MX"/>
+              <a:t>Los componentes principales se obtienen de la siguiente forma</a:t>
+            </a:r>
+          </a:p>
+          <a:p>
+            <a:endParaRPr lang="es-MX"/>
+          </a:p>
+          <a:p>
+            <a:r>
+              <a:rPr lang="es-MX" err="1"/>
+              <a:t>Zi</a:t>
+            </a:r>
+            <a:r>
+              <a:rPr lang="es-MX"/>
+              <a:t> = </a:t>
+            </a:r>
+            <a:r>
+              <a:rPr lang="es-MX" err="1"/>
+              <a:t>Ak</a:t>
+            </a:r>
+            <a:r>
+              <a:rPr lang="es-MX"/>
+              <a:t>*</a:t>
+            </a:r>
+            <a:r>
+              <a:rPr lang="es-MX" err="1"/>
+              <a:t>yi</a:t>
+            </a:r>
+            <a:endParaRPr lang="es-MX"/>
+          </a:p>
+          <a:p>
+            <a:endParaRPr lang="es-MX"/>
+          </a:p>
+          <a:p>
+            <a:r>
+              <a:rPr lang="es-MX"/>
+              <a:t>Donde </a:t>
+            </a:r>
+            <a:r>
+              <a:rPr lang="es-MX" err="1"/>
+              <a:t>Zi</a:t>
+            </a:r>
+            <a:r>
+              <a:rPr lang="es-MX"/>
+              <a:t> es el componente principal i, </a:t>
+            </a:r>
+            <a:r>
+              <a:rPr lang="es-MX" err="1"/>
+              <a:t>Ak</a:t>
+            </a:r>
+            <a:r>
+              <a:rPr lang="es-MX"/>
+              <a:t> la matriz de datos original y </a:t>
+            </a:r>
+            <a:r>
+              <a:rPr lang="es-MX" err="1"/>
+              <a:t>yi</a:t>
+            </a:r>
+            <a:r>
+              <a:rPr lang="es-MX"/>
+              <a:t> el i-</a:t>
+            </a:r>
+            <a:r>
+              <a:rPr lang="es-MX" err="1"/>
+              <a:t>ésimo</a:t>
+            </a:r>
+            <a:r>
+              <a:rPr lang="es-MX"/>
+              <a:t> </a:t>
+            </a:r>
+            <a:r>
+              <a:rPr lang="es-MX" err="1"/>
+              <a:t>eigenvector</a:t>
+            </a:r>
+            <a:r>
+              <a:rPr lang="es-MX"/>
+              <a:t> de la matriz de covarianzas</a:t>
+            </a:r>
+          </a:p>
+        </p:txBody>
+      </p:sp>
+      <p:sp>
+        <p:nvSpPr>
+          <p:cNvPr id="8" name="Marcador de contenido 7">
+            <a:extLst>
+              <a:ext uri="{FF2B5EF4-FFF2-40B4-BE49-F238E27FC236}">
+                <a16:creationId xmlns:a16="http://schemas.microsoft.com/office/drawing/2014/main" xmlns="" id="{36139C0B-4654-4BB9-B939-38D10AB5E580}"/>
+              </a:ext>
+            </a:extLst>
+          </p:cNvPr>
+          <p:cNvSpPr>
+            <a:spLocks noGrp="1"/>
+          </p:cNvSpPr>
+          <p:nvPr>
+            <p:ph sz="half" idx="2"/>
+          </p:nvPr>
+        </p:nvSpPr>
+        <p:spPr/>
+        <p:txBody>
+          <a:bodyPr vert="horz" lIns="91440" tIns="45720" rIns="91440" bIns="45720" rtlCol="0" anchor="t">
+            <a:normAutofit/>
+          </a:bodyPr>
+          <a:lstStyle/>
+          <a:p>
+            <a:r>
+              <a:rPr lang="es-MX"/>
+              <a:t>La varianza explicada se obtiene a partir de los eigenvalores.</a:t>
+            </a:r>
+          </a:p>
+          <a:p>
+            <a:r>
+              <a:rPr lang="es-MX"/>
+              <a:t>Para saber que porcentaje de varianza explicada aporta cada componente principal se hace </a:t>
+            </a:r>
+          </a:p>
+          <a:p>
+            <a:pPr marL="0" indent="0">
+              <a:buNone/>
+            </a:pPr>
+            <a:r>
+              <a:rPr lang="es-MX"/>
+              <a:t>Ei / </a:t>
+            </a:r>
+            <a:r>
+              <a:rPr lang="es-MX" err="1"/>
+              <a:t>ΣEi</a:t>
+            </a:r>
+          </a:p>
+          <a:p>
+            <a:pPr marL="0" indent="0">
+              <a:buNone/>
+            </a:pPr>
+            <a:r>
+              <a:rPr lang="es-MX"/>
+              <a:t>Donde Ei es el i-</a:t>
+            </a:r>
+            <a:r>
+              <a:rPr lang="es-MX" err="1"/>
+              <a:t>ésimo</a:t>
+            </a:r>
+            <a:r>
+              <a:rPr lang="es-MX"/>
+              <a:t> eigenvalor de la matriz de covarianzas</a:t>
+            </a:r>
+          </a:p>
+        </p:txBody>
+      </p:sp>
+    </p:spTree>
+    <p:extLst>
+      <p:ext uri="{BB962C8B-B14F-4D97-AF65-F5344CB8AC3E}">
+        <p14:creationId xmlns:p14="http://schemas.microsoft.com/office/powerpoint/2010/main" val="365136214"/>
+      </p:ext>
+    </p:extLst>
+  </p:cSld>
+  <p:clrMapOvr>
+    <a:masterClrMapping/>
+  </p:clrMapOvr>
+</p:sld>
+</file>
+
+<file path=ppt/slides/slide19.xml><?xml version="1.0" encoding="utf-8"?>
+<p:sld xmlns:a="http://schemas.openxmlformats.org/drawingml/2006/main" xmlns:r="http://schemas.openxmlformats.org/officeDocument/2006/relationships" xmlns:p="http://schemas.openxmlformats.org/presentationml/2006/main">
+  <p:cSld>
+    <p:spTree>
+      <p:nvGrpSpPr>
+        <p:cNvPr id="1" name=""/>
+        <p:cNvGrpSpPr/>
+        <p:nvPr/>
+      </p:nvGrpSpPr>
+      <p:grpSpPr>
+        <a:xfrm>
+          <a:off x="0" y="0"/>
+          <a:ext cx="0" cy="0"/>
+          <a:chOff x="0" y="0"/>
+          <a:chExt cx="0" cy="0"/>
+        </a:xfrm>
+      </p:grpSpPr>
+      <p:sp>
+        <p:nvSpPr>
+          <p:cNvPr id="2" name="Title 1"/>
+          <p:cNvSpPr>
+            <a:spLocks noGrp="1"/>
+          </p:cNvSpPr>
+          <p:nvPr>
+            <p:ph type="title"/>
+          </p:nvPr>
+        </p:nvSpPr>
+        <p:spPr/>
+        <p:txBody>
           <a:bodyPr/>
           <a:lstStyle/>
           <a:p>
@@ -7349,7 +7584,184 @@
 </p:sld>
 </file>
 
-<file path=ppt/slides/slide19.xml><?xml version="1.0" encoding="utf-8"?>
+<file path=ppt/slides/slide2.xml><?xml version="1.0" encoding="utf-8"?>
+<p:sld xmlns:a="http://schemas.openxmlformats.org/drawingml/2006/main" xmlns:r="http://schemas.openxmlformats.org/officeDocument/2006/relationships" xmlns:p="http://schemas.openxmlformats.org/presentationml/2006/main">
+  <p:cSld>
+    <p:spTree>
+      <p:nvGrpSpPr>
+        <p:cNvPr id="1" name=""/>
+        <p:cNvGrpSpPr/>
+        <p:nvPr/>
+      </p:nvGrpSpPr>
+      <p:grpSpPr>
+        <a:xfrm>
+          <a:off x="0" y="0"/>
+          <a:ext cx="0" cy="0"/>
+          <a:chOff x="0" y="0"/>
+          <a:chExt cx="0" cy="0"/>
+        </a:xfrm>
+      </p:grpSpPr>
+      <p:sp>
+        <p:nvSpPr>
+          <p:cNvPr id="2" name="Title 1"/>
+          <p:cNvSpPr>
+            <a:spLocks noGrp="1"/>
+          </p:cNvSpPr>
+          <p:nvPr>
+            <p:ph type="title"/>
+          </p:nvPr>
+        </p:nvSpPr>
+        <p:spPr>
+          <a:xfrm>
+            <a:off x="1141413" y="0"/>
+            <a:ext cx="9905998" cy="1905000"/>
+          </a:xfrm>
+        </p:spPr>
+        <p:txBody>
+          <a:bodyPr/>
+          <a:lstStyle/>
+          <a:p>
+            <a:pPr algn="ctr"/>
+            <a:r>
+              <a:rPr lang="es-ES_tradnl" dirty="0"/>
+              <a:t>Tabla de contenidos</a:t>
+            </a:r>
+          </a:p>
+        </p:txBody>
+      </p:sp>
+      <p:sp>
+        <p:nvSpPr>
+          <p:cNvPr id="3" name="Content Placeholder 2"/>
+          <p:cNvSpPr>
+            <a:spLocks noGrp="1"/>
+          </p:cNvSpPr>
+          <p:nvPr>
+            <p:ph idx="1"/>
+          </p:nvPr>
+        </p:nvSpPr>
+        <p:spPr>
+          <a:xfrm>
+            <a:off x="1141413" y="2053086"/>
+            <a:ext cx="9905998" cy="4347713"/>
+          </a:xfrm>
+        </p:spPr>
+        <p:txBody>
+          <a:bodyPr>
+            <a:normAutofit/>
+          </a:bodyPr>
+          <a:lstStyle/>
+          <a:p>
+            <a:r>
+              <a:rPr lang="en-US" sz="2400" u="sng" dirty="0">
+                <a:effectLst/>
+                <a:hlinkClick r:id="rId2"/>
+              </a:rPr>
+              <a:t>Introducción</a:t>
+            </a:r>
+            <a:endParaRPr lang="en-US" sz="2400" dirty="0">
+              <a:effectLst/>
+            </a:endParaRPr>
+          </a:p>
+          <a:p>
+            <a:r>
+              <a:rPr lang="en-US" sz="2400" u="sng" dirty="0">
+                <a:effectLst/>
+                <a:hlinkClick r:id="rId3"/>
+              </a:rPr>
+              <a:t>Datos y contexto</a:t>
+            </a:r>
+            <a:endParaRPr lang="en-US" sz="2400" dirty="0">
+              <a:effectLst/>
+            </a:endParaRPr>
+          </a:p>
+          <a:p>
+            <a:r>
+              <a:rPr lang="en-US" sz="2400" u="sng" dirty="0">
+                <a:effectLst/>
+                <a:hlinkClick r:id="rId4"/>
+              </a:rPr>
+              <a:t>Análisis exploratorio de los datos</a:t>
+            </a:r>
+            <a:endParaRPr lang="en-US" sz="2400" dirty="0">
+              <a:effectLst/>
+            </a:endParaRPr>
+          </a:p>
+          <a:p>
+            <a:r>
+              <a:rPr lang="en-US" sz="2400" u="sng" dirty="0">
+                <a:effectLst/>
+                <a:hlinkClick r:id="rId5"/>
+              </a:rPr>
+              <a:t>Teoría del Análisis de Componentes Principales</a:t>
+            </a:r>
+            <a:endParaRPr lang="en-US" sz="2400" dirty="0">
+              <a:effectLst/>
+            </a:endParaRPr>
+          </a:p>
+          <a:p>
+            <a:r>
+              <a:rPr lang="en-US" sz="2400" u="sng" dirty="0">
+                <a:effectLst/>
+                <a:hlinkClick r:id="rId6"/>
+              </a:rPr>
+              <a:t>Resultados del Análisis de Componentes Principales</a:t>
+            </a:r>
+            <a:endParaRPr lang="en-US" sz="2400" dirty="0">
+              <a:effectLst/>
+            </a:endParaRPr>
+          </a:p>
+          <a:p>
+            <a:r>
+              <a:rPr lang="en-US" sz="2400" u="sng" dirty="0">
+                <a:effectLst/>
+                <a:hlinkClick r:id="rId7"/>
+              </a:rPr>
+              <a:t>Análisis de conglomerados (clustering)</a:t>
+            </a:r>
+            <a:endParaRPr lang="en-US" sz="2400" dirty="0">
+              <a:effectLst/>
+            </a:endParaRPr>
+          </a:p>
+          <a:p>
+            <a:r>
+              <a:rPr lang="en-US" sz="2400" u="sng" dirty="0">
+                <a:effectLst/>
+                <a:hlinkClick r:id="rId8"/>
+              </a:rPr>
+              <a:t>Conclusiones</a:t>
+            </a:r>
+            <a:endParaRPr lang="en-US" sz="2400" dirty="0">
+              <a:effectLst/>
+            </a:endParaRPr>
+          </a:p>
+          <a:p>
+            <a:r>
+              <a:rPr lang="en-US" sz="2400" u="sng" dirty="0">
+                <a:effectLst/>
+                <a:hlinkClick r:id="rId9"/>
+              </a:rPr>
+              <a:t>Referencias</a:t>
+            </a:r>
+            <a:endParaRPr lang="en-US" sz="2400" dirty="0">
+              <a:effectLst/>
+            </a:endParaRPr>
+          </a:p>
+        </p:txBody>
+      </p:sp>
+    </p:spTree>
+    <p:extLst>
+      <p:ext uri="{BB962C8B-B14F-4D97-AF65-F5344CB8AC3E}">
+        <p14:creationId xmlns:p14="http://schemas.microsoft.com/office/powerpoint/2010/main" val="1960165556"/>
+      </p:ext>
+    </p:extLst>
+  </p:cSld>
+  <p:clrMapOvr>
+    <a:masterClrMapping/>
+  </p:clrMapOvr>
+</p:sld>
+</file>
+
+<file path=ppt/slides/slide20.xml><?xml version="1.0" encoding="utf-8"?>
 <p:sld xmlns:a="http://schemas.openxmlformats.org/drawingml/2006/main" xmlns:r="http://schemas.openxmlformats.org/officeDocument/2006/relationships" xmlns:p="http://schemas.openxmlformats.org/presentationml/2006/main">
   <p:cSld>
     <p:spTree>
@@ -7715,184 +8127,7 @@
 </p:sld>
 </file>
 
-<file path=ppt/slides/slide2.xml><?xml version="1.0" encoding="utf-8"?>
-<p:sld xmlns:a="http://schemas.openxmlformats.org/drawingml/2006/main" xmlns:r="http://schemas.openxmlformats.org/officeDocument/2006/relationships" xmlns:p="http://schemas.openxmlformats.org/presentationml/2006/main">
-  <p:cSld>
-    <p:spTree>
-      <p:nvGrpSpPr>
-        <p:cNvPr id="1" name=""/>
-        <p:cNvGrpSpPr/>
-        <p:nvPr/>
-      </p:nvGrpSpPr>
-      <p:grpSpPr>
-        <a:xfrm>
-          <a:off x="0" y="0"/>
-          <a:ext cx="0" cy="0"/>
-          <a:chOff x="0" y="0"/>
-          <a:chExt cx="0" cy="0"/>
-        </a:xfrm>
-      </p:grpSpPr>
-      <p:sp>
-        <p:nvSpPr>
-          <p:cNvPr id="2" name="Title 1"/>
-          <p:cNvSpPr>
-            <a:spLocks noGrp="1"/>
-          </p:cNvSpPr>
-          <p:nvPr>
-            <p:ph type="title"/>
-          </p:nvPr>
-        </p:nvSpPr>
-        <p:spPr>
-          <a:xfrm>
-            <a:off x="1141413" y="0"/>
-            <a:ext cx="9905998" cy="1905000"/>
-          </a:xfrm>
-        </p:spPr>
-        <p:txBody>
-          <a:bodyPr/>
-          <a:lstStyle/>
-          <a:p>
-            <a:pPr algn="ctr"/>
-            <a:r>
-              <a:rPr lang="es-ES_tradnl" dirty="0"/>
-              <a:t>Tabla de contenidos</a:t>
-            </a:r>
-          </a:p>
-        </p:txBody>
-      </p:sp>
-      <p:sp>
-        <p:nvSpPr>
-          <p:cNvPr id="3" name="Content Placeholder 2"/>
-          <p:cNvSpPr>
-            <a:spLocks noGrp="1"/>
-          </p:cNvSpPr>
-          <p:nvPr>
-            <p:ph idx="1"/>
-          </p:nvPr>
-        </p:nvSpPr>
-        <p:spPr>
-          <a:xfrm>
-            <a:off x="1141413" y="2053086"/>
-            <a:ext cx="9905998" cy="4347713"/>
-          </a:xfrm>
-        </p:spPr>
-        <p:txBody>
-          <a:bodyPr>
-            <a:normAutofit/>
-          </a:bodyPr>
-          <a:lstStyle/>
-          <a:p>
-            <a:r>
-              <a:rPr lang="en-US" sz="2400" u="sng" dirty="0">
-                <a:effectLst/>
-                <a:hlinkClick r:id="rId2"/>
-              </a:rPr>
-              <a:t>Introducción</a:t>
-            </a:r>
-            <a:endParaRPr lang="en-US" sz="2400" dirty="0">
-              <a:effectLst/>
-            </a:endParaRPr>
-          </a:p>
-          <a:p>
-            <a:r>
-              <a:rPr lang="en-US" sz="2400" u="sng" dirty="0">
-                <a:effectLst/>
-                <a:hlinkClick r:id="rId3"/>
-              </a:rPr>
-              <a:t>Datos y contexto</a:t>
-            </a:r>
-            <a:endParaRPr lang="en-US" sz="2400" dirty="0">
-              <a:effectLst/>
-            </a:endParaRPr>
-          </a:p>
-          <a:p>
-            <a:r>
-              <a:rPr lang="en-US" sz="2400" u="sng" dirty="0">
-                <a:effectLst/>
-                <a:hlinkClick r:id="rId4"/>
-              </a:rPr>
-              <a:t>Análisis exploratorio de los datos</a:t>
-            </a:r>
-            <a:endParaRPr lang="en-US" sz="2400" dirty="0">
-              <a:effectLst/>
-            </a:endParaRPr>
-          </a:p>
-          <a:p>
-            <a:r>
-              <a:rPr lang="en-US" sz="2400" u="sng" dirty="0">
-                <a:effectLst/>
-                <a:hlinkClick r:id="rId5"/>
-              </a:rPr>
-              <a:t>Teoría del Análisis de Componentes Principales</a:t>
-            </a:r>
-            <a:endParaRPr lang="en-US" sz="2400" dirty="0">
-              <a:effectLst/>
-            </a:endParaRPr>
-          </a:p>
-          <a:p>
-            <a:r>
-              <a:rPr lang="en-US" sz="2400" u="sng" dirty="0">
-                <a:effectLst/>
-                <a:hlinkClick r:id="rId6"/>
-              </a:rPr>
-              <a:t>Resultados del Análisis de Componentes Principales</a:t>
-            </a:r>
-            <a:endParaRPr lang="en-US" sz="2400" dirty="0">
-              <a:effectLst/>
-            </a:endParaRPr>
-          </a:p>
-          <a:p>
-            <a:r>
-              <a:rPr lang="en-US" sz="2400" u="sng" dirty="0">
-                <a:effectLst/>
-                <a:hlinkClick r:id="rId7"/>
-              </a:rPr>
-              <a:t>Análisis de conglomerados (clustering)</a:t>
-            </a:r>
-            <a:endParaRPr lang="en-US" sz="2400" dirty="0">
-              <a:effectLst/>
-            </a:endParaRPr>
-          </a:p>
-          <a:p>
-            <a:r>
-              <a:rPr lang="en-US" sz="2400" u="sng" dirty="0">
-                <a:effectLst/>
-                <a:hlinkClick r:id="rId8"/>
-              </a:rPr>
-              <a:t>Conclusiones</a:t>
-            </a:r>
-            <a:endParaRPr lang="en-US" sz="2400" dirty="0">
-              <a:effectLst/>
-            </a:endParaRPr>
-          </a:p>
-          <a:p>
-            <a:r>
-              <a:rPr lang="en-US" sz="2400" u="sng" dirty="0">
-                <a:effectLst/>
-                <a:hlinkClick r:id="rId9"/>
-              </a:rPr>
-              <a:t>Referencias</a:t>
-            </a:r>
-            <a:endParaRPr lang="en-US" sz="2400" dirty="0">
-              <a:effectLst/>
-            </a:endParaRPr>
-          </a:p>
-        </p:txBody>
-      </p:sp>
-    </p:spTree>
-    <p:extLst>
-      <p:ext uri="{BB962C8B-B14F-4D97-AF65-F5344CB8AC3E}">
-        <p14:creationId xmlns:p14="http://schemas.microsoft.com/office/powerpoint/2010/main" val="1960165556"/>
-      </p:ext>
-    </p:extLst>
-  </p:cSld>
-  <p:clrMapOvr>
-    <a:masterClrMapping/>
-  </p:clrMapOvr>
-</p:sld>
-</file>
-
-<file path=ppt/slides/slide20.xml><?xml version="1.0" encoding="utf-8"?>
+<file path=ppt/slides/slide21.xml><?xml version="1.0" encoding="utf-8"?>
 <p:sld xmlns:a="http://schemas.openxmlformats.org/drawingml/2006/main" xmlns:r="http://schemas.openxmlformats.org/officeDocument/2006/relationships" xmlns:p="http://schemas.openxmlformats.org/presentationml/2006/main">
   <p:cSld>
     <p:spTree>
@@ -8258,7 +8493,7 @@
 </p:sld>
 </file>
 
-<file path=ppt/slides/slide21.xml><?xml version="1.0" encoding="utf-8"?>
+<file path=ppt/slides/slide22.xml><?xml version="1.0" encoding="utf-8"?>
 <p:sld xmlns:a="http://schemas.openxmlformats.org/drawingml/2006/main" xmlns:r="http://schemas.openxmlformats.org/officeDocument/2006/relationships" xmlns:p="http://schemas.openxmlformats.org/presentationml/2006/main">
   <p:cSld>
     <p:spTree>
@@ -8335,7 +8570,7 @@
 </p:sld>
 </file>
 
-<file path=ppt/slides/slide22.xml><?xml version="1.0" encoding="utf-8"?>
+<file path=ppt/slides/slide23.xml><?xml version="1.0" encoding="utf-8"?>
 <p:sld xmlns:a="http://schemas.openxmlformats.org/drawingml/2006/main" xmlns:r="http://schemas.openxmlformats.org/officeDocument/2006/relationships" xmlns:p="http://schemas.openxmlformats.org/presentationml/2006/main">
   <p:cSld>
     <p:spTree>
@@ -9098,7 +9333,7 @@
 </p:sld>
 </file>
 
-<file path=ppt/slides/slide23.xml><?xml version="1.0" encoding="utf-8"?>
+<file path=ppt/slides/slide24.xml><?xml version="1.0" encoding="utf-8"?>
 <p:sld xmlns:a="http://schemas.openxmlformats.org/drawingml/2006/main" xmlns:r="http://schemas.openxmlformats.org/officeDocument/2006/relationships" xmlns:p="http://schemas.openxmlformats.org/presentationml/2006/main">
   <p:cSld>
     <p:spTree>
@@ -10359,7 +10594,7 @@
 </p:sld>
 </file>
 
-<file path=ppt/slides/slide24.xml><?xml version="1.0" encoding="utf-8"?>
+<file path=ppt/slides/slide25.xml><?xml version="1.0" encoding="utf-8"?>
 <p:sld xmlns:a="http://schemas.openxmlformats.org/drawingml/2006/main" xmlns:r="http://schemas.openxmlformats.org/officeDocument/2006/relationships" xmlns:p="http://schemas.openxmlformats.org/presentationml/2006/main">
   <p:cSld>
     <p:spTree>
@@ -11319,7 +11554,7 @@
 </p:sld>
 </file>
 
-<file path=ppt/slides/slide25.xml><?xml version="1.0" encoding="utf-8"?>
+<file path=ppt/slides/slide26.xml><?xml version="1.0" encoding="utf-8"?>
 <p:sld xmlns:a="http://schemas.openxmlformats.org/drawingml/2006/main" xmlns:r="http://schemas.openxmlformats.org/officeDocument/2006/relationships" xmlns:p="http://schemas.openxmlformats.org/presentationml/2006/main">
   <p:cSld>
     <p:bg>
@@ -11349,7 +11584,7 @@
           <p:cNvPr id="6" name="Marcador de contenido 5">
             <a:extLst>
               <a:ext uri="{FF2B5EF4-FFF2-40B4-BE49-F238E27FC236}">
-                <a16:creationId xmlns:a16="http://schemas.microsoft.com/office/drawing/2014/main" id="{23D41DC1-16F7-498C-8C38-3F268A285C40}"/>
+                <a16:creationId xmlns:a16="http://schemas.microsoft.com/office/drawing/2014/main" xmlns="" id="{23D41DC1-16F7-498C-8C38-3F268A285C40}"/>
               </a:ext>
             </a:extLst>
           </p:cNvPr>
@@ -11366,8 +11601,8 @@
         </p:blipFill>
         <p:spPr>
           <a:xfrm>
-            <a:off x="995302" y="1129940"/>
-            <a:ext cx="5224873" cy="5588101"/>
+            <a:off x="995302" y="1272335"/>
+            <a:ext cx="5992094" cy="5303309"/>
           </a:xfrm>
           <a:prstGeom prst="rect">
             <a:avLst/>
@@ -11379,7 +11614,7 @@
           <p:cNvPr id="27" name="Content Placeholder 10">
             <a:extLst>
               <a:ext uri="{FF2B5EF4-FFF2-40B4-BE49-F238E27FC236}">
-                <a16:creationId xmlns:a16="http://schemas.microsoft.com/office/drawing/2014/main" id="{ECBD1444-430D-480D-8E00-07AC237FD6F9}"/>
+                <a16:creationId xmlns:a16="http://schemas.microsoft.com/office/drawing/2014/main" xmlns="" id="{ECBD1444-430D-480D-8E00-07AC237FD6F9}"/>
               </a:ext>
             </a:extLst>
           </p:cNvPr>
@@ -11392,8 +11627,8 @@
         </p:nvSpPr>
         <p:spPr>
           <a:xfrm>
-            <a:off x="6988580" y="1877700"/>
-            <a:ext cx="3677263" cy="4092579"/>
+            <a:off x="7851221" y="2913270"/>
+            <a:ext cx="3677263" cy="2021440"/>
           </a:xfrm>
         </p:spPr>
         <p:txBody>
@@ -11408,17 +11643,22 @@
             </a:r>
             <a:r>
               <a:rPr lang="en-US" dirty="0"/>
-              <a:t> de confusion</a:t>
-            </a:r>
-          </a:p>
-          <a:p>
-            <a:r>
-              <a:rPr lang="es-ES_tradnl" dirty="0" err="1"/>
-              <a:t>Precision</a:t>
+              <a:t> de </a:t>
+            </a:r>
+            <a:r>
+              <a:rPr lang="en-US" dirty="0" err="1" smtClean="0"/>
+              <a:t>confusión</a:t>
+            </a:r>
+            <a:endParaRPr lang="en-US" dirty="0"/>
+          </a:p>
+          <a:p>
+            <a:r>
+              <a:rPr lang="es-ES_tradnl" dirty="0" smtClean="0"/>
+              <a:t>Precisión </a:t>
             </a:r>
             <a:r>
               <a:rPr lang="es-ES_tradnl" dirty="0"/>
-              <a:t> score:</a:t>
+              <a:t>score:</a:t>
             </a:r>
           </a:p>
           <a:p>
@@ -11464,7 +11704,7 @@
           <p:cNvPr id="4" name="Título 3">
             <a:extLst>
               <a:ext uri="{FF2B5EF4-FFF2-40B4-BE49-F238E27FC236}">
-                <a16:creationId xmlns:a16="http://schemas.microsoft.com/office/drawing/2014/main" id="{1EED4081-E428-4AAC-8F91-9FB80487ADE2}"/>
+                <a16:creationId xmlns:a16="http://schemas.microsoft.com/office/drawing/2014/main" xmlns="" id="{1EED4081-E428-4AAC-8F91-9FB80487ADE2}"/>
               </a:ext>
             </a:extLst>
           </p:cNvPr>
@@ -11477,8 +11717,8 @@
         </p:nvSpPr>
         <p:spPr>
           <a:xfrm>
-            <a:off x="2998337" y="-15302"/>
-            <a:ext cx="7190692" cy="1609344"/>
+            <a:off x="2208362" y="-15302"/>
+            <a:ext cx="8678174" cy="1609344"/>
           </a:xfrm>
         </p:spPr>
         <p:txBody>
@@ -11487,8 +11727,9 @@
           </a:bodyPr>
           <a:lstStyle/>
           <a:p>
-            <a:r>
-              <a:rPr lang="es-ES_tradnl" sz="3600" dirty="0"/>
+            <a:pPr algn="ctr"/>
+            <a:r>
+              <a:rPr lang="es-ES_tradnl" sz="4400" dirty="0"/>
               <a:t>Árboles de decisión para clasificación</a:t>
             </a:r>
           </a:p>
@@ -11498,208 +11739,6 @@
     <p:extLst>
       <p:ext uri="{BB962C8B-B14F-4D97-AF65-F5344CB8AC3E}">
         <p14:creationId xmlns:p14="http://schemas.microsoft.com/office/powerpoint/2010/main" val="2479810407"/>
-      </p:ext>
-    </p:extLst>
-  </p:cSld>
-  <p:clrMapOvr>
-    <a:masterClrMapping/>
-  </p:clrMapOvr>
-</p:sld>
-</file>
-
-<file path=ppt/slides/slide26.xml><?xml version="1.0" encoding="utf-8"?>
-<p:sld xmlns:a="http://schemas.openxmlformats.org/drawingml/2006/main" xmlns:r="http://schemas.openxmlformats.org/officeDocument/2006/relationships" xmlns:p="http://schemas.openxmlformats.org/presentationml/2006/main">
-  <p:cSld>
-    <p:spTree>
-      <p:nvGrpSpPr>
-        <p:cNvPr id="1" name=""/>
-        <p:cNvGrpSpPr/>
-        <p:nvPr/>
-      </p:nvGrpSpPr>
-      <p:grpSpPr>
-        <a:xfrm>
-          <a:off x="0" y="0"/>
-          <a:ext cx="0" cy="0"/>
-          <a:chOff x="0" y="0"/>
-          <a:chExt cx="0" cy="0"/>
-        </a:xfrm>
-      </p:grpSpPr>
-      <p:sp>
-        <p:nvSpPr>
-          <p:cNvPr id="2" name="Title 1"/>
-          <p:cNvSpPr>
-            <a:spLocks noGrp="1"/>
-          </p:cNvSpPr>
-          <p:nvPr>
-            <p:ph type="title"/>
-          </p:nvPr>
-        </p:nvSpPr>
-        <p:spPr>
-          <a:xfrm>
-            <a:off x="1069848" y="278970"/>
-            <a:ext cx="10058400" cy="1609344"/>
-          </a:xfrm>
-        </p:spPr>
-        <p:txBody>
-          <a:bodyPr/>
-          <a:lstStyle/>
-          <a:p>
-            <a:pPr algn="ctr"/>
-            <a:r>
-              <a:rPr lang="es-ES_tradnl" dirty="0"/>
-              <a:t>Paralelización</a:t>
-            </a:r>
-            <a:br>
-              <a:rPr lang="es-ES_tradnl" dirty="0"/>
-            </a:br>
-            <a:r>
-              <a:rPr lang="es-ES_tradnl" dirty="0"/>
-              <a:t>(</a:t>
-            </a:r>
-            <a:r>
-              <a:rPr lang="es-ES_tradnl" dirty="0" err="1"/>
-              <a:t>Dask</a:t>
-            </a:r>
-            <a:r>
-              <a:rPr lang="es-ES_tradnl" dirty="0"/>
-              <a:t>)</a:t>
-            </a:r>
-          </a:p>
-        </p:txBody>
-      </p:sp>
-      <p:pic>
-        <p:nvPicPr>
-          <p:cNvPr id="6" name="Imagen 5">
-            <a:extLst>
-              <a:ext uri="{FF2B5EF4-FFF2-40B4-BE49-F238E27FC236}">
-                <a16:creationId xmlns:a16="http://schemas.microsoft.com/office/drawing/2014/main" id="{9D5E962C-9996-4E68-AB37-F3934F0727D0}"/>
-              </a:ext>
-            </a:extLst>
-          </p:cNvPr>
-          <p:cNvPicPr>
-            <a:picLocks noChangeAspect="1"/>
-          </p:cNvPicPr>
-          <p:nvPr/>
-        </p:nvPicPr>
-        <p:blipFill>
-          <a:blip r:embed="rId2"/>
-          <a:stretch>
-            <a:fillRect/>
-          </a:stretch>
-        </p:blipFill>
-        <p:spPr>
-          <a:xfrm>
-            <a:off x="4350256" y="1888314"/>
-            <a:ext cx="3733800" cy="1009650"/>
-          </a:xfrm>
-          <a:prstGeom prst="rect">
-            <a:avLst/>
-          </a:prstGeom>
-        </p:spPr>
-      </p:pic>
-      <p:cxnSp>
-        <p:nvCxnSpPr>
-          <p:cNvPr id="8" name="Conector recto de flecha 7">
-            <a:extLst>
-              <a:ext uri="{FF2B5EF4-FFF2-40B4-BE49-F238E27FC236}">
-                <a16:creationId xmlns:a16="http://schemas.microsoft.com/office/drawing/2014/main" id="{4CF654CC-9649-4D13-BCF8-3A8B2183FFD4}"/>
-              </a:ext>
-            </a:extLst>
-          </p:cNvPr>
-          <p:cNvCxnSpPr/>
-          <p:nvPr/>
-        </p:nvCxnSpPr>
-        <p:spPr>
-          <a:xfrm>
-            <a:off x="5522162" y="4225771"/>
-            <a:ext cx="1038687" cy="0"/>
-          </a:xfrm>
-          <a:prstGeom prst="straightConnector1">
-            <a:avLst/>
-          </a:prstGeom>
-          <a:ln w="57150">
-            <a:tailEnd type="triangle"/>
-          </a:ln>
-        </p:spPr>
-        <p:style>
-          <a:lnRef idx="1">
-            <a:schemeClr val="accent1"/>
-          </a:lnRef>
-          <a:fillRef idx="0">
-            <a:schemeClr val="accent1"/>
-          </a:fillRef>
-          <a:effectRef idx="0">
-            <a:schemeClr val="accent1"/>
-          </a:effectRef>
-          <a:fontRef idx="minor">
-            <a:schemeClr val="tx1"/>
-          </a:fontRef>
-        </p:style>
-      </p:cxnSp>
-      <p:pic>
-        <p:nvPicPr>
-          <p:cNvPr id="10" name="Imagen 9">
-            <a:extLst>
-              <a:ext uri="{FF2B5EF4-FFF2-40B4-BE49-F238E27FC236}">
-                <a16:creationId xmlns:a16="http://schemas.microsoft.com/office/drawing/2014/main" id="{19FE01A7-2E58-45CF-B53A-06C162079B06}"/>
-              </a:ext>
-            </a:extLst>
-          </p:cNvPr>
-          <p:cNvPicPr>
-            <a:picLocks noChangeAspect="1"/>
-          </p:cNvPicPr>
-          <p:nvPr/>
-        </p:nvPicPr>
-        <p:blipFill>
-          <a:blip r:embed="rId3"/>
-          <a:stretch>
-            <a:fillRect/>
-          </a:stretch>
-        </p:blipFill>
-        <p:spPr>
-          <a:xfrm>
-            <a:off x="929889" y="2933342"/>
-            <a:ext cx="4867275" cy="3048000"/>
-          </a:xfrm>
-          <a:prstGeom prst="rect">
-            <a:avLst/>
-          </a:prstGeom>
-        </p:spPr>
-      </p:pic>
-      <p:pic>
-        <p:nvPicPr>
-          <p:cNvPr id="13" name="Imagen 12">
-            <a:extLst>
-              <a:ext uri="{FF2B5EF4-FFF2-40B4-BE49-F238E27FC236}">
-                <a16:creationId xmlns:a16="http://schemas.microsoft.com/office/drawing/2014/main" id="{C37197B3-7E12-4321-9631-01C8C41DE7ED}"/>
-              </a:ext>
-            </a:extLst>
-          </p:cNvPr>
-          <p:cNvPicPr>
-            <a:picLocks noChangeAspect="1"/>
-          </p:cNvPicPr>
-          <p:nvPr/>
-        </p:nvPicPr>
-        <p:blipFill>
-          <a:blip r:embed="rId4"/>
-          <a:stretch>
-            <a:fillRect/>
-          </a:stretch>
-        </p:blipFill>
-        <p:spPr>
-          <a:xfrm>
-            <a:off x="6969968" y="2942867"/>
-            <a:ext cx="4876800" cy="3038475"/>
-          </a:xfrm>
-          <a:prstGeom prst="rect">
-            <a:avLst/>
-          </a:prstGeom>
-        </p:spPr>
-      </p:pic>
-    </p:spTree>
-    <p:extLst>
-      <p:ext uri="{BB962C8B-B14F-4D97-AF65-F5344CB8AC3E}">
-        <p14:creationId xmlns:p14="http://schemas.microsoft.com/office/powerpoint/2010/main" val="633653516"/>
       </p:ext>
     </p:extLst>
   </p:cSld>
@@ -11738,7 +11777,7 @@
         </p:nvSpPr>
         <p:spPr>
           <a:xfrm>
-            <a:off x="1069848" y="216977"/>
+            <a:off x="1069848" y="278970"/>
             <a:ext cx="10058400" cy="1609344"/>
           </a:xfrm>
         </p:spPr>
@@ -11748,19 +11787,30 @@
           <a:p>
             <a:pPr algn="ctr"/>
             <a:r>
-              <a:rPr lang="es-ES_tradnl"/>
-              <a:t>Análisis de conglomerados</a:t>
-            </a:r>
-            <a:endParaRPr lang="es-ES_tradnl" dirty="0"/>
+              <a:rPr lang="es-ES_tradnl" dirty="0" err="1" smtClean="0"/>
+              <a:t>Paralelización</a:t>
+            </a:r>
+            <a:r>
+              <a:rPr lang="es-ES_tradnl" dirty="0" smtClean="0"/>
+              <a:t> (</a:t>
+            </a:r>
+            <a:r>
+              <a:rPr lang="es-ES_tradnl" dirty="0" err="1" smtClean="0"/>
+              <a:t>Dask</a:t>
+            </a:r>
+            <a:r>
+              <a:rPr lang="es-ES_tradnl" dirty="0"/>
+              <a:t>)</a:t>
+            </a:r>
           </a:p>
         </p:txBody>
       </p:sp>
       <p:pic>
         <p:nvPicPr>
-          <p:cNvPr id="4" name="Imagen 3">
+          <p:cNvPr id="6" name="Imagen 5">
             <a:extLst>
               <a:ext uri="{FF2B5EF4-FFF2-40B4-BE49-F238E27FC236}">
-                <a16:creationId xmlns:a16="http://schemas.microsoft.com/office/drawing/2014/main" id="{22EBF1D6-84F7-42D3-B3D7-B0537994E33C}"/>
+                <a16:creationId xmlns:a16="http://schemas.microsoft.com/office/drawing/2014/main" xmlns="" id="{9D5E962C-9996-4E68-AB37-F3934F0727D0}"/>
               </a:ext>
             </a:extLst>
           </p:cNvPr>
@@ -11777,59 +11827,117 @@
         </p:blipFill>
         <p:spPr>
           <a:xfrm>
-            <a:off x="5034043" y="2416968"/>
-            <a:ext cx="6717135" cy="3772887"/>
+            <a:off x="3745546" y="1666282"/>
+            <a:ext cx="4591918" cy="1241692"/>
           </a:xfrm>
           <a:prstGeom prst="rect">
             <a:avLst/>
           </a:prstGeom>
         </p:spPr>
       </p:pic>
-      <p:sp>
-        <p:nvSpPr>
-          <p:cNvPr id="18" name="Content Placeholder 10">
+      <p:cxnSp>
+        <p:nvCxnSpPr>
+          <p:cNvPr id="8" name="Conector recto de flecha 7">
             <a:extLst>
               <a:ext uri="{FF2B5EF4-FFF2-40B4-BE49-F238E27FC236}">
-                <a16:creationId xmlns:a16="http://schemas.microsoft.com/office/drawing/2014/main" id="{90672348-6608-45D4-89A7-3650AB93C70D}"/>
+                <a16:creationId xmlns:a16="http://schemas.microsoft.com/office/drawing/2014/main" xmlns="" id="{4CF654CC-9649-4D13-BCF8-3A8B2183FFD4}"/>
               </a:ext>
             </a:extLst>
           </p:cNvPr>
-          <p:cNvSpPr>
-            <a:spLocks noGrp="1"/>
-          </p:cNvSpPr>
-          <p:nvPr>
-            <p:ph idx="1"/>
-          </p:nvPr>
-        </p:nvSpPr>
+          <p:cNvCxnSpPr/>
+          <p:nvPr/>
+        </p:nvCxnSpPr>
         <p:spPr>
           <a:xfrm>
-            <a:off x="440822" y="1997896"/>
-            <a:ext cx="4512918" cy="4092579"/>
+            <a:off x="5332381" y="4393088"/>
+            <a:ext cx="1038687" cy="0"/>
           </a:xfrm>
+          <a:prstGeom prst="straightConnector1">
+            <a:avLst/>
+          </a:prstGeom>
+          <a:ln w="57150">
+            <a:tailEnd type="triangle"/>
+          </a:ln>
         </p:spPr>
-        <p:txBody>
-          <a:bodyPr>
-            <a:normAutofit/>
-          </a:bodyPr>
-          <a:lstStyle/>
-          <a:p>
-            <a:pPr algn="just"/>
-            <a:r>
-              <a:rPr lang="en-US" dirty="0"/>
-              <a:t>S</a:t>
-            </a:r>
-            <a:r>
-              <a:rPr lang="es-ES" dirty="0"/>
-              <a:t>e eligió un parámetro de k=2que este es el número de grupos en los que se agrupan los datos.</a:t>
-            </a:r>
-            <a:endParaRPr lang="en-US" dirty="0"/>
-          </a:p>
-        </p:txBody>
-      </p:sp>
+        <p:style>
+          <a:lnRef idx="1">
+            <a:schemeClr val="accent1"/>
+          </a:lnRef>
+          <a:fillRef idx="0">
+            <a:schemeClr val="accent1"/>
+          </a:fillRef>
+          <a:effectRef idx="0">
+            <a:schemeClr val="accent1"/>
+          </a:effectRef>
+          <a:fontRef idx="minor">
+            <a:schemeClr val="tx1"/>
+          </a:fontRef>
+        </p:style>
+      </p:cxnSp>
+      <p:pic>
+        <p:nvPicPr>
+          <p:cNvPr id="10" name="Imagen 9">
+            <a:extLst>
+              <a:ext uri="{FF2B5EF4-FFF2-40B4-BE49-F238E27FC236}">
+                <a16:creationId xmlns:a16="http://schemas.microsoft.com/office/drawing/2014/main" xmlns="" id="{19FE01A7-2E58-45CF-B53A-06C162079B06}"/>
+              </a:ext>
+            </a:extLst>
+          </p:cNvPr>
+          <p:cNvPicPr>
+            <a:picLocks noChangeAspect="1"/>
+          </p:cNvPicPr>
+          <p:nvPr/>
+        </p:nvPicPr>
+        <p:blipFill>
+          <a:blip r:embed="rId3"/>
+          <a:stretch>
+            <a:fillRect/>
+          </a:stretch>
+        </p:blipFill>
+        <p:spPr>
+          <a:xfrm>
+            <a:off x="535252" y="2907974"/>
+            <a:ext cx="5022337" cy="3145103"/>
+          </a:xfrm>
+          <a:prstGeom prst="rect">
+            <a:avLst/>
+          </a:prstGeom>
+        </p:spPr>
+      </p:pic>
+      <p:pic>
+        <p:nvPicPr>
+          <p:cNvPr id="13" name="Imagen 12">
+            <a:extLst>
+              <a:ext uri="{FF2B5EF4-FFF2-40B4-BE49-F238E27FC236}">
+                <a16:creationId xmlns:a16="http://schemas.microsoft.com/office/drawing/2014/main" xmlns="" id="{C37197B3-7E12-4321-9631-01C8C41DE7ED}"/>
+              </a:ext>
+            </a:extLst>
+          </p:cNvPr>
+          <p:cNvPicPr>
+            <a:picLocks noChangeAspect="1"/>
+          </p:cNvPicPr>
+          <p:nvPr/>
+        </p:nvPicPr>
+        <p:blipFill>
+          <a:blip r:embed="rId4"/>
+          <a:stretch>
+            <a:fillRect/>
+          </a:stretch>
+        </p:blipFill>
+        <p:spPr>
+          <a:xfrm>
+            <a:off x="6676670" y="2936096"/>
+            <a:ext cx="5291043" cy="3296568"/>
+          </a:xfrm>
+          <a:prstGeom prst="rect">
+            <a:avLst/>
+          </a:prstGeom>
+        </p:spPr>
+      </p:pic>
     </p:spTree>
     <p:extLst>
       <p:ext uri="{BB962C8B-B14F-4D97-AF65-F5344CB8AC3E}">
-        <p14:creationId xmlns:p14="http://schemas.microsoft.com/office/powerpoint/2010/main" val="284662205"/>
+        <p14:creationId xmlns:p14="http://schemas.microsoft.com/office/powerpoint/2010/main" val="633653516"/>
       </p:ext>
     </p:extLst>
   </p:cSld>
@@ -11868,7 +11976,7 @@
         </p:nvSpPr>
         <p:spPr>
           <a:xfrm>
-            <a:off x="1069848" y="294468"/>
+            <a:off x="1069848" y="216977"/>
             <a:ext cx="10058400" cy="1609344"/>
           </a:xfrm>
         </p:spPr>
@@ -11878,15 +11986,51 @@
           <a:p>
             <a:pPr algn="ctr"/>
             <a:r>
-              <a:rPr lang="es-ES_tradnl" dirty="0"/>
-              <a:t>Conclusión</a:t>
-            </a:r>
+              <a:rPr lang="es-ES_tradnl"/>
+              <a:t>Análisis de conglomerados</a:t>
+            </a:r>
+            <a:endParaRPr lang="es-ES_tradnl" dirty="0"/>
           </a:p>
         </p:txBody>
       </p:sp>
+      <p:pic>
+        <p:nvPicPr>
+          <p:cNvPr id="4" name="Imagen 3">
+            <a:extLst>
+              <a:ext uri="{FF2B5EF4-FFF2-40B4-BE49-F238E27FC236}">
+                <a16:creationId xmlns:a16="http://schemas.microsoft.com/office/drawing/2014/main" xmlns="" id="{22EBF1D6-84F7-42D3-B3D7-B0537994E33C}"/>
+              </a:ext>
+            </a:extLst>
+          </p:cNvPr>
+          <p:cNvPicPr>
+            <a:picLocks noChangeAspect="1"/>
+          </p:cNvPicPr>
+          <p:nvPr/>
+        </p:nvPicPr>
+        <p:blipFill rotWithShape="1">
+          <a:blip r:embed="rId2"/>
+          <a:srcRect r="7861"/>
+          <a:stretch/>
+        </p:blipFill>
+        <p:spPr>
+          <a:xfrm>
+            <a:off x="5034043" y="1826322"/>
+            <a:ext cx="7157957" cy="4363534"/>
+          </a:xfrm>
+          <a:prstGeom prst="rect">
+            <a:avLst/>
+          </a:prstGeom>
+        </p:spPr>
+      </p:pic>
       <p:sp>
         <p:nvSpPr>
-          <p:cNvPr id="3" name="Content Placeholder 2"/>
+          <p:cNvPr id="18" name="Content Placeholder 10">
+            <a:extLst>
+              <a:ext uri="{FF2B5EF4-FFF2-40B4-BE49-F238E27FC236}">
+                <a16:creationId xmlns:a16="http://schemas.microsoft.com/office/drawing/2014/main" xmlns="" id="{90672348-6608-45D4-89A7-3650AB93C70D}"/>
+              </a:ext>
+            </a:extLst>
+          </p:cNvPr>
           <p:cNvSpPr>
             <a:spLocks noGrp="1"/>
           </p:cNvSpPr>
@@ -11894,19 +12038,43 @@
             <p:ph idx="1"/>
           </p:nvPr>
         </p:nvSpPr>
-        <p:spPr/>
+        <p:spPr>
+          <a:xfrm>
+            <a:off x="371811" y="2843286"/>
+            <a:ext cx="4512918" cy="1004096"/>
+          </a:xfrm>
+        </p:spPr>
         <p:txBody>
-          <a:bodyPr/>
+          <a:bodyPr>
+            <a:normAutofit/>
+          </a:bodyPr>
           <a:lstStyle/>
           <a:p>
-            <a:endParaRPr lang="es-ES_tradnl"/>
+            <a:pPr algn="just"/>
+            <a:r>
+              <a:rPr lang="en-US" dirty="0"/>
+              <a:t>S</a:t>
+            </a:r>
+            <a:r>
+              <a:rPr lang="es-ES" dirty="0"/>
+              <a:t>e eligió un parámetro de </a:t>
+            </a:r>
+            <a:r>
+              <a:rPr lang="es-ES" dirty="0" smtClean="0"/>
+              <a:t>k=2. Este es </a:t>
+            </a:r>
+            <a:r>
+              <a:rPr lang="es-ES" dirty="0"/>
+              <a:t>el número de grupos en los que se agrupan los datos.</a:t>
+            </a:r>
+            <a:endParaRPr lang="en-US" dirty="0"/>
           </a:p>
         </p:txBody>
       </p:sp>
     </p:spTree>
     <p:extLst>
       <p:ext uri="{BB962C8B-B14F-4D97-AF65-F5344CB8AC3E}">
-        <p14:creationId xmlns:p14="http://schemas.microsoft.com/office/powerpoint/2010/main" val="1360722586"/>
+        <p14:creationId xmlns:p14="http://schemas.microsoft.com/office/powerpoint/2010/main" val="284662205"/>
       </p:ext>
     </p:extLst>
   </p:cSld>
@@ -11945,7 +12113,7 @@
         </p:nvSpPr>
         <p:spPr>
           <a:xfrm>
-            <a:off x="1069848" y="0"/>
+            <a:off x="1069848" y="294468"/>
             <a:ext cx="10058400" cy="1609344"/>
           </a:xfrm>
         </p:spPr>
@@ -11956,7 +12124,7 @@
             <a:pPr algn="ctr"/>
             <a:r>
               <a:rPr lang="es-ES_tradnl" dirty="0"/>
-              <a:t>referencias</a:t>
+              <a:t>Conclusión</a:t>
             </a:r>
           </a:p>
         </p:txBody>
@@ -11971,284 +12139,19 @@
             <p:ph idx="1"/>
           </p:nvPr>
         </p:nvSpPr>
-        <p:spPr>
-          <a:xfrm>
-            <a:off x="1069848" y="1441341"/>
-            <a:ext cx="10197420" cy="5300421"/>
-          </a:xfrm>
-        </p:spPr>
+        <p:spPr/>
         <p:txBody>
-          <a:bodyPr>
-            <a:normAutofit fontScale="70000" lnSpcReduction="20000"/>
-          </a:bodyPr>
+          <a:bodyPr/>
           <a:lstStyle/>
           <a:p>
-            <a:r>
-              <a:rPr lang="en-US" dirty="0" err="1"/>
-              <a:t>Codesansar</a:t>
-            </a:r>
-            <a:r>
-              <a:rPr lang="en-US" dirty="0"/>
-              <a:t>. (</a:t>
-            </a:r>
-            <a:r>
-              <a:rPr lang="en-US" dirty="0" err="1"/>
-              <a:t>s.f</a:t>
-            </a:r>
-            <a:r>
-              <a:rPr lang="en-US" dirty="0"/>
-              <a:t>). </a:t>
-            </a:r>
-            <a:r>
-              <a:rPr lang="en-US" u="sng" dirty="0">
-                <a:hlinkClick r:id="rId2"/>
-              </a:rPr>
-              <a:t>Power Method Algorithm for Finding Dominant Eigen Value and Eigen Vector</a:t>
-            </a:r>
-            <a:endParaRPr lang="en-US" dirty="0"/>
-          </a:p>
-          <a:p>
-            <a:r>
-              <a:rPr lang="en-US" dirty="0"/>
-              <a:t>Dan, D. J. (2014). </a:t>
-            </a:r>
-            <a:r>
-              <a:rPr lang="en-US" u="sng" dirty="0">
-                <a:hlinkClick r:id="rId3"/>
-              </a:rPr>
-              <a:t>Power-Method-PCA</a:t>
-            </a:r>
-            <a:endParaRPr lang="en-US" dirty="0"/>
-          </a:p>
-          <a:p>
-            <a:r>
-              <a:rPr lang="en-US" dirty="0" err="1"/>
-              <a:t>Data.world</a:t>
-            </a:r>
-            <a:r>
-              <a:rPr lang="en-US" dirty="0"/>
-              <a:t>. (2017). </a:t>
-            </a:r>
-            <a:r>
-              <a:rPr lang="en-US" u="sng" dirty="0">
-                <a:hlinkClick r:id="rId4"/>
-              </a:rPr>
-              <a:t>USDA National Nutrient DB</a:t>
-            </a:r>
-            <a:endParaRPr lang="en-US" dirty="0"/>
-          </a:p>
-          <a:p>
-            <a:r>
-              <a:rPr lang="en-US" dirty="0" err="1"/>
-              <a:t>Equipo</a:t>
-            </a:r>
-            <a:r>
-              <a:rPr lang="en-US" dirty="0"/>
-              <a:t> SVD. (2020). </a:t>
-            </a:r>
-            <a:r>
-              <a:rPr lang="en-US" u="sng" dirty="0">
-                <a:hlinkClick r:id="rId5"/>
-              </a:rPr>
-              <a:t>Examen de cómputo matricial equipo SVD</a:t>
-            </a:r>
-            <a:endParaRPr lang="en-US" dirty="0"/>
-          </a:p>
-          <a:p>
-            <a:r>
-              <a:rPr lang="en-US" dirty="0" err="1"/>
-              <a:t>Equipo</a:t>
-            </a:r>
-            <a:r>
-              <a:rPr lang="en-US" dirty="0"/>
-              <a:t> QR. (2020). </a:t>
-            </a:r>
-            <a:r>
-              <a:rPr lang="en-US" u="sng" dirty="0">
-                <a:hlinkClick r:id="rId6"/>
-              </a:rPr>
-              <a:t>Examen de cómputo matricial equipo QR</a:t>
-            </a:r>
-            <a:endParaRPr lang="en-US" dirty="0"/>
-          </a:p>
-          <a:p>
-            <a:r>
-              <a:rPr lang="en-US" dirty="0"/>
-              <a:t>Fox, J., Chalmers, P., Monette, G., &amp; Sanchez, G. (2020). </a:t>
-            </a:r>
-            <a:r>
-              <a:rPr lang="en-US" u="sng" dirty="0">
-                <a:hlinkClick r:id="rId7"/>
-              </a:rPr>
-              <a:t>PowerMethod: Power Method for Eigenvectors in matlib: Matrix Functions for Teaching and Learning Linear Algebra and Multivariate Statistics</a:t>
-            </a:r>
-            <a:endParaRPr lang="en-US" dirty="0"/>
-          </a:p>
-          <a:p>
-            <a:r>
-              <a:rPr lang="en-US" dirty="0" err="1"/>
-              <a:t>Luhaniwal</a:t>
-            </a:r>
-            <a:r>
-              <a:rPr lang="en-US" dirty="0"/>
-              <a:t> </a:t>
-            </a:r>
-            <a:r>
-              <a:rPr lang="en-US" dirty="0" err="1"/>
-              <a:t>Vikashraj</a:t>
-            </a:r>
-            <a:r>
-              <a:rPr lang="en-US" dirty="0"/>
-              <a:t>. (2019). </a:t>
-            </a:r>
-            <a:r>
-              <a:rPr lang="en-US" u="sng" dirty="0">
-                <a:hlinkClick r:id="rId8"/>
-              </a:rPr>
-              <a:t>"Feature selection using Wrapper methods in Python"</a:t>
-            </a:r>
-            <a:endParaRPr lang="en-US" dirty="0"/>
-          </a:p>
-          <a:p>
-            <a:r>
-              <a:rPr lang="en-US" dirty="0"/>
-              <a:t>Palacios M. Erick. (2020). </a:t>
-            </a:r>
-            <a:r>
-              <a:rPr lang="en-US" dirty="0" err="1"/>
-              <a:t>Notas</a:t>
-            </a:r>
-            <a:r>
-              <a:rPr lang="en-US" dirty="0"/>
-              <a:t> de MNO 2020. </a:t>
-            </a:r>
-            <a:r>
-              <a:rPr lang="en-US" u="sng" dirty="0">
-                <a:hlinkClick r:id="rId9"/>
-              </a:rPr>
-              <a:t>SVD</a:t>
-            </a:r>
-            <a:endParaRPr lang="en-US" dirty="0"/>
-          </a:p>
-          <a:p>
-            <a:r>
-              <a:rPr lang="en-US" dirty="0"/>
-              <a:t>Palacios M. Erick. (2020). </a:t>
-            </a:r>
-            <a:r>
-              <a:rPr lang="en-US" dirty="0" err="1"/>
-              <a:t>Notas</a:t>
-            </a:r>
-            <a:r>
-              <a:rPr lang="en-US" dirty="0"/>
-              <a:t> de MNO 2020. </a:t>
-            </a:r>
-            <a:r>
-              <a:rPr lang="en-US" u="sng" dirty="0">
-                <a:hlinkClick r:id="rId10"/>
-              </a:rPr>
-              <a:t>Componentes principales</a:t>
-            </a:r>
-            <a:endParaRPr lang="en-US" dirty="0"/>
-          </a:p>
-          <a:p>
-            <a:r>
-              <a:rPr lang="en-US" dirty="0"/>
-              <a:t>Palacios M. Erick. (2020). </a:t>
-            </a:r>
-            <a:r>
-              <a:rPr lang="en-US" dirty="0" err="1"/>
-              <a:t>Notas</a:t>
-            </a:r>
-            <a:r>
-              <a:rPr lang="en-US" dirty="0"/>
-              <a:t> de MNO 2020. </a:t>
-            </a:r>
-            <a:r>
-              <a:rPr lang="en-US" u="sng" dirty="0">
-                <a:hlinkClick r:id="rId11"/>
-              </a:rPr>
-              <a:t>Cómputo en paralelo - Dask</a:t>
-            </a:r>
-            <a:endParaRPr lang="en-US" dirty="0"/>
-          </a:p>
-          <a:p>
-            <a:r>
-              <a:rPr lang="en-US" dirty="0"/>
-              <a:t>Ramos, Irene. (2020). </a:t>
-            </a:r>
-            <a:r>
-              <a:rPr lang="en-US" u="sng" dirty="0">
-                <a:hlinkClick r:id="rId12"/>
-              </a:rPr>
-              <a:t>"Tipología_manejo_agrícola"</a:t>
-            </a:r>
-            <a:endParaRPr lang="en-US" dirty="0"/>
-          </a:p>
-          <a:p>
-            <a:r>
-              <a:rPr lang="en-US" dirty="0" err="1"/>
-              <a:t>Rencher</a:t>
-            </a:r>
-            <a:r>
-              <a:rPr lang="en-US" dirty="0"/>
-              <a:t>, Alvin C &amp; William F. Christensen. (2012). Methods of Multivariate Analysis. Department of Statistics, Brigham Young University, Provo, UT.- Third Edition. </a:t>
-            </a:r>
-            <a:r>
-              <a:rPr lang="en-US" dirty="0" err="1"/>
-              <a:t>Ch</a:t>
-            </a:r>
-            <a:r>
-              <a:rPr lang="en-US" dirty="0"/>
-              <a:t> 12.</a:t>
-            </a:r>
-          </a:p>
-          <a:p>
-            <a:r>
-              <a:rPr lang="en-US" dirty="0"/>
-              <a:t>Sharma </a:t>
-            </a:r>
-            <a:r>
-              <a:rPr lang="en-US" dirty="0" err="1"/>
-              <a:t>Subhash</a:t>
-            </a:r>
-            <a:r>
-              <a:rPr lang="en-US" dirty="0"/>
-              <a:t>. (1996). Applied Multivariate Techniques. University of South Carolina. Ch4.</a:t>
-            </a:r>
-          </a:p>
-          <a:p>
-            <a:r>
-              <a:rPr lang="en-US" dirty="0"/>
-              <a:t>U.S. Department of Agriculture, Agricultural Research Service. 2014. USDA National Nutrient Database for Standard Reference, Release 27. Methods and Application of Food Composition Laboratory Home Page, </a:t>
-            </a:r>
-            <a:r>
-              <a:rPr lang="en-US" u="sng" dirty="0">
-                <a:hlinkClick r:id="rId13"/>
-              </a:rPr>
-              <a:t>http://www.ars.usda.gov/nea/bhnrc/mafcl</a:t>
-            </a:r>
-            <a:endParaRPr lang="en-US" dirty="0"/>
-          </a:p>
-          <a:p>
-            <a:r>
-              <a:rPr lang="en-US" dirty="0"/>
-              <a:t>Wikipedia. </a:t>
-            </a:r>
-            <a:r>
-              <a:rPr lang="en-US" u="sng" dirty="0">
-                <a:hlinkClick r:id="rId14"/>
-              </a:rPr>
-              <a:t>QR algorithm</a:t>
-            </a:r>
-            <a:endParaRPr lang="en-US" dirty="0"/>
+            <a:endParaRPr lang="es-ES_tradnl"/>
           </a:p>
         </p:txBody>
       </p:sp>
     </p:spTree>
     <p:extLst>
       <p:ext uri="{BB962C8B-B14F-4D97-AF65-F5344CB8AC3E}">
-        <p14:creationId xmlns:p14="http://schemas.microsoft.com/office/powerpoint/2010/main" val="151035696"/>
+        <p14:creationId xmlns:p14="http://schemas.microsoft.com/office/powerpoint/2010/main" val="1360722586"/>
       </p:ext>
     </p:extLst>
   </p:cSld>
@@ -12446,8 +12349,32 @@
               <a:t> </a:t>
             </a:r>
             <a:r>
+              <a:rPr lang="en-US" dirty="0" err="1" smtClean="0"/>
+              <a:t>Análisis</a:t>
+            </a:r>
+            <a:r>
+              <a:rPr lang="en-US" dirty="0" smtClean="0"/>
+              <a:t> no </a:t>
+            </a:r>
+            <a:r>
+              <a:rPr lang="en-US" dirty="0" err="1" smtClean="0"/>
+              <a:t>supervisado</a:t>
+            </a:r>
+            <a:r>
+              <a:rPr lang="en-US" dirty="0" smtClean="0"/>
+              <a:t> de </a:t>
+            </a:r>
+            <a:r>
+              <a:rPr lang="en-US" dirty="0" err="1" smtClean="0"/>
+              <a:t>clasificación</a:t>
+            </a:r>
+            <a:r>
+              <a:rPr lang="en-US" dirty="0" smtClean="0"/>
+              <a:t> de </a:t>
+            </a:r>
+            <a:r>
               <a:rPr lang="en-US" dirty="0" err="1"/>
-              <a:t>Clasificar</a:t>
+              <a:t>los</a:t>
             </a:r>
             <a:r>
               <a:rPr lang="en-US" dirty="0"/>
@@ -12455,7 +12382,27 @@
             </a:r>
             <a:r>
               <a:rPr lang="en-US" dirty="0" err="1"/>
-              <a:t>los</a:t>
+              <a:t>grupos</a:t>
+            </a:r>
+            <a:r>
+              <a:rPr lang="en-US" dirty="0"/>
+              <a:t> de </a:t>
+            </a:r>
+            <a:r>
+              <a:rPr lang="en-US" dirty="0" err="1" smtClean="0"/>
+              <a:t>alimentos</a:t>
+            </a:r>
+            <a:r>
+              <a:rPr lang="en-US" dirty="0" smtClean="0"/>
+              <a:t> </a:t>
+            </a:r>
+            <a:r>
+              <a:rPr lang="en-US" dirty="0"/>
+              <a:t>con base </a:t>
+            </a:r>
+            <a:r>
+              <a:rPr lang="en-US" dirty="0" err="1"/>
+              <a:t>en</a:t>
             </a:r>
             <a:r>
               <a:rPr lang="en-US" dirty="0"/>
@@ -12463,15 +12410,7 @@
             </a:r>
             <a:r>
               <a:rPr lang="en-US" dirty="0" err="1"/>
-              <a:t>grupos</a:t>
-            </a:r>
-            <a:r>
-              <a:rPr lang="en-US" dirty="0"/>
-              <a:t> de comida con base </a:t>
-            </a:r>
-            <a:r>
-              <a:rPr lang="en-US" dirty="0" err="1"/>
-              <a:t>en</a:t>
+              <a:t>su</a:t>
             </a:r>
             <a:r>
               <a:rPr lang="en-US" dirty="0"/>
@@ -12479,7 +12418,15 @@
             </a:r>
             <a:r>
               <a:rPr lang="en-US" dirty="0" err="1"/>
-              <a:t>su</a:t>
+              <a:t>información</a:t>
+            </a:r>
+            <a:r>
+              <a:rPr lang="en-US" dirty="0"/>
+              <a:t> nutrimental </a:t>
+            </a:r>
+            <a:r>
+              <a:rPr lang="en-US" dirty="0" err="1"/>
+              <a:t>habiendo</a:t>
             </a:r>
             <a:r>
               <a:rPr lang="en-US" dirty="0"/>
@@ -12487,27 +12434,51 @@
             </a:r>
             <a:r>
               <a:rPr lang="en-US" dirty="0" err="1"/>
-              <a:t>información</a:t>
+              <a:t>eliminado</a:t>
             </a:r>
             <a:r>
               <a:rPr lang="en-US" dirty="0"/>
-              <a:t> nutrimental </a:t>
-            </a:r>
-            <a:r>
-              <a:rPr lang="en-US" dirty="0" err="1"/>
-              <a:t>habiendo</a:t>
-            </a:r>
-            <a:r>
-              <a:rPr lang="en-US" dirty="0"/>
+              <a:t> la multicolinealidad de la </a:t>
+            </a:r>
+            <a:r>
+              <a:rPr lang="en-US" dirty="0" smtClean="0"/>
+              <a:t>base al </a:t>
+            </a:r>
+            <a:r>
+              <a:rPr lang="en-US" dirty="0" err="1" smtClean="0"/>
+              <a:t>aplica</a:t>
+            </a:r>
+            <a:r>
+              <a:rPr lang="en-US" dirty="0" err="1" smtClean="0"/>
+              <a:t>r</a:t>
+            </a:r>
+            <a:r>
+              <a:rPr lang="en-US" dirty="0" smtClean="0"/>
               <a:t> </a:t>
             </a:r>
             <a:r>
-              <a:rPr lang="en-US" dirty="0" err="1"/>
-              <a:t>eliminado</a:t>
-            </a:r>
-            <a:r>
-              <a:rPr lang="en-US" dirty="0"/>
-              <a:t> la multicolinealidad de la base.</a:t>
+              <a:rPr lang="en-US" dirty="0" err="1" smtClean="0"/>
+              <a:t>Análisis</a:t>
+            </a:r>
+            <a:r>
+              <a:rPr lang="en-US" dirty="0" smtClean="0"/>
+              <a:t> de </a:t>
+            </a:r>
+            <a:r>
+              <a:rPr lang="en-US" dirty="0" err="1" smtClean="0"/>
+              <a:t>Componentes</a:t>
+            </a:r>
+            <a:r>
+              <a:rPr lang="en-US" dirty="0" smtClean="0"/>
+              <a:t> </a:t>
+            </a:r>
+            <a:r>
+              <a:rPr lang="en-US" dirty="0" err="1" smtClean="0"/>
+              <a:t>Principales</a:t>
+            </a:r>
+            <a:r>
+              <a:rPr lang="en-US" dirty="0" smtClean="0"/>
+              <a:t>.</a:t>
             </a:r>
             <a:endParaRPr lang="es-ES_tradnl" dirty="0"/>
           </a:p>
@@ -12517,6 +12488,327 @@
     <p:extLst>
       <p:ext uri="{BB962C8B-B14F-4D97-AF65-F5344CB8AC3E}">
         <p14:creationId xmlns:p14="http://schemas.microsoft.com/office/powerpoint/2010/main" val="968098702"/>
+      </p:ext>
+    </p:extLst>
+  </p:cSld>
+  <p:clrMapOvr>
+    <a:masterClrMapping/>
+  </p:clrMapOvr>
+</p:sld>
+</file>
+
+<file path=ppt/slides/slide30.xml><?xml version="1.0" encoding="utf-8"?>
+<p:sld xmlns:a="http://schemas.openxmlformats.org/drawingml/2006/main" xmlns:r="http://schemas.openxmlformats.org/officeDocument/2006/relationships" xmlns:p="http://schemas.openxmlformats.org/presentationml/2006/main">
+  <p:cSld>
+    <p:spTree>
+      <p:nvGrpSpPr>
+        <p:cNvPr id="1" name=""/>
+        <p:cNvGrpSpPr/>
+        <p:nvPr/>
+      </p:nvGrpSpPr>
+      <p:grpSpPr>
+        <a:xfrm>
+          <a:off x="0" y="0"/>
+          <a:ext cx="0" cy="0"/>
+          <a:chOff x="0" y="0"/>
+          <a:chExt cx="0" cy="0"/>
+        </a:xfrm>
+      </p:grpSpPr>
+      <p:sp>
+        <p:nvSpPr>
+          <p:cNvPr id="2" name="Title 1"/>
+          <p:cNvSpPr>
+            <a:spLocks noGrp="1"/>
+          </p:cNvSpPr>
+          <p:nvPr>
+            <p:ph type="title"/>
+          </p:nvPr>
+        </p:nvSpPr>
+        <p:spPr>
+          <a:xfrm>
+            <a:off x="1069848" y="0"/>
+            <a:ext cx="10058400" cy="1609344"/>
+          </a:xfrm>
+        </p:spPr>
+        <p:txBody>
+          <a:bodyPr/>
+          <a:lstStyle/>
+          <a:p>
+            <a:pPr algn="ctr"/>
+            <a:r>
+              <a:rPr lang="es-ES_tradnl" dirty="0"/>
+              <a:t>referencias</a:t>
+            </a:r>
+          </a:p>
+        </p:txBody>
+      </p:sp>
+      <p:sp>
+        <p:nvSpPr>
+          <p:cNvPr id="3" name="Content Placeholder 2"/>
+          <p:cNvSpPr>
+            <a:spLocks noGrp="1"/>
+          </p:cNvSpPr>
+          <p:nvPr>
+            <p:ph idx="1"/>
+          </p:nvPr>
+        </p:nvSpPr>
+        <p:spPr>
+          <a:xfrm>
+            <a:off x="1069848" y="1441341"/>
+            <a:ext cx="10197420" cy="5300421"/>
+          </a:xfrm>
+        </p:spPr>
+        <p:txBody>
+          <a:bodyPr>
+            <a:normAutofit fontScale="77500" lnSpcReduction="20000"/>
+          </a:bodyPr>
+          <a:lstStyle/>
+          <a:p>
+            <a:r>
+              <a:rPr lang="en-US" dirty="0" err="1"/>
+              <a:t>Codesansar</a:t>
+            </a:r>
+            <a:r>
+              <a:rPr lang="en-US" dirty="0"/>
+              <a:t>. (</a:t>
+            </a:r>
+            <a:r>
+              <a:rPr lang="en-US" dirty="0" err="1"/>
+              <a:t>s.f</a:t>
+            </a:r>
+            <a:r>
+              <a:rPr lang="en-US" dirty="0"/>
+              <a:t>). </a:t>
+            </a:r>
+            <a:r>
+              <a:rPr lang="en-US" u="sng" dirty="0">
+                <a:hlinkClick r:id="rId2"/>
+              </a:rPr>
+              <a:t>Power Method Algorithm for Finding Dominant Eigen Value and Eigen Vector</a:t>
+            </a:r>
+            <a:endParaRPr lang="en-US" dirty="0"/>
+          </a:p>
+          <a:p>
+            <a:r>
+              <a:rPr lang="en-US" dirty="0"/>
+              <a:t>Dan, D. J. (2014). </a:t>
+            </a:r>
+            <a:r>
+              <a:rPr lang="en-US" u="sng" dirty="0">
+                <a:hlinkClick r:id="rId3"/>
+              </a:rPr>
+              <a:t>Power-Method-PCA</a:t>
+            </a:r>
+            <a:endParaRPr lang="en-US" dirty="0"/>
+          </a:p>
+          <a:p>
+            <a:r>
+              <a:rPr lang="en-US" dirty="0" err="1"/>
+              <a:t>Data.world</a:t>
+            </a:r>
+            <a:r>
+              <a:rPr lang="en-US" dirty="0"/>
+              <a:t>. (2017). </a:t>
+            </a:r>
+            <a:r>
+              <a:rPr lang="en-US" u="sng" dirty="0">
+                <a:hlinkClick r:id="rId4"/>
+              </a:rPr>
+              <a:t>USDA National Nutrient DB</a:t>
+            </a:r>
+            <a:endParaRPr lang="en-US" dirty="0"/>
+          </a:p>
+          <a:p>
+            <a:r>
+              <a:rPr lang="en-US" dirty="0" err="1"/>
+              <a:t>Equipo</a:t>
+            </a:r>
+            <a:r>
+              <a:rPr lang="en-US" dirty="0"/>
+              <a:t> SVD. (2020). </a:t>
+            </a:r>
+            <a:r>
+              <a:rPr lang="en-US" u="sng" dirty="0">
+                <a:hlinkClick r:id="rId5"/>
+              </a:rPr>
+              <a:t>Examen de cómputo matricial equipo SVD</a:t>
+            </a:r>
+            <a:endParaRPr lang="en-US" dirty="0"/>
+          </a:p>
+          <a:p>
+            <a:r>
+              <a:rPr lang="en-US" dirty="0" err="1"/>
+              <a:t>Equipo</a:t>
+            </a:r>
+            <a:r>
+              <a:rPr lang="en-US" dirty="0"/>
+              <a:t> QR. (2020). </a:t>
+            </a:r>
+            <a:r>
+              <a:rPr lang="en-US" u="sng" dirty="0">
+                <a:hlinkClick r:id="rId6"/>
+              </a:rPr>
+              <a:t>Examen de cómputo matricial equipo QR</a:t>
+            </a:r>
+            <a:endParaRPr lang="en-US" dirty="0"/>
+          </a:p>
+          <a:p>
+            <a:r>
+              <a:rPr lang="en-US" dirty="0"/>
+              <a:t>Fox, J., Chalmers, P., Monette, G., &amp; Sanchez, G. (2020). </a:t>
+            </a:r>
+            <a:r>
+              <a:rPr lang="en-US" u="sng" dirty="0">
+                <a:hlinkClick r:id="rId7"/>
+              </a:rPr>
+              <a:t>PowerMethod: Power Method for Eigenvectors in matlib: Matrix Functions for Teaching and Learning Linear Algebra and Multivariate Statistics</a:t>
+            </a:r>
+            <a:endParaRPr lang="en-US" dirty="0"/>
+          </a:p>
+          <a:p>
+            <a:r>
+              <a:rPr lang="en-US" dirty="0" smtClean="0"/>
+              <a:t>Palacios </a:t>
+            </a:r>
+            <a:r>
+              <a:rPr lang="en-US" dirty="0"/>
+              <a:t>M. Erick. (2020). </a:t>
+            </a:r>
+            <a:r>
+              <a:rPr lang="en-US" dirty="0" err="1"/>
+              <a:t>Notas</a:t>
+            </a:r>
+            <a:r>
+              <a:rPr lang="en-US" dirty="0"/>
+              <a:t> de MNO 2020. </a:t>
+            </a:r>
+            <a:r>
+              <a:rPr lang="en-US" u="sng" dirty="0">
+                <a:hlinkClick r:id="rId8"/>
+              </a:rPr>
+              <a:t>SVD</a:t>
+            </a:r>
+            <a:endParaRPr lang="en-US" dirty="0"/>
+          </a:p>
+          <a:p>
+            <a:r>
+              <a:rPr lang="en-US" dirty="0"/>
+              <a:t>Palacios M. Erick. (2020). </a:t>
+            </a:r>
+            <a:r>
+              <a:rPr lang="en-US" dirty="0" err="1"/>
+              <a:t>Notas</a:t>
+            </a:r>
+            <a:r>
+              <a:rPr lang="en-US" dirty="0"/>
+              <a:t> de MNO 2020. </a:t>
+            </a:r>
+            <a:r>
+              <a:rPr lang="en-US" u="sng" dirty="0">
+                <a:hlinkClick r:id="rId9"/>
+              </a:rPr>
+              <a:t>Componentes principales</a:t>
+            </a:r>
+            <a:endParaRPr lang="en-US" dirty="0"/>
+          </a:p>
+          <a:p>
+            <a:r>
+              <a:rPr lang="en-US" dirty="0"/>
+              <a:t>Palacios M. Erick. (2020). </a:t>
+            </a:r>
+            <a:r>
+              <a:rPr lang="en-US" dirty="0" err="1"/>
+              <a:t>Notas</a:t>
+            </a:r>
+            <a:r>
+              <a:rPr lang="en-US" dirty="0"/>
+              <a:t> de MNO 2020. </a:t>
+            </a:r>
+            <a:r>
+              <a:rPr lang="en-US" u="sng" dirty="0">
+                <a:hlinkClick r:id="rId10"/>
+              </a:rPr>
+              <a:t>Cómputo en paralelo - Dask</a:t>
+            </a:r>
+            <a:endParaRPr lang="en-US" dirty="0"/>
+          </a:p>
+          <a:p>
+            <a:r>
+              <a:rPr lang="en-US" dirty="0"/>
+              <a:t>Ramos, Irene. (2020). </a:t>
+            </a:r>
+            <a:r>
+              <a:rPr lang="en-US" u="sng" dirty="0">
+                <a:hlinkClick r:id="rId11"/>
+              </a:rPr>
+              <a:t>"Tipología_manejo_agrícola"</a:t>
+            </a:r>
+            <a:endParaRPr lang="en-US" dirty="0"/>
+          </a:p>
+          <a:p>
+            <a:r>
+              <a:rPr lang="en-US" dirty="0" err="1"/>
+              <a:t>Rencher</a:t>
+            </a:r>
+            <a:r>
+              <a:rPr lang="en-US" dirty="0"/>
+              <a:t>, Alvin C &amp; William F. Christensen. (2012). Methods of Multivariate Analysis. Department of Statistics, Brigham Young University, Provo, UT.- Third Edition. </a:t>
+            </a:r>
+            <a:r>
+              <a:rPr lang="en-US" dirty="0" err="1"/>
+              <a:t>Ch</a:t>
+            </a:r>
+            <a:r>
+              <a:rPr lang="en-US" dirty="0"/>
+              <a:t> 12.</a:t>
+            </a:r>
+          </a:p>
+          <a:p>
+            <a:r>
+              <a:rPr lang="en-US" dirty="0"/>
+              <a:t>Sharma </a:t>
+            </a:r>
+            <a:r>
+              <a:rPr lang="en-US" dirty="0" err="1"/>
+              <a:t>Subhash</a:t>
+            </a:r>
+            <a:r>
+              <a:rPr lang="en-US" dirty="0"/>
+              <a:t>. (1996). Applied Multivariate Techniques. University of South Carolina. Ch4.</a:t>
+            </a:r>
+          </a:p>
+          <a:p>
+            <a:r>
+              <a:rPr lang="en-US" dirty="0"/>
+              <a:t>U.S. Department of Agriculture, Agricultural Research Service. 2014. USDA National Nutrient Database for Standard Reference, Release 27. Methods and Application of Food Composition Laboratory Home Page, </a:t>
+            </a:r>
+            <a:r>
+              <a:rPr lang="en-US" u="sng" dirty="0">
+                <a:hlinkClick r:id="rId12"/>
+              </a:rPr>
+              <a:t>http://www.ars.usda.gov/nea/bhnrc/mafcl</a:t>
+            </a:r>
+            <a:endParaRPr lang="en-US" dirty="0"/>
+          </a:p>
+          <a:p>
+            <a:r>
+              <a:rPr lang="en-US" dirty="0"/>
+              <a:t>Wikipedia. </a:t>
+            </a:r>
+            <a:r>
+              <a:rPr lang="en-US" u="sng" dirty="0">
+                <a:hlinkClick r:id="rId13"/>
+              </a:rPr>
+              <a:t>QR algorithm</a:t>
+            </a:r>
+            <a:endParaRPr lang="en-US" dirty="0"/>
+          </a:p>
+        </p:txBody>
+      </p:sp>
+    </p:spTree>
+    <p:extLst>
+      <p:ext uri="{BB962C8B-B14F-4D97-AF65-F5344CB8AC3E}">
+        <p14:creationId xmlns:p14="http://schemas.microsoft.com/office/powerpoint/2010/main" val="151035696"/>
       </p:ext>
     </p:extLst>
   </p:cSld>
@@ -12802,7 +13094,7 @@
         </p:nvSpPr>
         <p:spPr>
           <a:xfrm>
-            <a:off x="0" y="278969"/>
+            <a:off x="0" y="0"/>
             <a:ext cx="12026684" cy="1609344"/>
           </a:xfrm>
         </p:spPr>
@@ -12812,35 +13104,53 @@
           <a:p>
             <a:pPr algn="ctr"/>
             <a:r>
-              <a:rPr lang="es-ES_tradnl" dirty="0" err="1"/>
+              <a:rPr lang="es-ES_tradnl" dirty="0" smtClean="0"/>
               <a:t>Distr</a:t>
             </a:r>
             <a:r>
+              <a:rPr lang="es-ES_tradnl" dirty="0" smtClean="0"/>
+              <a:t>ibución</a:t>
+            </a:r>
+            <a:r>
+              <a:rPr lang="es-ES_tradnl" dirty="0" smtClean="0"/>
+              <a:t> </a:t>
+            </a:r>
+            <a:r>
               <a:rPr lang="es-ES_tradnl" dirty="0"/>
-              <a:t>. de los macronutrientes</a:t>
+              <a:t>de los macronutrientes</a:t>
             </a:r>
           </a:p>
         </p:txBody>
       </p:sp>
-      <p:sp>
-        <p:nvSpPr>
-          <p:cNvPr id="3" name="Content Placeholder 2"/>
-          <p:cNvSpPr>
-            <a:spLocks noGrp="1"/>
-          </p:cNvSpPr>
+      <p:pic>
+        <p:nvPicPr>
+          <p:cNvPr id="4" name="Content Placeholder 3"/>
+          <p:cNvPicPr>
+            <a:picLocks noGrp="1" noChangeAspect="1"/>
+          </p:cNvPicPr>
           <p:nvPr>
             <p:ph idx="1"/>
           </p:nvPr>
-        </p:nvSpPr>
-        <p:spPr/>
-        <p:txBody>
-          <a:bodyPr/>
-          <a:lstStyle/>
-          <a:p>
-            <a:endParaRPr lang="es-ES_tradnl"/>
-          </a:p>
-        </p:txBody>
-      </p:sp>
+        </p:nvPicPr>
+        <p:blipFill>
+          <a:blip r:embed="rId2">
+            <a:extLst>
+              <a:ext uri="{28A0092B-C50C-407E-A947-70E740481C1C}">
+                <a14:useLocalDpi xmlns:a14="http://schemas.microsoft.com/office/drawing/2010/main" val="0"/>
+              </a:ext>
+            </a:extLst>
+          </a:blip>
+          <a:stretch>
+            <a:fillRect/>
+          </a:stretch>
+        </p:blipFill>
+        <p:spPr>
+          <a:xfrm>
+            <a:off x="1431985" y="1471786"/>
+            <a:ext cx="9040483" cy="5181095"/>
+          </a:xfrm>
+        </p:spPr>
+      </p:pic>
     </p:spTree>
     <p:extLst>
       <p:ext uri="{BB962C8B-B14F-4D97-AF65-F5344CB8AC3E}">
@@ -12893,12 +13203,12 @@
           <a:p>
             <a:pPr algn="ctr"/>
             <a:r>
-              <a:rPr lang="es-ES_tradnl" dirty="0" err="1"/>
-              <a:t>Distr</a:t>
+              <a:rPr lang="es-ES_tradnl" smtClean="0"/>
+              <a:t>Distribución </a:t>
             </a:r>
             <a:r>
               <a:rPr lang="es-ES_tradnl" dirty="0"/>
-              <a:t>. de los micronutrientes</a:t>
+              <a:t>de los micronutrientes</a:t>
             </a:r>
           </a:p>
         </p:txBody>

</xml_diff>

<commit_message>
agregar presentacion en pdf
</commit_message>
<xml_diff>
--- a/results/PCA_presentacion.pptx
+++ b/results/PCA_presentacion.pptx
@@ -226,7 +226,7 @@
           <a:p>
             <a:fld id="{395C63AC-4902-F448-A1B5-F71A761D9957}" type="datetimeFigureOut">
               <a:rPr lang="es-ES_tradnl" smtClean="0"/>
-              <a:t>29/05/2020</a:t>
+              <a:t>29/5/20</a:t>
             </a:fld>
             <a:endParaRPr lang="es-ES_tradnl"/>
           </a:p>
@@ -385,7 +385,7 @@
           <a:p>
             <a:fld id="{2DDB4F98-9E2F-4642-AD0A-52F13A28866B}" type="slidenum">
               <a:rPr lang="es-ES_tradnl" smtClean="0"/>
-              <a:t>‹Nº›</a:t>
+              <a:t>‹#›</a:t>
             </a:fld>
             <a:endParaRPr lang="es-ES_tradnl"/>
           </a:p>
@@ -996,7 +996,7 @@
             <a:fld id="{B61BEF0D-F0BB-DE4B-95CE-6DB70DBA9567}" type="datetimeFigureOut">
               <a:rPr lang="en-US" smtClean="0"/>
               <a:pPr/>
-              <a:t>5/29/2020</a:t>
+              <a:t>5/29/20</a:t>
             </a:fld>
             <a:endParaRPr lang="en-US" dirty="0"/>
           </a:p>
@@ -1048,7 +1048,7 @@
             <a:fld id="{D57F1E4F-1CFF-5643-939E-217C01CDF565}" type="slidenum">
               <a:rPr lang="en-US" smtClean="0"/>
               <a:pPr/>
-              <a:t>‹Nº›</a:t>
+              <a:t>‹#›</a:t>
             </a:fld>
             <a:endParaRPr lang="en-US" dirty="0"/>
           </a:p>
@@ -1170,7 +1170,7 @@
             <a:fld id="{B61BEF0D-F0BB-DE4B-95CE-6DB70DBA9567}" type="datetimeFigureOut">
               <a:rPr lang="en-US" smtClean="0"/>
               <a:pPr/>
-              <a:t>5/29/2020</a:t>
+              <a:t>5/29/20</a:t>
             </a:fld>
             <a:endParaRPr lang="en-US" dirty="0"/>
           </a:p>
@@ -1213,7 +1213,7 @@
             <a:fld id="{D57F1E4F-1CFF-5643-939E-217C01CDF565}" type="slidenum">
               <a:rPr lang="en-US" smtClean="0"/>
               <a:pPr/>
-              <a:t>‹Nº›</a:t>
+              <a:t>‹#›</a:t>
             </a:fld>
             <a:endParaRPr lang="en-US" dirty="0"/>
           </a:p>
@@ -1347,7 +1347,7 @@
             <a:fld id="{B61BEF0D-F0BB-DE4B-95CE-6DB70DBA9567}" type="datetimeFigureOut">
               <a:rPr lang="en-US" smtClean="0"/>
               <a:pPr/>
-              <a:t>5/29/2020</a:t>
+              <a:t>5/29/20</a:t>
             </a:fld>
             <a:endParaRPr lang="en-US" dirty="0"/>
           </a:p>
@@ -1390,7 +1390,7 @@
             <a:fld id="{D57F1E4F-1CFF-5643-939E-217C01CDF565}" type="slidenum">
               <a:rPr lang="en-US" smtClean="0"/>
               <a:pPr/>
-              <a:t>‹Nº›</a:t>
+              <a:t>‹#›</a:t>
             </a:fld>
             <a:endParaRPr lang="en-US" dirty="0"/>
           </a:p>
@@ -1514,7 +1514,7 @@
             <a:fld id="{B61BEF0D-F0BB-DE4B-95CE-6DB70DBA9567}" type="datetimeFigureOut">
               <a:rPr lang="en-US" smtClean="0"/>
               <a:pPr/>
-              <a:t>5/29/2020</a:t>
+              <a:t>5/29/20</a:t>
             </a:fld>
             <a:endParaRPr lang="en-US" dirty="0"/>
           </a:p>
@@ -1557,7 +1557,7 @@
             <a:fld id="{D57F1E4F-1CFF-5643-939E-217C01CDF565}" type="slidenum">
               <a:rPr lang="en-US" smtClean="0"/>
               <a:pPr/>
-              <a:t>‹Nº›</a:t>
+              <a:t>‹#›</a:t>
             </a:fld>
             <a:endParaRPr lang="en-US" dirty="0"/>
           </a:p>
@@ -1832,7 +1832,7 @@
             <a:fld id="{B61BEF0D-F0BB-DE4B-95CE-6DB70DBA9567}" type="datetimeFigureOut">
               <a:rPr lang="en-US" smtClean="0"/>
               <a:pPr/>
-              <a:t>5/29/2020</a:t>
+              <a:t>5/29/20</a:t>
             </a:fld>
             <a:endParaRPr lang="en-US" dirty="0"/>
           </a:p>
@@ -2047,7 +2047,7 @@
             <a:fld id="{D57F1E4F-1CFF-5643-939E-217C01CDF565}" type="slidenum">
               <a:rPr lang="en-US" smtClean="0"/>
               <a:pPr/>
-              <a:t>‹Nº›</a:t>
+              <a:t>‹#›</a:t>
             </a:fld>
             <a:endParaRPr lang="en-US" dirty="0"/>
           </a:p>
@@ -2289,7 +2289,7 @@
             <a:fld id="{B61BEF0D-F0BB-DE4B-95CE-6DB70DBA9567}" type="datetimeFigureOut">
               <a:rPr lang="en-US" smtClean="0"/>
               <a:pPr/>
-              <a:t>5/29/2020</a:t>
+              <a:t>5/29/20</a:t>
             </a:fld>
             <a:endParaRPr lang="en-US" dirty="0"/>
           </a:p>
@@ -2332,7 +2332,7 @@
             <a:fld id="{D57F1E4F-1CFF-5643-939E-217C01CDF565}" type="slidenum">
               <a:rPr lang="en-US" smtClean="0"/>
               <a:pPr/>
-              <a:t>‹Nº›</a:t>
+              <a:t>‹#›</a:t>
             </a:fld>
             <a:endParaRPr lang="en-US" dirty="0"/>
           </a:p>
@@ -2697,7 +2697,7 @@
             <a:fld id="{B61BEF0D-F0BB-DE4B-95CE-6DB70DBA9567}" type="datetimeFigureOut">
               <a:rPr lang="en-US" smtClean="0"/>
               <a:pPr/>
-              <a:t>5/29/2020</a:t>
+              <a:t>5/29/20</a:t>
             </a:fld>
             <a:endParaRPr lang="en-US" dirty="0"/>
           </a:p>
@@ -2740,7 +2740,7 @@
             <a:fld id="{D57F1E4F-1CFF-5643-939E-217C01CDF565}" type="slidenum">
               <a:rPr lang="en-US" smtClean="0"/>
               <a:pPr/>
-              <a:t>‹Nº›</a:t>
+              <a:t>‹#›</a:t>
             </a:fld>
             <a:endParaRPr lang="en-US" dirty="0"/>
           </a:p>
@@ -2812,7 +2812,7 @@
             <a:fld id="{B61BEF0D-F0BB-DE4B-95CE-6DB70DBA9567}" type="datetimeFigureOut">
               <a:rPr lang="en-US" smtClean="0"/>
               <a:pPr/>
-              <a:t>5/29/2020</a:t>
+              <a:t>5/29/20</a:t>
             </a:fld>
             <a:endParaRPr lang="en-US" dirty="0"/>
           </a:p>
@@ -2855,7 +2855,7 @@
             <a:fld id="{D57F1E4F-1CFF-5643-939E-217C01CDF565}" type="slidenum">
               <a:rPr lang="en-US" smtClean="0"/>
               <a:pPr/>
-              <a:t>‹Nº›</a:t>
+              <a:t>‹#›</a:t>
             </a:fld>
             <a:endParaRPr lang="en-US" dirty="0"/>
           </a:p>
@@ -2926,7 +2926,7 @@
             <a:fld id="{B61BEF0D-F0BB-DE4B-95CE-6DB70DBA9567}" type="datetimeFigureOut">
               <a:rPr lang="en-US" smtClean="0"/>
               <a:pPr/>
-              <a:t>5/29/2020</a:t>
+              <a:t>5/29/20</a:t>
             </a:fld>
             <a:endParaRPr lang="en-US" dirty="0"/>
           </a:p>
@@ -2969,7 +2969,7 @@
             <a:fld id="{D57F1E4F-1CFF-5643-939E-217C01CDF565}" type="slidenum">
               <a:rPr lang="en-US" smtClean="0"/>
               <a:pPr/>
-              <a:t>‹Nº›</a:t>
+              <a:t>‹#›</a:t>
             </a:fld>
             <a:endParaRPr lang="en-US" dirty="0"/>
           </a:p>
@@ -3281,7 +3281,7 @@
             <a:fld id="{B61BEF0D-F0BB-DE4B-95CE-6DB70DBA9567}" type="datetimeFigureOut">
               <a:rPr lang="en-US" smtClean="0"/>
               <a:pPr/>
-              <a:t>5/29/2020</a:t>
+              <a:t>5/29/20</a:t>
             </a:fld>
             <a:endParaRPr lang="en-US" dirty="0"/>
           </a:p>
@@ -3487,7 +3487,7 @@
             <a:fld id="{D57F1E4F-1CFF-5643-939E-217C01CDF565}" type="slidenum">
               <a:rPr lang="en-US" smtClean="0"/>
               <a:pPr/>
-              <a:t>‹Nº›</a:t>
+              <a:t>‹#›</a:t>
             </a:fld>
             <a:endParaRPr lang="en-US" dirty="0"/>
           </a:p>
@@ -3785,7 +3785,7 @@
             <a:fld id="{B61BEF0D-F0BB-DE4B-95CE-6DB70DBA9567}" type="datetimeFigureOut">
               <a:rPr lang="en-US" smtClean="0"/>
               <a:pPr/>
-              <a:t>5/29/2020</a:t>
+              <a:t>5/29/20</a:t>
             </a:fld>
             <a:endParaRPr lang="en-US" dirty="0"/>
           </a:p>
@@ -3972,7 +3972,7 @@
             <a:fld id="{D57F1E4F-1CFF-5643-939E-217C01CDF565}" type="slidenum">
               <a:rPr lang="en-US" smtClean="0"/>
               <a:pPr/>
-              <a:t>‹Nº›</a:t>
+              <a:t>‹#›</a:t>
             </a:fld>
             <a:endParaRPr lang="en-US" dirty="0"/>
           </a:p>
@@ -4137,7 +4137,7 @@
             <a:fld id="{B61BEF0D-F0BB-DE4B-95CE-6DB70DBA9567}" type="datetimeFigureOut">
               <a:rPr lang="en-US" smtClean="0"/>
               <a:pPr/>
-              <a:t>5/29/2020</a:t>
+              <a:t>5/29/20</a:t>
             </a:fld>
             <a:endParaRPr lang="en-US" dirty="0"/>
           </a:p>
@@ -4376,7 +4376,7 @@
             <a:fld id="{D57F1E4F-1CFF-5643-939E-217C01CDF565}" type="slidenum">
               <a:rPr lang="en-US" smtClean="0"/>
               <a:pPr/>
-              <a:t>‹Nº›</a:t>
+              <a:t>‹#›</a:t>
             </a:fld>
             <a:endParaRPr lang="en-US" dirty="0"/>
           </a:p>
@@ -5634,7 +5634,7 @@
                       <m:sSupPr>
                         <m:ctrlPr>
                           <a:rPr lang="es-MX" sz="2400" b="0" i="1" dirty="0" smtClean="0">
-                            <a:latin typeface="Cambria Math" panose="02040503050406030204" pitchFamily="18" charset="0"/>
+                            <a:latin typeface="Cambria Math" charset="0"/>
                           </a:rPr>
                         </m:ctrlPr>
                       </m:sSupPr>
@@ -5970,7 +5970,7 @@
                       <m:sSubPr>
                         <m:ctrlPr>
                           <a:rPr lang="es-ES_tradnl" sz="2400" i="1" dirty="0" smtClean="0">
-                            <a:latin typeface="Cambria Math" panose="02040503050406030204" pitchFamily="18" charset="0"/>
+                            <a:latin typeface="Cambria Math" charset="0"/>
                           </a:rPr>
                         </m:ctrlPr>
                       </m:sSubPr>
@@ -6021,7 +6021,7 @@
                       <m:sSubPr>
                         <m:ctrlPr>
                           <a:rPr lang="es-MX" sz="2000" b="0" i="1" smtClean="0">
-                            <a:latin typeface="Cambria Math" panose="02040503050406030204" pitchFamily="18" charset="0"/>
+                            <a:latin typeface="Cambria Math" charset="0"/>
                           </a:rPr>
                         </m:ctrlPr>
                       </m:sSubPr>
@@ -6052,7 +6052,7 @@
                       <m:sSubPr>
                         <m:ctrlPr>
                           <a:rPr lang="es-MX" sz="2000" b="0" i="1" smtClean="0">
-                            <a:latin typeface="Cambria Math" panose="02040503050406030204" pitchFamily="18" charset="0"/>
+                            <a:latin typeface="Cambria Math" charset="0"/>
                           </a:rPr>
                         </m:ctrlPr>
                       </m:sSubPr>
@@ -6077,7 +6077,7 @@
                       <m:sSubPr>
                         <m:ctrlPr>
                           <a:rPr lang="es-MX" sz="2000" b="0" i="1" smtClean="0">
-                            <a:latin typeface="Cambria Math" panose="02040503050406030204" pitchFamily="18" charset="0"/>
+                            <a:latin typeface="Cambria Math" charset="0"/>
                           </a:rPr>
                         </m:ctrlPr>
                       </m:sSubPr>
@@ -6110,7 +6110,7 @@
                       <m:sSubPr>
                         <m:ctrlPr>
                           <a:rPr lang="es-ES_tradnl" sz="2000" i="1" dirty="0" smtClean="0">
-                            <a:latin typeface="Cambria Math" panose="02040503050406030204" pitchFamily="18" charset="0"/>
+                            <a:latin typeface="Cambria Math" charset="0"/>
                           </a:rPr>
                         </m:ctrlPr>
                       </m:sSubPr>
@@ -6147,7 +6147,7 @@
                       <m:sSubPr>
                         <m:ctrlPr>
                           <a:rPr lang="es-MX" sz="2000" b="0" i="1" dirty="0" smtClean="0">
-                            <a:latin typeface="Cambria Math" panose="02040503050406030204" pitchFamily="18" charset="0"/>
+                            <a:latin typeface="Cambria Math" charset="0"/>
                           </a:rPr>
                         </m:ctrlPr>
                       </m:sSubPr>
@@ -6172,7 +6172,7 @@
                       <m:sSubPr>
                         <m:ctrlPr>
                           <a:rPr lang="es-MX" sz="2000" b="0" i="1" dirty="0" smtClean="0">
-                            <a:latin typeface="Cambria Math" panose="02040503050406030204" pitchFamily="18" charset="0"/>
+                            <a:latin typeface="Cambria Math" charset="0"/>
                           </a:rPr>
                         </m:ctrlPr>
                       </m:sSubPr>
@@ -6241,7 +6241,7 @@
                       <m:sSubPr>
                         <m:ctrlPr>
                           <a:rPr lang="es-ES_tradnl" sz="2400" i="1" dirty="0" smtClean="0">
-                            <a:latin typeface="Cambria Math" panose="02040503050406030204" pitchFamily="18" charset="0"/>
+                            <a:latin typeface="Cambria Math" charset="0"/>
                           </a:rPr>
                         </m:ctrlPr>
                       </m:sSubPr>
@@ -6285,7 +6285,7 @@
                       <m:sSubPr>
                         <m:ctrlPr>
                           <a:rPr lang="es-ES_tradnl" sz="2400" i="1" dirty="0" smtClean="0">
-                            <a:latin typeface="Cambria Math" panose="02040503050406030204" pitchFamily="18" charset="0"/>
+                            <a:latin typeface="Cambria Math" charset="0"/>
                           </a:rPr>
                         </m:ctrlPr>
                       </m:sSubPr>
@@ -6409,8 +6409,8 @@
           </a:p>
         </p:txBody>
       </p:sp>
-      <mc:AlternateContent xmlns:mc="http://schemas.openxmlformats.org/markup-compatibility/2006">
-        <mc:Choice xmlns:a14="http://schemas.microsoft.com/office/drawing/2010/main" Requires="a14">
+      <mc:AlternateContent xmlns:mc="http://schemas.openxmlformats.org/markup-compatibility/2006" xmlns:a14="http://schemas.microsoft.com/office/drawing/2010/main">
+        <mc:Choice Requires="a14">
           <p:sp>
             <p:nvSpPr>
               <p:cNvPr id="3" name="Content Placeholder 2"/>
@@ -6525,7 +6525,7 @@
                       <m:sSubPr>
                         <m:ctrlPr>
                           <a:rPr lang="es-ES" sz="2000" i="1" dirty="0" smtClean="0">
-                            <a:latin typeface="Cambria Math" panose="02040503050406030204" pitchFamily="18" charset="0"/>
+                            <a:latin typeface="Cambria Math" charset="0"/>
                           </a:rPr>
                         </m:ctrlPr>
                       </m:sSubPr>
@@ -6565,7 +6565,7 @@
             </p:txBody>
           </p:sp>
         </mc:Choice>
-        <mc:Fallback>
+        <mc:Fallback xmlns="">
           <p:sp>
             <p:nvSpPr>
               <p:cNvPr id="3" name="Content Placeholder 2"/>
@@ -6603,8 +6603,8 @@
           </p:sp>
         </mc:Fallback>
       </mc:AlternateContent>
-      <mc:AlternateContent xmlns:mc="http://schemas.openxmlformats.org/markup-compatibility/2006">
-        <mc:Choice xmlns:a14="http://schemas.microsoft.com/office/drawing/2010/main" Requires="a14">
+      <mc:AlternateContent xmlns:mc="http://schemas.openxmlformats.org/markup-compatibility/2006" xmlns:a14="http://schemas.microsoft.com/office/drawing/2010/main">
+        <mc:Choice Requires="a14">
           <p:sp>
             <p:nvSpPr>
               <p:cNvPr id="4" name="Content Placeholder 3"/>
@@ -6637,7 +6637,7 @@
                       <m:sSubPr>
                         <m:ctrlPr>
                           <a:rPr lang="es-ES_tradnl" sz="2400" i="1" dirty="0" smtClean="0">
-                            <a:latin typeface="Cambria Math" panose="02040503050406030204" pitchFamily="18" charset="0"/>
+                            <a:latin typeface="Cambria Math" charset="0"/>
                           </a:rPr>
                         </m:ctrlPr>
                       </m:sSubPr>
@@ -6685,7 +6685,7 @@
                       <m:sSubPr>
                         <m:ctrlPr>
                           <a:rPr lang="es-MX" sz="2000" i="1">
-                            <a:latin typeface="Cambria Math" panose="02040503050406030204" pitchFamily="18" charset="0"/>
+                            <a:latin typeface="Cambria Math" charset="0"/>
                           </a:rPr>
                         </m:ctrlPr>
                       </m:sSubPr>
@@ -6722,7 +6722,7 @@
                       <m:fPr>
                         <m:ctrlPr>
                           <a:rPr lang="es-MX" sz="2000" i="1" smtClean="0">
-                            <a:latin typeface="Cambria Math" panose="02040503050406030204" pitchFamily="18" charset="0"/>
+                            <a:latin typeface="Cambria Math" charset="0"/>
                           </a:rPr>
                         </m:ctrlPr>
                       </m:fPr>
@@ -6737,7 +6737,7 @@
                           <m:sSubPr>
                             <m:ctrlPr>
                               <a:rPr lang="es-MX" sz="2000" i="1">
-                                <a:latin typeface="Cambria Math" panose="02040503050406030204" pitchFamily="18" charset="0"/>
+                                <a:latin typeface="Cambria Math" charset="0"/>
                               </a:rPr>
                             </m:ctrlPr>
                           </m:sSubPr>
@@ -6766,7 +6766,7 @@
                             <m:endChr m:val="|"/>
                             <m:ctrlPr>
                               <a:rPr lang="es-MX" sz="2000" b="0" i="1" smtClean="0">
-                                <a:latin typeface="Cambria Math" panose="02040503050406030204" pitchFamily="18" charset="0"/>
+                                <a:latin typeface="Cambria Math" charset="0"/>
                               </a:rPr>
                             </m:ctrlPr>
                           </m:dPr>
@@ -6777,7 +6777,7 @@
                                 <m:endChr m:val="|"/>
                                 <m:ctrlPr>
                                   <a:rPr lang="es-MX" sz="2000" b="0" i="1" smtClean="0">
-                                    <a:latin typeface="Cambria Math" panose="02040503050406030204" pitchFamily="18" charset="0"/>
+                                    <a:latin typeface="Cambria Math" charset="0"/>
                                   </a:rPr>
                                 </m:ctrlPr>
                               </m:dPr>
@@ -6792,7 +6792,7 @@
                                   <m:sSubPr>
                                     <m:ctrlPr>
                                       <a:rPr lang="es-MX" sz="2000" i="1">
-                                        <a:latin typeface="Cambria Math" panose="02040503050406030204" pitchFamily="18" charset="0"/>
+                                        <a:latin typeface="Cambria Math" charset="0"/>
                                       </a:rPr>
                                     </m:ctrlPr>
                                   </m:sSubPr>
@@ -6831,7 +6831,7 @@
                       <m:sSubPr>
                         <m:ctrlPr>
                           <a:rPr lang="es-MX" sz="2000" b="0" i="1" smtClean="0">
-                            <a:latin typeface="Cambria Math" panose="02040503050406030204" pitchFamily="18" charset="0"/>
+                            <a:latin typeface="Cambria Math" charset="0"/>
                           </a:rPr>
                         </m:ctrlPr>
                       </m:sSubPr>
@@ -6856,19 +6856,13 @@
                       <a:rPr lang="es-MX" sz="2000" b="0" i="1" smtClean="0">
                         <a:latin typeface="Cambria Math" panose="02040503050406030204" pitchFamily="18" charset="0"/>
                       </a:rPr>
-                      <m:t>=</m:t>
-                    </m:r>
-                    <m:r>
-                      <a:rPr lang="es-MX" sz="2000" b="0" i="1" smtClean="0">
-                        <a:latin typeface="Cambria Math" panose="02040503050406030204" pitchFamily="18" charset="0"/>
-                      </a:rPr>
-                      <m:t> </m:t>
+                      <m:t>= </m:t>
                     </m:r>
                     <m:f>
                       <m:fPr>
                         <m:ctrlPr>
                           <a:rPr lang="es-MX" sz="2000" b="0" i="1" smtClean="0">
-                            <a:latin typeface="Cambria Math" panose="02040503050406030204" pitchFamily="18" charset="0"/>
+                            <a:latin typeface="Cambria Math" charset="0"/>
                           </a:rPr>
                         </m:ctrlPr>
                       </m:fPr>
@@ -6877,7 +6871,7 @@
                           <m:sSubSupPr>
                             <m:ctrlPr>
                               <a:rPr lang="es-MX" sz="2000" i="1" smtClean="0">
-                                <a:latin typeface="Cambria Math" panose="02040503050406030204" pitchFamily="18" charset="0"/>
+                                <a:latin typeface="Cambria Math" charset="0"/>
                               </a:rPr>
                             </m:ctrlPr>
                           </m:sSubSupPr>
@@ -6886,7 +6880,7 @@
                               <m:sSubPr>
                                 <m:ctrlPr>
                                   <a:rPr lang="es-MX" sz="2000" b="0" i="1" smtClean="0">
-                                    <a:latin typeface="Cambria Math" panose="02040503050406030204" pitchFamily="18" charset="0"/>
+                                    <a:latin typeface="Cambria Math" charset="0"/>
                                   </a:rPr>
                                 </m:ctrlPr>
                               </m:sSubPr>
@@ -6941,7 +6935,7 @@
                           <m:sSubPr>
                             <m:ctrlPr>
                               <a:rPr lang="es-MX" sz="2000" b="0" i="1" smtClean="0">
-                                <a:latin typeface="Cambria Math" panose="02040503050406030204" pitchFamily="18" charset="0"/>
+                                <a:latin typeface="Cambria Math" charset="0"/>
                               </a:rPr>
                             </m:ctrlPr>
                           </m:sSubPr>
@@ -6968,7 +6962,7 @@
                           <m:sSubSupPr>
                             <m:ctrlPr>
                               <a:rPr lang="es-MX" sz="2000" i="1">
-                                <a:latin typeface="Cambria Math" panose="02040503050406030204" pitchFamily="18" charset="0"/>
+                                <a:latin typeface="Cambria Math" charset="0"/>
                               </a:rPr>
                             </m:ctrlPr>
                           </m:sSubSupPr>
@@ -7001,7 +6995,7 @@
                           <m:sSubPr>
                             <m:ctrlPr>
                               <a:rPr lang="es-MX" sz="2000" i="1">
-                                <a:latin typeface="Cambria Math" panose="02040503050406030204" pitchFamily="18" charset="0"/>
+                                <a:latin typeface="Cambria Math" charset="0"/>
                               </a:rPr>
                             </m:ctrlPr>
                           </m:sSubPr>
@@ -7039,7 +7033,7 @@
                       <m:sSubPr>
                         <m:ctrlPr>
                           <a:rPr lang="es-MX" i="1" smtClean="0">
-                            <a:latin typeface="Cambria Math" panose="02040503050406030204" pitchFamily="18" charset="0"/>
+                            <a:latin typeface="Cambria Math" charset="0"/>
                           </a:rPr>
                         </m:ctrlPr>
                       </m:sSubPr>
@@ -7110,7 +7104,7 @@
             </p:txBody>
           </p:sp>
         </mc:Choice>
-        <mc:Fallback>
+        <mc:Fallback xmlns="">
           <p:sp>
             <p:nvSpPr>
               <p:cNvPr id="4" name="Content Placeholder 3"/>
@@ -7148,14 +7142,14 @@
           </p:sp>
         </mc:Fallback>
       </mc:AlternateContent>
-      <mc:AlternateContent xmlns:mc="http://schemas.openxmlformats.org/markup-compatibility/2006">
-        <mc:Choice xmlns:a14="http://schemas.microsoft.com/office/drawing/2010/main" Requires="a14">
+      <mc:AlternateContent xmlns:mc="http://schemas.openxmlformats.org/markup-compatibility/2006" xmlns:a14="http://schemas.microsoft.com/office/drawing/2010/main">
+        <mc:Choice Requires="a14">
           <p:sp>
             <p:nvSpPr>
               <p:cNvPr id="5" name="CuadroTexto 4">
                 <a:extLst>
                   <a:ext uri="{FF2B5EF4-FFF2-40B4-BE49-F238E27FC236}">
-                    <a16:creationId xmlns:a16="http://schemas.microsoft.com/office/drawing/2014/main" id="{72F4B9BE-7D72-4F8A-97F9-0F5612E2E6FA}"/>
+                    <a16:creationId xmlns="" xmlns:a16="http://schemas.microsoft.com/office/drawing/2014/main" id="{72F4B9BE-7D72-4F8A-97F9-0F5612E2E6FA}"/>
                   </a:ext>
                 </a:extLst>
               </p:cNvPr>
@@ -7196,6 +7190,7 @@
                 </a:endParaRPr>
               </a:p>
               <a:p>
+                <a:pPr/>
                 <a14:m>
                   <m:oMathPara xmlns:m="http://schemas.openxmlformats.org/officeDocument/2006/math">
                     <m:oMathParaPr>
@@ -7206,7 +7201,7 @@
                         <m:sSubPr>
                           <m:ctrlPr>
                             <a:rPr lang="es-MX" b="0" i="1" smtClean="0">
-                              <a:latin typeface="Cambria Math" panose="02040503050406030204" pitchFamily="18" charset="0"/>
+                              <a:latin typeface="Cambria Math" charset="0"/>
                             </a:rPr>
                           </m:ctrlPr>
                         </m:sSubPr>
@@ -7243,7 +7238,7 @@
                         <m:sSubPr>
                           <m:ctrlPr>
                             <a:rPr lang="es-MX" b="0" i="1" smtClean="0">
-                              <a:latin typeface="Cambria Math" panose="02040503050406030204" pitchFamily="18" charset="0"/>
+                              <a:latin typeface="Cambria Math" charset="0"/>
                             </a:rPr>
                           </m:ctrlPr>
                         </m:sSubPr>
@@ -7274,7 +7269,7 @@
                         <m:sSubPr>
                           <m:ctrlPr>
                             <a:rPr lang="es-MX" b="0" i="1" smtClean="0">
-                              <a:latin typeface="Cambria Math" panose="02040503050406030204" pitchFamily="18" charset="0"/>
+                              <a:latin typeface="Cambria Math" charset="0"/>
                             </a:rPr>
                           </m:ctrlPr>
                         </m:sSubPr>
@@ -7299,7 +7294,7 @@
                         <m:sSubSupPr>
                           <m:ctrlPr>
                             <a:rPr lang="es-MX" b="0" i="1" smtClean="0">
-                              <a:latin typeface="Cambria Math" panose="02040503050406030204" pitchFamily="18" charset="0"/>
+                              <a:latin typeface="Cambria Math" charset="0"/>
                             </a:rPr>
                           </m:ctrlPr>
                         </m:sSubSupPr>
@@ -7338,7 +7333,7 @@
                         <m:sSubPr>
                           <m:ctrlPr>
                             <a:rPr lang="es-MX" b="0" i="1" smtClean="0">
-                              <a:latin typeface="Cambria Math" panose="02040503050406030204" pitchFamily="18" charset="0"/>
+                              <a:latin typeface="Cambria Math" charset="0"/>
                             </a:rPr>
                           </m:ctrlPr>
                         </m:sSubPr>
@@ -7363,7 +7358,7 @@
                         <m:sSubSupPr>
                           <m:ctrlPr>
                             <a:rPr lang="es-MX" b="0" i="1" smtClean="0">
-                              <a:latin typeface="Cambria Math" panose="02040503050406030204" pitchFamily="18" charset="0"/>
+                              <a:latin typeface="Cambria Math" charset="0"/>
                             </a:rPr>
                           </m:ctrlPr>
                         </m:sSubSupPr>
@@ -7400,7 +7395,7 @@
             </p:txBody>
           </p:sp>
         </mc:Choice>
-        <mc:Fallback>
+        <mc:Fallback xmlns="">
           <p:sp>
             <p:nvSpPr>
               <p:cNvPr id="5" name="CuadroTexto 4">
@@ -7518,7 +7513,7 @@
           <p:cNvPr id="6" name="Marcador de contenido 5">
             <a:extLst>
               <a:ext uri="{FF2B5EF4-FFF2-40B4-BE49-F238E27FC236}">
-                <a16:creationId xmlns:a16="http://schemas.microsoft.com/office/drawing/2014/main" id="{E455B322-C01E-4610-841D-977DCE934821}"/>
+                <a16:creationId xmlns="" xmlns:a16="http://schemas.microsoft.com/office/drawing/2014/main" id="{E455B322-C01E-4610-841D-977DCE934821}"/>
               </a:ext>
             </a:extLst>
           </p:cNvPr>
@@ -7615,7 +7610,7 @@
           <p:cNvPr id="8" name="Marcador de contenido 7">
             <a:extLst>
               <a:ext uri="{FF2B5EF4-FFF2-40B4-BE49-F238E27FC236}">
-                <a16:creationId xmlns:a16="http://schemas.microsoft.com/office/drawing/2014/main" id="{36139C0B-4654-4BB9-B939-38D10AB5E580}"/>
+                <a16:creationId xmlns="" xmlns:a16="http://schemas.microsoft.com/office/drawing/2014/main" id="{36139C0B-4654-4BB9-B939-38D10AB5E580}"/>
               </a:ext>
             </a:extLst>
           </p:cNvPr>
@@ -8206,8 +8201,8 @@
         </p:blipFill>
         <p:spPr>
           <a:xfrm>
-            <a:off x="531708" y="3381256"/>
-            <a:ext cx="11382647" cy="2105144"/>
+            <a:off x="636962" y="3398509"/>
+            <a:ext cx="10924171" cy="2105144"/>
           </a:xfrm>
         </p:spPr>
       </p:pic>
@@ -8572,8 +8567,8 @@
         </p:blipFill>
         <p:spPr>
           <a:xfrm>
-            <a:off x="682157" y="3210255"/>
-            <a:ext cx="10833781" cy="1937288"/>
+            <a:off x="1242204" y="3210255"/>
+            <a:ext cx="10221976" cy="1937288"/>
           </a:xfrm>
         </p:spPr>
       </p:pic>
@@ -8919,7 +8914,7 @@
           <p:cNvPr id="6" name="Marcador de contenido 5">
             <a:extLst>
               <a:ext uri="{FF2B5EF4-FFF2-40B4-BE49-F238E27FC236}">
-                <a16:creationId xmlns:a16="http://schemas.microsoft.com/office/drawing/2014/main" id="{E9DC11B1-3888-40B3-8055-F93BD4490177}"/>
+                <a16:creationId xmlns="" xmlns:a16="http://schemas.microsoft.com/office/drawing/2014/main" id="{E9DC11B1-3888-40B3-8055-F93BD4490177}"/>
               </a:ext>
             </a:extLst>
           </p:cNvPr>
@@ -8938,7 +8933,7 @@
         </p:blipFill>
         <p:spPr>
           <a:xfrm>
-            <a:off x="4328293" y="2566219"/>
+            <a:off x="4331341" y="3210255"/>
             <a:ext cx="3535414" cy="1245573"/>
           </a:xfrm>
           <a:prstGeom prst="rect">
@@ -8946,6 +8941,297 @@
           </a:prstGeom>
         </p:spPr>
       </p:pic>
+      <p:sp>
+        <p:nvSpPr>
+          <p:cNvPr id="5" name="Content Placeholder 2"/>
+          <p:cNvSpPr txBox="1">
+            <a:spLocks/>
+          </p:cNvSpPr>
+          <p:nvPr/>
+        </p:nvSpPr>
+        <p:spPr>
+          <a:xfrm>
+            <a:off x="775845" y="2093976"/>
+            <a:ext cx="10058400" cy="1116279"/>
+          </a:xfrm>
+          <a:prstGeom prst="rect">
+            <a:avLst/>
+          </a:prstGeom>
+        </p:spPr>
+        <p:txBody>
+          <a:bodyPr vert="horz" lIns="91440" tIns="45720" rIns="91440" bIns="45720" rtlCol="0">
+            <a:normAutofit/>
+          </a:bodyPr>
+          <a:lstStyle>
+            <a:lvl1pPr marL="182880" indent="-182880" algn="l" defTabSz="914400" rtl="0" eaLnBrk="1" latinLnBrk="0" hangingPunct="1">
+              <a:lnSpc>
+                <a:spcPct val="90000"/>
+              </a:lnSpc>
+              <a:spcBef>
+                <a:spcPts val="1200"/>
+              </a:spcBef>
+              <a:buClr>
+                <a:schemeClr val="accent1">
+                  <a:lumMod val="75000"/>
+                </a:schemeClr>
+              </a:buClr>
+              <a:buSzPct val="85000"/>
+              <a:buFont typeface="Wingdings" pitchFamily="2" charset="2"/>
+              <a:buChar char="§"/>
+              <a:defRPr sz="2000" kern="1200">
+                <a:solidFill>
+                  <a:schemeClr val="tx1"/>
+                </a:solidFill>
+                <a:latin typeface="+mn-lt"/>
+                <a:ea typeface="+mn-ea"/>
+                <a:cs typeface="+mn-cs"/>
+              </a:defRPr>
+            </a:lvl1pPr>
+            <a:lvl2pPr marL="457200" indent="-182880" algn="l" defTabSz="914400" rtl="0" eaLnBrk="1" latinLnBrk="0" hangingPunct="1">
+              <a:lnSpc>
+                <a:spcPct val="90000"/>
+              </a:lnSpc>
+              <a:spcBef>
+                <a:spcPts val="400"/>
+              </a:spcBef>
+              <a:spcAft>
+                <a:spcPts val="200"/>
+              </a:spcAft>
+              <a:buClr>
+                <a:schemeClr val="accent1">
+                  <a:lumMod val="75000"/>
+                </a:schemeClr>
+              </a:buClr>
+              <a:buSzPct val="85000"/>
+              <a:buFont typeface="Wingdings" pitchFamily="2" charset="2"/>
+              <a:buChar char="§"/>
+              <a:defRPr sz="1800" kern="1200">
+                <a:solidFill>
+                  <a:schemeClr val="tx1"/>
+                </a:solidFill>
+                <a:latin typeface="+mn-lt"/>
+                <a:ea typeface="+mn-ea"/>
+                <a:cs typeface="+mn-cs"/>
+              </a:defRPr>
+            </a:lvl2pPr>
+            <a:lvl3pPr marL="731520" indent="-182880" algn="l" defTabSz="914400" rtl="0" eaLnBrk="1" latinLnBrk="0" hangingPunct="1">
+              <a:lnSpc>
+                <a:spcPct val="90000"/>
+              </a:lnSpc>
+              <a:spcBef>
+                <a:spcPts val="400"/>
+              </a:spcBef>
+              <a:spcAft>
+                <a:spcPts val="200"/>
+              </a:spcAft>
+              <a:buClr>
+                <a:schemeClr val="accent1">
+                  <a:lumMod val="75000"/>
+                </a:schemeClr>
+              </a:buClr>
+              <a:buSzPct val="85000"/>
+              <a:buFont typeface="Wingdings" pitchFamily="2" charset="2"/>
+              <a:buChar char="§"/>
+              <a:defRPr sz="1600" kern="1200">
+                <a:solidFill>
+                  <a:schemeClr val="tx1"/>
+                </a:solidFill>
+                <a:latin typeface="+mn-lt"/>
+                <a:ea typeface="+mn-ea"/>
+                <a:cs typeface="+mn-cs"/>
+              </a:defRPr>
+            </a:lvl3pPr>
+            <a:lvl4pPr marL="1005840" indent="-182880" algn="l" defTabSz="914400" rtl="0" eaLnBrk="1" latinLnBrk="0" hangingPunct="1">
+              <a:lnSpc>
+                <a:spcPct val="90000"/>
+              </a:lnSpc>
+              <a:spcBef>
+                <a:spcPts val="400"/>
+              </a:spcBef>
+              <a:spcAft>
+                <a:spcPts val="200"/>
+              </a:spcAft>
+              <a:buClr>
+                <a:schemeClr val="accent1">
+                  <a:lumMod val="75000"/>
+                </a:schemeClr>
+              </a:buClr>
+              <a:buSzPct val="85000"/>
+              <a:buFont typeface="Wingdings" pitchFamily="2" charset="2"/>
+              <a:buChar char="§"/>
+              <a:defRPr sz="1600" kern="1200">
+                <a:solidFill>
+                  <a:schemeClr val="tx1"/>
+                </a:solidFill>
+                <a:latin typeface="+mn-lt"/>
+                <a:ea typeface="+mn-ea"/>
+                <a:cs typeface="+mn-cs"/>
+              </a:defRPr>
+            </a:lvl4pPr>
+            <a:lvl5pPr marL="1280160" indent="-182880" algn="l" defTabSz="914400" rtl="0" eaLnBrk="1" latinLnBrk="0" hangingPunct="1">
+              <a:lnSpc>
+                <a:spcPct val="90000"/>
+              </a:lnSpc>
+              <a:spcBef>
+                <a:spcPts val="400"/>
+              </a:spcBef>
+              <a:spcAft>
+                <a:spcPts val="200"/>
+              </a:spcAft>
+              <a:buClr>
+                <a:schemeClr val="accent1">
+                  <a:lumMod val="75000"/>
+                </a:schemeClr>
+              </a:buClr>
+              <a:buSzPct val="85000"/>
+              <a:buFont typeface="Wingdings" pitchFamily="2" charset="2"/>
+              <a:buChar char="§"/>
+              <a:defRPr sz="1600" kern="1200">
+                <a:solidFill>
+                  <a:schemeClr val="tx1"/>
+                </a:solidFill>
+                <a:latin typeface="+mn-lt"/>
+                <a:ea typeface="+mn-ea"/>
+                <a:cs typeface="+mn-cs"/>
+              </a:defRPr>
+            </a:lvl5pPr>
+            <a:lvl6pPr marL="1600000" indent="-228600" algn="l" defTabSz="914400" rtl="0" eaLnBrk="1" latinLnBrk="0" hangingPunct="1">
+              <a:lnSpc>
+                <a:spcPct val="90000"/>
+              </a:lnSpc>
+              <a:spcBef>
+                <a:spcPts val="400"/>
+              </a:spcBef>
+              <a:spcAft>
+                <a:spcPts val="200"/>
+              </a:spcAft>
+              <a:buClr>
+                <a:schemeClr val="accent1">
+                  <a:lumMod val="75000"/>
+                </a:schemeClr>
+              </a:buClr>
+              <a:buSzPct val="85000"/>
+              <a:buFont typeface="Wingdings" pitchFamily="2" charset="2"/>
+              <a:buChar char="§"/>
+              <a:defRPr sz="1600" kern="1200">
+                <a:solidFill>
+                  <a:schemeClr val="tx1"/>
+                </a:solidFill>
+                <a:latin typeface="+mn-lt"/>
+                <a:ea typeface="+mn-ea"/>
+                <a:cs typeface="+mn-cs"/>
+              </a:defRPr>
+            </a:lvl6pPr>
+            <a:lvl7pPr marL="1900000" indent="-228600" algn="l" defTabSz="914400" rtl="0" eaLnBrk="1" latinLnBrk="0" hangingPunct="1">
+              <a:lnSpc>
+                <a:spcPct val="90000"/>
+              </a:lnSpc>
+              <a:spcBef>
+                <a:spcPts val="400"/>
+              </a:spcBef>
+              <a:spcAft>
+                <a:spcPts val="200"/>
+              </a:spcAft>
+              <a:buClr>
+                <a:schemeClr val="accent1">
+                  <a:lumMod val="75000"/>
+                </a:schemeClr>
+              </a:buClr>
+              <a:buSzPct val="85000"/>
+              <a:buFont typeface="Wingdings" pitchFamily="2" charset="2"/>
+              <a:buChar char="§"/>
+              <a:defRPr sz="1600" kern="1200">
+                <a:solidFill>
+                  <a:schemeClr val="tx1"/>
+                </a:solidFill>
+                <a:latin typeface="+mn-lt"/>
+                <a:ea typeface="+mn-ea"/>
+                <a:cs typeface="+mn-cs"/>
+              </a:defRPr>
+            </a:lvl7pPr>
+            <a:lvl8pPr marL="2200000" indent="-228600" algn="l" defTabSz="914400" rtl="0" eaLnBrk="1" latinLnBrk="0" hangingPunct="1">
+              <a:lnSpc>
+                <a:spcPct val="90000"/>
+              </a:lnSpc>
+              <a:spcBef>
+                <a:spcPts val="400"/>
+              </a:spcBef>
+              <a:spcAft>
+                <a:spcPts val="200"/>
+              </a:spcAft>
+              <a:buClr>
+                <a:schemeClr val="accent1">
+                  <a:lumMod val="75000"/>
+                </a:schemeClr>
+              </a:buClr>
+              <a:buSzPct val="85000"/>
+              <a:buFont typeface="Wingdings" pitchFamily="2" charset="2"/>
+              <a:buChar char="§"/>
+              <a:defRPr sz="1600" kern="1200">
+                <a:solidFill>
+                  <a:schemeClr val="tx1"/>
+                </a:solidFill>
+                <a:latin typeface="+mn-lt"/>
+                <a:ea typeface="+mn-ea"/>
+                <a:cs typeface="+mn-cs"/>
+              </a:defRPr>
+            </a:lvl8pPr>
+            <a:lvl9pPr marL="2500000" indent="-228600" algn="l" defTabSz="914400" rtl="0" eaLnBrk="1" latinLnBrk="0" hangingPunct="1">
+              <a:lnSpc>
+                <a:spcPct val="90000"/>
+              </a:lnSpc>
+              <a:spcBef>
+                <a:spcPts val="400"/>
+              </a:spcBef>
+              <a:spcAft>
+                <a:spcPts val="200"/>
+              </a:spcAft>
+              <a:buClr>
+                <a:schemeClr val="accent1">
+                  <a:lumMod val="75000"/>
+                </a:schemeClr>
+              </a:buClr>
+              <a:buSzPct val="85000"/>
+              <a:buFont typeface="Wingdings" pitchFamily="2" charset="2"/>
+              <a:buChar char="§"/>
+              <a:defRPr sz="1600" kern="1200">
+                <a:solidFill>
+                  <a:schemeClr val="tx1"/>
+                </a:solidFill>
+                <a:latin typeface="+mn-lt"/>
+                <a:ea typeface="+mn-ea"/>
+                <a:cs typeface="+mn-cs"/>
+              </a:defRPr>
+            </a:lvl9pPr>
+          </a:lstStyle>
+          <a:p>
+            <a:r>
+              <a:rPr lang="es-ES_tradnl" sz="2400" dirty="0"/>
+              <a:t>El </a:t>
+            </a:r>
+            <a:r>
+              <a:rPr lang="es-ES_tradnl" sz="2400" dirty="0" smtClean="0"/>
+              <a:t>error relativo fue </a:t>
+            </a:r>
+            <a:r>
+              <a:rPr lang="es-ES_tradnl" sz="2400" dirty="0"/>
+              <a:t>del orden de </a:t>
+            </a:r>
+            <a:r>
+              <a:rPr lang="es-ES_tradnl" sz="2400" dirty="0" smtClean="0"/>
+              <a:t>10</a:t>
+            </a:r>
+            <a:r>
+              <a:rPr lang="es-ES_tradnl" sz="2400" baseline="30000" dirty="0" smtClean="0"/>
+              <a:t>-15</a:t>
+            </a:r>
+            <a:r>
+              <a:rPr lang="es-ES_tradnl" sz="2400" dirty="0"/>
+              <a:t>.</a:t>
+            </a:r>
+          </a:p>
+        </p:txBody>
+      </p:sp>
     </p:spTree>
     <p:extLst>
       <p:ext uri="{BB962C8B-B14F-4D97-AF65-F5344CB8AC3E}">
@@ -11975,7 +12261,7 @@
           <p:cNvPr id="6" name="Marcador de contenido 5">
             <a:extLst>
               <a:ext uri="{FF2B5EF4-FFF2-40B4-BE49-F238E27FC236}">
-                <a16:creationId xmlns:a16="http://schemas.microsoft.com/office/drawing/2014/main" id="{23D41DC1-16F7-498C-8C38-3F268A285C40}"/>
+                <a16:creationId xmlns="" xmlns:a16="http://schemas.microsoft.com/office/drawing/2014/main" id="{23D41DC1-16F7-498C-8C38-3F268A285C40}"/>
               </a:ext>
             </a:extLst>
           </p:cNvPr>
@@ -12005,7 +12291,7 @@
           <p:cNvPr id="27" name="Content Placeholder 10">
             <a:extLst>
               <a:ext uri="{FF2B5EF4-FFF2-40B4-BE49-F238E27FC236}">
-                <a16:creationId xmlns:a16="http://schemas.microsoft.com/office/drawing/2014/main" id="{ECBD1444-430D-480D-8E00-07AC237FD6F9}"/>
+                <a16:creationId xmlns="" xmlns:a16="http://schemas.microsoft.com/office/drawing/2014/main" id="{ECBD1444-430D-480D-8E00-07AC237FD6F9}"/>
               </a:ext>
             </a:extLst>
           </p:cNvPr>
@@ -12091,7 +12377,7 @@
           <p:cNvPr id="4" name="Título 3">
             <a:extLst>
               <a:ext uri="{FF2B5EF4-FFF2-40B4-BE49-F238E27FC236}">
-                <a16:creationId xmlns:a16="http://schemas.microsoft.com/office/drawing/2014/main" id="{1EED4081-E428-4AAC-8F91-9FB80487ADE2}"/>
+                <a16:creationId xmlns="" xmlns:a16="http://schemas.microsoft.com/office/drawing/2014/main" id="{1EED4081-E428-4AAC-8F91-9FB80487ADE2}"/>
               </a:ext>
             </a:extLst>
           </p:cNvPr>
@@ -12197,7 +12483,7 @@
           <p:cNvPr id="6" name="Imagen 5">
             <a:extLst>
               <a:ext uri="{FF2B5EF4-FFF2-40B4-BE49-F238E27FC236}">
-                <a16:creationId xmlns:a16="http://schemas.microsoft.com/office/drawing/2014/main" id="{9D5E962C-9996-4E68-AB37-F3934F0727D0}"/>
+                <a16:creationId xmlns="" xmlns:a16="http://schemas.microsoft.com/office/drawing/2014/main" id="{9D5E962C-9996-4E68-AB37-F3934F0727D0}"/>
               </a:ext>
             </a:extLst>
           </p:cNvPr>
@@ -12227,7 +12513,7 @@
           <p:cNvPr id="8" name="Conector recto de flecha 7">
             <a:extLst>
               <a:ext uri="{FF2B5EF4-FFF2-40B4-BE49-F238E27FC236}">
-                <a16:creationId xmlns:a16="http://schemas.microsoft.com/office/drawing/2014/main" id="{4CF654CC-9649-4D13-BCF8-3A8B2183FFD4}"/>
+                <a16:creationId xmlns="" xmlns:a16="http://schemas.microsoft.com/office/drawing/2014/main" id="{4CF654CC-9649-4D13-BCF8-3A8B2183FFD4}"/>
               </a:ext>
             </a:extLst>
           </p:cNvPr>
@@ -12266,7 +12552,7 @@
           <p:cNvPr id="10" name="Imagen 9">
             <a:extLst>
               <a:ext uri="{FF2B5EF4-FFF2-40B4-BE49-F238E27FC236}">
-                <a16:creationId xmlns:a16="http://schemas.microsoft.com/office/drawing/2014/main" id="{19FE01A7-2E58-45CF-B53A-06C162079B06}"/>
+                <a16:creationId xmlns="" xmlns:a16="http://schemas.microsoft.com/office/drawing/2014/main" id="{19FE01A7-2E58-45CF-B53A-06C162079B06}"/>
               </a:ext>
             </a:extLst>
           </p:cNvPr>
@@ -12296,7 +12582,7 @@
           <p:cNvPr id="13" name="Imagen 12">
             <a:extLst>
               <a:ext uri="{FF2B5EF4-FFF2-40B4-BE49-F238E27FC236}">
-                <a16:creationId xmlns:a16="http://schemas.microsoft.com/office/drawing/2014/main" id="{C37197B3-7E12-4321-9631-01C8C41DE7ED}"/>
+                <a16:creationId xmlns="" xmlns:a16="http://schemas.microsoft.com/office/drawing/2014/main" id="{C37197B3-7E12-4321-9631-01C8C41DE7ED}"/>
               </a:ext>
             </a:extLst>
           </p:cNvPr>
@@ -12385,7 +12671,7 @@
           <p:cNvPr id="4" name="Imagen 3">
             <a:extLst>
               <a:ext uri="{FF2B5EF4-FFF2-40B4-BE49-F238E27FC236}">
-                <a16:creationId xmlns:a16="http://schemas.microsoft.com/office/drawing/2014/main" id="{22EBF1D6-84F7-42D3-B3D7-B0537994E33C}"/>
+                <a16:creationId xmlns="" xmlns:a16="http://schemas.microsoft.com/office/drawing/2014/main" id="{22EBF1D6-84F7-42D3-B3D7-B0537994E33C}"/>
               </a:ext>
             </a:extLst>
           </p:cNvPr>
@@ -12414,7 +12700,7 @@
           <p:cNvPr id="18" name="Content Placeholder 10">
             <a:extLst>
               <a:ext uri="{FF2B5EF4-FFF2-40B4-BE49-F238E27FC236}">
-                <a16:creationId xmlns:a16="http://schemas.microsoft.com/office/drawing/2014/main" id="{90672348-6608-45D4-89A7-3650AB93C70D}"/>
+                <a16:creationId xmlns="" xmlns:a16="http://schemas.microsoft.com/office/drawing/2014/main" id="{90672348-6608-45D4-89A7-3650AB93C70D}"/>
               </a:ext>
             </a:extLst>
           </p:cNvPr>

</xml_diff>